<commit_message>
changed the grey cards to horizontal to not confuse them with the upper cards.
</commit_message>
<xml_diff>
--- a/chapter_03/figures/integrated_experimental_strategy.pptx
+++ b/chapter_03/figures/integrated_experimental_strategy.pptx
@@ -118,7 +118,7 @@
 <file path=ppt/revisionInfo.xml><?xml version="1.0" encoding="utf-8"?>
 <p1510:revInfo xmlns:a="http://schemas.openxmlformats.org/drawingml/2006/main" xmlns:r="http://schemas.openxmlformats.org/officeDocument/2006/relationships" xmlns:p1510="http://schemas.microsoft.com/office/powerpoint/2015/10/main">
   <p1510:revLst>
-    <p1510:client id="{F0B9C950-5C19-45BA-B39E-FADB59417D97}" v="20" dt="2025-06-18T09:01:54.018"/>
+    <p1510:client id="{F0B9C950-5C19-45BA-B39E-FADB59417D97}" v="31" dt="2025-06-18T10:36:03.249"/>
   </p1510:revLst>
 </p1510:revInfo>
 </file>
@@ -128,12 +128,12 @@
   <pc:docChgLst>
     <pc:chgData name="Fatima Pillosu" userId="a6295d4dc9e22643" providerId="LiveId" clId="{F0B9C950-5C19-45BA-B39E-FADB59417D97}"/>
     <pc:docChg chg="undo redo custSel modSld">
-      <pc:chgData name="Fatima Pillosu" userId="a6295d4dc9e22643" providerId="LiveId" clId="{F0B9C950-5C19-45BA-B39E-FADB59417D97}" dt="2025-06-18T09:02:35.561" v="1163" actId="20577"/>
+      <pc:chgData name="Fatima Pillosu" userId="a6295d4dc9e22643" providerId="LiveId" clId="{F0B9C950-5C19-45BA-B39E-FADB59417D97}" dt="2025-06-18T10:36:54.156" v="1432" actId="478"/>
       <pc:docMkLst>
         <pc:docMk/>
       </pc:docMkLst>
       <pc:sldChg chg="addSp delSp modSp mod">
-        <pc:chgData name="Fatima Pillosu" userId="a6295d4dc9e22643" providerId="LiveId" clId="{F0B9C950-5C19-45BA-B39E-FADB59417D97}" dt="2025-06-18T09:02:35.561" v="1163" actId="20577"/>
+        <pc:chgData name="Fatima Pillosu" userId="a6295d4dc9e22643" providerId="LiveId" clId="{F0B9C950-5C19-45BA-B39E-FADB59417D97}" dt="2025-06-18T10:36:54.156" v="1432" actId="478"/>
         <pc:sldMkLst>
           <pc:docMk/>
           <pc:sldMk cId="2412790101" sldId="256"/>
@@ -154,6 +154,14 @@
             <ac:spMk id="2" creationId="{68487C72-9A74-02CF-F4A3-96805D5B2F75}"/>
           </ac:spMkLst>
         </pc:spChg>
+        <pc:spChg chg="add mod">
+          <ac:chgData name="Fatima Pillosu" userId="a6295d4dc9e22643" providerId="LiveId" clId="{F0B9C950-5C19-45BA-B39E-FADB59417D97}" dt="2025-06-18T10:32:02.515" v="1303" actId="554"/>
+          <ac:spMkLst>
+            <pc:docMk/>
+            <pc:sldMk cId="2412790101" sldId="256"/>
+            <ac:spMk id="2" creationId="{E90C6C9F-C26A-BA0C-97C9-D400337436C7}"/>
+          </ac:spMkLst>
+        </pc:spChg>
         <pc:spChg chg="add del">
           <ac:chgData name="Fatima Pillosu" userId="a6295d4dc9e22643" providerId="LiveId" clId="{F0B9C950-5C19-45BA-B39E-FADB59417D97}" dt="2025-06-18T08:55:46.345" v="1021" actId="478"/>
           <ac:spMkLst>
@@ -171,11 +179,27 @@
           </ac:spMkLst>
         </pc:spChg>
         <pc:spChg chg="add del mod">
+          <ac:chgData name="Fatima Pillosu" userId="a6295d4dc9e22643" providerId="LiveId" clId="{F0B9C950-5C19-45BA-B39E-FADB59417D97}" dt="2025-06-18T10:29:17.266" v="1253" actId="14100"/>
+          <ac:spMkLst>
+            <pc:docMk/>
+            <pc:sldMk cId="2412790101" sldId="256"/>
+            <ac:spMk id="3" creationId="{5137CFD3-310B-C4B7-5CBF-D6EBE8384DFF}"/>
+          </ac:spMkLst>
+        </pc:spChg>
+        <pc:spChg chg="add del mod">
+          <ac:chgData name="Fatima Pillosu" userId="a6295d4dc9e22643" providerId="LiveId" clId="{F0B9C950-5C19-45BA-B39E-FADB59417D97}" dt="2025-06-16T21:12:06.361" v="61" actId="21"/>
+          <ac:spMkLst>
+            <pc:docMk/>
+            <pc:sldMk cId="2412790101" sldId="256"/>
+            <ac:spMk id="4" creationId="{4E1DAB7F-CDAC-4060-D2E3-855C223F00C0}"/>
+          </ac:spMkLst>
+        </pc:spChg>
+        <pc:spChg chg="add del mod">
           <ac:chgData name="Fatima Pillosu" userId="a6295d4dc9e22643" providerId="LiveId" clId="{F0B9C950-5C19-45BA-B39E-FADB59417D97}" dt="2025-06-18T09:01:54.017" v="1162"/>
           <ac:spMkLst>
             <pc:docMk/>
             <pc:sldMk cId="2412790101" sldId="256"/>
-            <ac:spMk id="3" creationId="{5137CFD3-310B-C4B7-5CBF-D6EBE8384DFF}"/>
+            <ac:spMk id="4" creationId="{E38ABB4D-863F-E734-71F8-6A361F5E1DE3}"/>
           </ac:spMkLst>
         </pc:spChg>
         <pc:spChg chg="add del mod">
@@ -183,7 +207,7 @@
           <ac:spMkLst>
             <pc:docMk/>
             <pc:sldMk cId="2412790101" sldId="256"/>
-            <ac:spMk id="4" creationId="{4E1DAB7F-CDAC-4060-D2E3-855C223F00C0}"/>
+            <ac:spMk id="5" creationId="{1FE71E37-6166-0490-58E8-888C8B970604}"/>
           </ac:spMkLst>
         </pc:spChg>
         <pc:spChg chg="add del mod">
@@ -191,7 +215,15 @@
           <ac:spMkLst>
             <pc:docMk/>
             <pc:sldMk cId="2412790101" sldId="256"/>
-            <ac:spMk id="4" creationId="{E38ABB4D-863F-E734-71F8-6A361F5E1DE3}"/>
+            <ac:spMk id="5" creationId="{887FF438-27CB-7933-3FF0-750C83E136A4}"/>
+          </ac:spMkLst>
+        </pc:spChg>
+        <pc:spChg chg="add del mod">
+          <ac:chgData name="Fatima Pillosu" userId="a6295d4dc9e22643" providerId="LiveId" clId="{F0B9C950-5C19-45BA-B39E-FADB59417D97}" dt="2025-06-18T09:01:54.017" v="1162"/>
+          <ac:spMkLst>
+            <pc:docMk/>
+            <pc:sldMk cId="2412790101" sldId="256"/>
+            <ac:spMk id="6" creationId="{94699DC0-F296-4F13-1267-BB22E3869038}"/>
           </ac:spMkLst>
         </pc:spChg>
         <pc:spChg chg="add del mod">
@@ -199,7 +231,15 @@
           <ac:spMkLst>
             <pc:docMk/>
             <pc:sldMk cId="2412790101" sldId="256"/>
-            <ac:spMk id="5" creationId="{1FE71E37-6166-0490-58E8-888C8B970604}"/>
+            <ac:spMk id="6" creationId="{951A946F-24FC-86A6-3A72-C8D4D2433C01}"/>
+          </ac:spMkLst>
+        </pc:spChg>
+        <pc:spChg chg="add del mod">
+          <ac:chgData name="Fatima Pillosu" userId="a6295d4dc9e22643" providerId="LiveId" clId="{F0B9C950-5C19-45BA-B39E-FADB59417D97}" dt="2025-06-16T21:12:06.361" v="61" actId="21"/>
+          <ac:spMkLst>
+            <pc:docMk/>
+            <pc:sldMk cId="2412790101" sldId="256"/>
+            <ac:spMk id="7" creationId="{B6D31BEC-12CE-7910-9855-7BC31BC02FE2}"/>
           </ac:spMkLst>
         </pc:spChg>
         <pc:spChg chg="add del mod">
@@ -207,7 +247,7 @@
           <ac:spMkLst>
             <pc:docMk/>
             <pc:sldMk cId="2412790101" sldId="256"/>
-            <ac:spMk id="5" creationId="{887FF438-27CB-7933-3FF0-750C83E136A4}"/>
+            <ac:spMk id="7" creationId="{B70B7DAE-BBF8-26B9-F316-694D75EF55A1}"/>
           </ac:spMkLst>
         </pc:spChg>
         <pc:spChg chg="add del mod">
@@ -215,7 +255,7 @@
           <ac:spMkLst>
             <pc:docMk/>
             <pc:sldMk cId="2412790101" sldId="256"/>
-            <ac:spMk id="6" creationId="{94699DC0-F296-4F13-1267-BB22E3869038}"/>
+            <ac:spMk id="8" creationId="{DA0A3A3F-6F21-9FFB-DFE8-C73B8123777A}"/>
           </ac:spMkLst>
         </pc:spChg>
         <pc:spChg chg="add del mod">
@@ -223,7 +263,7 @@
           <ac:spMkLst>
             <pc:docMk/>
             <pc:sldMk cId="2412790101" sldId="256"/>
-            <ac:spMk id="6" creationId="{951A946F-24FC-86A6-3A72-C8D4D2433C01}"/>
+            <ac:spMk id="8" creationId="{F2436088-889E-27F8-2EEF-6C1B25EEB125}"/>
           </ac:spMkLst>
         </pc:spChg>
         <pc:spChg chg="add del mod">
@@ -231,7 +271,7 @@
           <ac:spMkLst>
             <pc:docMk/>
             <pc:sldMk cId="2412790101" sldId="256"/>
-            <ac:spMk id="7" creationId="{B6D31BEC-12CE-7910-9855-7BC31BC02FE2}"/>
+            <ac:spMk id="9" creationId="{B8281EE7-93D6-9B18-595D-356FDEF8B848}"/>
           </ac:spMkLst>
         </pc:spChg>
         <pc:spChg chg="add del mod">
@@ -239,7 +279,7 @@
           <ac:spMkLst>
             <pc:docMk/>
             <pc:sldMk cId="2412790101" sldId="256"/>
-            <ac:spMk id="7" creationId="{B70B7DAE-BBF8-26B9-F316-694D75EF55A1}"/>
+            <ac:spMk id="9" creationId="{DB5FE5E2-2AF1-E6C3-A893-A13186B11D78}"/>
           </ac:spMkLst>
         </pc:spChg>
         <pc:spChg chg="add del mod">
@@ -247,7 +287,7 @@
           <ac:spMkLst>
             <pc:docMk/>
             <pc:sldMk cId="2412790101" sldId="256"/>
-            <ac:spMk id="8" creationId="{DA0A3A3F-6F21-9FFB-DFE8-C73B8123777A}"/>
+            <ac:spMk id="10" creationId="{C697B761-747A-2315-B6B9-C750C47D99DC}"/>
           </ac:spMkLst>
         </pc:spChg>
         <pc:spChg chg="add del mod">
@@ -255,7 +295,15 @@
           <ac:spMkLst>
             <pc:docMk/>
             <pc:sldMk cId="2412790101" sldId="256"/>
-            <ac:spMk id="8" creationId="{F2436088-889E-27F8-2EEF-6C1B25EEB125}"/>
+            <ac:spMk id="10" creationId="{CE44919F-0651-92AF-E13E-2D5F82DA4C89}"/>
+          </ac:spMkLst>
+        </pc:spChg>
+        <pc:spChg chg="add del mod">
+          <ac:chgData name="Fatima Pillosu" userId="a6295d4dc9e22643" providerId="LiveId" clId="{F0B9C950-5C19-45BA-B39E-FADB59417D97}" dt="2025-06-18T09:01:54.017" v="1162"/>
+          <ac:spMkLst>
+            <pc:docMk/>
+            <pc:sldMk cId="2412790101" sldId="256"/>
+            <ac:spMk id="11" creationId="{3FA77F1B-56D8-FF8C-7ECE-F7D395C2B6A3}"/>
           </ac:spMkLst>
         </pc:spChg>
         <pc:spChg chg="add del mod">
@@ -263,7 +311,7 @@
           <ac:spMkLst>
             <pc:docMk/>
             <pc:sldMk cId="2412790101" sldId="256"/>
-            <ac:spMk id="9" creationId="{B8281EE7-93D6-9B18-595D-356FDEF8B848}"/>
+            <ac:spMk id="11" creationId="{4D2985CE-5085-0BF7-A4F9-0E6DCBB6E8FF}"/>
           </ac:spMkLst>
         </pc:spChg>
         <pc:spChg chg="add del mod">
@@ -271,7 +319,15 @@
           <ac:spMkLst>
             <pc:docMk/>
             <pc:sldMk cId="2412790101" sldId="256"/>
-            <ac:spMk id="9" creationId="{DB5FE5E2-2AF1-E6C3-A893-A13186B11D78}"/>
+            <ac:spMk id="12" creationId="{44B1E732-CD1A-C841-C76B-2D4E477D2BEA}"/>
+          </ac:spMkLst>
+        </pc:spChg>
+        <pc:spChg chg="add del mod">
+          <ac:chgData name="Fatima Pillosu" userId="a6295d4dc9e22643" providerId="LiveId" clId="{F0B9C950-5C19-45BA-B39E-FADB59417D97}" dt="2025-06-16T21:12:06.361" v="61" actId="21"/>
+          <ac:spMkLst>
+            <pc:docMk/>
+            <pc:sldMk cId="2412790101" sldId="256"/>
+            <ac:spMk id="12" creationId="{EE781A04-7C56-69E8-F789-9AA41BADF54F}"/>
           </ac:spMkLst>
         </pc:spChg>
         <pc:spChg chg="add del mod">
@@ -279,7 +335,7 @@
           <ac:spMkLst>
             <pc:docMk/>
             <pc:sldMk cId="2412790101" sldId="256"/>
-            <ac:spMk id="10" creationId="{C697B761-747A-2315-B6B9-C750C47D99DC}"/>
+            <ac:spMk id="13" creationId="{737BB970-06A3-D82D-DD59-9485C3A2FB34}"/>
           </ac:spMkLst>
         </pc:spChg>
         <pc:spChg chg="add del mod">
@@ -287,7 +343,15 @@
           <ac:spMkLst>
             <pc:docMk/>
             <pc:sldMk cId="2412790101" sldId="256"/>
-            <ac:spMk id="10" creationId="{CE44919F-0651-92AF-E13E-2D5F82DA4C89}"/>
+            <ac:spMk id="13" creationId="{7F657A6A-40E4-47E8-C3E4-1057A24F71BA}"/>
+          </ac:spMkLst>
+        </pc:spChg>
+        <pc:spChg chg="add del mod">
+          <ac:chgData name="Fatima Pillosu" userId="a6295d4dc9e22643" providerId="LiveId" clId="{F0B9C950-5C19-45BA-B39E-FADB59417D97}" dt="2025-06-16T21:12:06.361" v="61" actId="21"/>
+          <ac:spMkLst>
+            <pc:docMk/>
+            <pc:sldMk cId="2412790101" sldId="256"/>
+            <ac:spMk id="14" creationId="{3A5CD0EB-6B55-2725-6E3F-17726052CCE4}"/>
           </ac:spMkLst>
         </pc:spChg>
         <pc:spChg chg="add del mod">
@@ -295,7 +359,15 @@
           <ac:spMkLst>
             <pc:docMk/>
             <pc:sldMk cId="2412790101" sldId="256"/>
-            <ac:spMk id="11" creationId="{3FA77F1B-56D8-FF8C-7ECE-F7D395C2B6A3}"/>
+            <ac:spMk id="14" creationId="{88E5E416-C7A1-C227-031E-B35CF991FEFF}"/>
+          </ac:spMkLst>
+        </pc:spChg>
+        <pc:spChg chg="add del mod">
+          <ac:chgData name="Fatima Pillosu" userId="a6295d4dc9e22643" providerId="LiveId" clId="{F0B9C950-5C19-45BA-B39E-FADB59417D97}" dt="2025-06-18T09:01:54.017" v="1162"/>
+          <ac:spMkLst>
+            <pc:docMk/>
+            <pc:sldMk cId="2412790101" sldId="256"/>
+            <ac:spMk id="15" creationId="{761A0E4A-D491-74D5-90F0-C519DB1C25DC}"/>
           </ac:spMkLst>
         </pc:spChg>
         <pc:spChg chg="add del mod">
@@ -303,15 +375,7 @@
           <ac:spMkLst>
             <pc:docMk/>
             <pc:sldMk cId="2412790101" sldId="256"/>
-            <ac:spMk id="11" creationId="{4D2985CE-5085-0BF7-A4F9-0E6DCBB6E8FF}"/>
-          </ac:spMkLst>
-        </pc:spChg>
-        <pc:spChg chg="add del mod">
-          <ac:chgData name="Fatima Pillosu" userId="a6295d4dc9e22643" providerId="LiveId" clId="{F0B9C950-5C19-45BA-B39E-FADB59417D97}" dt="2025-06-18T09:01:54.017" v="1162"/>
-          <ac:spMkLst>
-            <pc:docMk/>
-            <pc:sldMk cId="2412790101" sldId="256"/>
-            <ac:spMk id="12" creationId="{44B1E732-CD1A-C841-C76B-2D4E477D2BEA}"/>
+            <ac:spMk id="15" creationId="{DA3F88A4-982E-EB2C-A843-AE6C9C1F2CF3}"/>
           </ac:spMkLst>
         </pc:spChg>
         <pc:spChg chg="add del mod">
@@ -319,15 +383,15 @@
           <ac:spMkLst>
             <pc:docMk/>
             <pc:sldMk cId="2412790101" sldId="256"/>
-            <ac:spMk id="12" creationId="{EE781A04-7C56-69E8-F789-9AA41BADF54F}"/>
-          </ac:spMkLst>
-        </pc:spChg>
-        <pc:spChg chg="add del mod">
-          <ac:chgData name="Fatima Pillosu" userId="a6295d4dc9e22643" providerId="LiveId" clId="{F0B9C950-5C19-45BA-B39E-FADB59417D97}" dt="2025-06-18T09:01:54.017" v="1162"/>
-          <ac:spMkLst>
-            <pc:docMk/>
-            <pc:sldMk cId="2412790101" sldId="256"/>
-            <ac:spMk id="13" creationId="{737BB970-06A3-D82D-DD59-9485C3A2FB34}"/>
+            <ac:spMk id="16" creationId="{0C70AC90-3132-131D-55B9-12D8EAA513A6}"/>
+          </ac:spMkLst>
+        </pc:spChg>
+        <pc:spChg chg="add del mod">
+          <ac:chgData name="Fatima Pillosu" userId="a6295d4dc9e22643" providerId="LiveId" clId="{F0B9C950-5C19-45BA-B39E-FADB59417D97}" dt="2025-06-18T09:02:35.561" v="1163" actId="20577"/>
+          <ac:spMkLst>
+            <pc:docMk/>
+            <pc:sldMk cId="2412790101" sldId="256"/>
+            <ac:spMk id="16" creationId="{5A52E58A-BA02-021E-4F28-6D976EBB835E}"/>
           </ac:spMkLst>
         </pc:spChg>
         <pc:spChg chg="add del mod">
@@ -335,7 +399,15 @@
           <ac:spMkLst>
             <pc:docMk/>
             <pc:sldMk cId="2412790101" sldId="256"/>
-            <ac:spMk id="13" creationId="{7F657A6A-40E4-47E8-C3E4-1057A24F71BA}"/>
+            <ac:spMk id="17" creationId="{10B3F3B2-D550-5D75-766F-A98D1A5E6D0B}"/>
+          </ac:spMkLst>
+        </pc:spChg>
+        <pc:spChg chg="add del mod">
+          <ac:chgData name="Fatima Pillosu" userId="a6295d4dc9e22643" providerId="LiveId" clId="{F0B9C950-5C19-45BA-B39E-FADB59417D97}" dt="2025-06-18T10:36:50.810" v="1431" actId="478"/>
+          <ac:spMkLst>
+            <pc:docMk/>
+            <pc:sldMk cId="2412790101" sldId="256"/>
+            <ac:spMk id="17" creationId="{4E1DAB7F-CDAC-4060-D2E3-855C223F00C0}"/>
           </ac:spMkLst>
         </pc:spChg>
         <pc:spChg chg="add del mod">
@@ -343,23 +415,15 @@
           <ac:spMkLst>
             <pc:docMk/>
             <pc:sldMk cId="2412790101" sldId="256"/>
-            <ac:spMk id="14" creationId="{3A5CD0EB-6B55-2725-6E3F-17726052CCE4}"/>
-          </ac:spMkLst>
-        </pc:spChg>
-        <pc:spChg chg="add del mod">
-          <ac:chgData name="Fatima Pillosu" userId="a6295d4dc9e22643" providerId="LiveId" clId="{F0B9C950-5C19-45BA-B39E-FADB59417D97}" dt="2025-06-18T09:01:54.017" v="1162"/>
-          <ac:spMkLst>
-            <pc:docMk/>
-            <pc:sldMk cId="2412790101" sldId="256"/>
-            <ac:spMk id="14" creationId="{88E5E416-C7A1-C227-031E-B35CF991FEFF}"/>
-          </ac:spMkLst>
-        </pc:spChg>
-        <pc:spChg chg="add del mod">
-          <ac:chgData name="Fatima Pillosu" userId="a6295d4dc9e22643" providerId="LiveId" clId="{F0B9C950-5C19-45BA-B39E-FADB59417D97}" dt="2025-06-18T09:01:54.017" v="1162"/>
-          <ac:spMkLst>
-            <pc:docMk/>
-            <pc:sldMk cId="2412790101" sldId="256"/>
-            <ac:spMk id="15" creationId="{761A0E4A-D491-74D5-90F0-C519DB1C25DC}"/>
+            <ac:spMk id="18" creationId="{13ABE3E0-2167-01FF-6150-9F5A8298C6B1}"/>
+          </ac:spMkLst>
+        </pc:spChg>
+        <pc:spChg chg="add del mod ord">
+          <ac:chgData name="Fatima Pillosu" userId="a6295d4dc9e22643" providerId="LiveId" clId="{F0B9C950-5C19-45BA-B39E-FADB59417D97}" dt="2025-06-18T10:29:32.827" v="1266" actId="1037"/>
+          <ac:spMkLst>
+            <pc:docMk/>
+            <pc:sldMk cId="2412790101" sldId="256"/>
+            <ac:spMk id="18" creationId="{1FE71E37-6166-0490-58E8-888C8B970604}"/>
           </ac:spMkLst>
         </pc:spChg>
         <pc:spChg chg="add del mod">
@@ -367,7 +431,15 @@
           <ac:spMkLst>
             <pc:docMk/>
             <pc:sldMk cId="2412790101" sldId="256"/>
-            <ac:spMk id="15" creationId="{DA3F88A4-982E-EB2C-A843-AE6C9C1F2CF3}"/>
+            <ac:spMk id="19" creationId="{0B4B8E5F-E463-3AEC-270F-183051860A7B}"/>
+          </ac:spMkLst>
+        </pc:spChg>
+        <pc:spChg chg="add del mod ord">
+          <ac:chgData name="Fatima Pillosu" userId="a6295d4dc9e22643" providerId="LiveId" clId="{F0B9C950-5C19-45BA-B39E-FADB59417D97}" dt="2025-06-18T10:29:32.827" v="1266" actId="1037"/>
+          <ac:spMkLst>
+            <pc:docMk/>
+            <pc:sldMk cId="2412790101" sldId="256"/>
+            <ac:spMk id="19" creationId="{951A946F-24FC-86A6-3A72-C8D4D2433C01}"/>
           </ac:spMkLst>
         </pc:spChg>
         <pc:spChg chg="add del mod">
@@ -375,15 +447,15 @@
           <ac:spMkLst>
             <pc:docMk/>
             <pc:sldMk cId="2412790101" sldId="256"/>
-            <ac:spMk id="16" creationId="{0C70AC90-3132-131D-55B9-12D8EAA513A6}"/>
-          </ac:spMkLst>
-        </pc:spChg>
-        <pc:spChg chg="add del mod">
-          <ac:chgData name="Fatima Pillosu" userId="a6295d4dc9e22643" providerId="LiveId" clId="{F0B9C950-5C19-45BA-B39E-FADB59417D97}" dt="2025-06-18T09:02:35.561" v="1163" actId="20577"/>
-          <ac:spMkLst>
-            <pc:docMk/>
-            <pc:sldMk cId="2412790101" sldId="256"/>
-            <ac:spMk id="16" creationId="{5A52E58A-BA02-021E-4F28-6D976EBB835E}"/>
+            <ac:spMk id="20" creationId="{A021CC37-1CD7-1EB2-79DA-105DD5A1F74A}"/>
+          </ac:spMkLst>
+        </pc:spChg>
+        <pc:spChg chg="add del mod">
+          <ac:chgData name="Fatima Pillosu" userId="a6295d4dc9e22643" providerId="LiveId" clId="{F0B9C950-5C19-45BA-B39E-FADB59417D97}" dt="2025-06-18T10:36:50.810" v="1431" actId="478"/>
+          <ac:spMkLst>
+            <pc:docMk/>
+            <pc:sldMk cId="2412790101" sldId="256"/>
+            <ac:spMk id="20" creationId="{B6D31BEC-12CE-7910-9855-7BC31BC02FE2}"/>
           </ac:spMkLst>
         </pc:spChg>
         <pc:spChg chg="add del mod">
@@ -391,79 +463,55 @@
           <ac:spMkLst>
             <pc:docMk/>
             <pc:sldMk cId="2412790101" sldId="256"/>
-            <ac:spMk id="17" creationId="{10B3F3B2-D550-5D75-766F-A98D1A5E6D0B}"/>
-          </ac:spMkLst>
-        </pc:spChg>
-        <pc:spChg chg="add del mod">
-          <ac:chgData name="Fatima Pillosu" userId="a6295d4dc9e22643" providerId="LiveId" clId="{F0B9C950-5C19-45BA-B39E-FADB59417D97}" dt="2025-06-18T09:01:54.017" v="1162"/>
-          <ac:spMkLst>
-            <pc:docMk/>
-            <pc:sldMk cId="2412790101" sldId="256"/>
-            <ac:spMk id="17" creationId="{4E1DAB7F-CDAC-4060-D2E3-855C223F00C0}"/>
-          </ac:spMkLst>
-        </pc:spChg>
-        <pc:spChg chg="add del mod">
-          <ac:chgData name="Fatima Pillosu" userId="a6295d4dc9e22643" providerId="LiveId" clId="{F0B9C950-5C19-45BA-B39E-FADB59417D97}" dt="2025-06-16T21:12:06.361" v="61" actId="21"/>
-          <ac:spMkLst>
-            <pc:docMk/>
-            <pc:sldMk cId="2412790101" sldId="256"/>
-            <ac:spMk id="18" creationId="{13ABE3E0-2167-01FF-6150-9F5A8298C6B1}"/>
-          </ac:spMkLst>
-        </pc:spChg>
-        <pc:spChg chg="add del mod">
-          <ac:chgData name="Fatima Pillosu" userId="a6295d4dc9e22643" providerId="LiveId" clId="{F0B9C950-5C19-45BA-B39E-FADB59417D97}" dt="2025-06-18T09:01:54.017" v="1162"/>
-          <ac:spMkLst>
-            <pc:docMk/>
-            <pc:sldMk cId="2412790101" sldId="256"/>
-            <ac:spMk id="18" creationId="{1FE71E37-6166-0490-58E8-888C8B970604}"/>
-          </ac:spMkLst>
-        </pc:spChg>
-        <pc:spChg chg="add del mod">
-          <ac:chgData name="Fatima Pillosu" userId="a6295d4dc9e22643" providerId="LiveId" clId="{F0B9C950-5C19-45BA-B39E-FADB59417D97}" dt="2025-06-16T21:12:06.361" v="61" actId="21"/>
-          <ac:spMkLst>
-            <pc:docMk/>
-            <pc:sldMk cId="2412790101" sldId="256"/>
-            <ac:spMk id="19" creationId="{0B4B8E5F-E463-3AEC-270F-183051860A7B}"/>
-          </ac:spMkLst>
-        </pc:spChg>
-        <pc:spChg chg="add del mod">
-          <ac:chgData name="Fatima Pillosu" userId="a6295d4dc9e22643" providerId="LiveId" clId="{F0B9C950-5C19-45BA-B39E-FADB59417D97}" dt="2025-06-18T09:01:54.017" v="1162"/>
-          <ac:spMkLst>
-            <pc:docMk/>
-            <pc:sldMk cId="2412790101" sldId="256"/>
-            <ac:spMk id="19" creationId="{951A946F-24FC-86A6-3A72-C8D4D2433C01}"/>
-          </ac:spMkLst>
-        </pc:spChg>
-        <pc:spChg chg="add del mod">
-          <ac:chgData name="Fatima Pillosu" userId="a6295d4dc9e22643" providerId="LiveId" clId="{F0B9C950-5C19-45BA-B39E-FADB59417D97}" dt="2025-06-16T21:12:06.361" v="61" actId="21"/>
-          <ac:spMkLst>
-            <pc:docMk/>
-            <pc:sldMk cId="2412790101" sldId="256"/>
-            <ac:spMk id="20" creationId="{A021CC37-1CD7-1EB2-79DA-105DD5A1F74A}"/>
-          </ac:spMkLst>
-        </pc:spChg>
-        <pc:spChg chg="add del mod">
-          <ac:chgData name="Fatima Pillosu" userId="a6295d4dc9e22643" providerId="LiveId" clId="{F0B9C950-5C19-45BA-B39E-FADB59417D97}" dt="2025-06-18T09:01:54.017" v="1162"/>
-          <ac:spMkLst>
-            <pc:docMk/>
-            <pc:sldMk cId="2412790101" sldId="256"/>
-            <ac:spMk id="20" creationId="{B6D31BEC-12CE-7910-9855-7BC31BC02FE2}"/>
-          </ac:spMkLst>
-        </pc:spChg>
-        <pc:spChg chg="add del mod">
-          <ac:chgData name="Fatima Pillosu" userId="a6295d4dc9e22643" providerId="LiveId" clId="{F0B9C950-5C19-45BA-B39E-FADB59417D97}" dt="2025-06-16T21:12:06.361" v="61" actId="21"/>
-          <ac:spMkLst>
-            <pc:docMk/>
-            <pc:sldMk cId="2412790101" sldId="256"/>
             <ac:spMk id="21" creationId="{1A09656C-CB17-5C56-2150-CB0A1765180D}"/>
           </ac:spMkLst>
         </pc:spChg>
         <pc:spChg chg="add del mod">
-          <ac:chgData name="Fatima Pillosu" userId="a6295d4dc9e22643" providerId="LiveId" clId="{F0B9C950-5C19-45BA-B39E-FADB59417D97}" dt="2025-06-18T09:01:54.017" v="1162"/>
+          <ac:chgData name="Fatima Pillosu" userId="a6295d4dc9e22643" providerId="LiveId" clId="{F0B9C950-5C19-45BA-B39E-FADB59417D97}" dt="2025-06-18T10:36:41.294" v="1430" actId="1035"/>
           <ac:spMkLst>
             <pc:docMk/>
             <pc:sldMk cId="2412790101" sldId="256"/>
             <ac:spMk id="21" creationId="{3A5CD0EB-6B55-2725-6E3F-17726052CCE4}"/>
+          </ac:spMkLst>
+        </pc:spChg>
+        <pc:spChg chg="add del mod">
+          <ac:chgData name="Fatima Pillosu" userId="a6295d4dc9e22643" providerId="LiveId" clId="{F0B9C950-5C19-45BA-B39E-FADB59417D97}" dt="2025-06-18T10:36:50.810" v="1431" actId="478"/>
+          <ac:spMkLst>
+            <pc:docMk/>
+            <pc:sldMk cId="2412790101" sldId="256"/>
+            <ac:spMk id="22" creationId="{DA3F88A4-982E-EB2C-A843-AE6C9C1F2CF3}"/>
+          </ac:spMkLst>
+        </pc:spChg>
+        <pc:spChg chg="add del mod">
+          <ac:chgData name="Fatima Pillosu" userId="a6295d4dc9e22643" providerId="LiveId" clId="{F0B9C950-5C19-45BA-B39E-FADB59417D97}" dt="2025-06-18T08:55:48.261" v="1022" actId="21"/>
+          <ac:spMkLst>
+            <pc:docMk/>
+            <pc:sldMk cId="2412790101" sldId="256"/>
+            <ac:spMk id="22" creationId="{E38ABB4D-863F-E734-71F8-6A361F5E1DE3}"/>
+          </ac:spMkLst>
+        </pc:spChg>
+        <pc:spChg chg="add del mod">
+          <ac:chgData name="Fatima Pillosu" userId="a6295d4dc9e22643" providerId="LiveId" clId="{F0B9C950-5C19-45BA-B39E-FADB59417D97}" dt="2025-06-18T10:36:50.810" v="1431" actId="478"/>
+          <ac:spMkLst>
+            <pc:docMk/>
+            <pc:sldMk cId="2412790101" sldId="256"/>
+            <ac:spMk id="23" creationId="{0C70AC90-3132-131D-55B9-12D8EAA513A6}"/>
+          </ac:spMkLst>
+        </pc:spChg>
+        <pc:spChg chg="add del mod">
+          <ac:chgData name="Fatima Pillosu" userId="a6295d4dc9e22643" providerId="LiveId" clId="{F0B9C950-5C19-45BA-B39E-FADB59417D97}" dt="2025-06-18T08:55:48.261" v="1022" actId="21"/>
+          <ac:spMkLst>
+            <pc:docMk/>
+            <pc:sldMk cId="2412790101" sldId="256"/>
+            <ac:spMk id="23" creationId="{887FF438-27CB-7933-3FF0-750C83E136A4}"/>
+          </ac:spMkLst>
+        </pc:spChg>
+        <pc:spChg chg="add del mod">
+          <ac:chgData name="Fatima Pillosu" userId="a6295d4dc9e22643" providerId="LiveId" clId="{F0B9C950-5C19-45BA-B39E-FADB59417D97}" dt="2025-06-18T08:55:48.261" v="1022" actId="21"/>
+          <ac:spMkLst>
+            <pc:docMk/>
+            <pc:sldMk cId="2412790101" sldId="256"/>
+            <ac:spMk id="24" creationId="{94699DC0-F296-4F13-1267-BB22E3869038}"/>
           </ac:spMkLst>
         </pc:spChg>
         <pc:spChg chg="add mod">
@@ -471,15 +519,7 @@
           <ac:spMkLst>
             <pc:docMk/>
             <pc:sldMk cId="2412790101" sldId="256"/>
-            <ac:spMk id="22" creationId="{DA3F88A4-982E-EB2C-A843-AE6C9C1F2CF3}"/>
-          </ac:spMkLst>
-        </pc:spChg>
-        <pc:spChg chg="add del mod">
-          <ac:chgData name="Fatima Pillosu" userId="a6295d4dc9e22643" providerId="LiveId" clId="{F0B9C950-5C19-45BA-B39E-FADB59417D97}" dt="2025-06-18T08:55:48.261" v="1022" actId="21"/>
-          <ac:spMkLst>
-            <pc:docMk/>
-            <pc:sldMk cId="2412790101" sldId="256"/>
-            <ac:spMk id="22" creationId="{E38ABB4D-863F-E734-71F8-6A361F5E1DE3}"/>
+            <ac:spMk id="24" creationId="{DD422E1D-E299-828A-BD94-EA3FE9B35B2F}"/>
           </ac:spMkLst>
         </pc:spChg>
         <pc:spChg chg="add mod">
@@ -487,7 +527,7 @@
           <ac:spMkLst>
             <pc:docMk/>
             <pc:sldMk cId="2412790101" sldId="256"/>
-            <ac:spMk id="23" creationId="{0C70AC90-3132-131D-55B9-12D8EAA513A6}"/>
+            <ac:spMk id="25" creationId="{3D8EC9DA-9022-BEAE-0FAC-C07CABA596E2}"/>
           </ac:spMkLst>
         </pc:spChg>
         <pc:spChg chg="add del mod">
@@ -495,15 +535,7 @@
           <ac:spMkLst>
             <pc:docMk/>
             <pc:sldMk cId="2412790101" sldId="256"/>
-            <ac:spMk id="23" creationId="{887FF438-27CB-7933-3FF0-750C83E136A4}"/>
-          </ac:spMkLst>
-        </pc:spChg>
-        <pc:spChg chg="add del mod">
-          <ac:chgData name="Fatima Pillosu" userId="a6295d4dc9e22643" providerId="LiveId" clId="{F0B9C950-5C19-45BA-B39E-FADB59417D97}" dt="2025-06-18T08:55:48.261" v="1022" actId="21"/>
-          <ac:spMkLst>
-            <pc:docMk/>
-            <pc:sldMk cId="2412790101" sldId="256"/>
-            <ac:spMk id="24" creationId="{94699DC0-F296-4F13-1267-BB22E3869038}"/>
+            <ac:spMk id="25" creationId="{B70B7DAE-BBF8-26B9-F316-694D75EF55A1}"/>
           </ac:spMkLst>
         </pc:spChg>
         <pc:spChg chg="add mod">
@@ -511,15 +543,263 @@
           <ac:spMkLst>
             <pc:docMk/>
             <pc:sldMk cId="2412790101" sldId="256"/>
-            <ac:spMk id="24" creationId="{DD422E1D-E299-828A-BD94-EA3FE9B35B2F}"/>
+            <ac:spMk id="26" creationId="{9097776E-A046-4D6E-89DA-50B1F5A3FAF4}"/>
+          </ac:spMkLst>
+        </pc:spChg>
+        <pc:spChg chg="add del mod">
+          <ac:chgData name="Fatima Pillosu" userId="a6295d4dc9e22643" providerId="LiveId" clId="{F0B9C950-5C19-45BA-B39E-FADB59417D97}" dt="2025-06-18T08:55:48.261" v="1022" actId="21"/>
+          <ac:spMkLst>
+            <pc:docMk/>
+            <pc:sldMk cId="2412790101" sldId="256"/>
+            <ac:spMk id="26" creationId="{DA0A3A3F-6F21-9FFB-DFE8-C73B8123777A}"/>
+          </ac:spMkLst>
+        </pc:spChg>
+        <pc:spChg chg="add del mod">
+          <ac:chgData name="Fatima Pillosu" userId="a6295d4dc9e22643" providerId="LiveId" clId="{F0B9C950-5C19-45BA-B39E-FADB59417D97}" dt="2025-06-18T10:36:50.810" v="1431" actId="478"/>
+          <ac:spMkLst>
+            <pc:docMk/>
+            <pc:sldMk cId="2412790101" sldId="256"/>
+            <ac:spMk id="27" creationId="{8528F7D7-A81B-BC37-30A6-95E2C4569922}"/>
+          </ac:spMkLst>
+        </pc:spChg>
+        <pc:spChg chg="add del mod">
+          <ac:chgData name="Fatima Pillosu" userId="a6295d4dc9e22643" providerId="LiveId" clId="{F0B9C950-5C19-45BA-B39E-FADB59417D97}" dt="2025-06-18T08:55:48.261" v="1022" actId="21"/>
+          <ac:spMkLst>
+            <pc:docMk/>
+            <pc:sldMk cId="2412790101" sldId="256"/>
+            <ac:spMk id="27" creationId="{DB5FE5E2-2AF1-E6C3-A893-A13186B11D78}"/>
+          </ac:spMkLst>
+        </pc:spChg>
+        <pc:spChg chg="add del mod">
+          <ac:chgData name="Fatima Pillosu" userId="a6295d4dc9e22643" providerId="LiveId" clId="{F0B9C950-5C19-45BA-B39E-FADB59417D97}" dt="2025-06-18T10:36:50.810" v="1431" actId="478"/>
+          <ac:spMkLst>
+            <pc:docMk/>
+            <pc:sldMk cId="2412790101" sldId="256"/>
+            <ac:spMk id="28" creationId="{24814AF3-44CD-F19E-FF61-4CCDCB6710C1}"/>
+          </ac:spMkLst>
+        </pc:spChg>
+        <pc:spChg chg="add del mod">
+          <ac:chgData name="Fatima Pillosu" userId="a6295d4dc9e22643" providerId="LiveId" clId="{F0B9C950-5C19-45BA-B39E-FADB59417D97}" dt="2025-06-18T08:55:48.261" v="1022" actId="21"/>
+          <ac:spMkLst>
+            <pc:docMk/>
+            <pc:sldMk cId="2412790101" sldId="256"/>
+            <ac:spMk id="28" creationId="{C697B761-747A-2315-B6B9-C750C47D99DC}"/>
+          </ac:spMkLst>
+        </pc:spChg>
+        <pc:spChg chg="add del mod">
+          <ac:chgData name="Fatima Pillosu" userId="a6295d4dc9e22643" providerId="LiveId" clId="{F0B9C950-5C19-45BA-B39E-FADB59417D97}" dt="2025-06-18T08:55:48.261" v="1022" actId="21"/>
+          <ac:spMkLst>
+            <pc:docMk/>
+            <pc:sldMk cId="2412790101" sldId="256"/>
+            <ac:spMk id="29" creationId="{3FA77F1B-56D8-FF8C-7ECE-F7D395C2B6A3}"/>
+          </ac:spMkLst>
+        </pc:spChg>
+        <pc:spChg chg="add del mod">
+          <ac:chgData name="Fatima Pillosu" userId="a6295d4dc9e22643" providerId="LiveId" clId="{F0B9C950-5C19-45BA-B39E-FADB59417D97}" dt="2025-06-18T10:36:50.810" v="1431" actId="478"/>
+          <ac:spMkLst>
+            <pc:docMk/>
+            <pc:sldMk cId="2412790101" sldId="256"/>
+            <ac:spMk id="29" creationId="{E6F79664-7D05-1CB7-9B16-7CF6037CB7F8}"/>
+          </ac:spMkLst>
+        </pc:spChg>
+        <pc:spChg chg="add del mod">
+          <ac:chgData name="Fatima Pillosu" userId="a6295d4dc9e22643" providerId="LiveId" clId="{F0B9C950-5C19-45BA-B39E-FADB59417D97}" dt="2025-06-18T08:55:48.261" v="1022" actId="21"/>
+          <ac:spMkLst>
+            <pc:docMk/>
+            <pc:sldMk cId="2412790101" sldId="256"/>
+            <ac:spMk id="30" creationId="{44B1E732-CD1A-C841-C76B-2D4E477D2BEA}"/>
+          </ac:spMkLst>
+        </pc:spChg>
+        <pc:spChg chg="add del mod">
+          <ac:chgData name="Fatima Pillosu" userId="a6295d4dc9e22643" providerId="LiveId" clId="{F0B9C950-5C19-45BA-B39E-FADB59417D97}" dt="2025-06-18T10:36:50.810" v="1431" actId="478"/>
+          <ac:spMkLst>
+            <pc:docMk/>
+            <pc:sldMk cId="2412790101" sldId="256"/>
+            <ac:spMk id="30" creationId="{D72F21FB-E876-B3EC-8628-148AAE9996E5}"/>
+          </ac:spMkLst>
+        </pc:spChg>
+        <pc:spChg chg="add del mod">
+          <ac:chgData name="Fatima Pillosu" userId="a6295d4dc9e22643" providerId="LiveId" clId="{F0B9C950-5C19-45BA-B39E-FADB59417D97}" dt="2025-06-18T10:36:50.810" v="1431" actId="478"/>
+          <ac:spMkLst>
+            <pc:docMk/>
+            <pc:sldMk cId="2412790101" sldId="256"/>
+            <ac:spMk id="31" creationId="{0D7A0A59-3B69-64ED-60AB-80D874FCD344}"/>
+          </ac:spMkLst>
+        </pc:spChg>
+        <pc:spChg chg="add del mod">
+          <ac:chgData name="Fatima Pillosu" userId="a6295d4dc9e22643" providerId="LiveId" clId="{F0B9C950-5C19-45BA-B39E-FADB59417D97}" dt="2025-06-18T08:55:48.261" v="1022" actId="21"/>
+          <ac:spMkLst>
+            <pc:docMk/>
+            <pc:sldMk cId="2412790101" sldId="256"/>
+            <ac:spMk id="31" creationId="{737BB970-06A3-D82D-DD59-9485C3A2FB34}"/>
+          </ac:spMkLst>
+        </pc:spChg>
+        <pc:spChg chg="add del mod">
+          <ac:chgData name="Fatima Pillosu" userId="a6295d4dc9e22643" providerId="LiveId" clId="{F0B9C950-5C19-45BA-B39E-FADB59417D97}" dt="2025-06-18T10:36:50.810" v="1431" actId="478"/>
+          <ac:spMkLst>
+            <pc:docMk/>
+            <pc:sldMk cId="2412790101" sldId="256"/>
+            <ac:spMk id="32" creationId="{395C51C3-D025-9D90-DE2F-5E2BD772360E}"/>
+          </ac:spMkLst>
+        </pc:spChg>
+        <pc:spChg chg="add del mod">
+          <ac:chgData name="Fatima Pillosu" userId="a6295d4dc9e22643" providerId="LiveId" clId="{F0B9C950-5C19-45BA-B39E-FADB59417D97}" dt="2025-06-18T08:55:48.261" v="1022" actId="21"/>
+          <ac:spMkLst>
+            <pc:docMk/>
+            <pc:sldMk cId="2412790101" sldId="256"/>
+            <ac:spMk id="32" creationId="{88E5E416-C7A1-C227-031E-B35CF991FEFF}"/>
+          </ac:spMkLst>
+        </pc:spChg>
+        <pc:spChg chg="add del mod">
+          <ac:chgData name="Fatima Pillosu" userId="a6295d4dc9e22643" providerId="LiveId" clId="{F0B9C950-5C19-45BA-B39E-FADB59417D97}" dt="2025-06-18T10:36:50.810" v="1431" actId="478"/>
+          <ac:spMkLst>
+            <pc:docMk/>
+            <pc:sldMk cId="2412790101" sldId="256"/>
+            <ac:spMk id="33" creationId="{500A8CFC-93BD-87AD-C58A-DCD3EB34FAB6}"/>
+          </ac:spMkLst>
+        </pc:spChg>
+        <pc:spChg chg="add del mod">
+          <ac:chgData name="Fatima Pillosu" userId="a6295d4dc9e22643" providerId="LiveId" clId="{F0B9C950-5C19-45BA-B39E-FADB59417D97}" dt="2025-06-18T08:55:48.261" v="1022" actId="21"/>
+          <ac:spMkLst>
+            <pc:docMk/>
+            <pc:sldMk cId="2412790101" sldId="256"/>
+            <ac:spMk id="33" creationId="{761A0E4A-D491-74D5-90F0-C519DB1C25DC}"/>
+          </ac:spMkLst>
+        </pc:spChg>
+        <pc:spChg chg="add del mod">
+          <ac:chgData name="Fatima Pillosu" userId="a6295d4dc9e22643" providerId="LiveId" clId="{F0B9C950-5C19-45BA-B39E-FADB59417D97}" dt="2025-06-18T10:36:50.810" v="1431" actId="478"/>
+          <ac:spMkLst>
+            <pc:docMk/>
+            <pc:sldMk cId="2412790101" sldId="256"/>
+            <ac:spMk id="34" creationId="{3DBF3549-D2E3-38EE-CF84-93B78B0AA1D7}"/>
+          </ac:spMkLst>
+        </pc:spChg>
+        <pc:spChg chg="add del mod">
+          <ac:chgData name="Fatima Pillosu" userId="a6295d4dc9e22643" providerId="LiveId" clId="{F0B9C950-5C19-45BA-B39E-FADB59417D97}" dt="2025-06-18T08:55:48.261" v="1022" actId="21"/>
+          <ac:spMkLst>
+            <pc:docMk/>
+            <pc:sldMk cId="2412790101" sldId="256"/>
+            <ac:spMk id="34" creationId="{5A52E58A-BA02-021E-4F28-6D976EBB835E}"/>
+          </ac:spMkLst>
+        </pc:spChg>
+        <pc:spChg chg="add del mod">
+          <ac:chgData name="Fatima Pillosu" userId="a6295d4dc9e22643" providerId="LiveId" clId="{F0B9C950-5C19-45BA-B39E-FADB59417D97}" dt="2025-06-16T21:25:03.465" v="301" actId="478"/>
+          <ac:spMkLst>
+            <pc:docMk/>
+            <pc:sldMk cId="2412790101" sldId="256"/>
+            <ac:spMk id="35" creationId="{15CA4F09-F1A7-41A4-A86D-36FE77C2FC9C}"/>
+          </ac:spMkLst>
+        </pc:spChg>
+        <pc:spChg chg="add del mod">
+          <ac:chgData name="Fatima Pillosu" userId="a6295d4dc9e22643" providerId="LiveId" clId="{F0B9C950-5C19-45BA-B39E-FADB59417D97}" dt="2025-06-18T10:36:50.810" v="1431" actId="478"/>
+          <ac:spMkLst>
+            <pc:docMk/>
+            <pc:sldMk cId="2412790101" sldId="256"/>
+            <ac:spMk id="35" creationId="{541DE2BE-828B-C425-73CD-1775A4E7A79E}"/>
+          </ac:spMkLst>
+        </pc:spChg>
+        <pc:spChg chg="add del mod">
+          <ac:chgData name="Fatima Pillosu" userId="a6295d4dc9e22643" providerId="LiveId" clId="{F0B9C950-5C19-45BA-B39E-FADB59417D97}" dt="2025-06-18T08:56:22.750" v="1026" actId="21"/>
+          <ac:spMkLst>
+            <pc:docMk/>
+            <pc:sldMk cId="2412790101" sldId="256"/>
+            <ac:spMk id="35" creationId="{DA3F88A4-982E-EB2C-A843-AE6C9C1F2CF3}"/>
+          </ac:spMkLst>
+        </pc:spChg>
+        <pc:spChg chg="add del mod">
+          <ac:chgData name="Fatima Pillosu" userId="a6295d4dc9e22643" providerId="LiveId" clId="{F0B9C950-5C19-45BA-B39E-FADB59417D97}" dt="2025-06-18T08:56:22.750" v="1026" actId="21"/>
+          <ac:spMkLst>
+            <pc:docMk/>
+            <pc:sldMk cId="2412790101" sldId="256"/>
+            <ac:spMk id="36" creationId="{0C70AC90-3132-131D-55B9-12D8EAA513A6}"/>
+          </ac:spMkLst>
+        </pc:spChg>
+        <pc:spChg chg="add del mod">
+          <ac:chgData name="Fatima Pillosu" userId="a6295d4dc9e22643" providerId="LiveId" clId="{F0B9C950-5C19-45BA-B39E-FADB59417D97}" dt="2025-06-16T21:25:02.549" v="300" actId="478"/>
+          <ac:spMkLst>
+            <pc:docMk/>
+            <pc:sldMk cId="2412790101" sldId="256"/>
+            <ac:spMk id="36" creationId="{5A8C9634-9682-9574-2A41-A1E6BF3F9779}"/>
+          </ac:spMkLst>
+        </pc:spChg>
+        <pc:spChg chg="add del mod">
+          <ac:chgData name="Fatima Pillosu" userId="a6295d4dc9e22643" providerId="LiveId" clId="{F0B9C950-5C19-45BA-B39E-FADB59417D97}" dt="2025-06-18T10:36:50.810" v="1431" actId="478"/>
+          <ac:spMkLst>
+            <pc:docMk/>
+            <pc:sldMk cId="2412790101" sldId="256"/>
+            <ac:spMk id="36" creationId="{B7D730D9-F446-27B9-1CBE-A82DAD647E82}"/>
+          </ac:spMkLst>
+        </pc:spChg>
+        <pc:spChg chg="add del mod">
+          <ac:chgData name="Fatima Pillosu" userId="a6295d4dc9e22643" providerId="LiveId" clId="{F0B9C950-5C19-45BA-B39E-FADB59417D97}" dt="2025-06-18T10:36:54.156" v="1432" actId="478"/>
+          <ac:spMkLst>
+            <pc:docMk/>
+            <pc:sldMk cId="2412790101" sldId="256"/>
+            <ac:spMk id="37" creationId="{4D8EA029-FC88-A23B-4193-BBABB3998E88}"/>
+          </ac:spMkLst>
+        </pc:spChg>
+        <pc:spChg chg="add del mod">
+          <ac:chgData name="Fatima Pillosu" userId="a6295d4dc9e22643" providerId="LiveId" clId="{F0B9C950-5C19-45BA-B39E-FADB59417D97}" dt="2025-06-16T21:48:21.890" v="933" actId="478"/>
+          <ac:spMkLst>
+            <pc:docMk/>
+            <pc:sldMk cId="2412790101" sldId="256"/>
+            <ac:spMk id="37" creationId="{68487C72-9A74-02CF-F4A3-96805D5B2F75}"/>
+          </ac:spMkLst>
+        </pc:spChg>
+        <pc:spChg chg="add del mod">
+          <ac:chgData name="Fatima Pillosu" userId="a6295d4dc9e22643" providerId="LiveId" clId="{F0B9C950-5C19-45BA-B39E-FADB59417D97}" dt="2025-06-18T08:56:22.750" v="1026" actId="21"/>
+          <ac:spMkLst>
+            <pc:docMk/>
+            <pc:sldMk cId="2412790101" sldId="256"/>
+            <ac:spMk id="37" creationId="{DD422E1D-E299-828A-BD94-EA3FE9B35B2F}"/>
+          </ac:spMkLst>
+        </pc:spChg>
+        <pc:spChg chg="add del mod">
+          <ac:chgData name="Fatima Pillosu" userId="a6295d4dc9e22643" providerId="LiveId" clId="{F0B9C950-5C19-45BA-B39E-FADB59417D97}" dt="2025-06-18T08:56:22.750" v="1026" actId="21"/>
+          <ac:spMkLst>
+            <pc:docMk/>
+            <pc:sldMk cId="2412790101" sldId="256"/>
+            <ac:spMk id="38" creationId="{3D8EC9DA-9022-BEAE-0FAC-C07CABA596E2}"/>
+          </ac:spMkLst>
+        </pc:spChg>
+        <pc:spChg chg="add del mod">
+          <ac:chgData name="Fatima Pillosu" userId="a6295d4dc9e22643" providerId="LiveId" clId="{F0B9C950-5C19-45BA-B39E-FADB59417D97}" dt="2025-06-16T21:48:21.890" v="933" actId="478"/>
+          <ac:spMkLst>
+            <pc:docMk/>
+            <pc:sldMk cId="2412790101" sldId="256"/>
+            <ac:spMk id="38" creationId="{43B876FD-5DCA-EA7E-4F41-E69BD70411F2}"/>
+          </ac:spMkLst>
+        </pc:spChg>
+        <pc:spChg chg="add del mod">
+          <ac:chgData name="Fatima Pillosu" userId="a6295d4dc9e22643" providerId="LiveId" clId="{F0B9C950-5C19-45BA-B39E-FADB59417D97}" dt="2025-06-18T10:36:50.810" v="1431" actId="478"/>
+          <ac:spMkLst>
+            <pc:docMk/>
+            <pc:sldMk cId="2412790101" sldId="256"/>
+            <ac:spMk id="38" creationId="{9A6D088A-0A8D-96FF-4A52-CC04B5AF66E2}"/>
+          </ac:spMkLst>
+        </pc:spChg>
+        <pc:spChg chg="add del mod">
+          <ac:chgData name="Fatima Pillosu" userId="a6295d4dc9e22643" providerId="LiveId" clId="{F0B9C950-5C19-45BA-B39E-FADB59417D97}" dt="2025-06-18T10:36:50.810" v="1431" actId="478"/>
+          <ac:spMkLst>
+            <pc:docMk/>
+            <pc:sldMk cId="2412790101" sldId="256"/>
+            <ac:spMk id="39" creationId="{386A4F79-10E9-1934-66C0-03AA4A7C99CE}"/>
+          </ac:spMkLst>
+        </pc:spChg>
+        <pc:spChg chg="add del mod">
+          <ac:chgData name="Fatima Pillosu" userId="a6295d4dc9e22643" providerId="LiveId" clId="{F0B9C950-5C19-45BA-B39E-FADB59417D97}" dt="2025-06-18T08:55:48.261" v="1022" actId="21"/>
+          <ac:spMkLst>
+            <pc:docMk/>
+            <pc:sldMk cId="2412790101" sldId="256"/>
+            <ac:spMk id="39" creationId="{4E1DAB7F-CDAC-4060-D2E3-855C223F00C0}"/>
           </ac:spMkLst>
         </pc:spChg>
         <pc:spChg chg="add mod">
-          <ac:chgData name="Fatima Pillosu" userId="a6295d4dc9e22643" providerId="LiveId" clId="{F0B9C950-5C19-45BA-B39E-FADB59417D97}" dt="2025-06-18T09:01:54.017" v="1162"/>
-          <ac:spMkLst>
-            <pc:docMk/>
-            <pc:sldMk cId="2412790101" sldId="256"/>
-            <ac:spMk id="25" creationId="{3D8EC9DA-9022-BEAE-0FAC-C07CABA596E2}"/>
+          <ac:chgData name="Fatima Pillosu" userId="a6295d4dc9e22643" providerId="LiveId" clId="{F0B9C950-5C19-45BA-B39E-FADB59417D97}" dt="2025-06-18T10:32:26.424" v="1316" actId="1037"/>
+          <ac:spMkLst>
+            <pc:docMk/>
+            <pc:sldMk cId="2412790101" sldId="256"/>
+            <ac:spMk id="40" creationId="{17A4B2C5-47D5-3495-68D8-2CB424DC7257}"/>
           </ac:spMkLst>
         </pc:spChg>
         <pc:spChg chg="add del mod">
@@ -527,15 +807,183 @@
           <ac:spMkLst>
             <pc:docMk/>
             <pc:sldMk cId="2412790101" sldId="256"/>
-            <ac:spMk id="25" creationId="{B70B7DAE-BBF8-26B9-F316-694D75EF55A1}"/>
+            <ac:spMk id="40" creationId="{1FE71E37-6166-0490-58E8-888C8B970604}"/>
+          </ac:spMkLst>
+        </pc:spChg>
+        <pc:spChg chg="add mod ord">
+          <ac:chgData name="Fatima Pillosu" userId="a6295d4dc9e22643" providerId="LiveId" clId="{F0B9C950-5C19-45BA-B39E-FADB59417D97}" dt="2025-06-18T10:33:49.743" v="1359" actId="14100"/>
+          <ac:spMkLst>
+            <pc:docMk/>
+            <pc:sldMk cId="2412790101" sldId="256"/>
+            <ac:spMk id="41" creationId="{6E0A576C-FEB4-8631-B956-C0ECE587A165}"/>
+          </ac:spMkLst>
+        </pc:spChg>
+        <pc:spChg chg="add del mod">
+          <ac:chgData name="Fatima Pillosu" userId="a6295d4dc9e22643" providerId="LiveId" clId="{F0B9C950-5C19-45BA-B39E-FADB59417D97}" dt="2025-06-18T08:55:48.261" v="1022" actId="21"/>
+          <ac:spMkLst>
+            <pc:docMk/>
+            <pc:sldMk cId="2412790101" sldId="256"/>
+            <ac:spMk id="41" creationId="{951A946F-24FC-86A6-3A72-C8D4D2433C01}"/>
+          </ac:spMkLst>
+        </pc:spChg>
+        <pc:spChg chg="add del mod">
+          <ac:chgData name="Fatima Pillosu" userId="a6295d4dc9e22643" providerId="LiveId" clId="{F0B9C950-5C19-45BA-B39E-FADB59417D97}" dt="2025-06-18T08:55:48.261" v="1022" actId="21"/>
+          <ac:spMkLst>
+            <pc:docMk/>
+            <pc:sldMk cId="2412790101" sldId="256"/>
+            <ac:spMk id="42" creationId="{B6D31BEC-12CE-7910-9855-7BC31BC02FE2}"/>
           </ac:spMkLst>
         </pc:spChg>
         <pc:spChg chg="add mod">
-          <ac:chgData name="Fatima Pillosu" userId="a6295d4dc9e22643" providerId="LiveId" clId="{F0B9C950-5C19-45BA-B39E-FADB59417D97}" dt="2025-06-18T09:01:54.017" v="1162"/>
-          <ac:spMkLst>
-            <pc:docMk/>
-            <pc:sldMk cId="2412790101" sldId="256"/>
-            <ac:spMk id="26" creationId="{9097776E-A046-4D6E-89DA-50B1F5A3FAF4}"/>
+          <ac:chgData name="Fatima Pillosu" userId="a6295d4dc9e22643" providerId="LiveId" clId="{F0B9C950-5C19-45BA-B39E-FADB59417D97}" dt="2025-06-18T10:33:58.435" v="1360" actId="14100"/>
+          <ac:spMkLst>
+            <pc:docMk/>
+            <pc:sldMk cId="2412790101" sldId="256"/>
+            <ac:spMk id="42" creationId="{D7B7EA2C-EE98-FF83-48D1-3425D530EEDB}"/>
+          </ac:spMkLst>
+        </pc:spChg>
+        <pc:spChg chg="add mod">
+          <ac:chgData name="Fatima Pillosu" userId="a6295d4dc9e22643" providerId="LiveId" clId="{F0B9C950-5C19-45BA-B39E-FADB59417D97}" dt="2025-06-18T10:31:39.199" v="1301" actId="12789"/>
+          <ac:spMkLst>
+            <pc:docMk/>
+            <pc:sldMk cId="2412790101" sldId="256"/>
+            <ac:spMk id="43" creationId="{441CB6E6-87E2-1A0A-67F8-7F99E4513D1C}"/>
+          </ac:spMkLst>
+        </pc:spChg>
+        <pc:spChg chg="add del mod">
+          <ac:chgData name="Fatima Pillosu" userId="a6295d4dc9e22643" providerId="LiveId" clId="{F0B9C950-5C19-45BA-B39E-FADB59417D97}" dt="2025-06-18T08:56:22.750" v="1026" actId="21"/>
+          <ac:spMkLst>
+            <pc:docMk/>
+            <pc:sldMk cId="2412790101" sldId="256"/>
+            <ac:spMk id="43" creationId="{9097776E-A046-4D6E-89DA-50B1F5A3FAF4}"/>
+          </ac:spMkLst>
+        </pc:spChg>
+        <pc:spChg chg="add del mod">
+          <ac:chgData name="Fatima Pillosu" userId="a6295d4dc9e22643" providerId="LiveId" clId="{F0B9C950-5C19-45BA-B39E-FADB59417D97}" dt="2025-06-16T21:48:21.890" v="933" actId="478"/>
+          <ac:spMkLst>
+            <pc:docMk/>
+            <pc:sldMk cId="2412790101" sldId="256"/>
+            <ac:spMk id="43" creationId="{F2436088-889E-27F8-2EEF-6C1B25EEB125}"/>
+          </ac:spMkLst>
+        </pc:spChg>
+        <pc:spChg chg="add del mod">
+          <ac:chgData name="Fatima Pillosu" userId="a6295d4dc9e22643" providerId="LiveId" clId="{F0B9C950-5C19-45BA-B39E-FADB59417D97}" dt="2025-06-18T08:56:22.750" v="1026" actId="21"/>
+          <ac:spMkLst>
+            <pc:docMk/>
+            <pc:sldMk cId="2412790101" sldId="256"/>
+            <ac:spMk id="44" creationId="{8528F7D7-A81B-BC37-30A6-95E2C4569922}"/>
+          </ac:spMkLst>
+        </pc:spChg>
+        <pc:spChg chg="add del mod">
+          <ac:chgData name="Fatima Pillosu" userId="a6295d4dc9e22643" providerId="LiveId" clId="{F0B9C950-5C19-45BA-B39E-FADB59417D97}" dt="2025-06-16T21:48:21.890" v="933" actId="478"/>
+          <ac:spMkLst>
+            <pc:docMk/>
+            <pc:sldMk cId="2412790101" sldId="256"/>
+            <ac:spMk id="44" creationId="{B8281EE7-93D6-9B18-595D-356FDEF8B848}"/>
+          </ac:spMkLst>
+        </pc:spChg>
+        <pc:spChg chg="add mod">
+          <ac:chgData name="Fatima Pillosu" userId="a6295d4dc9e22643" providerId="LiveId" clId="{F0B9C950-5C19-45BA-B39E-FADB59417D97}" dt="2025-06-18T10:32:26.424" v="1316" actId="1037"/>
+          <ac:spMkLst>
+            <pc:docMk/>
+            <pc:sldMk cId="2412790101" sldId="256"/>
+            <ac:spMk id="44" creationId="{DC1CA93F-6FAF-42B3-BBBF-433BE0D7EC13}"/>
+          </ac:spMkLst>
+        </pc:spChg>
+        <pc:spChg chg="add mod">
+          <ac:chgData name="Fatima Pillosu" userId="a6295d4dc9e22643" providerId="LiveId" clId="{F0B9C950-5C19-45BA-B39E-FADB59417D97}" dt="2025-06-18T10:29:32.827" v="1266" actId="1037"/>
+          <ac:spMkLst>
+            <pc:docMk/>
+            <pc:sldMk cId="2412790101" sldId="256"/>
+            <ac:spMk id="45" creationId="{06561625-E084-10DA-C9D2-DC79AAA113FE}"/>
+          </ac:spMkLst>
+        </pc:spChg>
+        <pc:spChg chg="add del mod">
+          <ac:chgData name="Fatima Pillosu" userId="a6295d4dc9e22643" providerId="LiveId" clId="{F0B9C950-5C19-45BA-B39E-FADB59417D97}" dt="2025-06-18T08:56:22.750" v="1026" actId="21"/>
+          <ac:spMkLst>
+            <pc:docMk/>
+            <pc:sldMk cId="2412790101" sldId="256"/>
+            <ac:spMk id="45" creationId="{24814AF3-44CD-F19E-FF61-4CCDCB6710C1}"/>
+          </ac:spMkLst>
+        </pc:spChg>
+        <pc:spChg chg="add del mod">
+          <ac:chgData name="Fatima Pillosu" userId="a6295d4dc9e22643" providerId="LiveId" clId="{F0B9C950-5C19-45BA-B39E-FADB59417D97}" dt="2025-06-16T21:48:21.890" v="933" actId="478"/>
+          <ac:spMkLst>
+            <pc:docMk/>
+            <pc:sldMk cId="2412790101" sldId="256"/>
+            <ac:spMk id="45" creationId="{CE44919F-0651-92AF-E13E-2D5F82DA4C89}"/>
+          </ac:spMkLst>
+        </pc:spChg>
+        <pc:spChg chg="add del mod">
+          <ac:chgData name="Fatima Pillosu" userId="a6295d4dc9e22643" providerId="LiveId" clId="{F0B9C950-5C19-45BA-B39E-FADB59417D97}" dt="2025-06-16T21:48:21.890" v="933" actId="478"/>
+          <ac:spMkLst>
+            <pc:docMk/>
+            <pc:sldMk cId="2412790101" sldId="256"/>
+            <ac:spMk id="46" creationId="{4D2985CE-5085-0BF7-A4F9-0E6DCBB6E8FF}"/>
+          </ac:spMkLst>
+        </pc:spChg>
+        <pc:spChg chg="add mod">
+          <ac:chgData name="Fatima Pillosu" userId="a6295d4dc9e22643" providerId="LiveId" clId="{F0B9C950-5C19-45BA-B39E-FADB59417D97}" dt="2025-06-18T10:29:53.678" v="1271" actId="20577"/>
+          <ac:spMkLst>
+            <pc:docMk/>
+            <pc:sldMk cId="2412790101" sldId="256"/>
+            <ac:spMk id="46" creationId="{E1DBA1A3-69AC-E204-1AED-E215C8C8CEB0}"/>
+          </ac:spMkLst>
+        </pc:spChg>
+        <pc:spChg chg="add del mod">
+          <ac:chgData name="Fatima Pillosu" userId="a6295d4dc9e22643" providerId="LiveId" clId="{F0B9C950-5C19-45BA-B39E-FADB59417D97}" dt="2025-06-18T08:56:22.750" v="1026" actId="21"/>
+          <ac:spMkLst>
+            <pc:docMk/>
+            <pc:sldMk cId="2412790101" sldId="256"/>
+            <ac:spMk id="46" creationId="{E6F79664-7D05-1CB7-9B16-7CF6037CB7F8}"/>
+          </ac:spMkLst>
+        </pc:spChg>
+        <pc:spChg chg="add mod">
+          <ac:chgData name="Fatima Pillosu" userId="a6295d4dc9e22643" providerId="LiveId" clId="{F0B9C950-5C19-45BA-B39E-FADB59417D97}" dt="2025-06-18T10:34:06.061" v="1361" actId="14100"/>
+          <ac:spMkLst>
+            <pc:docMk/>
+            <pc:sldMk cId="2412790101" sldId="256"/>
+            <ac:spMk id="47" creationId="{1402EF05-0A8D-81FE-F96A-820C0CB99803}"/>
+          </ac:spMkLst>
+        </pc:spChg>
+        <pc:spChg chg="add del mod">
+          <ac:chgData name="Fatima Pillosu" userId="a6295d4dc9e22643" providerId="LiveId" clId="{F0B9C950-5C19-45BA-B39E-FADB59417D97}" dt="2025-06-18T08:56:22.750" v="1026" actId="21"/>
+          <ac:spMkLst>
+            <pc:docMk/>
+            <pc:sldMk cId="2412790101" sldId="256"/>
+            <ac:spMk id="47" creationId="{D72F21FB-E876-B3EC-8628-148AAE9996E5}"/>
+          </ac:spMkLst>
+        </pc:spChg>
+        <pc:spChg chg="add del mod">
+          <ac:chgData name="Fatima Pillosu" userId="a6295d4dc9e22643" providerId="LiveId" clId="{F0B9C950-5C19-45BA-B39E-FADB59417D97}" dt="2025-06-16T21:48:21.890" v="933" actId="478"/>
+          <ac:spMkLst>
+            <pc:docMk/>
+            <pc:sldMk cId="2412790101" sldId="256"/>
+            <ac:spMk id="47" creationId="{EE781A04-7C56-69E8-F789-9AA41BADF54F}"/>
+          </ac:spMkLst>
+        </pc:spChg>
+        <pc:spChg chg="add del mod">
+          <ac:chgData name="Fatima Pillosu" userId="a6295d4dc9e22643" providerId="LiveId" clId="{F0B9C950-5C19-45BA-B39E-FADB59417D97}" dt="2025-06-18T08:56:22.750" v="1026" actId="21"/>
+          <ac:spMkLst>
+            <pc:docMk/>
+            <pc:sldMk cId="2412790101" sldId="256"/>
+            <ac:spMk id="48" creationId="{0D7A0A59-3B69-64ED-60AB-80D874FCD344}"/>
+          </ac:spMkLst>
+        </pc:spChg>
+        <pc:spChg chg="add mod">
+          <ac:chgData name="Fatima Pillosu" userId="a6295d4dc9e22643" providerId="LiveId" clId="{F0B9C950-5C19-45BA-B39E-FADB59417D97}" dt="2025-06-18T10:29:32.827" v="1266" actId="1037"/>
+          <ac:spMkLst>
+            <pc:docMk/>
+            <pc:sldMk cId="2412790101" sldId="256"/>
+            <ac:spMk id="48" creationId="{4CDF8D29-A1A4-B6EF-CC2D-02154951F423}"/>
+          </ac:spMkLst>
+        </pc:spChg>
+        <pc:spChg chg="add del mod">
+          <ac:chgData name="Fatima Pillosu" userId="a6295d4dc9e22643" providerId="LiveId" clId="{F0B9C950-5C19-45BA-B39E-FADB59417D97}" dt="2025-06-16T21:48:21.890" v="933" actId="478"/>
+          <ac:spMkLst>
+            <pc:docMk/>
+            <pc:sldMk cId="2412790101" sldId="256"/>
+            <ac:spMk id="48" creationId="{7F657A6A-40E4-47E8-C3E4-1057A24F71BA}"/>
           </ac:spMkLst>
         </pc:spChg>
         <pc:spChg chg="add del mod">
@@ -543,15 +991,23 @@
           <ac:spMkLst>
             <pc:docMk/>
             <pc:sldMk cId="2412790101" sldId="256"/>
-            <ac:spMk id="26" creationId="{DA0A3A3F-6F21-9FFB-DFE8-C73B8123777A}"/>
+            <ac:spMk id="49" creationId="{3A5CD0EB-6B55-2725-6E3F-17726052CCE4}"/>
           </ac:spMkLst>
         </pc:spChg>
         <pc:spChg chg="add mod">
-          <ac:chgData name="Fatima Pillosu" userId="a6295d4dc9e22643" providerId="LiveId" clId="{F0B9C950-5C19-45BA-B39E-FADB59417D97}" dt="2025-06-18T09:01:54.017" v="1162"/>
-          <ac:spMkLst>
-            <pc:docMk/>
-            <pc:sldMk cId="2412790101" sldId="256"/>
-            <ac:spMk id="27" creationId="{8528F7D7-A81B-BC37-30A6-95E2C4569922}"/>
+          <ac:chgData name="Fatima Pillosu" userId="a6295d4dc9e22643" providerId="LiveId" clId="{F0B9C950-5C19-45BA-B39E-FADB59417D97}" dt="2025-06-18T10:32:26.424" v="1316" actId="1037"/>
+          <ac:spMkLst>
+            <pc:docMk/>
+            <pc:sldMk cId="2412790101" sldId="256"/>
+            <ac:spMk id="49" creationId="{C5F22480-43D2-EC6C-C595-536DDF09AC46}"/>
+          </ac:spMkLst>
+        </pc:spChg>
+        <pc:spChg chg="add mod">
+          <ac:chgData name="Fatima Pillosu" userId="a6295d4dc9e22643" providerId="LiveId" clId="{F0B9C950-5C19-45BA-B39E-FADB59417D97}" dt="2025-06-18T10:29:32.827" v="1266" actId="1037"/>
+          <ac:spMkLst>
+            <pc:docMk/>
+            <pc:sldMk cId="2412790101" sldId="256"/>
+            <ac:spMk id="50" creationId="{65CF77BB-AB79-BDF7-1AD9-C8ABDB188BCE}"/>
           </ac:spMkLst>
         </pc:spChg>
         <pc:spChg chg="add del mod">
@@ -559,135 +1015,87 @@
           <ac:spMkLst>
             <pc:docMk/>
             <pc:sldMk cId="2412790101" sldId="256"/>
-            <ac:spMk id="27" creationId="{DB5FE5E2-2AF1-E6C3-A893-A13186B11D78}"/>
+            <ac:spMk id="50" creationId="{DA3F88A4-982E-EB2C-A843-AE6C9C1F2CF3}"/>
+          </ac:spMkLst>
+        </pc:spChg>
+        <pc:spChg chg="add del mod">
+          <ac:chgData name="Fatima Pillosu" userId="a6295d4dc9e22643" providerId="LiveId" clId="{F0B9C950-5C19-45BA-B39E-FADB59417D97}" dt="2025-06-18T08:55:48.261" v="1022" actId="21"/>
+          <ac:spMkLst>
+            <pc:docMk/>
+            <pc:sldMk cId="2412790101" sldId="256"/>
+            <ac:spMk id="51" creationId="{0C70AC90-3132-131D-55B9-12D8EAA513A6}"/>
           </ac:spMkLst>
         </pc:spChg>
         <pc:spChg chg="add mod">
-          <ac:chgData name="Fatima Pillosu" userId="a6295d4dc9e22643" providerId="LiveId" clId="{F0B9C950-5C19-45BA-B39E-FADB59417D97}" dt="2025-06-18T09:01:54.017" v="1162"/>
-          <ac:spMkLst>
-            <pc:docMk/>
-            <pc:sldMk cId="2412790101" sldId="256"/>
-            <ac:spMk id="28" creationId="{24814AF3-44CD-F19E-FF61-4CCDCB6710C1}"/>
-          </ac:spMkLst>
-        </pc:spChg>
-        <pc:spChg chg="add del mod">
-          <ac:chgData name="Fatima Pillosu" userId="a6295d4dc9e22643" providerId="LiveId" clId="{F0B9C950-5C19-45BA-B39E-FADB59417D97}" dt="2025-06-18T08:55:48.261" v="1022" actId="21"/>
-          <ac:spMkLst>
-            <pc:docMk/>
-            <pc:sldMk cId="2412790101" sldId="256"/>
-            <ac:spMk id="28" creationId="{C697B761-747A-2315-B6B9-C750C47D99DC}"/>
-          </ac:spMkLst>
-        </pc:spChg>
-        <pc:spChg chg="add del mod">
-          <ac:chgData name="Fatima Pillosu" userId="a6295d4dc9e22643" providerId="LiveId" clId="{F0B9C950-5C19-45BA-B39E-FADB59417D97}" dt="2025-06-18T08:55:48.261" v="1022" actId="21"/>
-          <ac:spMkLst>
-            <pc:docMk/>
-            <pc:sldMk cId="2412790101" sldId="256"/>
-            <ac:spMk id="29" creationId="{3FA77F1B-56D8-FF8C-7ECE-F7D395C2B6A3}"/>
+          <ac:chgData name="Fatima Pillosu" userId="a6295d4dc9e22643" providerId="LiveId" clId="{F0B9C950-5C19-45BA-B39E-FADB59417D97}" dt="2025-06-18T10:29:55.581" v="1273" actId="20577"/>
+          <ac:spMkLst>
+            <pc:docMk/>
+            <pc:sldMk cId="2412790101" sldId="256"/>
+            <ac:spMk id="51" creationId="{CE0D8E67-F738-7066-FAAB-7F1C9C0D3446}"/>
+          </ac:spMkLst>
+        </pc:spChg>
+        <pc:spChg chg="add del mod">
+          <ac:chgData name="Fatima Pillosu" userId="a6295d4dc9e22643" providerId="LiveId" clId="{F0B9C950-5C19-45BA-B39E-FADB59417D97}" dt="2025-06-16T21:22:18.109" v="241" actId="478"/>
+          <ac:spMkLst>
+            <pc:docMk/>
+            <pc:sldMk cId="2412790101" sldId="256"/>
+            <ac:spMk id="52" creationId="{10B3F3B2-D550-5D75-766F-A98D1A5E6D0B}"/>
+          </ac:spMkLst>
+        </pc:spChg>
+        <pc:spChg chg="add del mod">
+          <ac:chgData name="Fatima Pillosu" userId="a6295d4dc9e22643" providerId="LiveId" clId="{F0B9C950-5C19-45BA-B39E-FADB59417D97}" dt="2025-06-18T08:56:22.750" v="1026" actId="21"/>
+          <ac:spMkLst>
+            <pc:docMk/>
+            <pc:sldMk cId="2412790101" sldId="256"/>
+            <ac:spMk id="52" creationId="{395C51C3-D025-9D90-DE2F-5E2BD772360E}"/>
           </ac:spMkLst>
         </pc:spChg>
         <pc:spChg chg="add mod">
-          <ac:chgData name="Fatima Pillosu" userId="a6295d4dc9e22643" providerId="LiveId" clId="{F0B9C950-5C19-45BA-B39E-FADB59417D97}" dt="2025-06-18T09:01:54.017" v="1162"/>
-          <ac:spMkLst>
-            <pc:docMk/>
-            <pc:sldMk cId="2412790101" sldId="256"/>
-            <ac:spMk id="29" creationId="{E6F79664-7D05-1CB7-9B16-7CF6037CB7F8}"/>
-          </ac:spMkLst>
-        </pc:spChg>
-        <pc:spChg chg="add del mod">
-          <ac:chgData name="Fatima Pillosu" userId="a6295d4dc9e22643" providerId="LiveId" clId="{F0B9C950-5C19-45BA-B39E-FADB59417D97}" dt="2025-06-18T08:55:48.261" v="1022" actId="21"/>
-          <ac:spMkLst>
-            <pc:docMk/>
-            <pc:sldMk cId="2412790101" sldId="256"/>
-            <ac:spMk id="30" creationId="{44B1E732-CD1A-C841-C76B-2D4E477D2BEA}"/>
+          <ac:chgData name="Fatima Pillosu" userId="a6295d4dc9e22643" providerId="LiveId" clId="{F0B9C950-5C19-45BA-B39E-FADB59417D97}" dt="2025-06-18T10:35:28.975" v="1394" actId="207"/>
+          <ac:spMkLst>
+            <pc:docMk/>
+            <pc:sldMk cId="2412790101" sldId="256"/>
+            <ac:spMk id="52" creationId="{4D8BB4D1-20CB-1DE2-D4F0-75DF1EAC1D67}"/>
+          </ac:spMkLst>
+        </pc:spChg>
+        <pc:spChg chg="add del mod">
+          <ac:chgData name="Fatima Pillosu" userId="a6295d4dc9e22643" providerId="LiveId" clId="{F0B9C950-5C19-45BA-B39E-FADB59417D97}" dt="2025-06-16T21:22:18.109" v="241" actId="478"/>
+          <ac:spMkLst>
+            <pc:docMk/>
+            <pc:sldMk cId="2412790101" sldId="256"/>
+            <ac:spMk id="53" creationId="{13ABE3E0-2167-01FF-6150-9F5A8298C6B1}"/>
+          </ac:spMkLst>
+        </pc:spChg>
+        <pc:spChg chg="add del mod">
+          <ac:chgData name="Fatima Pillosu" userId="a6295d4dc9e22643" providerId="LiveId" clId="{F0B9C950-5C19-45BA-B39E-FADB59417D97}" dt="2025-06-18T08:56:22.750" v="1026" actId="21"/>
+          <ac:spMkLst>
+            <pc:docMk/>
+            <pc:sldMk cId="2412790101" sldId="256"/>
+            <ac:spMk id="53" creationId="{500A8CFC-93BD-87AD-C58A-DCD3EB34FAB6}"/>
           </ac:spMkLst>
         </pc:spChg>
         <pc:spChg chg="add mod">
-          <ac:chgData name="Fatima Pillosu" userId="a6295d4dc9e22643" providerId="LiveId" clId="{F0B9C950-5C19-45BA-B39E-FADB59417D97}" dt="2025-06-18T09:01:54.017" v="1162"/>
-          <ac:spMkLst>
-            <pc:docMk/>
-            <pc:sldMk cId="2412790101" sldId="256"/>
-            <ac:spMk id="30" creationId="{D72F21FB-E876-B3EC-8628-148AAE9996E5}"/>
-          </ac:spMkLst>
-        </pc:spChg>
-        <pc:spChg chg="add mod">
-          <ac:chgData name="Fatima Pillosu" userId="a6295d4dc9e22643" providerId="LiveId" clId="{F0B9C950-5C19-45BA-B39E-FADB59417D97}" dt="2025-06-18T09:01:54.017" v="1162"/>
-          <ac:spMkLst>
-            <pc:docMk/>
-            <pc:sldMk cId="2412790101" sldId="256"/>
-            <ac:spMk id="31" creationId="{0D7A0A59-3B69-64ED-60AB-80D874FCD344}"/>
-          </ac:spMkLst>
-        </pc:spChg>
-        <pc:spChg chg="add del mod">
-          <ac:chgData name="Fatima Pillosu" userId="a6295d4dc9e22643" providerId="LiveId" clId="{F0B9C950-5C19-45BA-B39E-FADB59417D97}" dt="2025-06-18T08:55:48.261" v="1022" actId="21"/>
-          <ac:spMkLst>
-            <pc:docMk/>
-            <pc:sldMk cId="2412790101" sldId="256"/>
-            <ac:spMk id="31" creationId="{737BB970-06A3-D82D-DD59-9485C3A2FB34}"/>
-          </ac:spMkLst>
-        </pc:spChg>
-        <pc:spChg chg="add mod">
-          <ac:chgData name="Fatima Pillosu" userId="a6295d4dc9e22643" providerId="LiveId" clId="{F0B9C950-5C19-45BA-B39E-FADB59417D97}" dt="2025-06-18T09:01:54.017" v="1162"/>
-          <ac:spMkLst>
-            <pc:docMk/>
-            <pc:sldMk cId="2412790101" sldId="256"/>
-            <ac:spMk id="32" creationId="{395C51C3-D025-9D90-DE2F-5E2BD772360E}"/>
-          </ac:spMkLst>
-        </pc:spChg>
-        <pc:spChg chg="add del mod">
-          <ac:chgData name="Fatima Pillosu" userId="a6295d4dc9e22643" providerId="LiveId" clId="{F0B9C950-5C19-45BA-B39E-FADB59417D97}" dt="2025-06-18T08:55:48.261" v="1022" actId="21"/>
-          <ac:spMkLst>
-            <pc:docMk/>
-            <pc:sldMk cId="2412790101" sldId="256"/>
-            <ac:spMk id="32" creationId="{88E5E416-C7A1-C227-031E-B35CF991FEFF}"/>
-          </ac:spMkLst>
-        </pc:spChg>
-        <pc:spChg chg="add mod">
-          <ac:chgData name="Fatima Pillosu" userId="a6295d4dc9e22643" providerId="LiveId" clId="{F0B9C950-5C19-45BA-B39E-FADB59417D97}" dt="2025-06-18T09:01:54.017" v="1162"/>
-          <ac:spMkLst>
-            <pc:docMk/>
-            <pc:sldMk cId="2412790101" sldId="256"/>
-            <ac:spMk id="33" creationId="{500A8CFC-93BD-87AD-C58A-DCD3EB34FAB6}"/>
-          </ac:spMkLst>
-        </pc:spChg>
-        <pc:spChg chg="add del mod">
-          <ac:chgData name="Fatima Pillosu" userId="a6295d4dc9e22643" providerId="LiveId" clId="{F0B9C950-5C19-45BA-B39E-FADB59417D97}" dt="2025-06-18T08:55:48.261" v="1022" actId="21"/>
-          <ac:spMkLst>
-            <pc:docMk/>
-            <pc:sldMk cId="2412790101" sldId="256"/>
-            <ac:spMk id="33" creationId="{761A0E4A-D491-74D5-90F0-C519DB1C25DC}"/>
-          </ac:spMkLst>
-        </pc:spChg>
-        <pc:spChg chg="add mod">
-          <ac:chgData name="Fatima Pillosu" userId="a6295d4dc9e22643" providerId="LiveId" clId="{F0B9C950-5C19-45BA-B39E-FADB59417D97}" dt="2025-06-18T09:01:54.017" v="1162"/>
-          <ac:spMkLst>
-            <pc:docMk/>
-            <pc:sldMk cId="2412790101" sldId="256"/>
-            <ac:spMk id="34" creationId="{3DBF3549-D2E3-38EE-CF84-93B78B0AA1D7}"/>
-          </ac:spMkLst>
-        </pc:spChg>
-        <pc:spChg chg="add del mod">
-          <ac:chgData name="Fatima Pillosu" userId="a6295d4dc9e22643" providerId="LiveId" clId="{F0B9C950-5C19-45BA-B39E-FADB59417D97}" dt="2025-06-18T08:55:48.261" v="1022" actId="21"/>
-          <ac:spMkLst>
-            <pc:docMk/>
-            <pc:sldMk cId="2412790101" sldId="256"/>
-            <ac:spMk id="34" creationId="{5A52E58A-BA02-021E-4F28-6D976EBB835E}"/>
-          </ac:spMkLst>
-        </pc:spChg>
-        <pc:spChg chg="add del mod">
-          <ac:chgData name="Fatima Pillosu" userId="a6295d4dc9e22643" providerId="LiveId" clId="{F0B9C950-5C19-45BA-B39E-FADB59417D97}" dt="2025-06-16T21:25:03.465" v="301" actId="478"/>
-          <ac:spMkLst>
-            <pc:docMk/>
-            <pc:sldMk cId="2412790101" sldId="256"/>
-            <ac:spMk id="35" creationId="{15CA4F09-F1A7-41A4-A86D-36FE77C2FC9C}"/>
-          </ac:spMkLst>
-        </pc:spChg>
-        <pc:spChg chg="add mod">
-          <ac:chgData name="Fatima Pillosu" userId="a6295d4dc9e22643" providerId="LiveId" clId="{F0B9C950-5C19-45BA-B39E-FADB59417D97}" dt="2025-06-18T09:01:54.017" v="1162"/>
-          <ac:spMkLst>
-            <pc:docMk/>
-            <pc:sldMk cId="2412790101" sldId="256"/>
-            <ac:spMk id="35" creationId="{541DE2BE-828B-C425-73CD-1775A4E7A79E}"/>
+          <ac:chgData name="Fatima Pillosu" userId="a6295d4dc9e22643" providerId="LiveId" clId="{F0B9C950-5C19-45BA-B39E-FADB59417D97}" dt="2025-06-18T10:36:38.814" v="1425" actId="1036"/>
+          <ac:spMkLst>
+            <pc:docMk/>
+            <pc:sldMk cId="2412790101" sldId="256"/>
+            <ac:spMk id="53" creationId="{50D42DFB-603C-F1E1-00B0-82C244B805A5}"/>
+          </ac:spMkLst>
+        </pc:spChg>
+        <pc:spChg chg="add del mod">
+          <ac:chgData name="Fatima Pillosu" userId="a6295d4dc9e22643" providerId="LiveId" clId="{F0B9C950-5C19-45BA-B39E-FADB59417D97}" dt="2025-06-16T21:22:18.109" v="241" actId="478"/>
+          <ac:spMkLst>
+            <pc:docMk/>
+            <pc:sldMk cId="2412790101" sldId="256"/>
+            <ac:spMk id="54" creationId="{0B4B8E5F-E463-3AEC-270F-183051860A7B}"/>
+          </ac:spMkLst>
+        </pc:spChg>
+        <pc:spChg chg="add del mod">
+          <ac:chgData name="Fatima Pillosu" userId="a6295d4dc9e22643" providerId="LiveId" clId="{F0B9C950-5C19-45BA-B39E-FADB59417D97}" dt="2025-06-18T10:35:42.039" v="1396" actId="478"/>
+          <ac:spMkLst>
+            <pc:docMk/>
+            <pc:sldMk cId="2412790101" sldId="256"/>
+            <ac:spMk id="54" creationId="{2252E0B2-0D8B-AD54-C27D-8B84A1EB18A6}"/>
           </ac:spMkLst>
         </pc:spChg>
         <pc:spChg chg="add del mod">
@@ -695,7 +1103,7 @@
           <ac:spMkLst>
             <pc:docMk/>
             <pc:sldMk cId="2412790101" sldId="256"/>
-            <ac:spMk id="35" creationId="{DA3F88A4-982E-EB2C-A843-AE6C9C1F2CF3}"/>
+            <ac:spMk id="54" creationId="{3DBF3549-D2E3-38EE-CF84-93B78B0AA1D7}"/>
           </ac:spMkLst>
         </pc:spChg>
         <pc:spChg chg="add del mod">
@@ -703,231 +1111,7 @@
           <ac:spMkLst>
             <pc:docMk/>
             <pc:sldMk cId="2412790101" sldId="256"/>
-            <ac:spMk id="36" creationId="{0C70AC90-3132-131D-55B9-12D8EAA513A6}"/>
-          </ac:spMkLst>
-        </pc:spChg>
-        <pc:spChg chg="add del mod">
-          <ac:chgData name="Fatima Pillosu" userId="a6295d4dc9e22643" providerId="LiveId" clId="{F0B9C950-5C19-45BA-B39E-FADB59417D97}" dt="2025-06-16T21:25:02.549" v="300" actId="478"/>
-          <ac:spMkLst>
-            <pc:docMk/>
-            <pc:sldMk cId="2412790101" sldId="256"/>
-            <ac:spMk id="36" creationId="{5A8C9634-9682-9574-2A41-A1E6BF3F9779}"/>
-          </ac:spMkLst>
-        </pc:spChg>
-        <pc:spChg chg="add mod">
-          <ac:chgData name="Fatima Pillosu" userId="a6295d4dc9e22643" providerId="LiveId" clId="{F0B9C950-5C19-45BA-B39E-FADB59417D97}" dt="2025-06-18T09:01:54.017" v="1162"/>
-          <ac:spMkLst>
-            <pc:docMk/>
-            <pc:sldMk cId="2412790101" sldId="256"/>
-            <ac:spMk id="36" creationId="{B7D730D9-F446-27B9-1CBE-A82DAD647E82}"/>
-          </ac:spMkLst>
-        </pc:spChg>
-        <pc:spChg chg="add mod">
-          <ac:chgData name="Fatima Pillosu" userId="a6295d4dc9e22643" providerId="LiveId" clId="{F0B9C950-5C19-45BA-B39E-FADB59417D97}" dt="2025-06-18T09:01:54.017" v="1162"/>
-          <ac:spMkLst>
-            <pc:docMk/>
-            <pc:sldMk cId="2412790101" sldId="256"/>
-            <ac:spMk id="37" creationId="{4D8EA029-FC88-A23B-4193-BBABB3998E88}"/>
-          </ac:spMkLst>
-        </pc:spChg>
-        <pc:spChg chg="add del mod">
-          <ac:chgData name="Fatima Pillosu" userId="a6295d4dc9e22643" providerId="LiveId" clId="{F0B9C950-5C19-45BA-B39E-FADB59417D97}" dt="2025-06-16T21:48:21.890" v="933" actId="478"/>
-          <ac:spMkLst>
-            <pc:docMk/>
-            <pc:sldMk cId="2412790101" sldId="256"/>
-            <ac:spMk id="37" creationId="{68487C72-9A74-02CF-F4A3-96805D5B2F75}"/>
-          </ac:spMkLst>
-        </pc:spChg>
-        <pc:spChg chg="add del mod">
-          <ac:chgData name="Fatima Pillosu" userId="a6295d4dc9e22643" providerId="LiveId" clId="{F0B9C950-5C19-45BA-B39E-FADB59417D97}" dt="2025-06-18T08:56:22.750" v="1026" actId="21"/>
-          <ac:spMkLst>
-            <pc:docMk/>
-            <pc:sldMk cId="2412790101" sldId="256"/>
-            <ac:spMk id="37" creationId="{DD422E1D-E299-828A-BD94-EA3FE9B35B2F}"/>
-          </ac:spMkLst>
-        </pc:spChg>
-        <pc:spChg chg="add del mod">
-          <ac:chgData name="Fatima Pillosu" userId="a6295d4dc9e22643" providerId="LiveId" clId="{F0B9C950-5C19-45BA-B39E-FADB59417D97}" dt="2025-06-18T08:56:22.750" v="1026" actId="21"/>
-          <ac:spMkLst>
-            <pc:docMk/>
-            <pc:sldMk cId="2412790101" sldId="256"/>
-            <ac:spMk id="38" creationId="{3D8EC9DA-9022-BEAE-0FAC-C07CABA596E2}"/>
-          </ac:spMkLst>
-        </pc:spChg>
-        <pc:spChg chg="add del mod">
-          <ac:chgData name="Fatima Pillosu" userId="a6295d4dc9e22643" providerId="LiveId" clId="{F0B9C950-5C19-45BA-B39E-FADB59417D97}" dt="2025-06-16T21:48:21.890" v="933" actId="478"/>
-          <ac:spMkLst>
-            <pc:docMk/>
-            <pc:sldMk cId="2412790101" sldId="256"/>
-            <ac:spMk id="38" creationId="{43B876FD-5DCA-EA7E-4F41-E69BD70411F2}"/>
-          </ac:spMkLst>
-        </pc:spChg>
-        <pc:spChg chg="add mod">
-          <ac:chgData name="Fatima Pillosu" userId="a6295d4dc9e22643" providerId="LiveId" clId="{F0B9C950-5C19-45BA-B39E-FADB59417D97}" dt="2025-06-18T09:01:54.017" v="1162"/>
-          <ac:spMkLst>
-            <pc:docMk/>
-            <pc:sldMk cId="2412790101" sldId="256"/>
-            <ac:spMk id="38" creationId="{9A6D088A-0A8D-96FF-4A52-CC04B5AF66E2}"/>
-          </ac:spMkLst>
-        </pc:spChg>
-        <pc:spChg chg="add mod">
-          <ac:chgData name="Fatima Pillosu" userId="a6295d4dc9e22643" providerId="LiveId" clId="{F0B9C950-5C19-45BA-B39E-FADB59417D97}" dt="2025-06-18T09:01:54.017" v="1162"/>
-          <ac:spMkLst>
-            <pc:docMk/>
-            <pc:sldMk cId="2412790101" sldId="256"/>
-            <ac:spMk id="39" creationId="{386A4F79-10E9-1934-66C0-03AA4A7C99CE}"/>
-          </ac:spMkLst>
-        </pc:spChg>
-        <pc:spChg chg="add del mod">
-          <ac:chgData name="Fatima Pillosu" userId="a6295d4dc9e22643" providerId="LiveId" clId="{F0B9C950-5C19-45BA-B39E-FADB59417D97}" dt="2025-06-18T08:55:48.261" v="1022" actId="21"/>
-          <ac:spMkLst>
-            <pc:docMk/>
-            <pc:sldMk cId="2412790101" sldId="256"/>
-            <ac:spMk id="39" creationId="{4E1DAB7F-CDAC-4060-D2E3-855C223F00C0}"/>
-          </ac:spMkLst>
-        </pc:spChg>
-        <pc:spChg chg="add del mod">
-          <ac:chgData name="Fatima Pillosu" userId="a6295d4dc9e22643" providerId="LiveId" clId="{F0B9C950-5C19-45BA-B39E-FADB59417D97}" dt="2025-06-18T08:55:48.261" v="1022" actId="21"/>
-          <ac:spMkLst>
-            <pc:docMk/>
-            <pc:sldMk cId="2412790101" sldId="256"/>
-            <ac:spMk id="40" creationId="{1FE71E37-6166-0490-58E8-888C8B970604}"/>
-          </ac:spMkLst>
-        </pc:spChg>
-        <pc:spChg chg="add del mod">
-          <ac:chgData name="Fatima Pillosu" userId="a6295d4dc9e22643" providerId="LiveId" clId="{F0B9C950-5C19-45BA-B39E-FADB59417D97}" dt="2025-06-18T08:55:48.261" v="1022" actId="21"/>
-          <ac:spMkLst>
-            <pc:docMk/>
-            <pc:sldMk cId="2412790101" sldId="256"/>
-            <ac:spMk id="41" creationId="{951A946F-24FC-86A6-3A72-C8D4D2433C01}"/>
-          </ac:spMkLst>
-        </pc:spChg>
-        <pc:spChg chg="add del mod">
-          <ac:chgData name="Fatima Pillosu" userId="a6295d4dc9e22643" providerId="LiveId" clId="{F0B9C950-5C19-45BA-B39E-FADB59417D97}" dt="2025-06-18T08:55:48.261" v="1022" actId="21"/>
-          <ac:spMkLst>
-            <pc:docMk/>
-            <pc:sldMk cId="2412790101" sldId="256"/>
-            <ac:spMk id="42" creationId="{B6D31BEC-12CE-7910-9855-7BC31BC02FE2}"/>
-          </ac:spMkLst>
-        </pc:spChg>
-        <pc:spChg chg="add del mod">
-          <ac:chgData name="Fatima Pillosu" userId="a6295d4dc9e22643" providerId="LiveId" clId="{F0B9C950-5C19-45BA-B39E-FADB59417D97}" dt="2025-06-18T08:56:22.750" v="1026" actId="21"/>
-          <ac:spMkLst>
-            <pc:docMk/>
-            <pc:sldMk cId="2412790101" sldId="256"/>
-            <ac:spMk id="43" creationId="{9097776E-A046-4D6E-89DA-50B1F5A3FAF4}"/>
-          </ac:spMkLst>
-        </pc:spChg>
-        <pc:spChg chg="add del mod">
-          <ac:chgData name="Fatima Pillosu" userId="a6295d4dc9e22643" providerId="LiveId" clId="{F0B9C950-5C19-45BA-B39E-FADB59417D97}" dt="2025-06-16T21:48:21.890" v="933" actId="478"/>
-          <ac:spMkLst>
-            <pc:docMk/>
-            <pc:sldMk cId="2412790101" sldId="256"/>
-            <ac:spMk id="43" creationId="{F2436088-889E-27F8-2EEF-6C1B25EEB125}"/>
-          </ac:spMkLst>
-        </pc:spChg>
-        <pc:spChg chg="add del mod">
-          <ac:chgData name="Fatima Pillosu" userId="a6295d4dc9e22643" providerId="LiveId" clId="{F0B9C950-5C19-45BA-B39E-FADB59417D97}" dt="2025-06-18T08:56:22.750" v="1026" actId="21"/>
-          <ac:spMkLst>
-            <pc:docMk/>
-            <pc:sldMk cId="2412790101" sldId="256"/>
-            <ac:spMk id="44" creationId="{8528F7D7-A81B-BC37-30A6-95E2C4569922}"/>
-          </ac:spMkLst>
-        </pc:spChg>
-        <pc:spChg chg="add del mod">
-          <ac:chgData name="Fatima Pillosu" userId="a6295d4dc9e22643" providerId="LiveId" clId="{F0B9C950-5C19-45BA-B39E-FADB59417D97}" dt="2025-06-16T21:48:21.890" v="933" actId="478"/>
-          <ac:spMkLst>
-            <pc:docMk/>
-            <pc:sldMk cId="2412790101" sldId="256"/>
-            <ac:spMk id="44" creationId="{B8281EE7-93D6-9B18-595D-356FDEF8B848}"/>
-          </ac:spMkLst>
-        </pc:spChg>
-        <pc:spChg chg="add del mod">
-          <ac:chgData name="Fatima Pillosu" userId="a6295d4dc9e22643" providerId="LiveId" clId="{F0B9C950-5C19-45BA-B39E-FADB59417D97}" dt="2025-06-18T08:56:22.750" v="1026" actId="21"/>
-          <ac:spMkLst>
-            <pc:docMk/>
-            <pc:sldMk cId="2412790101" sldId="256"/>
-            <ac:spMk id="45" creationId="{24814AF3-44CD-F19E-FF61-4CCDCB6710C1}"/>
-          </ac:spMkLst>
-        </pc:spChg>
-        <pc:spChg chg="add del mod">
-          <ac:chgData name="Fatima Pillosu" userId="a6295d4dc9e22643" providerId="LiveId" clId="{F0B9C950-5C19-45BA-B39E-FADB59417D97}" dt="2025-06-16T21:48:21.890" v="933" actId="478"/>
-          <ac:spMkLst>
-            <pc:docMk/>
-            <pc:sldMk cId="2412790101" sldId="256"/>
-            <ac:spMk id="45" creationId="{CE44919F-0651-92AF-E13E-2D5F82DA4C89}"/>
-          </ac:spMkLst>
-        </pc:spChg>
-        <pc:spChg chg="add del mod">
-          <ac:chgData name="Fatima Pillosu" userId="a6295d4dc9e22643" providerId="LiveId" clId="{F0B9C950-5C19-45BA-B39E-FADB59417D97}" dt="2025-06-16T21:48:21.890" v="933" actId="478"/>
-          <ac:spMkLst>
-            <pc:docMk/>
-            <pc:sldMk cId="2412790101" sldId="256"/>
-            <ac:spMk id="46" creationId="{4D2985CE-5085-0BF7-A4F9-0E6DCBB6E8FF}"/>
-          </ac:spMkLst>
-        </pc:spChg>
-        <pc:spChg chg="add del mod">
-          <ac:chgData name="Fatima Pillosu" userId="a6295d4dc9e22643" providerId="LiveId" clId="{F0B9C950-5C19-45BA-B39E-FADB59417D97}" dt="2025-06-18T08:56:22.750" v="1026" actId="21"/>
-          <ac:spMkLst>
-            <pc:docMk/>
-            <pc:sldMk cId="2412790101" sldId="256"/>
-            <ac:spMk id="46" creationId="{E6F79664-7D05-1CB7-9B16-7CF6037CB7F8}"/>
-          </ac:spMkLst>
-        </pc:spChg>
-        <pc:spChg chg="add del mod">
-          <ac:chgData name="Fatima Pillosu" userId="a6295d4dc9e22643" providerId="LiveId" clId="{F0B9C950-5C19-45BA-B39E-FADB59417D97}" dt="2025-06-18T08:56:22.750" v="1026" actId="21"/>
-          <ac:spMkLst>
-            <pc:docMk/>
-            <pc:sldMk cId="2412790101" sldId="256"/>
-            <ac:spMk id="47" creationId="{D72F21FB-E876-B3EC-8628-148AAE9996E5}"/>
-          </ac:spMkLst>
-        </pc:spChg>
-        <pc:spChg chg="add del mod">
-          <ac:chgData name="Fatima Pillosu" userId="a6295d4dc9e22643" providerId="LiveId" clId="{F0B9C950-5C19-45BA-B39E-FADB59417D97}" dt="2025-06-16T21:48:21.890" v="933" actId="478"/>
-          <ac:spMkLst>
-            <pc:docMk/>
-            <pc:sldMk cId="2412790101" sldId="256"/>
-            <ac:spMk id="47" creationId="{EE781A04-7C56-69E8-F789-9AA41BADF54F}"/>
-          </ac:spMkLst>
-        </pc:spChg>
-        <pc:spChg chg="add del mod">
-          <ac:chgData name="Fatima Pillosu" userId="a6295d4dc9e22643" providerId="LiveId" clId="{F0B9C950-5C19-45BA-B39E-FADB59417D97}" dt="2025-06-18T08:56:22.750" v="1026" actId="21"/>
-          <ac:spMkLst>
-            <pc:docMk/>
-            <pc:sldMk cId="2412790101" sldId="256"/>
-            <ac:spMk id="48" creationId="{0D7A0A59-3B69-64ED-60AB-80D874FCD344}"/>
-          </ac:spMkLst>
-        </pc:spChg>
-        <pc:spChg chg="add del mod">
-          <ac:chgData name="Fatima Pillosu" userId="a6295d4dc9e22643" providerId="LiveId" clId="{F0B9C950-5C19-45BA-B39E-FADB59417D97}" dt="2025-06-16T21:48:21.890" v="933" actId="478"/>
-          <ac:spMkLst>
-            <pc:docMk/>
-            <pc:sldMk cId="2412790101" sldId="256"/>
-            <ac:spMk id="48" creationId="{7F657A6A-40E4-47E8-C3E4-1057A24F71BA}"/>
-          </ac:spMkLst>
-        </pc:spChg>
-        <pc:spChg chg="add del mod">
-          <ac:chgData name="Fatima Pillosu" userId="a6295d4dc9e22643" providerId="LiveId" clId="{F0B9C950-5C19-45BA-B39E-FADB59417D97}" dt="2025-06-18T08:55:48.261" v="1022" actId="21"/>
-          <ac:spMkLst>
-            <pc:docMk/>
-            <pc:sldMk cId="2412790101" sldId="256"/>
-            <ac:spMk id="49" creationId="{3A5CD0EB-6B55-2725-6E3F-17726052CCE4}"/>
-          </ac:spMkLst>
-        </pc:spChg>
-        <pc:spChg chg="add del mod">
-          <ac:chgData name="Fatima Pillosu" userId="a6295d4dc9e22643" providerId="LiveId" clId="{F0B9C950-5C19-45BA-B39E-FADB59417D97}" dt="2025-06-18T08:55:48.261" v="1022" actId="21"/>
-          <ac:spMkLst>
-            <pc:docMk/>
-            <pc:sldMk cId="2412790101" sldId="256"/>
-            <ac:spMk id="50" creationId="{DA3F88A4-982E-EB2C-A843-AE6C9C1F2CF3}"/>
-          </ac:spMkLst>
-        </pc:spChg>
-        <pc:spChg chg="add del mod">
-          <ac:chgData name="Fatima Pillosu" userId="a6295d4dc9e22643" providerId="LiveId" clId="{F0B9C950-5C19-45BA-B39E-FADB59417D97}" dt="2025-06-18T08:55:48.261" v="1022" actId="21"/>
-          <ac:spMkLst>
-            <pc:docMk/>
-            <pc:sldMk cId="2412790101" sldId="256"/>
-            <ac:spMk id="51" creationId="{0C70AC90-3132-131D-55B9-12D8EAA513A6}"/>
+            <ac:spMk id="55" creationId="{541DE2BE-828B-C425-73CD-1775A4E7A79E}"/>
           </ac:spMkLst>
         </pc:spChg>
         <pc:spChg chg="add del mod">
@@ -935,15 +1119,15 @@
           <ac:spMkLst>
             <pc:docMk/>
             <pc:sldMk cId="2412790101" sldId="256"/>
-            <ac:spMk id="52" creationId="{10B3F3B2-D550-5D75-766F-A98D1A5E6D0B}"/>
-          </ac:spMkLst>
-        </pc:spChg>
-        <pc:spChg chg="add del mod">
-          <ac:chgData name="Fatima Pillosu" userId="a6295d4dc9e22643" providerId="LiveId" clId="{F0B9C950-5C19-45BA-B39E-FADB59417D97}" dt="2025-06-18T08:56:22.750" v="1026" actId="21"/>
-          <ac:spMkLst>
-            <pc:docMk/>
-            <pc:sldMk cId="2412790101" sldId="256"/>
-            <ac:spMk id="52" creationId="{395C51C3-D025-9D90-DE2F-5E2BD772360E}"/>
+            <ac:spMk id="55" creationId="{A021CC37-1CD7-1EB2-79DA-105DD5A1F74A}"/>
+          </ac:spMkLst>
+        </pc:spChg>
+        <pc:spChg chg="add del mod">
+          <ac:chgData name="Fatima Pillosu" userId="a6295d4dc9e22643" providerId="LiveId" clId="{F0B9C950-5C19-45BA-B39E-FADB59417D97}" dt="2025-06-18T10:35:42.039" v="1396" actId="478"/>
+          <ac:spMkLst>
+            <pc:docMk/>
+            <pc:sldMk cId="2412790101" sldId="256"/>
+            <ac:spMk id="55" creationId="{EFF16D4E-F358-C17D-62EE-6616F95C8C29}"/>
           </ac:spMkLst>
         </pc:spChg>
         <pc:spChg chg="add del mod">
@@ -951,55 +1135,15 @@
           <ac:spMkLst>
             <pc:docMk/>
             <pc:sldMk cId="2412790101" sldId="256"/>
-            <ac:spMk id="53" creationId="{13ABE3E0-2167-01FF-6150-9F5A8298C6B1}"/>
-          </ac:spMkLst>
-        </pc:spChg>
-        <pc:spChg chg="add del mod">
-          <ac:chgData name="Fatima Pillosu" userId="a6295d4dc9e22643" providerId="LiveId" clId="{F0B9C950-5C19-45BA-B39E-FADB59417D97}" dt="2025-06-18T08:56:22.750" v="1026" actId="21"/>
-          <ac:spMkLst>
-            <pc:docMk/>
-            <pc:sldMk cId="2412790101" sldId="256"/>
-            <ac:spMk id="53" creationId="{500A8CFC-93BD-87AD-C58A-DCD3EB34FAB6}"/>
-          </ac:spMkLst>
-        </pc:spChg>
-        <pc:spChg chg="add del mod">
-          <ac:chgData name="Fatima Pillosu" userId="a6295d4dc9e22643" providerId="LiveId" clId="{F0B9C950-5C19-45BA-B39E-FADB59417D97}" dt="2025-06-16T21:22:18.109" v="241" actId="478"/>
-          <ac:spMkLst>
-            <pc:docMk/>
-            <pc:sldMk cId="2412790101" sldId="256"/>
-            <ac:spMk id="54" creationId="{0B4B8E5F-E463-3AEC-270F-183051860A7B}"/>
-          </ac:spMkLst>
-        </pc:spChg>
-        <pc:spChg chg="add del mod">
-          <ac:chgData name="Fatima Pillosu" userId="a6295d4dc9e22643" providerId="LiveId" clId="{F0B9C950-5C19-45BA-B39E-FADB59417D97}" dt="2025-06-18T08:56:22.750" v="1026" actId="21"/>
-          <ac:spMkLst>
-            <pc:docMk/>
-            <pc:sldMk cId="2412790101" sldId="256"/>
-            <ac:spMk id="54" creationId="{3DBF3549-D2E3-38EE-CF84-93B78B0AA1D7}"/>
-          </ac:spMkLst>
-        </pc:spChg>
-        <pc:spChg chg="add del mod">
-          <ac:chgData name="Fatima Pillosu" userId="a6295d4dc9e22643" providerId="LiveId" clId="{F0B9C950-5C19-45BA-B39E-FADB59417D97}" dt="2025-06-18T08:56:22.750" v="1026" actId="21"/>
-          <ac:spMkLst>
-            <pc:docMk/>
-            <pc:sldMk cId="2412790101" sldId="256"/>
-            <ac:spMk id="55" creationId="{541DE2BE-828B-C425-73CD-1775A4E7A79E}"/>
-          </ac:spMkLst>
-        </pc:spChg>
-        <pc:spChg chg="add del mod">
-          <ac:chgData name="Fatima Pillosu" userId="a6295d4dc9e22643" providerId="LiveId" clId="{F0B9C950-5C19-45BA-B39E-FADB59417D97}" dt="2025-06-16T21:22:18.109" v="241" actId="478"/>
-          <ac:spMkLst>
-            <pc:docMk/>
-            <pc:sldMk cId="2412790101" sldId="256"/>
-            <ac:spMk id="55" creationId="{A021CC37-1CD7-1EB2-79DA-105DD5A1F74A}"/>
-          </ac:spMkLst>
-        </pc:spChg>
-        <pc:spChg chg="add del mod">
-          <ac:chgData name="Fatima Pillosu" userId="a6295d4dc9e22643" providerId="LiveId" clId="{F0B9C950-5C19-45BA-B39E-FADB59417D97}" dt="2025-06-16T21:22:18.109" v="241" actId="478"/>
-          <ac:spMkLst>
-            <pc:docMk/>
-            <pc:sldMk cId="2412790101" sldId="256"/>
             <ac:spMk id="56" creationId="{1A09656C-CB17-5C56-2150-CB0A1765180D}"/>
+          </ac:spMkLst>
+        </pc:spChg>
+        <pc:spChg chg="add del mod">
+          <ac:chgData name="Fatima Pillosu" userId="a6295d4dc9e22643" providerId="LiveId" clId="{F0B9C950-5C19-45BA-B39E-FADB59417D97}" dt="2025-06-18T10:35:42.039" v="1396" actId="478"/>
+          <ac:spMkLst>
+            <pc:docMk/>
+            <pc:sldMk cId="2412790101" sldId="256"/>
+            <ac:spMk id="56" creationId="{1DEE8B73-004C-166B-C391-1DC474B2DC5D}"/>
           </ac:spMkLst>
         </pc:spChg>
         <pc:spChg chg="add del mod">
@@ -1019,11 +1163,27 @@
           </ac:spMkLst>
         </pc:spChg>
         <pc:spChg chg="add del mod">
+          <ac:chgData name="Fatima Pillosu" userId="a6295d4dc9e22643" providerId="LiveId" clId="{F0B9C950-5C19-45BA-B39E-FADB59417D97}" dt="2025-06-18T10:35:42.039" v="1396" actId="478"/>
+          <ac:spMkLst>
+            <pc:docMk/>
+            <pc:sldMk cId="2412790101" sldId="256"/>
+            <ac:spMk id="57" creationId="{74458017-F419-8326-E8EB-735317435C51}"/>
+          </ac:spMkLst>
+        </pc:spChg>
+        <pc:spChg chg="add del mod">
           <ac:chgData name="Fatima Pillosu" userId="a6295d4dc9e22643" providerId="LiveId" clId="{F0B9C950-5C19-45BA-B39E-FADB59417D97}" dt="2025-06-18T08:56:22.750" v="1026" actId="21"/>
           <ac:spMkLst>
             <pc:docMk/>
             <pc:sldMk cId="2412790101" sldId="256"/>
             <ac:spMk id="58" creationId="{4D8EA029-FC88-A23B-4193-BBABB3998E88}"/>
+          </ac:spMkLst>
+        </pc:spChg>
+        <pc:spChg chg="add del mod">
+          <ac:chgData name="Fatima Pillosu" userId="a6295d4dc9e22643" providerId="LiveId" clId="{F0B9C950-5C19-45BA-B39E-FADB59417D97}" dt="2025-06-18T10:35:42.039" v="1396" actId="478"/>
+          <ac:spMkLst>
+            <pc:docMk/>
+            <pc:sldMk cId="2412790101" sldId="256"/>
+            <ac:spMk id="58" creationId="{B3883CC7-089A-D614-9291-95847C22E79E}"/>
           </ac:spMkLst>
         </pc:spChg>
         <pc:spChg chg="del mod">
@@ -1034,6 +1194,14 @@
             <ac:spMk id="58" creationId="{E38ABB4D-863F-E734-71F8-6A361F5E1DE3}"/>
           </ac:spMkLst>
         </pc:spChg>
+        <pc:spChg chg="add del mod">
+          <ac:chgData name="Fatima Pillosu" userId="a6295d4dc9e22643" providerId="LiveId" clId="{F0B9C950-5C19-45BA-B39E-FADB59417D97}" dt="2025-06-18T10:35:42.039" v="1396" actId="478"/>
+          <ac:spMkLst>
+            <pc:docMk/>
+            <pc:sldMk cId="2412790101" sldId="256"/>
+            <ac:spMk id="59" creationId="{515C692C-D219-2089-6FCE-4EE7F420B9A0}"/>
+          </ac:spMkLst>
+        </pc:spChg>
         <pc:spChg chg="del mod">
           <ac:chgData name="Fatima Pillosu" userId="a6295d4dc9e22643" providerId="LiveId" clId="{F0B9C950-5C19-45BA-B39E-FADB59417D97}" dt="2025-06-16T21:12:06.361" v="61" actId="21"/>
           <ac:spMkLst>
@@ -1058,6 +1226,14 @@
             <ac:spMk id="60" creationId="{386A4F79-10E9-1934-66C0-03AA4A7C99CE}"/>
           </ac:spMkLst>
         </pc:spChg>
+        <pc:spChg chg="add mod">
+          <ac:chgData name="Fatima Pillosu" userId="a6295d4dc9e22643" providerId="LiveId" clId="{F0B9C950-5C19-45BA-B39E-FADB59417D97}" dt="2025-06-18T10:36:36.047" v="1420" actId="1035"/>
+          <ac:spMkLst>
+            <pc:docMk/>
+            <pc:sldMk cId="2412790101" sldId="256"/>
+            <ac:spMk id="60" creationId="{4CB4D06F-1CFC-86DB-9C76-5F0C3731175E}"/>
+          </ac:spMkLst>
+        </pc:spChg>
         <pc:spChg chg="del mod">
           <ac:chgData name="Fatima Pillosu" userId="a6295d4dc9e22643" providerId="LiveId" clId="{F0B9C950-5C19-45BA-B39E-FADB59417D97}" dt="2025-06-16T21:12:06.361" v="61" actId="21"/>
           <ac:spMkLst>
@@ -1066,6 +1242,14 @@
             <ac:spMk id="60" creationId="{94699DC0-F296-4F13-1267-BB22E3869038}"/>
           </ac:spMkLst>
         </pc:spChg>
+        <pc:spChg chg="add mod">
+          <ac:chgData name="Fatima Pillosu" userId="a6295d4dc9e22643" providerId="LiveId" clId="{F0B9C950-5C19-45BA-B39E-FADB59417D97}" dt="2025-06-18T10:36:01.144" v="1398" actId="1076"/>
+          <ac:spMkLst>
+            <pc:docMk/>
+            <pc:sldMk cId="2412790101" sldId="256"/>
+            <ac:spMk id="61" creationId="{3677E649-7591-CF6E-4DD8-9E544C86BDA1}"/>
+          </ac:spMkLst>
+        </pc:spChg>
         <pc:spChg chg="add del">
           <ac:chgData name="Fatima Pillosu" userId="a6295d4dc9e22643" providerId="LiveId" clId="{F0B9C950-5C19-45BA-B39E-FADB59417D97}" dt="2025-06-18T08:56:21.061" v="1025" actId="478"/>
           <ac:spMkLst>
@@ -1082,6 +1266,14 @@
             <ac:spMk id="61" creationId="{B70B7DAE-BBF8-26B9-F316-694D75EF55A1}"/>
           </ac:spMkLst>
         </pc:spChg>
+        <pc:spChg chg="add mod">
+          <ac:chgData name="Fatima Pillosu" userId="a6295d4dc9e22643" providerId="LiveId" clId="{F0B9C950-5C19-45BA-B39E-FADB59417D97}" dt="2025-06-18T10:36:33.367" v="1415" actId="1036"/>
+          <ac:spMkLst>
+            <pc:docMk/>
+            <pc:sldMk cId="2412790101" sldId="256"/>
+            <ac:spMk id="62" creationId="{2BFE8251-FDEF-457C-6AFD-2E5AF06DF895}"/>
+          </ac:spMkLst>
+        </pc:spChg>
         <pc:spChg chg="add del mod">
           <ac:chgData name="Fatima Pillosu" userId="a6295d4dc9e22643" providerId="LiveId" clId="{F0B9C950-5C19-45BA-B39E-FADB59417D97}" dt="2025-06-18T09:01:43.107" v="1161" actId="21"/>
           <ac:spMkLst>
@@ -1098,6 +1290,14 @@
             <ac:spMk id="62" creationId="{DA0A3A3F-6F21-9FFB-DFE8-C73B8123777A}"/>
           </ac:spMkLst>
         </pc:spChg>
+        <pc:spChg chg="add mod">
+          <ac:chgData name="Fatima Pillosu" userId="a6295d4dc9e22643" providerId="LiveId" clId="{F0B9C950-5C19-45BA-B39E-FADB59417D97}" dt="2025-06-18T10:36:29.548" v="1410" actId="1035"/>
+          <ac:spMkLst>
+            <pc:docMk/>
+            <pc:sldMk cId="2412790101" sldId="256"/>
+            <ac:spMk id="63" creationId="{80A2885C-C700-FB46-FB9D-5B6CEDF2F266}"/>
+          </ac:spMkLst>
+        </pc:spChg>
         <pc:spChg chg="del mod">
           <ac:chgData name="Fatima Pillosu" userId="a6295d4dc9e22643" providerId="LiveId" clId="{F0B9C950-5C19-45BA-B39E-FADB59417D97}" dt="2025-06-16T21:12:06.361" v="61" actId="21"/>
           <ac:spMkLst>
@@ -1114,6 +1314,14 @@
             <ac:spMk id="63" creationId="{E38ABB4D-863F-E734-71F8-6A361F5E1DE3}"/>
           </ac:spMkLst>
         </pc:spChg>
+        <pc:spChg chg="add mod">
+          <ac:chgData name="Fatima Pillosu" userId="a6295d4dc9e22643" providerId="LiveId" clId="{F0B9C950-5C19-45BA-B39E-FADB59417D97}" dt="2025-06-18T10:36:08.210" v="1400" actId="1076"/>
+          <ac:spMkLst>
+            <pc:docMk/>
+            <pc:sldMk cId="2412790101" sldId="256"/>
+            <ac:spMk id="64" creationId="{36D3542B-779B-AA13-5BF1-D5B361BB166D}"/>
+          </ac:spMkLst>
+        </pc:spChg>
         <pc:spChg chg="add del mod">
           <ac:chgData name="Fatima Pillosu" userId="a6295d4dc9e22643" providerId="LiveId" clId="{F0B9C950-5C19-45BA-B39E-FADB59417D97}" dt="2025-06-18T09:01:43.107" v="1161" actId="21"/>
           <ac:spMkLst>
@@ -1144,6 +1352,14 @@
             <pc:docMk/>
             <pc:sldMk cId="2412790101" sldId="256"/>
             <ac:spMk id="65" creationId="{94699DC0-F296-4F13-1267-BB22E3869038}"/>
+          </ac:spMkLst>
+        </pc:spChg>
+        <pc:spChg chg="add mod">
+          <ac:chgData name="Fatima Pillosu" userId="a6295d4dc9e22643" providerId="LiveId" clId="{F0B9C950-5C19-45BA-B39E-FADB59417D97}" dt="2025-06-18T10:36:26.667" v="1405" actId="1036"/>
+          <ac:spMkLst>
+            <pc:docMk/>
+            <pc:sldMk cId="2412790101" sldId="256"/>
+            <ac:spMk id="65" creationId="{DFF9F863-65F7-D89A-853C-C1170C80C088}"/>
           </ac:spMkLst>
         </pc:spChg>
         <pc:spChg chg="add del mod">
@@ -6702,6 +6918,64 @@
       </p:grpSpPr>
       <p:sp>
         <p:nvSpPr>
+          <p:cNvPr id="41" name="Rectangle 40">
+            <a:extLst>
+              <a:ext uri="{FF2B5EF4-FFF2-40B4-BE49-F238E27FC236}">
+                <a16:creationId xmlns:a16="http://schemas.microsoft.com/office/drawing/2014/main" id="{6E0A576C-FEB4-8631-B956-C0ECE587A165}"/>
+              </a:ext>
+            </a:extLst>
+          </p:cNvPr>
+          <p:cNvSpPr/>
+          <p:nvPr/>
+        </p:nvSpPr>
+        <p:spPr>
+          <a:xfrm>
+            <a:off x="1516134" y="3447932"/>
+            <a:ext cx="2412000" cy="645433"/>
+          </a:xfrm>
+          <a:prstGeom prst="rect">
+            <a:avLst/>
+          </a:prstGeom>
+          <a:solidFill>
+            <a:schemeClr val="bg1">
+              <a:lumMod val="85000"/>
+            </a:schemeClr>
+          </a:solidFill>
+          <a:ln w="3175">
+            <a:solidFill>
+              <a:schemeClr val="bg1">
+                <a:lumMod val="85000"/>
+              </a:schemeClr>
+            </a:solidFill>
+          </a:ln>
+        </p:spPr>
+        <p:style>
+          <a:lnRef idx="2">
+            <a:schemeClr val="accent1">
+              <a:shade val="15000"/>
+            </a:schemeClr>
+          </a:lnRef>
+          <a:fillRef idx="1">
+            <a:schemeClr val="accent1"/>
+          </a:fillRef>
+          <a:effectRef idx="0">
+            <a:schemeClr val="accent1"/>
+          </a:effectRef>
+          <a:fontRef idx="minor">
+            <a:schemeClr val="lt1"/>
+          </a:fontRef>
+        </p:style>
+        <p:txBody>
+          <a:bodyPr rtlCol="0" anchor="ctr"/>
+          <a:lstStyle/>
+          <a:p>
+            <a:pPr algn="ctr"/>
+            <a:endParaRPr lang="en-GB" dirty="0"/>
+          </a:p>
+        </p:txBody>
+      </p:sp>
+      <p:sp>
+        <p:nvSpPr>
           <p:cNvPr id="3" name="Rectangle 2">
             <a:extLst>
               <a:ext uri="{FF2B5EF4-FFF2-40B4-BE49-F238E27FC236}">
@@ -6714,8 +6988,8 @@
         </p:nvSpPr>
         <p:spPr>
           <a:xfrm>
-            <a:off x="26752" y="3439942"/>
-            <a:ext cx="4083522" cy="2067077"/>
+            <a:off x="26752" y="3385670"/>
+            <a:ext cx="4083522" cy="2121350"/>
           </a:xfrm>
           <a:prstGeom prst="rect">
             <a:avLst/>
@@ -7674,258 +7948,6 @@
       </p:sp>
       <p:sp>
         <p:nvSpPr>
-          <p:cNvPr id="17" name="Rectangle 16">
-            <a:extLst>
-              <a:ext uri="{FF2B5EF4-FFF2-40B4-BE49-F238E27FC236}">
-                <a16:creationId xmlns:a16="http://schemas.microsoft.com/office/drawing/2014/main" id="{4E1DAB7F-CDAC-4060-D2E3-855C223F00C0}"/>
-              </a:ext>
-            </a:extLst>
-          </p:cNvPr>
-          <p:cNvSpPr/>
-          <p:nvPr/>
-        </p:nvSpPr>
-        <p:spPr>
-          <a:xfrm>
-            <a:off x="382670" y="3537601"/>
-            <a:ext cx="1152000" cy="1774583"/>
-          </a:xfrm>
-          <a:prstGeom prst="rect">
-            <a:avLst/>
-          </a:prstGeom>
-          <a:gradFill flip="none" rotWithShape="1">
-            <a:gsLst>
-              <a:gs pos="0">
-                <a:schemeClr val="bg1">
-                  <a:lumMod val="75000"/>
-                </a:schemeClr>
-              </a:gs>
-              <a:gs pos="100000">
-                <a:schemeClr val="bg1">
-                  <a:lumMod val="85000"/>
-                </a:schemeClr>
-              </a:gs>
-            </a:gsLst>
-            <a:lin ang="16200000" scaled="1"/>
-            <a:tileRect/>
-          </a:gradFill>
-          <a:ln w="3175">
-            <a:solidFill>
-              <a:schemeClr val="bg1">
-                <a:lumMod val="85000"/>
-              </a:schemeClr>
-            </a:solidFill>
-          </a:ln>
-        </p:spPr>
-        <p:style>
-          <a:lnRef idx="2">
-            <a:schemeClr val="accent1">
-              <a:shade val="15000"/>
-            </a:schemeClr>
-          </a:lnRef>
-          <a:fillRef idx="1">
-            <a:schemeClr val="accent1"/>
-          </a:fillRef>
-          <a:effectRef idx="0">
-            <a:schemeClr val="accent1"/>
-          </a:effectRef>
-          <a:fontRef idx="minor">
-            <a:schemeClr val="lt1"/>
-          </a:fontRef>
-        </p:style>
-        <p:txBody>
-          <a:bodyPr rtlCol="0" anchor="ctr"/>
-          <a:lstStyle/>
-          <a:p>
-            <a:pPr algn="ctr"/>
-            <a:endParaRPr lang="en-GB" dirty="0"/>
-          </a:p>
-        </p:txBody>
-      </p:sp>
-      <p:sp>
-        <p:nvSpPr>
-          <p:cNvPr id="18" name="TextBox 17">
-            <a:extLst>
-              <a:ext uri="{FF2B5EF4-FFF2-40B4-BE49-F238E27FC236}">
-                <a16:creationId xmlns:a16="http://schemas.microsoft.com/office/drawing/2014/main" id="{1FE71E37-6166-0490-58E8-888C8B970604}"/>
-              </a:ext>
-            </a:extLst>
-          </p:cNvPr>
-          <p:cNvSpPr txBox="1"/>
-          <p:nvPr/>
-        </p:nvSpPr>
-        <p:spPr>
-          <a:xfrm>
-            <a:off x="379668" y="4741613"/>
-            <a:ext cx="1464286" cy="400110"/>
-          </a:xfrm>
-          <a:prstGeom prst="rect">
-            <a:avLst/>
-          </a:prstGeom>
-          <a:noFill/>
-        </p:spPr>
-        <p:txBody>
-          <a:bodyPr wrap="square" rtlCol="0">
-            <a:spAutoFit/>
-          </a:bodyPr>
-          <a:lstStyle/>
-          <a:p>
-            <a:r>
-              <a:rPr lang="en-GB" sz="2000" b="1" dirty="0">
-                <a:solidFill>
-                  <a:schemeClr val="bg1"/>
-                </a:solidFill>
-                <a:latin typeface="Calibri" panose="020F0502020204030204" pitchFamily="34" charset="0"/>
-                <a:cs typeface="Calibri" panose="020F0502020204030204" pitchFamily="34" charset="0"/>
-              </a:rPr>
-              <a:t>Section</a:t>
-            </a:r>
-          </a:p>
-        </p:txBody>
-      </p:sp>
-      <p:sp>
-        <p:nvSpPr>
-          <p:cNvPr id="19" name="TextBox 18">
-            <a:extLst>
-              <a:ext uri="{FF2B5EF4-FFF2-40B4-BE49-F238E27FC236}">
-                <a16:creationId xmlns:a16="http://schemas.microsoft.com/office/drawing/2014/main" id="{951A946F-24FC-86A6-3A72-C8D4D2433C01}"/>
-              </a:ext>
-            </a:extLst>
-          </p:cNvPr>
-          <p:cNvSpPr txBox="1"/>
-          <p:nvPr/>
-        </p:nvSpPr>
-        <p:spPr>
-          <a:xfrm>
-            <a:off x="363192" y="4808225"/>
-            <a:ext cx="963142" cy="553998"/>
-          </a:xfrm>
-          <a:prstGeom prst="rect">
-            <a:avLst/>
-          </a:prstGeom>
-          <a:noFill/>
-        </p:spPr>
-        <p:txBody>
-          <a:bodyPr wrap="square" rtlCol="0">
-            <a:spAutoFit/>
-          </a:bodyPr>
-          <a:lstStyle/>
-          <a:p>
-            <a:r>
-              <a:rPr lang="en-GB" sz="3000" b="1" dirty="0">
-                <a:solidFill>
-                  <a:schemeClr val="tx1">
-                    <a:lumMod val="95000"/>
-                    <a:lumOff val="5000"/>
-                  </a:schemeClr>
-                </a:solidFill>
-                <a:latin typeface="Calibri" panose="020F0502020204030204" pitchFamily="34" charset="0"/>
-                <a:cs typeface="Calibri" panose="020F0502020204030204" pitchFamily="34" charset="0"/>
-              </a:rPr>
-              <a:t>3.1</a:t>
-            </a:r>
-          </a:p>
-        </p:txBody>
-      </p:sp>
-      <p:sp>
-        <p:nvSpPr>
-          <p:cNvPr id="20" name="TextBox 19">
-            <a:extLst>
-              <a:ext uri="{FF2B5EF4-FFF2-40B4-BE49-F238E27FC236}">
-                <a16:creationId xmlns:a16="http://schemas.microsoft.com/office/drawing/2014/main" id="{B6D31BEC-12CE-7910-9855-7BC31BC02FE2}"/>
-              </a:ext>
-            </a:extLst>
-          </p:cNvPr>
-          <p:cNvSpPr txBox="1"/>
-          <p:nvPr/>
-        </p:nvSpPr>
-        <p:spPr>
-          <a:xfrm>
-            <a:off x="381156" y="3587981"/>
-            <a:ext cx="1152000" cy="1200329"/>
-          </a:xfrm>
-          <a:prstGeom prst="rect">
-            <a:avLst/>
-          </a:prstGeom>
-          <a:noFill/>
-        </p:spPr>
-        <p:txBody>
-          <a:bodyPr wrap="square" rtlCol="0">
-            <a:spAutoFit/>
-          </a:bodyPr>
-          <a:lstStyle/>
-          <a:p>
-            <a:r>
-              <a:rPr lang="en-GB" sz="800" b="1" dirty="0">
-                <a:solidFill>
-                  <a:schemeClr val="tx1">
-                    <a:lumMod val="95000"/>
-                    <a:lumOff val="5000"/>
-                  </a:schemeClr>
-                </a:solidFill>
-                <a:latin typeface="Calibri" panose="020F0502020204030204" pitchFamily="34" charset="0"/>
-                <a:cs typeface="Calibri" panose="020F0502020204030204" pitchFamily="34" charset="0"/>
-              </a:rPr>
-              <a:t>SELECTION OF </a:t>
-            </a:r>
-          </a:p>
-          <a:p>
-            <a:r>
-              <a:rPr lang="en-GB" sz="800" b="1" dirty="0">
-                <a:solidFill>
-                  <a:schemeClr val="tx1">
-                    <a:lumMod val="95000"/>
-                    <a:lumOff val="5000"/>
-                  </a:schemeClr>
-                </a:solidFill>
-                <a:latin typeface="Calibri" panose="020F0502020204030204" pitchFamily="34" charset="0"/>
-                <a:cs typeface="Calibri" panose="020F0502020204030204" pitchFamily="34" charset="0"/>
-              </a:rPr>
-              <a:t>DATA SOURCES </a:t>
-            </a:r>
-          </a:p>
-          <a:p>
-            <a:endParaRPr lang="en-GB" sz="800" b="1" dirty="0">
-              <a:solidFill>
-                <a:schemeClr val="tx1">
-                  <a:lumMod val="95000"/>
-                  <a:lumOff val="5000"/>
-                </a:schemeClr>
-              </a:solidFill>
-              <a:latin typeface="Calibri" panose="020F0502020204030204" pitchFamily="34" charset="0"/>
-              <a:cs typeface="Calibri" panose="020F0502020204030204" pitchFamily="34" charset="0"/>
-            </a:endParaRPr>
-          </a:p>
-          <a:p>
-            <a:endParaRPr lang="en-GB" sz="800" b="1" dirty="0">
-              <a:solidFill>
-                <a:schemeClr val="tx1">
-                  <a:lumMod val="95000"/>
-                  <a:lumOff val="5000"/>
-                </a:schemeClr>
-              </a:solidFill>
-              <a:latin typeface="Calibri" panose="020F0502020204030204" pitchFamily="34" charset="0"/>
-              <a:cs typeface="Calibri" panose="020F0502020204030204" pitchFamily="34" charset="0"/>
-            </a:endParaRPr>
-          </a:p>
-          <a:p>
-            <a:r>
-              <a:rPr lang="en-GB" sz="800" dirty="0">
-                <a:solidFill>
-                  <a:schemeClr val="tx1">
-                    <a:lumMod val="95000"/>
-                    <a:lumOff val="5000"/>
-                  </a:schemeClr>
-                </a:solidFill>
-                <a:latin typeface="Calibri Light" panose="020F0302020204030204" pitchFamily="34" charset="0"/>
-                <a:cs typeface="Calibri Light" panose="020F0302020204030204" pitchFamily="34" charset="0"/>
-              </a:rPr>
-              <a:t>For model development and operational implementation, and forecast verification. </a:t>
-            </a:r>
-          </a:p>
-        </p:txBody>
-      </p:sp>
-      <p:sp>
-        <p:nvSpPr>
           <p:cNvPr id="21" name="Rectangle 20">
             <a:extLst>
               <a:ext uri="{FF2B5EF4-FFF2-40B4-BE49-F238E27FC236}">
@@ -7938,118 +7960,14 @@
         </p:nvSpPr>
         <p:spPr>
           <a:xfrm>
-            <a:off x="379668" y="5351677"/>
-            <a:ext cx="360000" cy="90000"/>
+            <a:off x="3969185" y="3474631"/>
+            <a:ext cx="72000" cy="180000"/>
           </a:xfrm>
           <a:prstGeom prst="rect">
             <a:avLst/>
           </a:prstGeom>
           <a:solidFill>
             <a:srgbClr val="FF595E"/>
-          </a:solidFill>
-          <a:ln>
-            <a:noFill/>
-          </a:ln>
-        </p:spPr>
-        <p:style>
-          <a:lnRef idx="2">
-            <a:schemeClr val="accent1">
-              <a:shade val="15000"/>
-            </a:schemeClr>
-          </a:lnRef>
-          <a:fillRef idx="1">
-            <a:schemeClr val="accent1"/>
-          </a:fillRef>
-          <a:effectRef idx="0">
-            <a:schemeClr val="accent1"/>
-          </a:effectRef>
-          <a:fontRef idx="minor">
-            <a:schemeClr val="lt1"/>
-          </a:fontRef>
-        </p:style>
-        <p:txBody>
-          <a:bodyPr rtlCol="0" anchor="ctr"/>
-          <a:lstStyle/>
-          <a:p>
-            <a:pPr algn="ctr"/>
-            <a:endParaRPr lang="en-GB"/>
-          </a:p>
-        </p:txBody>
-      </p:sp>
-      <p:sp>
-        <p:nvSpPr>
-          <p:cNvPr id="22" name="Rectangle 21">
-            <a:extLst>
-              <a:ext uri="{FF2B5EF4-FFF2-40B4-BE49-F238E27FC236}">
-                <a16:creationId xmlns:a16="http://schemas.microsoft.com/office/drawing/2014/main" id="{DA3F88A4-982E-EB2C-A843-AE6C9C1F2CF3}"/>
-              </a:ext>
-            </a:extLst>
-          </p:cNvPr>
-          <p:cNvSpPr/>
-          <p:nvPr/>
-        </p:nvSpPr>
-        <p:spPr>
-          <a:xfrm>
-            <a:off x="775882" y="5351677"/>
-            <a:ext cx="360000" cy="90000"/>
-          </a:xfrm>
-          <a:prstGeom prst="rect">
-            <a:avLst/>
-          </a:prstGeom>
-          <a:solidFill>
-            <a:srgbClr val="E68301"/>
-          </a:solidFill>
-          <a:ln>
-            <a:noFill/>
-          </a:ln>
-        </p:spPr>
-        <p:style>
-          <a:lnRef idx="2">
-            <a:schemeClr val="accent1">
-              <a:shade val="15000"/>
-            </a:schemeClr>
-          </a:lnRef>
-          <a:fillRef idx="1">
-            <a:schemeClr val="accent1"/>
-          </a:fillRef>
-          <a:effectRef idx="0">
-            <a:schemeClr val="accent1"/>
-          </a:effectRef>
-          <a:fontRef idx="minor">
-            <a:schemeClr val="lt1"/>
-          </a:fontRef>
-        </p:style>
-        <p:txBody>
-          <a:bodyPr rtlCol="0" anchor="ctr"/>
-          <a:lstStyle/>
-          <a:p>
-            <a:pPr algn="ctr"/>
-            <a:endParaRPr lang="en-GB"/>
-          </a:p>
-        </p:txBody>
-      </p:sp>
-      <p:sp>
-        <p:nvSpPr>
-          <p:cNvPr id="23" name="Rectangle 22">
-            <a:extLst>
-              <a:ext uri="{FF2B5EF4-FFF2-40B4-BE49-F238E27FC236}">
-                <a16:creationId xmlns:a16="http://schemas.microsoft.com/office/drawing/2014/main" id="{0C70AC90-3132-131D-55B9-12D8EAA513A6}"/>
-              </a:ext>
-            </a:extLst>
-          </p:cNvPr>
-          <p:cNvSpPr/>
-          <p:nvPr/>
-        </p:nvSpPr>
-        <p:spPr>
-          <a:xfrm>
-            <a:off x="1172096" y="5351677"/>
-            <a:ext cx="360000" cy="90000"/>
-          </a:xfrm>
-          <a:prstGeom prst="rect">
-            <a:avLst/>
-          </a:prstGeom>
-          <a:solidFill>
-            <a:srgbClr val="3F37C9"/>
           </a:solidFill>
           <a:ln>
             <a:noFill/>
@@ -8293,10 +8211,10 @@
       </p:sp>
       <p:sp>
         <p:nvSpPr>
-          <p:cNvPr id="27" name="Rectangle 26">
+          <p:cNvPr id="2" name="Rectangle 1">
             <a:extLst>
               <a:ext uri="{FF2B5EF4-FFF2-40B4-BE49-F238E27FC236}">
-                <a16:creationId xmlns:a16="http://schemas.microsoft.com/office/drawing/2014/main" id="{8528F7D7-A81B-BC37-30A6-95E2C4569922}"/>
+                <a16:creationId xmlns:a16="http://schemas.microsoft.com/office/drawing/2014/main" id="{E90C6C9F-C26A-BA0C-97C9-D400337436C7}"/>
               </a:ext>
             </a:extLst>
           </p:cNvPr>
@@ -8305,28 +8223,17 @@
         </p:nvSpPr>
         <p:spPr>
           <a:xfrm>
-            <a:off x="1630938" y="3537601"/>
-            <a:ext cx="1152000" cy="1774583"/>
+            <a:off x="400487" y="3447932"/>
+            <a:ext cx="1119889" cy="645433"/>
           </a:xfrm>
           <a:prstGeom prst="rect">
             <a:avLst/>
           </a:prstGeom>
-          <a:gradFill flip="none" rotWithShape="1">
-            <a:gsLst>
-              <a:gs pos="0">
-                <a:schemeClr val="bg1">
-                  <a:lumMod val="75000"/>
-                </a:schemeClr>
-              </a:gs>
-              <a:gs pos="100000">
-                <a:schemeClr val="bg1">
-                  <a:lumMod val="85000"/>
-                </a:schemeClr>
-              </a:gs>
-            </a:gsLst>
-            <a:lin ang="16200000" scaled="1"/>
-            <a:tileRect/>
-          </a:gradFill>
+          <a:solidFill>
+            <a:schemeClr val="bg1">
+              <a:lumMod val="75000"/>
+            </a:schemeClr>
+          </a:solidFill>
           <a:ln w="3175">
             <a:solidFill>
               <a:schemeClr val="bg1">
@@ -8362,10 +8269,154 @@
       </p:sp>
       <p:sp>
         <p:nvSpPr>
-          <p:cNvPr id="28" name="Rectangle 27">
+          <p:cNvPr id="40" name="TextBox 39">
             <a:extLst>
               <a:ext uri="{FF2B5EF4-FFF2-40B4-BE49-F238E27FC236}">
-                <a16:creationId xmlns:a16="http://schemas.microsoft.com/office/drawing/2014/main" id="{24814AF3-44CD-F19E-FF61-4CCDCB6710C1}"/>
+                <a16:creationId xmlns:a16="http://schemas.microsoft.com/office/drawing/2014/main" id="{17A4B2C5-47D5-3495-68D8-2CB424DC7257}"/>
+              </a:ext>
+            </a:extLst>
+          </p:cNvPr>
+          <p:cNvSpPr txBox="1"/>
+          <p:nvPr/>
+        </p:nvSpPr>
+        <p:spPr>
+          <a:xfrm>
+            <a:off x="1530267" y="3539816"/>
+            <a:ext cx="2450431" cy="461665"/>
+          </a:xfrm>
+          <a:prstGeom prst="rect">
+            <a:avLst/>
+          </a:prstGeom>
+          <a:noFill/>
+        </p:spPr>
+        <p:txBody>
+          <a:bodyPr wrap="square" rtlCol="0">
+            <a:spAutoFit/>
+          </a:bodyPr>
+          <a:lstStyle/>
+          <a:p>
+            <a:r>
+              <a:rPr lang="en-GB" sz="800" b="1" dirty="0">
+                <a:solidFill>
+                  <a:schemeClr val="tx1">
+                    <a:lumMod val="95000"/>
+                    <a:lumOff val="5000"/>
+                  </a:schemeClr>
+                </a:solidFill>
+                <a:latin typeface="Calibri" panose="020F0502020204030204" pitchFamily="34" charset="0"/>
+                <a:cs typeface="Calibri" panose="020F0502020204030204" pitchFamily="34" charset="0"/>
+              </a:rPr>
+              <a:t>SELECTION OF DATA SOURCES </a:t>
+            </a:r>
+          </a:p>
+          <a:p>
+            <a:r>
+              <a:rPr lang="en-GB" sz="800" dirty="0">
+                <a:solidFill>
+                  <a:schemeClr val="tx1">
+                    <a:lumMod val="95000"/>
+                    <a:lumOff val="5000"/>
+                  </a:schemeClr>
+                </a:solidFill>
+                <a:latin typeface="Calibri Light" panose="020F0302020204030204" pitchFamily="34" charset="0"/>
+                <a:cs typeface="Calibri Light" panose="020F0302020204030204" pitchFamily="34" charset="0"/>
+              </a:rPr>
+              <a:t>For model development and operational implementation, and forecast verification. </a:t>
+            </a:r>
+          </a:p>
+        </p:txBody>
+      </p:sp>
+      <p:sp>
+        <p:nvSpPr>
+          <p:cNvPr id="18" name="TextBox 17">
+            <a:extLst>
+              <a:ext uri="{FF2B5EF4-FFF2-40B4-BE49-F238E27FC236}">
+                <a16:creationId xmlns:a16="http://schemas.microsoft.com/office/drawing/2014/main" id="{1FE71E37-6166-0490-58E8-888C8B970604}"/>
+              </a:ext>
+            </a:extLst>
+          </p:cNvPr>
+          <p:cNvSpPr txBox="1"/>
+          <p:nvPr/>
+        </p:nvSpPr>
+        <p:spPr>
+          <a:xfrm>
+            <a:off x="493216" y="3471376"/>
+            <a:ext cx="1464286" cy="400110"/>
+          </a:xfrm>
+          <a:prstGeom prst="rect">
+            <a:avLst/>
+          </a:prstGeom>
+          <a:noFill/>
+        </p:spPr>
+        <p:txBody>
+          <a:bodyPr wrap="square" rtlCol="0">
+            <a:spAutoFit/>
+          </a:bodyPr>
+          <a:lstStyle/>
+          <a:p>
+            <a:r>
+              <a:rPr lang="en-GB" sz="2000" b="1" dirty="0">
+                <a:solidFill>
+                  <a:schemeClr val="bg1"/>
+                </a:solidFill>
+                <a:latin typeface="Calibri" panose="020F0502020204030204" pitchFamily="34" charset="0"/>
+                <a:cs typeface="Calibri" panose="020F0502020204030204" pitchFamily="34" charset="0"/>
+              </a:rPr>
+              <a:t>Section</a:t>
+            </a:r>
+          </a:p>
+        </p:txBody>
+      </p:sp>
+      <p:sp>
+        <p:nvSpPr>
+          <p:cNvPr id="19" name="TextBox 18">
+            <a:extLst>
+              <a:ext uri="{FF2B5EF4-FFF2-40B4-BE49-F238E27FC236}">
+                <a16:creationId xmlns:a16="http://schemas.microsoft.com/office/drawing/2014/main" id="{951A946F-24FC-86A6-3A72-C8D4D2433C01}"/>
+              </a:ext>
+            </a:extLst>
+          </p:cNvPr>
+          <p:cNvSpPr txBox="1"/>
+          <p:nvPr/>
+        </p:nvSpPr>
+        <p:spPr>
+          <a:xfrm>
+            <a:off x="476740" y="3537988"/>
+            <a:ext cx="963142" cy="553998"/>
+          </a:xfrm>
+          <a:prstGeom prst="rect">
+            <a:avLst/>
+          </a:prstGeom>
+          <a:noFill/>
+        </p:spPr>
+        <p:txBody>
+          <a:bodyPr wrap="square" rtlCol="0">
+            <a:spAutoFit/>
+          </a:bodyPr>
+          <a:lstStyle/>
+          <a:p>
+            <a:r>
+              <a:rPr lang="en-GB" sz="3000" b="1" dirty="0">
+                <a:solidFill>
+                  <a:schemeClr val="tx1">
+                    <a:lumMod val="95000"/>
+                    <a:lumOff val="5000"/>
+                  </a:schemeClr>
+                </a:solidFill>
+                <a:latin typeface="Calibri" panose="020F0502020204030204" pitchFamily="34" charset="0"/>
+                <a:cs typeface="Calibri" panose="020F0502020204030204" pitchFamily="34" charset="0"/>
+              </a:rPr>
+              <a:t>3.1</a:t>
+            </a:r>
+          </a:p>
+        </p:txBody>
+      </p:sp>
+      <p:sp>
+        <p:nvSpPr>
+          <p:cNvPr id="42" name="Rectangle 41">
+            <a:extLst>
+              <a:ext uri="{FF2B5EF4-FFF2-40B4-BE49-F238E27FC236}">
+                <a16:creationId xmlns:a16="http://schemas.microsoft.com/office/drawing/2014/main" id="{D7B7EA2C-EE98-FF83-48D1-3425D530EEDB}"/>
               </a:ext>
             </a:extLst>
           </p:cNvPr>
@@ -8374,28 +8425,17 @@
         </p:nvSpPr>
         <p:spPr>
           <a:xfrm>
-            <a:off x="2879206" y="3537601"/>
-            <a:ext cx="1152000" cy="1774583"/>
+            <a:off x="1516135" y="4121527"/>
+            <a:ext cx="2411999" cy="645433"/>
           </a:xfrm>
           <a:prstGeom prst="rect">
             <a:avLst/>
           </a:prstGeom>
-          <a:gradFill flip="none" rotWithShape="1">
-            <a:gsLst>
-              <a:gs pos="0">
-                <a:schemeClr val="bg1">
-                  <a:lumMod val="75000"/>
-                </a:schemeClr>
-              </a:gs>
-              <a:gs pos="100000">
-                <a:schemeClr val="bg1">
-                  <a:lumMod val="85000"/>
-                </a:schemeClr>
-              </a:gs>
-            </a:gsLst>
-            <a:lin ang="16200000" scaled="1"/>
-            <a:tileRect/>
-          </a:gradFill>
+          <a:solidFill>
+            <a:schemeClr val="bg1">
+              <a:lumMod val="85000"/>
+            </a:schemeClr>
+          </a:solidFill>
           <a:ln w="3175">
             <a:solidFill>
               <a:schemeClr val="bg1">
@@ -8431,10 +8471,10 @@
       </p:sp>
       <p:sp>
         <p:nvSpPr>
-          <p:cNvPr id="29" name="Rectangle 28">
+          <p:cNvPr id="43" name="Rectangle 42">
             <a:extLst>
               <a:ext uri="{FF2B5EF4-FFF2-40B4-BE49-F238E27FC236}">
-                <a16:creationId xmlns:a16="http://schemas.microsoft.com/office/drawing/2014/main" id="{E6F79664-7D05-1CB7-9B16-7CF6037CB7F8}"/>
+                <a16:creationId xmlns:a16="http://schemas.microsoft.com/office/drawing/2014/main" id="{441CB6E6-87E2-1A0A-67F8-7F99E4513D1C}"/>
               </a:ext>
             </a:extLst>
           </p:cNvPr>
@@ -8443,8 +8483,574 @@
         </p:nvSpPr>
         <p:spPr>
           <a:xfrm>
-            <a:off x="1628364" y="5351677"/>
-            <a:ext cx="360000" cy="90000"/>
+            <a:off x="400487" y="4121527"/>
+            <a:ext cx="1119889" cy="645433"/>
+          </a:xfrm>
+          <a:prstGeom prst="rect">
+            <a:avLst/>
+          </a:prstGeom>
+          <a:solidFill>
+            <a:schemeClr val="bg1">
+              <a:lumMod val="75000"/>
+            </a:schemeClr>
+          </a:solidFill>
+          <a:ln w="3175">
+            <a:solidFill>
+              <a:schemeClr val="bg1">
+                <a:lumMod val="85000"/>
+              </a:schemeClr>
+            </a:solidFill>
+          </a:ln>
+        </p:spPr>
+        <p:style>
+          <a:lnRef idx="2">
+            <a:schemeClr val="accent1">
+              <a:shade val="15000"/>
+            </a:schemeClr>
+          </a:lnRef>
+          <a:fillRef idx="1">
+            <a:schemeClr val="accent1"/>
+          </a:fillRef>
+          <a:effectRef idx="0">
+            <a:schemeClr val="accent1"/>
+          </a:effectRef>
+          <a:fontRef idx="minor">
+            <a:schemeClr val="lt1"/>
+          </a:fontRef>
+        </p:style>
+        <p:txBody>
+          <a:bodyPr rtlCol="0" anchor="ctr"/>
+          <a:lstStyle/>
+          <a:p>
+            <a:pPr algn="ctr"/>
+            <a:endParaRPr lang="en-GB" dirty="0"/>
+          </a:p>
+        </p:txBody>
+      </p:sp>
+      <p:sp>
+        <p:nvSpPr>
+          <p:cNvPr id="44" name="TextBox 43">
+            <a:extLst>
+              <a:ext uri="{FF2B5EF4-FFF2-40B4-BE49-F238E27FC236}">
+                <a16:creationId xmlns:a16="http://schemas.microsoft.com/office/drawing/2014/main" id="{DC1CA93F-6FAF-42B3-BBBF-433BE0D7EC13}"/>
+              </a:ext>
+            </a:extLst>
+          </p:cNvPr>
+          <p:cNvSpPr txBox="1"/>
+          <p:nvPr/>
+        </p:nvSpPr>
+        <p:spPr>
+          <a:xfrm>
+            <a:off x="1530267" y="4213411"/>
+            <a:ext cx="1959411" cy="461665"/>
+          </a:xfrm>
+          <a:prstGeom prst="rect">
+            <a:avLst/>
+          </a:prstGeom>
+          <a:noFill/>
+        </p:spPr>
+        <p:txBody>
+          <a:bodyPr wrap="square" rtlCol="0">
+            <a:spAutoFit/>
+          </a:bodyPr>
+          <a:lstStyle/>
+          <a:p>
+            <a:r>
+              <a:rPr lang="en-GB" sz="800" b="1" dirty="0">
+                <a:solidFill>
+                  <a:schemeClr val="tx1">
+                    <a:lumMod val="95000"/>
+                    <a:lumOff val="5000"/>
+                  </a:schemeClr>
+                </a:solidFill>
+                <a:latin typeface="Calibri" panose="020F0502020204030204" pitchFamily="34" charset="0"/>
+                <a:cs typeface="Calibri" panose="020F0502020204030204" pitchFamily="34" charset="0"/>
+              </a:rPr>
+              <a:t>FORECAST VERIFICATION STRATEGY</a:t>
+            </a:r>
+          </a:p>
+          <a:p>
+            <a:r>
+              <a:rPr lang="en-GB" sz="800" dirty="0">
+                <a:solidFill>
+                  <a:schemeClr val="tx1">
+                    <a:lumMod val="95000"/>
+                    <a:lumOff val="5000"/>
+                  </a:schemeClr>
+                </a:solidFill>
+                <a:latin typeface="Calibri Light" panose="020F0302020204030204" pitchFamily="34" charset="0"/>
+                <a:cs typeface="Calibri Light" panose="020F0302020204030204" pitchFamily="34" charset="0"/>
+              </a:rPr>
+              <a:t>For rainfall-based and hydro-met predictions of areas at risk of flash floods.</a:t>
+            </a:r>
+          </a:p>
+        </p:txBody>
+      </p:sp>
+      <p:sp>
+        <p:nvSpPr>
+          <p:cNvPr id="45" name="TextBox 44">
+            <a:extLst>
+              <a:ext uri="{FF2B5EF4-FFF2-40B4-BE49-F238E27FC236}">
+                <a16:creationId xmlns:a16="http://schemas.microsoft.com/office/drawing/2014/main" id="{06561625-E084-10DA-C9D2-DC79AAA113FE}"/>
+              </a:ext>
+            </a:extLst>
+          </p:cNvPr>
+          <p:cNvSpPr txBox="1"/>
+          <p:nvPr/>
+        </p:nvSpPr>
+        <p:spPr>
+          <a:xfrm>
+            <a:off x="493216" y="4144971"/>
+            <a:ext cx="1464286" cy="400110"/>
+          </a:xfrm>
+          <a:prstGeom prst="rect">
+            <a:avLst/>
+          </a:prstGeom>
+          <a:noFill/>
+        </p:spPr>
+        <p:txBody>
+          <a:bodyPr wrap="square" rtlCol="0">
+            <a:spAutoFit/>
+          </a:bodyPr>
+          <a:lstStyle/>
+          <a:p>
+            <a:r>
+              <a:rPr lang="en-GB" sz="2000" b="1" dirty="0">
+                <a:solidFill>
+                  <a:schemeClr val="bg1"/>
+                </a:solidFill>
+                <a:latin typeface="Calibri" panose="020F0502020204030204" pitchFamily="34" charset="0"/>
+                <a:cs typeface="Calibri" panose="020F0502020204030204" pitchFamily="34" charset="0"/>
+              </a:rPr>
+              <a:t>Section</a:t>
+            </a:r>
+          </a:p>
+        </p:txBody>
+      </p:sp>
+      <p:sp>
+        <p:nvSpPr>
+          <p:cNvPr id="46" name="TextBox 45">
+            <a:extLst>
+              <a:ext uri="{FF2B5EF4-FFF2-40B4-BE49-F238E27FC236}">
+                <a16:creationId xmlns:a16="http://schemas.microsoft.com/office/drawing/2014/main" id="{E1DBA1A3-69AC-E204-1AED-E215C8C8CEB0}"/>
+              </a:ext>
+            </a:extLst>
+          </p:cNvPr>
+          <p:cNvSpPr txBox="1"/>
+          <p:nvPr/>
+        </p:nvSpPr>
+        <p:spPr>
+          <a:xfrm>
+            <a:off x="476740" y="4211583"/>
+            <a:ext cx="963142" cy="553998"/>
+          </a:xfrm>
+          <a:prstGeom prst="rect">
+            <a:avLst/>
+          </a:prstGeom>
+          <a:noFill/>
+        </p:spPr>
+        <p:txBody>
+          <a:bodyPr wrap="square" rtlCol="0">
+            <a:spAutoFit/>
+          </a:bodyPr>
+          <a:lstStyle/>
+          <a:p>
+            <a:r>
+              <a:rPr lang="en-GB" sz="3000" b="1" dirty="0">
+                <a:solidFill>
+                  <a:schemeClr val="tx1">
+                    <a:lumMod val="95000"/>
+                    <a:lumOff val="5000"/>
+                  </a:schemeClr>
+                </a:solidFill>
+                <a:latin typeface="Calibri" panose="020F0502020204030204" pitchFamily="34" charset="0"/>
+                <a:cs typeface="Calibri" panose="020F0502020204030204" pitchFamily="34" charset="0"/>
+              </a:rPr>
+              <a:t>3.2</a:t>
+            </a:r>
+          </a:p>
+        </p:txBody>
+      </p:sp>
+      <p:sp>
+        <p:nvSpPr>
+          <p:cNvPr id="47" name="Rectangle 46">
+            <a:extLst>
+              <a:ext uri="{FF2B5EF4-FFF2-40B4-BE49-F238E27FC236}">
+                <a16:creationId xmlns:a16="http://schemas.microsoft.com/office/drawing/2014/main" id="{1402EF05-0A8D-81FE-F96A-820C0CB99803}"/>
+              </a:ext>
+            </a:extLst>
+          </p:cNvPr>
+          <p:cNvSpPr/>
+          <p:nvPr/>
+        </p:nvSpPr>
+        <p:spPr>
+          <a:xfrm>
+            <a:off x="1516135" y="4788361"/>
+            <a:ext cx="2411999" cy="645433"/>
+          </a:xfrm>
+          <a:prstGeom prst="rect">
+            <a:avLst/>
+          </a:prstGeom>
+          <a:solidFill>
+            <a:schemeClr val="bg1">
+              <a:lumMod val="85000"/>
+            </a:schemeClr>
+          </a:solidFill>
+          <a:ln w="3175">
+            <a:solidFill>
+              <a:schemeClr val="bg1">
+                <a:lumMod val="85000"/>
+              </a:schemeClr>
+            </a:solidFill>
+          </a:ln>
+        </p:spPr>
+        <p:style>
+          <a:lnRef idx="2">
+            <a:schemeClr val="accent1">
+              <a:shade val="15000"/>
+            </a:schemeClr>
+          </a:lnRef>
+          <a:fillRef idx="1">
+            <a:schemeClr val="accent1"/>
+          </a:fillRef>
+          <a:effectRef idx="0">
+            <a:schemeClr val="accent1"/>
+          </a:effectRef>
+          <a:fontRef idx="minor">
+            <a:schemeClr val="lt1"/>
+          </a:fontRef>
+        </p:style>
+        <p:txBody>
+          <a:bodyPr rtlCol="0" anchor="ctr"/>
+          <a:lstStyle/>
+          <a:p>
+            <a:pPr algn="ctr"/>
+            <a:endParaRPr lang="en-GB" dirty="0"/>
+          </a:p>
+        </p:txBody>
+      </p:sp>
+      <p:sp>
+        <p:nvSpPr>
+          <p:cNvPr id="48" name="Rectangle 47">
+            <a:extLst>
+              <a:ext uri="{FF2B5EF4-FFF2-40B4-BE49-F238E27FC236}">
+                <a16:creationId xmlns:a16="http://schemas.microsoft.com/office/drawing/2014/main" id="{4CDF8D29-A1A4-B6EF-CC2D-02154951F423}"/>
+              </a:ext>
+            </a:extLst>
+          </p:cNvPr>
+          <p:cNvSpPr/>
+          <p:nvPr/>
+        </p:nvSpPr>
+        <p:spPr>
+          <a:xfrm>
+            <a:off x="400487" y="4788361"/>
+            <a:ext cx="1119889" cy="645433"/>
+          </a:xfrm>
+          <a:prstGeom prst="rect">
+            <a:avLst/>
+          </a:prstGeom>
+          <a:solidFill>
+            <a:schemeClr val="bg1">
+              <a:lumMod val="75000"/>
+            </a:schemeClr>
+          </a:solidFill>
+          <a:ln w="3175">
+            <a:solidFill>
+              <a:schemeClr val="bg1">
+                <a:lumMod val="85000"/>
+              </a:schemeClr>
+            </a:solidFill>
+          </a:ln>
+        </p:spPr>
+        <p:style>
+          <a:lnRef idx="2">
+            <a:schemeClr val="accent1">
+              <a:shade val="15000"/>
+            </a:schemeClr>
+          </a:lnRef>
+          <a:fillRef idx="1">
+            <a:schemeClr val="accent1"/>
+          </a:fillRef>
+          <a:effectRef idx="0">
+            <a:schemeClr val="accent1"/>
+          </a:effectRef>
+          <a:fontRef idx="minor">
+            <a:schemeClr val="lt1"/>
+          </a:fontRef>
+        </p:style>
+        <p:txBody>
+          <a:bodyPr rtlCol="0" anchor="ctr"/>
+          <a:lstStyle/>
+          <a:p>
+            <a:pPr algn="ctr"/>
+            <a:endParaRPr lang="en-GB" dirty="0"/>
+          </a:p>
+        </p:txBody>
+      </p:sp>
+      <p:sp>
+        <p:nvSpPr>
+          <p:cNvPr id="49" name="TextBox 48">
+            <a:extLst>
+              <a:ext uri="{FF2B5EF4-FFF2-40B4-BE49-F238E27FC236}">
+                <a16:creationId xmlns:a16="http://schemas.microsoft.com/office/drawing/2014/main" id="{C5F22480-43D2-EC6C-C595-536DDF09AC46}"/>
+              </a:ext>
+            </a:extLst>
+          </p:cNvPr>
+          <p:cNvSpPr txBox="1"/>
+          <p:nvPr/>
+        </p:nvSpPr>
+        <p:spPr>
+          <a:xfrm>
+            <a:off x="1530267" y="4823762"/>
+            <a:ext cx="2255917" cy="584775"/>
+          </a:xfrm>
+          <a:prstGeom prst="rect">
+            <a:avLst/>
+          </a:prstGeom>
+          <a:noFill/>
+        </p:spPr>
+        <p:txBody>
+          <a:bodyPr wrap="square" rtlCol="0">
+            <a:spAutoFit/>
+          </a:bodyPr>
+          <a:lstStyle/>
+          <a:p>
+            <a:r>
+              <a:rPr lang="en-GB" sz="800" b="1" dirty="0">
+                <a:solidFill>
+                  <a:schemeClr val="tx1">
+                    <a:lumMod val="95000"/>
+                    <a:lumOff val="5000"/>
+                  </a:schemeClr>
+                </a:solidFill>
+                <a:latin typeface="Calibri" panose="020F0502020204030204" pitchFamily="34" charset="0"/>
+                <a:cs typeface="Calibri" panose="020F0502020204030204" pitchFamily="34" charset="0"/>
+              </a:rPr>
+              <a:t>DATA-DRIVEN MODEL DEVELOPMENT STRATEGY </a:t>
+            </a:r>
+          </a:p>
+          <a:p>
+            <a:r>
+              <a:rPr lang="en-GB" sz="800" dirty="0">
+                <a:solidFill>
+                  <a:schemeClr val="tx1">
+                    <a:lumMod val="95000"/>
+                    <a:lumOff val="5000"/>
+                  </a:schemeClr>
+                </a:solidFill>
+                <a:latin typeface="Calibri Light" panose="020F0302020204030204" pitchFamily="34" charset="0"/>
+                <a:cs typeface="Calibri Light" panose="020F0302020204030204" pitchFamily="34" charset="0"/>
+              </a:rPr>
+              <a:t>To develop hydro-met predictions of areas at risk of flash floods under imbalanced observational datasets.</a:t>
+            </a:r>
+          </a:p>
+        </p:txBody>
+      </p:sp>
+      <p:sp>
+        <p:nvSpPr>
+          <p:cNvPr id="50" name="TextBox 49">
+            <a:extLst>
+              <a:ext uri="{FF2B5EF4-FFF2-40B4-BE49-F238E27FC236}">
+                <a16:creationId xmlns:a16="http://schemas.microsoft.com/office/drawing/2014/main" id="{65CF77BB-AB79-BDF7-1AD9-C8ABDB188BCE}"/>
+              </a:ext>
+            </a:extLst>
+          </p:cNvPr>
+          <p:cNvSpPr txBox="1"/>
+          <p:nvPr/>
+        </p:nvSpPr>
+        <p:spPr>
+          <a:xfrm>
+            <a:off x="493216" y="4811805"/>
+            <a:ext cx="1464286" cy="400110"/>
+          </a:xfrm>
+          <a:prstGeom prst="rect">
+            <a:avLst/>
+          </a:prstGeom>
+          <a:noFill/>
+        </p:spPr>
+        <p:txBody>
+          <a:bodyPr wrap="square" rtlCol="0">
+            <a:spAutoFit/>
+          </a:bodyPr>
+          <a:lstStyle/>
+          <a:p>
+            <a:r>
+              <a:rPr lang="en-GB" sz="2000" b="1" dirty="0">
+                <a:solidFill>
+                  <a:schemeClr val="bg1"/>
+                </a:solidFill>
+                <a:latin typeface="Calibri" panose="020F0502020204030204" pitchFamily="34" charset="0"/>
+                <a:cs typeface="Calibri" panose="020F0502020204030204" pitchFamily="34" charset="0"/>
+              </a:rPr>
+              <a:t>Section</a:t>
+            </a:r>
+          </a:p>
+        </p:txBody>
+      </p:sp>
+      <p:sp>
+        <p:nvSpPr>
+          <p:cNvPr id="51" name="TextBox 50">
+            <a:extLst>
+              <a:ext uri="{FF2B5EF4-FFF2-40B4-BE49-F238E27FC236}">
+                <a16:creationId xmlns:a16="http://schemas.microsoft.com/office/drawing/2014/main" id="{CE0D8E67-F738-7066-FAAB-7F1C9C0D3446}"/>
+              </a:ext>
+            </a:extLst>
+          </p:cNvPr>
+          <p:cNvSpPr txBox="1"/>
+          <p:nvPr/>
+        </p:nvSpPr>
+        <p:spPr>
+          <a:xfrm>
+            <a:off x="476740" y="4878417"/>
+            <a:ext cx="963142" cy="553998"/>
+          </a:xfrm>
+          <a:prstGeom prst="rect">
+            <a:avLst/>
+          </a:prstGeom>
+          <a:noFill/>
+        </p:spPr>
+        <p:txBody>
+          <a:bodyPr wrap="square" rtlCol="0">
+            <a:spAutoFit/>
+          </a:bodyPr>
+          <a:lstStyle/>
+          <a:p>
+            <a:r>
+              <a:rPr lang="en-GB" sz="3000" b="1" dirty="0">
+                <a:solidFill>
+                  <a:schemeClr val="tx1">
+                    <a:lumMod val="95000"/>
+                    <a:lumOff val="5000"/>
+                  </a:schemeClr>
+                </a:solidFill>
+                <a:latin typeface="Calibri" panose="020F0502020204030204" pitchFamily="34" charset="0"/>
+                <a:cs typeface="Calibri" panose="020F0502020204030204" pitchFamily="34" charset="0"/>
+              </a:rPr>
+              <a:t>3.3</a:t>
+            </a:r>
+          </a:p>
+        </p:txBody>
+      </p:sp>
+      <p:sp>
+        <p:nvSpPr>
+          <p:cNvPr id="52" name="Rectangle 51">
+            <a:extLst>
+              <a:ext uri="{FF2B5EF4-FFF2-40B4-BE49-F238E27FC236}">
+                <a16:creationId xmlns:a16="http://schemas.microsoft.com/office/drawing/2014/main" id="{4D8BB4D1-20CB-1DE2-D4F0-75DF1EAC1D67}"/>
+              </a:ext>
+            </a:extLst>
+          </p:cNvPr>
+          <p:cNvSpPr/>
+          <p:nvPr/>
+        </p:nvSpPr>
+        <p:spPr>
+          <a:xfrm>
+            <a:off x="3969185" y="3679429"/>
+            <a:ext cx="72000" cy="180000"/>
+          </a:xfrm>
+          <a:prstGeom prst="rect">
+            <a:avLst/>
+          </a:prstGeom>
+          <a:solidFill>
+            <a:srgbClr val="E68301"/>
+          </a:solidFill>
+          <a:ln>
+            <a:noFill/>
+          </a:ln>
+        </p:spPr>
+        <p:style>
+          <a:lnRef idx="2">
+            <a:schemeClr val="accent1">
+              <a:shade val="15000"/>
+            </a:schemeClr>
+          </a:lnRef>
+          <a:fillRef idx="1">
+            <a:schemeClr val="accent1"/>
+          </a:fillRef>
+          <a:effectRef idx="0">
+            <a:schemeClr val="accent1"/>
+          </a:effectRef>
+          <a:fontRef idx="minor">
+            <a:schemeClr val="lt1"/>
+          </a:fontRef>
+        </p:style>
+        <p:txBody>
+          <a:bodyPr rtlCol="0" anchor="ctr"/>
+          <a:lstStyle/>
+          <a:p>
+            <a:pPr algn="ctr"/>
+            <a:endParaRPr lang="en-GB"/>
+          </a:p>
+        </p:txBody>
+      </p:sp>
+      <p:sp>
+        <p:nvSpPr>
+          <p:cNvPr id="53" name="Rectangle 52">
+            <a:extLst>
+              <a:ext uri="{FF2B5EF4-FFF2-40B4-BE49-F238E27FC236}">
+                <a16:creationId xmlns:a16="http://schemas.microsoft.com/office/drawing/2014/main" id="{50D42DFB-603C-F1E1-00B0-82C244B805A5}"/>
+              </a:ext>
+            </a:extLst>
+          </p:cNvPr>
+          <p:cNvSpPr/>
+          <p:nvPr/>
+        </p:nvSpPr>
+        <p:spPr>
+          <a:xfrm>
+            <a:off x="3969185" y="3884227"/>
+            <a:ext cx="72000" cy="180000"/>
+          </a:xfrm>
+          <a:prstGeom prst="rect">
+            <a:avLst/>
+          </a:prstGeom>
+          <a:solidFill>
+            <a:srgbClr val="3F37C9"/>
+          </a:solidFill>
+          <a:ln>
+            <a:noFill/>
+          </a:ln>
+        </p:spPr>
+        <p:style>
+          <a:lnRef idx="2">
+            <a:schemeClr val="accent1">
+              <a:shade val="15000"/>
+            </a:schemeClr>
+          </a:lnRef>
+          <a:fillRef idx="1">
+            <a:schemeClr val="accent1"/>
+          </a:fillRef>
+          <a:effectRef idx="0">
+            <a:schemeClr val="accent1"/>
+          </a:effectRef>
+          <a:fontRef idx="minor">
+            <a:schemeClr val="lt1"/>
+          </a:fontRef>
+        </p:style>
+        <p:txBody>
+          <a:bodyPr rtlCol="0" anchor="ctr"/>
+          <a:lstStyle/>
+          <a:p>
+            <a:pPr algn="ctr"/>
+            <a:endParaRPr lang="en-GB"/>
+          </a:p>
+        </p:txBody>
+      </p:sp>
+      <p:sp>
+        <p:nvSpPr>
+          <p:cNvPr id="60" name="Rectangle 59">
+            <a:extLst>
+              <a:ext uri="{FF2B5EF4-FFF2-40B4-BE49-F238E27FC236}">
+                <a16:creationId xmlns:a16="http://schemas.microsoft.com/office/drawing/2014/main" id="{4CB4D06F-1CFC-86DB-9C76-5F0C3731175E}"/>
+              </a:ext>
+            </a:extLst>
+          </p:cNvPr>
+          <p:cNvSpPr/>
+          <p:nvPr/>
+        </p:nvSpPr>
+        <p:spPr>
+          <a:xfrm>
+            <a:off x="3968387" y="4153986"/>
+            <a:ext cx="72000" cy="180000"/>
           </a:xfrm>
           <a:prstGeom prst="rect">
             <a:avLst/>
@@ -8483,10 +9089,10 @@
       </p:sp>
       <p:sp>
         <p:nvSpPr>
-          <p:cNvPr id="30" name="Rectangle 29">
+          <p:cNvPr id="61" name="Rectangle 60">
             <a:extLst>
               <a:ext uri="{FF2B5EF4-FFF2-40B4-BE49-F238E27FC236}">
-                <a16:creationId xmlns:a16="http://schemas.microsoft.com/office/drawing/2014/main" id="{D72F21FB-E876-B3EC-8628-148AAE9996E5}"/>
+                <a16:creationId xmlns:a16="http://schemas.microsoft.com/office/drawing/2014/main" id="{3677E649-7591-CF6E-4DD8-9E544C86BDA1}"/>
               </a:ext>
             </a:extLst>
           </p:cNvPr>
@@ -8495,8 +9101,8 @@
         </p:nvSpPr>
         <p:spPr>
           <a:xfrm>
-            <a:off x="2024578" y="5351677"/>
-            <a:ext cx="360000" cy="90000"/>
+            <a:off x="3968387" y="4358784"/>
+            <a:ext cx="72000" cy="180000"/>
           </a:xfrm>
           <a:prstGeom prst="rect">
             <a:avLst/>
@@ -8535,10 +9141,10 @@
       </p:sp>
       <p:sp>
         <p:nvSpPr>
-          <p:cNvPr id="31" name="Rectangle 30">
+          <p:cNvPr id="62" name="Rectangle 61">
             <a:extLst>
               <a:ext uri="{FF2B5EF4-FFF2-40B4-BE49-F238E27FC236}">
-                <a16:creationId xmlns:a16="http://schemas.microsoft.com/office/drawing/2014/main" id="{0D7A0A59-3B69-64ED-60AB-80D874FCD344}"/>
+                <a16:creationId xmlns:a16="http://schemas.microsoft.com/office/drawing/2014/main" id="{2BFE8251-FDEF-457C-6AFD-2E5AF06DF895}"/>
               </a:ext>
             </a:extLst>
           </p:cNvPr>
@@ -8547,8 +9153,8 @@
         </p:nvSpPr>
         <p:spPr>
           <a:xfrm>
-            <a:off x="2420792" y="5351677"/>
-            <a:ext cx="360000" cy="90000"/>
+            <a:off x="3968387" y="4563582"/>
+            <a:ext cx="72000" cy="180000"/>
           </a:xfrm>
           <a:prstGeom prst="rect">
             <a:avLst/>
@@ -8587,10 +9193,10 @@
       </p:sp>
       <p:sp>
         <p:nvSpPr>
-          <p:cNvPr id="32" name="Rectangle 31">
+          <p:cNvPr id="63" name="Rectangle 62">
             <a:extLst>
               <a:ext uri="{FF2B5EF4-FFF2-40B4-BE49-F238E27FC236}">
-                <a16:creationId xmlns:a16="http://schemas.microsoft.com/office/drawing/2014/main" id="{395C51C3-D025-9D90-DE2F-5E2BD772360E}"/>
+                <a16:creationId xmlns:a16="http://schemas.microsoft.com/office/drawing/2014/main" id="{80A2885C-C700-FB46-FB9D-5B6CEDF2F266}"/>
               </a:ext>
             </a:extLst>
           </p:cNvPr>
@@ -8599,8 +9205,60 @@
         </p:nvSpPr>
         <p:spPr>
           <a:xfrm>
-            <a:off x="3272297" y="5355420"/>
-            <a:ext cx="360000" cy="90000"/>
+            <a:off x="3968087" y="4821469"/>
+            <a:ext cx="72000" cy="180000"/>
+          </a:xfrm>
+          <a:prstGeom prst="rect">
+            <a:avLst/>
+          </a:prstGeom>
+          <a:solidFill>
+            <a:srgbClr val="FF595E"/>
+          </a:solidFill>
+          <a:ln>
+            <a:noFill/>
+          </a:ln>
+        </p:spPr>
+        <p:style>
+          <a:lnRef idx="2">
+            <a:schemeClr val="accent1">
+              <a:shade val="15000"/>
+            </a:schemeClr>
+          </a:lnRef>
+          <a:fillRef idx="1">
+            <a:schemeClr val="accent1"/>
+          </a:fillRef>
+          <a:effectRef idx="0">
+            <a:schemeClr val="accent1"/>
+          </a:effectRef>
+          <a:fontRef idx="minor">
+            <a:schemeClr val="lt1"/>
+          </a:fontRef>
+        </p:style>
+        <p:txBody>
+          <a:bodyPr rtlCol="0" anchor="ctr"/>
+          <a:lstStyle/>
+          <a:p>
+            <a:pPr algn="ctr"/>
+            <a:endParaRPr lang="en-GB"/>
+          </a:p>
+        </p:txBody>
+      </p:sp>
+      <p:sp>
+        <p:nvSpPr>
+          <p:cNvPr id="64" name="Rectangle 63">
+            <a:extLst>
+              <a:ext uri="{FF2B5EF4-FFF2-40B4-BE49-F238E27FC236}">
+                <a16:creationId xmlns:a16="http://schemas.microsoft.com/office/drawing/2014/main" id="{36D3542B-779B-AA13-5BF1-D5B361BB166D}"/>
+              </a:ext>
+            </a:extLst>
+          </p:cNvPr>
+          <p:cNvSpPr/>
+          <p:nvPr/>
+        </p:nvSpPr>
+        <p:spPr>
+          <a:xfrm>
+            <a:off x="3968087" y="5026267"/>
+            <a:ext cx="72000" cy="180000"/>
           </a:xfrm>
           <a:prstGeom prst="rect">
             <a:avLst/>
@@ -8639,10 +9297,10 @@
       </p:sp>
       <p:sp>
         <p:nvSpPr>
-          <p:cNvPr id="33" name="Rectangle 32">
+          <p:cNvPr id="65" name="Rectangle 64">
             <a:extLst>
               <a:ext uri="{FF2B5EF4-FFF2-40B4-BE49-F238E27FC236}">
-                <a16:creationId xmlns:a16="http://schemas.microsoft.com/office/drawing/2014/main" id="{500A8CFC-93BD-87AD-C58A-DCD3EB34FAB6}"/>
+                <a16:creationId xmlns:a16="http://schemas.microsoft.com/office/drawing/2014/main" id="{DFF9F863-65F7-D89A-853C-C1170C80C088}"/>
               </a:ext>
             </a:extLst>
           </p:cNvPr>
@@ -8651,8 +9309,8 @@
         </p:nvSpPr>
         <p:spPr>
           <a:xfrm>
-            <a:off x="3668511" y="5355420"/>
-            <a:ext cx="360000" cy="90000"/>
+            <a:off x="3968087" y="5231065"/>
+            <a:ext cx="72000" cy="180000"/>
           </a:xfrm>
           <a:prstGeom prst="rect">
             <a:avLst/>
@@ -8686,318 +9344,6 @@
           <a:p>
             <a:pPr algn="ctr"/>
             <a:endParaRPr lang="en-GB"/>
-          </a:p>
-        </p:txBody>
-      </p:sp>
-      <p:sp>
-        <p:nvSpPr>
-          <p:cNvPr id="34" name="TextBox 33">
-            <a:extLst>
-              <a:ext uri="{FF2B5EF4-FFF2-40B4-BE49-F238E27FC236}">
-                <a16:creationId xmlns:a16="http://schemas.microsoft.com/office/drawing/2014/main" id="{3DBF3549-D2E3-38EE-CF84-93B78B0AA1D7}"/>
-              </a:ext>
-            </a:extLst>
-          </p:cNvPr>
-          <p:cNvSpPr txBox="1"/>
-          <p:nvPr/>
-        </p:nvSpPr>
-        <p:spPr>
-          <a:xfrm>
-            <a:off x="1654997" y="4741613"/>
-            <a:ext cx="1464286" cy="400110"/>
-          </a:xfrm>
-          <a:prstGeom prst="rect">
-            <a:avLst/>
-          </a:prstGeom>
-          <a:noFill/>
-        </p:spPr>
-        <p:txBody>
-          <a:bodyPr wrap="square" rtlCol="0">
-            <a:spAutoFit/>
-          </a:bodyPr>
-          <a:lstStyle/>
-          <a:p>
-            <a:r>
-              <a:rPr lang="en-GB" sz="2000" b="1" dirty="0">
-                <a:solidFill>
-                  <a:schemeClr val="bg1"/>
-                </a:solidFill>
-                <a:latin typeface="Calibri" panose="020F0502020204030204" pitchFamily="34" charset="0"/>
-                <a:cs typeface="Calibri" panose="020F0502020204030204" pitchFamily="34" charset="0"/>
-              </a:rPr>
-              <a:t>Section</a:t>
-            </a:r>
-          </a:p>
-        </p:txBody>
-      </p:sp>
-      <p:sp>
-        <p:nvSpPr>
-          <p:cNvPr id="35" name="TextBox 34">
-            <a:extLst>
-              <a:ext uri="{FF2B5EF4-FFF2-40B4-BE49-F238E27FC236}">
-                <a16:creationId xmlns:a16="http://schemas.microsoft.com/office/drawing/2014/main" id="{541DE2BE-828B-C425-73CD-1775A4E7A79E}"/>
-              </a:ext>
-            </a:extLst>
-          </p:cNvPr>
-          <p:cNvSpPr txBox="1"/>
-          <p:nvPr/>
-        </p:nvSpPr>
-        <p:spPr>
-          <a:xfrm>
-            <a:off x="1638521" y="4808225"/>
-            <a:ext cx="963142" cy="553998"/>
-          </a:xfrm>
-          <a:prstGeom prst="rect">
-            <a:avLst/>
-          </a:prstGeom>
-          <a:noFill/>
-        </p:spPr>
-        <p:txBody>
-          <a:bodyPr wrap="square" rtlCol="0">
-            <a:spAutoFit/>
-          </a:bodyPr>
-          <a:lstStyle/>
-          <a:p>
-            <a:r>
-              <a:rPr lang="en-GB" sz="3000" b="1" dirty="0">
-                <a:solidFill>
-                  <a:schemeClr val="tx1">
-                    <a:lumMod val="95000"/>
-                    <a:lumOff val="5000"/>
-                  </a:schemeClr>
-                </a:solidFill>
-                <a:latin typeface="Calibri" panose="020F0502020204030204" pitchFamily="34" charset="0"/>
-                <a:cs typeface="Calibri" panose="020F0502020204030204" pitchFamily="34" charset="0"/>
-              </a:rPr>
-              <a:t>3.2</a:t>
-            </a:r>
-          </a:p>
-        </p:txBody>
-      </p:sp>
-      <p:sp>
-        <p:nvSpPr>
-          <p:cNvPr id="36" name="TextBox 35">
-            <a:extLst>
-              <a:ext uri="{FF2B5EF4-FFF2-40B4-BE49-F238E27FC236}">
-                <a16:creationId xmlns:a16="http://schemas.microsoft.com/office/drawing/2014/main" id="{B7D730D9-F446-27B9-1CBE-A82DAD647E82}"/>
-              </a:ext>
-            </a:extLst>
-          </p:cNvPr>
-          <p:cNvSpPr txBox="1"/>
-          <p:nvPr/>
-        </p:nvSpPr>
-        <p:spPr>
-          <a:xfrm>
-            <a:off x="1629424" y="3587981"/>
-            <a:ext cx="1152000" cy="1077218"/>
-          </a:xfrm>
-          <a:prstGeom prst="rect">
-            <a:avLst/>
-          </a:prstGeom>
-          <a:noFill/>
-        </p:spPr>
-        <p:txBody>
-          <a:bodyPr wrap="square" rtlCol="0">
-            <a:spAutoFit/>
-          </a:bodyPr>
-          <a:lstStyle/>
-          <a:p>
-            <a:r>
-              <a:rPr lang="en-GB" sz="800" b="1" dirty="0">
-                <a:solidFill>
-                  <a:schemeClr val="tx1">
-                    <a:lumMod val="95000"/>
-                    <a:lumOff val="5000"/>
-                  </a:schemeClr>
-                </a:solidFill>
-                <a:latin typeface="Calibri" panose="020F0502020204030204" pitchFamily="34" charset="0"/>
-                <a:cs typeface="Calibri" panose="020F0502020204030204" pitchFamily="34" charset="0"/>
-              </a:rPr>
-              <a:t>FORECAST VERIFICATION STRATEGY</a:t>
-            </a:r>
-          </a:p>
-          <a:p>
-            <a:endParaRPr lang="en-GB" sz="800" b="1" dirty="0">
-              <a:solidFill>
-                <a:schemeClr val="tx1">
-                  <a:lumMod val="95000"/>
-                  <a:lumOff val="5000"/>
-                </a:schemeClr>
-              </a:solidFill>
-              <a:latin typeface="Calibri" panose="020F0502020204030204" pitchFamily="34" charset="0"/>
-              <a:cs typeface="Calibri" panose="020F0502020204030204" pitchFamily="34" charset="0"/>
-            </a:endParaRPr>
-          </a:p>
-          <a:p>
-            <a:r>
-              <a:rPr lang="en-GB" sz="800" dirty="0">
-                <a:solidFill>
-                  <a:schemeClr val="tx1">
-                    <a:lumMod val="95000"/>
-                    <a:lumOff val="5000"/>
-                  </a:schemeClr>
-                </a:solidFill>
-                <a:latin typeface="Calibri Light" panose="020F0302020204030204" pitchFamily="34" charset="0"/>
-                <a:cs typeface="Calibri Light" panose="020F0302020204030204" pitchFamily="34" charset="0"/>
-              </a:rPr>
-              <a:t>For rainfall-based and hydro-met predictions of areas at risk of flash floods.</a:t>
-            </a:r>
-          </a:p>
-        </p:txBody>
-      </p:sp>
-      <p:sp>
-        <p:nvSpPr>
-          <p:cNvPr id="37" name="TextBox 36">
-            <a:extLst>
-              <a:ext uri="{FF2B5EF4-FFF2-40B4-BE49-F238E27FC236}">
-                <a16:creationId xmlns:a16="http://schemas.microsoft.com/office/drawing/2014/main" id="{4D8EA029-FC88-A23B-4193-BBABB3998E88}"/>
-              </a:ext>
-            </a:extLst>
-          </p:cNvPr>
-          <p:cNvSpPr txBox="1"/>
-          <p:nvPr/>
-        </p:nvSpPr>
-        <p:spPr>
-          <a:xfrm>
-            <a:off x="2904779" y="4741613"/>
-            <a:ext cx="1464286" cy="400110"/>
-          </a:xfrm>
-          <a:prstGeom prst="rect">
-            <a:avLst/>
-          </a:prstGeom>
-          <a:noFill/>
-        </p:spPr>
-        <p:txBody>
-          <a:bodyPr wrap="square" rtlCol="0">
-            <a:spAutoFit/>
-          </a:bodyPr>
-          <a:lstStyle/>
-          <a:p>
-            <a:r>
-              <a:rPr lang="en-GB" sz="2000" b="1" dirty="0">
-                <a:solidFill>
-                  <a:schemeClr val="bg1"/>
-                </a:solidFill>
-                <a:latin typeface="Calibri" panose="020F0502020204030204" pitchFamily="34" charset="0"/>
-                <a:cs typeface="Calibri" panose="020F0502020204030204" pitchFamily="34" charset="0"/>
-              </a:rPr>
-              <a:t>Section</a:t>
-            </a:r>
-          </a:p>
-        </p:txBody>
-      </p:sp>
-      <p:sp>
-        <p:nvSpPr>
-          <p:cNvPr id="38" name="TextBox 37">
-            <a:extLst>
-              <a:ext uri="{FF2B5EF4-FFF2-40B4-BE49-F238E27FC236}">
-                <a16:creationId xmlns:a16="http://schemas.microsoft.com/office/drawing/2014/main" id="{9A6D088A-0A8D-96FF-4A52-CC04B5AF66E2}"/>
-              </a:ext>
-            </a:extLst>
-          </p:cNvPr>
-          <p:cNvSpPr txBox="1"/>
-          <p:nvPr/>
-        </p:nvSpPr>
-        <p:spPr>
-          <a:xfrm>
-            <a:off x="2888303" y="4808225"/>
-            <a:ext cx="963142" cy="553998"/>
-          </a:xfrm>
-          <a:prstGeom prst="rect">
-            <a:avLst/>
-          </a:prstGeom>
-          <a:noFill/>
-        </p:spPr>
-        <p:txBody>
-          <a:bodyPr wrap="square" rtlCol="0">
-            <a:spAutoFit/>
-          </a:bodyPr>
-          <a:lstStyle/>
-          <a:p>
-            <a:r>
-              <a:rPr lang="en-GB" sz="3000" b="1" dirty="0">
-                <a:solidFill>
-                  <a:schemeClr val="tx1">
-                    <a:lumMod val="95000"/>
-                    <a:lumOff val="5000"/>
-                  </a:schemeClr>
-                </a:solidFill>
-                <a:latin typeface="Calibri" panose="020F0502020204030204" pitchFamily="34" charset="0"/>
-                <a:cs typeface="Calibri" panose="020F0502020204030204" pitchFamily="34" charset="0"/>
-              </a:rPr>
-              <a:t>3.3</a:t>
-            </a:r>
-          </a:p>
-        </p:txBody>
-      </p:sp>
-      <p:sp>
-        <p:nvSpPr>
-          <p:cNvPr id="39" name="TextBox 38">
-            <a:extLst>
-              <a:ext uri="{FF2B5EF4-FFF2-40B4-BE49-F238E27FC236}">
-                <a16:creationId xmlns:a16="http://schemas.microsoft.com/office/drawing/2014/main" id="{386A4F79-10E9-1934-66C0-03AA4A7C99CE}"/>
-              </a:ext>
-            </a:extLst>
-          </p:cNvPr>
-          <p:cNvSpPr txBox="1"/>
-          <p:nvPr/>
-        </p:nvSpPr>
-        <p:spPr>
-          <a:xfrm>
-            <a:off x="2879206" y="3587981"/>
-            <a:ext cx="1151879" cy="1200329"/>
-          </a:xfrm>
-          <a:prstGeom prst="rect">
-            <a:avLst/>
-          </a:prstGeom>
-          <a:noFill/>
-        </p:spPr>
-        <p:txBody>
-          <a:bodyPr wrap="square" rtlCol="0">
-            <a:spAutoFit/>
-          </a:bodyPr>
-          <a:lstStyle/>
-          <a:p>
-            <a:r>
-              <a:rPr lang="en-GB" sz="800" b="1" dirty="0">
-                <a:solidFill>
-                  <a:schemeClr val="tx1">
-                    <a:lumMod val="95000"/>
-                    <a:lumOff val="5000"/>
-                  </a:schemeClr>
-                </a:solidFill>
-                <a:latin typeface="Calibri" panose="020F0502020204030204" pitchFamily="34" charset="0"/>
-                <a:cs typeface="Calibri" panose="020F0502020204030204" pitchFamily="34" charset="0"/>
-              </a:rPr>
-              <a:t>DATA-DRIVEN MODEL DEVELOPMENT STRATEGY </a:t>
-            </a:r>
-          </a:p>
-          <a:p>
-            <a:endParaRPr lang="en-GB" sz="800" b="1" dirty="0">
-              <a:solidFill>
-                <a:schemeClr val="tx1">
-                  <a:lumMod val="95000"/>
-                  <a:lumOff val="5000"/>
-                </a:schemeClr>
-              </a:solidFill>
-              <a:latin typeface="Calibri" panose="020F0502020204030204" pitchFamily="34" charset="0"/>
-              <a:cs typeface="Calibri" panose="020F0502020204030204" pitchFamily="34" charset="0"/>
-            </a:endParaRPr>
-          </a:p>
-          <a:p>
-            <a:r>
-              <a:rPr lang="en-GB" sz="800" dirty="0">
-                <a:solidFill>
-                  <a:schemeClr val="tx1">
-                    <a:lumMod val="95000"/>
-                    <a:lumOff val="5000"/>
-                  </a:schemeClr>
-                </a:solidFill>
-                <a:latin typeface="Calibri Light" panose="020F0302020204030204" pitchFamily="34" charset="0"/>
-                <a:cs typeface="Calibri Light" panose="020F0302020204030204" pitchFamily="34" charset="0"/>
-              </a:rPr>
-              <a:t>To develop hydro-met predictions of areas at risk of flash floods under imbalanced observational datasets.</a:t>
-            </a:r>
           </a:p>
         </p:txBody>
       </p:sp>

</xml_diff>

<commit_message>
removed one interaction with one research component in the methodological decisions.
</commit_message>
<xml_diff>
--- a/chapter_03/figures/integrated_experimental_strategy.pptx
+++ b/chapter_03/figures/integrated_experimental_strategy.pptx
@@ -128,12 +128,12 @@
   <pc:docChgLst>
     <pc:chgData name="Fatima Pillosu" userId="a6295d4dc9e22643" providerId="LiveId" clId="{F0B9C950-5C19-45BA-B39E-FADB59417D97}"/>
     <pc:docChg chg="undo redo custSel modSld">
-      <pc:chgData name="Fatima Pillosu" userId="a6295d4dc9e22643" providerId="LiveId" clId="{F0B9C950-5C19-45BA-B39E-FADB59417D97}" dt="2025-06-18T10:36:54.156" v="1432" actId="478"/>
+      <pc:chgData name="Fatima Pillosu" userId="a6295d4dc9e22643" providerId="LiveId" clId="{F0B9C950-5C19-45BA-B39E-FADB59417D97}" dt="2025-06-18T10:40:04.953" v="1433" actId="478"/>
       <pc:docMkLst>
         <pc:docMk/>
       </pc:docMkLst>
       <pc:sldChg chg="addSp delSp modSp mod">
-        <pc:chgData name="Fatima Pillosu" userId="a6295d4dc9e22643" providerId="LiveId" clId="{F0B9C950-5C19-45BA-B39E-FADB59417D97}" dt="2025-06-18T10:36:54.156" v="1432" actId="478"/>
+        <pc:chgData name="Fatima Pillosu" userId="a6295d4dc9e22643" providerId="LiveId" clId="{F0B9C950-5C19-45BA-B39E-FADB59417D97}" dt="2025-06-18T10:40:04.953" v="1433" actId="478"/>
         <pc:sldMkLst>
           <pc:docMk/>
           <pc:sldMk cId="2412790101" sldId="256"/>
@@ -1290,8 +1290,8 @@
             <ac:spMk id="62" creationId="{DA0A3A3F-6F21-9FFB-DFE8-C73B8123777A}"/>
           </ac:spMkLst>
         </pc:spChg>
-        <pc:spChg chg="add mod">
-          <ac:chgData name="Fatima Pillosu" userId="a6295d4dc9e22643" providerId="LiveId" clId="{F0B9C950-5C19-45BA-B39E-FADB59417D97}" dt="2025-06-18T10:36:29.548" v="1410" actId="1035"/>
+        <pc:spChg chg="add del mod">
+          <ac:chgData name="Fatima Pillosu" userId="a6295d4dc9e22643" providerId="LiveId" clId="{F0B9C950-5C19-45BA-B39E-FADB59417D97}" dt="2025-06-18T10:40:04.953" v="1433" actId="478"/>
           <ac:spMkLst>
             <pc:docMk/>
             <pc:sldMk cId="2412790101" sldId="256"/>
@@ -9161,58 +9161,6 @@
           </a:prstGeom>
           <a:solidFill>
             <a:srgbClr val="3F37C9"/>
-          </a:solidFill>
-          <a:ln>
-            <a:noFill/>
-          </a:ln>
-        </p:spPr>
-        <p:style>
-          <a:lnRef idx="2">
-            <a:schemeClr val="accent1">
-              <a:shade val="15000"/>
-            </a:schemeClr>
-          </a:lnRef>
-          <a:fillRef idx="1">
-            <a:schemeClr val="accent1"/>
-          </a:fillRef>
-          <a:effectRef idx="0">
-            <a:schemeClr val="accent1"/>
-          </a:effectRef>
-          <a:fontRef idx="minor">
-            <a:schemeClr val="lt1"/>
-          </a:fontRef>
-        </p:style>
-        <p:txBody>
-          <a:bodyPr rtlCol="0" anchor="ctr"/>
-          <a:lstStyle/>
-          <a:p>
-            <a:pPr algn="ctr"/>
-            <a:endParaRPr lang="en-GB"/>
-          </a:p>
-        </p:txBody>
-      </p:sp>
-      <p:sp>
-        <p:nvSpPr>
-          <p:cNvPr id="63" name="Rectangle 62">
-            <a:extLst>
-              <a:ext uri="{FF2B5EF4-FFF2-40B4-BE49-F238E27FC236}">
-                <a16:creationId xmlns:a16="http://schemas.microsoft.com/office/drawing/2014/main" id="{80A2885C-C700-FB46-FB9D-5B6CEDF2F266}"/>
-              </a:ext>
-            </a:extLst>
-          </p:cNvPr>
-          <p:cNvSpPr/>
-          <p:nvPr/>
-        </p:nvSpPr>
-        <p:spPr>
-          <a:xfrm>
-            <a:off x="3968087" y="4821469"/>
-            <a:ext cx="72000" cy="180000"/>
-          </a:xfrm>
-          <a:prstGeom prst="rect">
-            <a:avLst/>
-          </a:prstGeom>
-          <a:solidFill>
-            <a:srgbClr val="FF595E"/>
           </a:solidFill>
           <a:ln>
             <a:noFill/>

</xml_diff>

<commit_message>
Improved the main infographic of chapter 3.
</commit_message>
<xml_diff>
--- a/chapter_03/figures/integrated_experimental_strategy.pptx
+++ b/chapter_03/figures/integrated_experimental_strategy.pptx
@@ -2,7 +2,7 @@
 <file path=ppt/presentation.xml><?xml version="1.0" encoding="utf-8"?>
 <p:presentation xmlns:a="http://schemas.openxmlformats.org/drawingml/2006/main" xmlns:r="http://schemas.openxmlformats.org/officeDocument/2006/relationships" xmlns:p="http://schemas.openxmlformats.org/presentationml/2006/main" saveSubsetFonts="1">
   <p:sldMasterIdLst>
-    <p:sldMasterId id="2147483828" r:id="rId1"/>
+    <p:sldMasterId id="2147483840" r:id="rId1"/>
   </p:sldMasterIdLst>
   <p:notesMasterIdLst>
     <p:notesMasterId r:id="rId3"/>
@@ -10,7 +10,7 @@
   <p:sldIdLst>
     <p:sldId id="257" r:id="rId2"/>
   </p:sldIdLst>
-  <p:sldSz cx="4140200" cy="6119813"/>
+  <p:sldSz cx="4140200" cy="5040313"/>
   <p:notesSz cx="6858000" cy="9144000"/>
   <p:defaultTextStyle>
     <a:defPPr>
@@ -118,7 +118,7 @@
 <file path=ppt/revisionInfo.xml><?xml version="1.0" encoding="utf-8"?>
 <p1510:revInfo xmlns:a="http://schemas.openxmlformats.org/drawingml/2006/main" xmlns:r="http://schemas.openxmlformats.org/officeDocument/2006/relationships" xmlns:p1510="http://schemas.microsoft.com/office/powerpoint/2015/10/main">
   <p1510:revLst>
-    <p1510:client id="{F0B9C950-5C19-45BA-B39E-FADB59417D97}" v="44" dt="2025-06-25T15:39:07.187"/>
+    <p1510:client id="{F0B9C950-5C19-45BA-B39E-FADB59417D97}" v="52" dt="2025-06-25T16:42:57.898"/>
   </p1510:revLst>
 </p1510:revInfo>
 </file>
@@ -128,7 +128,7 @@
   <pc:docChgLst>
     <pc:chgData name="Fatima Pillosu" userId="a6295d4dc9e22643" providerId="LiveId" clId="{F0B9C950-5C19-45BA-B39E-FADB59417D97}"/>
     <pc:docChg chg="undo redo custSel addSld delSld modSld">
-      <pc:chgData name="Fatima Pillosu" userId="a6295d4dc9e22643" providerId="LiveId" clId="{F0B9C950-5C19-45BA-B39E-FADB59417D97}" dt="2025-06-25T15:39:07.187" v="1903"/>
+      <pc:chgData name="Fatima Pillosu" userId="a6295d4dc9e22643" providerId="LiveId" clId="{F0B9C950-5C19-45BA-B39E-FADB59417D97}" dt="2025-06-25T16:43:01.281" v="3396" actId="1035"/>
       <pc:docMkLst>
         <pc:docMk/>
       </pc:docMkLst>
@@ -1923,12 +1923,20 @@
           </ac:spMkLst>
         </pc:spChg>
       </pc:sldChg>
-      <pc:sldChg chg="addSp delSp modSp new mod">
-        <pc:chgData name="Fatima Pillosu" userId="a6295d4dc9e22643" providerId="LiveId" clId="{F0B9C950-5C19-45BA-B39E-FADB59417D97}" dt="2025-06-25T15:39:07.187" v="1903"/>
+      <pc:sldChg chg="addSp delSp modSp new mod setBg">
+        <pc:chgData name="Fatima Pillosu" userId="a6295d4dc9e22643" providerId="LiveId" clId="{F0B9C950-5C19-45BA-B39E-FADB59417D97}" dt="2025-06-25T16:43:01.281" v="3396" actId="1035"/>
         <pc:sldMkLst>
           <pc:docMk/>
           <pc:sldMk cId="4289110639" sldId="257"/>
         </pc:sldMkLst>
+        <pc:spChg chg="add del mod">
+          <ac:chgData name="Fatima Pillosu" userId="a6295d4dc9e22643" providerId="LiveId" clId="{F0B9C950-5C19-45BA-B39E-FADB59417D97}" dt="2025-06-25T16:42:46.024" v="3394" actId="21"/>
+          <ac:spMkLst>
+            <pc:docMk/>
+            <pc:sldMk cId="4289110639" sldId="257"/>
+            <ac:spMk id="2" creationId="{0C8CE056-7612-0128-B393-AE3D0105B0B0}"/>
+          </ac:spMkLst>
+        </pc:spChg>
         <pc:spChg chg="del">
           <ac:chgData name="Fatima Pillosu" userId="a6295d4dc9e22643" providerId="LiveId" clId="{F0B9C950-5C19-45BA-B39E-FADB59417D97}" dt="2025-06-25T15:11:25.925" v="1436" actId="478"/>
           <ac:spMkLst>
@@ -1937,6 +1945,14 @@
             <ac:spMk id="2" creationId="{3ADA8BCA-B99E-8338-5E6C-05B0B2D2D0B2}"/>
           </ac:spMkLst>
         </pc:spChg>
+        <pc:spChg chg="add del mod">
+          <ac:chgData name="Fatima Pillosu" userId="a6295d4dc9e22643" providerId="LiveId" clId="{F0B9C950-5C19-45BA-B39E-FADB59417D97}" dt="2025-06-25T16:19:45.313" v="2891" actId="11529"/>
+          <ac:spMkLst>
+            <pc:docMk/>
+            <pc:sldMk cId="4289110639" sldId="257"/>
+            <ac:spMk id="3" creationId="{25F43096-7068-BBBB-F21C-EB070D795068}"/>
+          </ac:spMkLst>
+        </pc:spChg>
         <pc:spChg chg="del">
           <ac:chgData name="Fatima Pillosu" userId="a6295d4dc9e22643" providerId="LiveId" clId="{F0B9C950-5C19-45BA-B39E-FADB59417D97}" dt="2025-06-25T15:11:25.306" v="1435" actId="478"/>
           <ac:spMkLst>
@@ -1946,6 +1962,14 @@
           </ac:spMkLst>
         </pc:spChg>
         <pc:spChg chg="add del mod">
+          <ac:chgData name="Fatima Pillosu" userId="a6295d4dc9e22643" providerId="LiveId" clId="{F0B9C950-5C19-45BA-B39E-FADB59417D97}" dt="2025-06-25T16:42:46.024" v="3394" actId="21"/>
+          <ac:spMkLst>
+            <pc:docMk/>
+            <pc:sldMk cId="4289110639" sldId="257"/>
+            <ac:spMk id="4" creationId="{26E5001B-6DEC-3779-E01A-0A27FF325B8B}"/>
+          </ac:spMkLst>
+        </pc:spChg>
+        <pc:spChg chg="add del mod">
           <ac:chgData name="Fatima Pillosu" userId="a6295d4dc9e22643" providerId="LiveId" clId="{F0B9C950-5C19-45BA-B39E-FADB59417D97}" dt="2025-06-25T15:13:51.292" v="1448" actId="21"/>
           <ac:spMkLst>
             <pc:docMk/>
@@ -1954,6 +1978,14 @@
           </ac:spMkLst>
         </pc:spChg>
         <pc:spChg chg="add del mod">
+          <ac:chgData name="Fatima Pillosu" userId="a6295d4dc9e22643" providerId="LiveId" clId="{F0B9C950-5C19-45BA-B39E-FADB59417D97}" dt="2025-06-25T16:42:46.024" v="3394" actId="21"/>
+          <ac:spMkLst>
+            <pc:docMk/>
+            <pc:sldMk cId="4289110639" sldId="257"/>
+            <ac:spMk id="5" creationId="{9725519F-3CA2-8003-2FF8-53A9447B36EA}"/>
+          </ac:spMkLst>
+        </pc:spChg>
+        <pc:spChg chg="add del mod">
           <ac:chgData name="Fatima Pillosu" userId="a6295d4dc9e22643" providerId="LiveId" clId="{F0B9C950-5C19-45BA-B39E-FADB59417D97}" dt="2025-06-25T15:13:51.292" v="1448" actId="21"/>
           <ac:spMkLst>
             <pc:docMk/>
@@ -1969,6 +2001,14 @@
             <ac:spMk id="6" creationId="{C67831BC-0460-0F59-5119-29984C4351EE}"/>
           </ac:spMkLst>
         </pc:spChg>
+        <pc:spChg chg="add del">
+          <ac:chgData name="Fatima Pillosu" userId="a6295d4dc9e22643" providerId="LiveId" clId="{F0B9C950-5C19-45BA-B39E-FADB59417D97}" dt="2025-06-25T16:36:23.193" v="3312" actId="478"/>
+          <ac:spMkLst>
+            <pc:docMk/>
+            <pc:sldMk cId="4289110639" sldId="257"/>
+            <ac:spMk id="6" creationId="{CDB79588-1887-BEC6-210F-8E16AF324F09}"/>
+          </ac:spMkLst>
+        </pc:spChg>
         <pc:spChg chg="add del mod">
           <ac:chgData name="Fatima Pillosu" userId="a6295d4dc9e22643" providerId="LiveId" clId="{F0B9C950-5C19-45BA-B39E-FADB59417D97}" dt="2025-06-25T15:13:51.292" v="1448" actId="21"/>
           <ac:spMkLst>
@@ -1977,6 +2017,14 @@
             <ac:spMk id="7" creationId="{A96FCC34-B663-485A-1B91-366A6782D098}"/>
           </ac:spMkLst>
         </pc:spChg>
+        <pc:spChg chg="add del">
+          <ac:chgData name="Fatima Pillosu" userId="a6295d4dc9e22643" providerId="LiveId" clId="{F0B9C950-5C19-45BA-B39E-FADB59417D97}" dt="2025-06-25T16:36:43.714" v="3335" actId="478"/>
+          <ac:spMkLst>
+            <pc:docMk/>
+            <pc:sldMk cId="4289110639" sldId="257"/>
+            <ac:spMk id="7" creationId="{CA3561D9-9CD8-D18A-38C4-5CF7C631AB3C}"/>
+          </ac:spMkLst>
+        </pc:spChg>
         <pc:spChg chg="add del mod">
           <ac:chgData name="Fatima Pillosu" userId="a6295d4dc9e22643" providerId="LiveId" clId="{F0B9C950-5C19-45BA-B39E-FADB59417D97}" dt="2025-06-25T15:13:51.292" v="1448" actId="21"/>
           <ac:spMkLst>
@@ -1986,6 +2034,78 @@
           </ac:spMkLst>
         </pc:spChg>
         <pc:spChg chg="add del mod">
+          <ac:chgData name="Fatima Pillosu" userId="a6295d4dc9e22643" providerId="LiveId" clId="{F0B9C950-5C19-45BA-B39E-FADB59417D97}" dt="2025-06-25T16:42:46.024" v="3394" actId="21"/>
+          <ac:spMkLst>
+            <pc:docMk/>
+            <pc:sldMk cId="4289110639" sldId="257"/>
+            <ac:spMk id="8" creationId="{E8D2B8E7-039B-1A09-2DDC-C83E14EB46DF}"/>
+          </ac:spMkLst>
+        </pc:spChg>
+        <pc:spChg chg="add del mod">
+          <ac:chgData name="Fatima Pillosu" userId="a6295d4dc9e22643" providerId="LiveId" clId="{F0B9C950-5C19-45BA-B39E-FADB59417D97}" dt="2025-06-25T16:42:46.024" v="3394" actId="21"/>
+          <ac:spMkLst>
+            <pc:docMk/>
+            <pc:sldMk cId="4289110639" sldId="257"/>
+            <ac:spMk id="9" creationId="{C12365C0-1DFD-9105-1FAE-06F580451ED3}"/>
+          </ac:spMkLst>
+        </pc:spChg>
+        <pc:spChg chg="add del mod">
+          <ac:chgData name="Fatima Pillosu" userId="a6295d4dc9e22643" providerId="LiveId" clId="{F0B9C950-5C19-45BA-B39E-FADB59417D97}" dt="2025-06-25T16:42:46.024" v="3394" actId="21"/>
+          <ac:spMkLst>
+            <pc:docMk/>
+            <pc:sldMk cId="4289110639" sldId="257"/>
+            <ac:spMk id="10" creationId="{75EFEC79-3C2A-8CE1-D040-35A21318F4DF}"/>
+          </ac:spMkLst>
+        </pc:spChg>
+        <pc:spChg chg="add del mod">
+          <ac:chgData name="Fatima Pillosu" userId="a6295d4dc9e22643" providerId="LiveId" clId="{F0B9C950-5C19-45BA-B39E-FADB59417D97}" dt="2025-06-25T16:42:10.566" v="3391" actId="478"/>
+          <ac:spMkLst>
+            <pc:docMk/>
+            <pc:sldMk cId="4289110639" sldId="257"/>
+            <ac:spMk id="11" creationId="{6B050774-647F-CC0B-DB7D-ADFA5B964667}"/>
+          </ac:spMkLst>
+        </pc:spChg>
+        <pc:spChg chg="add del mod">
+          <ac:chgData name="Fatima Pillosu" userId="a6295d4dc9e22643" providerId="LiveId" clId="{F0B9C950-5C19-45BA-B39E-FADB59417D97}" dt="2025-06-25T16:42:46.024" v="3394" actId="21"/>
+          <ac:spMkLst>
+            <pc:docMk/>
+            <pc:sldMk cId="4289110639" sldId="257"/>
+            <ac:spMk id="12" creationId="{2E5BBF82-039A-99DB-1291-B984EF2722D0}"/>
+          </ac:spMkLst>
+        </pc:spChg>
+        <pc:spChg chg="add del mod">
+          <ac:chgData name="Fatima Pillosu" userId="a6295d4dc9e22643" providerId="LiveId" clId="{F0B9C950-5C19-45BA-B39E-FADB59417D97}" dt="2025-06-25T16:42:46.024" v="3394" actId="21"/>
+          <ac:spMkLst>
+            <pc:docMk/>
+            <pc:sldMk cId="4289110639" sldId="257"/>
+            <ac:spMk id="13" creationId="{F1B50902-05E1-2214-2377-74DDCE112879}"/>
+          </ac:spMkLst>
+        </pc:spChg>
+        <pc:spChg chg="add del">
+          <ac:chgData name="Fatima Pillosu" userId="a6295d4dc9e22643" providerId="LiveId" clId="{F0B9C950-5C19-45BA-B39E-FADB59417D97}" dt="2025-06-25T16:42:44.881" v="3393" actId="478"/>
+          <ac:spMkLst>
+            <pc:docMk/>
+            <pc:sldMk cId="4289110639" sldId="257"/>
+            <ac:spMk id="14" creationId="{146AA7D0-AA66-9412-FD7B-6A53D86C4EB9}"/>
+          </ac:spMkLst>
+        </pc:spChg>
+        <pc:spChg chg="add mod">
+          <ac:chgData name="Fatima Pillosu" userId="a6295d4dc9e22643" providerId="LiveId" clId="{F0B9C950-5C19-45BA-B39E-FADB59417D97}" dt="2025-06-25T16:43:01.281" v="3396" actId="1035"/>
+          <ac:spMkLst>
+            <pc:docMk/>
+            <pc:sldMk cId="4289110639" sldId="257"/>
+            <ac:spMk id="15" creationId="{DDAF3D54-885E-2A29-8D7C-F2C70C58F5B5}"/>
+          </ac:spMkLst>
+        </pc:spChg>
+        <pc:spChg chg="add mod">
+          <ac:chgData name="Fatima Pillosu" userId="a6295d4dc9e22643" providerId="LiveId" clId="{F0B9C950-5C19-45BA-B39E-FADB59417D97}" dt="2025-06-25T16:43:01.281" v="3396" actId="1035"/>
+          <ac:spMkLst>
+            <pc:docMk/>
+            <pc:sldMk cId="4289110639" sldId="257"/>
+            <ac:spMk id="16" creationId="{2CE8AC50-A4E3-9DB6-F606-EB886BE8550D}"/>
+          </ac:spMkLst>
+        </pc:spChg>
+        <pc:spChg chg="add del mod">
           <ac:chgData name="Fatima Pillosu" userId="a6295d4dc9e22643" providerId="LiveId" clId="{F0B9C950-5C19-45BA-B39E-FADB59417D97}" dt="2025-06-25T15:13:51.292" v="1448" actId="21"/>
           <ac:spMkLst>
             <pc:docMk/>
@@ -2001,6 +2121,22 @@
             <ac:spMk id="17" creationId="{3BC980C1-1730-6AF0-AED0-8759A78EA8C6}"/>
           </ac:spMkLst>
         </pc:spChg>
+        <pc:spChg chg="add mod">
+          <ac:chgData name="Fatima Pillosu" userId="a6295d4dc9e22643" providerId="LiveId" clId="{F0B9C950-5C19-45BA-B39E-FADB59417D97}" dt="2025-06-25T16:43:01.281" v="3396" actId="1035"/>
+          <ac:spMkLst>
+            <pc:docMk/>
+            <pc:sldMk cId="4289110639" sldId="257"/>
+            <ac:spMk id="17" creationId="{DC34E010-EA2E-EFF4-B042-AAD8E29801DE}"/>
+          </ac:spMkLst>
+        </pc:spChg>
+        <pc:spChg chg="add mod">
+          <ac:chgData name="Fatima Pillosu" userId="a6295d4dc9e22643" providerId="LiveId" clId="{F0B9C950-5C19-45BA-B39E-FADB59417D97}" dt="2025-06-25T16:43:01.281" v="3396" actId="1035"/>
+          <ac:spMkLst>
+            <pc:docMk/>
+            <pc:sldMk cId="4289110639" sldId="257"/>
+            <ac:spMk id="18" creationId="{A443D769-35EA-ACBB-55BC-2A7FE9B1D174}"/>
+          </ac:spMkLst>
+        </pc:spChg>
         <pc:spChg chg="add del mod">
           <ac:chgData name="Fatima Pillosu" userId="a6295d4dc9e22643" providerId="LiveId" clId="{F0B9C950-5C19-45BA-B39E-FADB59417D97}" dt="2025-06-25T15:13:51.292" v="1448" actId="21"/>
           <ac:spMkLst>
@@ -2009,6 +2145,54 @@
             <ac:spMk id="18" creationId="{C00C6D4F-6379-0107-EFEC-867498B3DF65}"/>
           </ac:spMkLst>
         </pc:spChg>
+        <pc:spChg chg="add mod">
+          <ac:chgData name="Fatima Pillosu" userId="a6295d4dc9e22643" providerId="LiveId" clId="{F0B9C950-5C19-45BA-B39E-FADB59417D97}" dt="2025-06-25T16:43:01.281" v="3396" actId="1035"/>
+          <ac:spMkLst>
+            <pc:docMk/>
+            <pc:sldMk cId="4289110639" sldId="257"/>
+            <ac:spMk id="19" creationId="{6541EEEE-3369-14C3-9119-24FBFEC538F6}"/>
+          </ac:spMkLst>
+        </pc:spChg>
+        <pc:spChg chg="add mod">
+          <ac:chgData name="Fatima Pillosu" userId="a6295d4dc9e22643" providerId="LiveId" clId="{F0B9C950-5C19-45BA-B39E-FADB59417D97}" dt="2025-06-25T16:43:01.281" v="3396" actId="1035"/>
+          <ac:spMkLst>
+            <pc:docMk/>
+            <pc:sldMk cId="4289110639" sldId="257"/>
+            <ac:spMk id="20" creationId="{A668C935-54EA-6F8F-0BB1-E7014CC096D7}"/>
+          </ac:spMkLst>
+        </pc:spChg>
+        <pc:spChg chg="add mod">
+          <ac:chgData name="Fatima Pillosu" userId="a6295d4dc9e22643" providerId="LiveId" clId="{F0B9C950-5C19-45BA-B39E-FADB59417D97}" dt="2025-06-25T16:43:01.281" v="3396" actId="1035"/>
+          <ac:spMkLst>
+            <pc:docMk/>
+            <pc:sldMk cId="4289110639" sldId="257"/>
+            <ac:spMk id="21" creationId="{DEEE2271-5967-5ABD-F72A-2D4C2F26C2AA}"/>
+          </ac:spMkLst>
+        </pc:spChg>
+        <pc:spChg chg="add mod">
+          <ac:chgData name="Fatima Pillosu" userId="a6295d4dc9e22643" providerId="LiveId" clId="{F0B9C950-5C19-45BA-B39E-FADB59417D97}" dt="2025-06-25T16:43:01.281" v="3396" actId="1035"/>
+          <ac:spMkLst>
+            <pc:docMk/>
+            <pc:sldMk cId="4289110639" sldId="257"/>
+            <ac:spMk id="22" creationId="{BE24FD28-FAFB-884F-4CE7-E4FD5429F6E3}"/>
+          </ac:spMkLst>
+        </pc:spChg>
+        <pc:spChg chg="add mod">
+          <ac:chgData name="Fatima Pillosu" userId="a6295d4dc9e22643" providerId="LiveId" clId="{F0B9C950-5C19-45BA-B39E-FADB59417D97}" dt="2025-06-25T16:43:01.281" v="3396" actId="1035"/>
+          <ac:spMkLst>
+            <pc:docMk/>
+            <pc:sldMk cId="4289110639" sldId="257"/>
+            <ac:spMk id="23" creationId="{16EB6FA0-CBE1-9983-F1CC-346BCA2848D4}"/>
+          </ac:spMkLst>
+        </pc:spChg>
+        <pc:spChg chg="add mod">
+          <ac:chgData name="Fatima Pillosu" userId="a6295d4dc9e22643" providerId="LiveId" clId="{F0B9C950-5C19-45BA-B39E-FADB59417D97}" dt="2025-06-25T16:43:01.281" v="3396" actId="1035"/>
+          <ac:spMkLst>
+            <pc:docMk/>
+            <pc:sldMk cId="4289110639" sldId="257"/>
+            <ac:spMk id="24" creationId="{5137CFD3-310B-C4B7-5CBF-D6EBE8384DFF}"/>
+          </ac:spMkLst>
+        </pc:spChg>
         <pc:spChg chg="add del mod">
           <ac:chgData name="Fatima Pillosu" userId="a6295d4dc9e22643" providerId="LiveId" clId="{F0B9C950-5C19-45BA-B39E-FADB59417D97}" dt="2025-06-25T15:13:51.292" v="1448" actId="21"/>
           <ac:spMkLst>
@@ -2017,6 +2201,22 @@
             <ac:spMk id="25" creationId="{2CE8AC50-A4E3-9DB6-F606-EB886BE8550D}"/>
           </ac:spMkLst>
         </pc:spChg>
+        <pc:spChg chg="add mod">
+          <ac:chgData name="Fatima Pillosu" userId="a6295d4dc9e22643" providerId="LiveId" clId="{F0B9C950-5C19-45BA-B39E-FADB59417D97}" dt="2025-06-25T16:43:01.281" v="3396" actId="1035"/>
+          <ac:spMkLst>
+            <pc:docMk/>
+            <pc:sldMk cId="4289110639" sldId="257"/>
+            <ac:spMk id="25" creationId="{9097776E-A046-4D6E-89DA-50B1F5A3FAF4}"/>
+          </ac:spMkLst>
+        </pc:spChg>
+        <pc:spChg chg="add mod">
+          <ac:chgData name="Fatima Pillosu" userId="a6295d4dc9e22643" providerId="LiveId" clId="{F0B9C950-5C19-45BA-B39E-FADB59417D97}" dt="2025-06-25T16:43:01.281" v="3396" actId="1035"/>
+          <ac:spMkLst>
+            <pc:docMk/>
+            <pc:sldMk cId="4289110639" sldId="257"/>
+            <ac:spMk id="26" creationId="{1402EF05-0A8D-81FE-F96A-820C0CB99803}"/>
+          </ac:spMkLst>
+        </pc:spChg>
         <pc:spChg chg="add del mod">
           <ac:chgData name="Fatima Pillosu" userId="a6295d4dc9e22643" providerId="LiveId" clId="{F0B9C950-5C19-45BA-B39E-FADB59417D97}" dt="2025-06-25T15:13:51.292" v="1448" actId="21"/>
           <ac:spMkLst>
@@ -2025,6 +2225,14 @@
             <ac:spMk id="26" creationId="{8BF45082-5DBA-2BDA-6B3B-1CE304EDBB0F}"/>
           </ac:spMkLst>
         </pc:spChg>
+        <pc:spChg chg="add mod">
+          <ac:chgData name="Fatima Pillosu" userId="a6295d4dc9e22643" providerId="LiveId" clId="{F0B9C950-5C19-45BA-B39E-FADB59417D97}" dt="2025-06-25T16:43:01.281" v="3396" actId="1035"/>
+          <ac:spMkLst>
+            <pc:docMk/>
+            <pc:sldMk cId="4289110639" sldId="257"/>
+            <ac:spMk id="27" creationId="{4CDF8D29-A1A4-B6EF-CC2D-02154951F423}"/>
+          </ac:spMkLst>
+        </pc:spChg>
         <pc:spChg chg="add del mod">
           <ac:chgData name="Fatima Pillosu" userId="a6295d4dc9e22643" providerId="LiveId" clId="{F0B9C950-5C19-45BA-B39E-FADB59417D97}" dt="2025-06-25T15:13:51.292" v="1448" actId="21"/>
           <ac:spMkLst>
@@ -2033,6 +2241,14 @@
             <ac:spMk id="27" creationId="{DC34E010-EA2E-EFF4-B042-AAD8E29801DE}"/>
           </ac:spMkLst>
         </pc:spChg>
+        <pc:spChg chg="add mod">
+          <ac:chgData name="Fatima Pillosu" userId="a6295d4dc9e22643" providerId="LiveId" clId="{F0B9C950-5C19-45BA-B39E-FADB59417D97}" dt="2025-06-25T16:43:01.281" v="3396" actId="1035"/>
+          <ac:spMkLst>
+            <pc:docMk/>
+            <pc:sldMk cId="4289110639" sldId="257"/>
+            <ac:spMk id="28" creationId="{C5F22480-43D2-EC6C-C595-536DDF09AC46}"/>
+          </ac:spMkLst>
+        </pc:spChg>
         <pc:spChg chg="add del mod">
           <ac:chgData name="Fatima Pillosu" userId="a6295d4dc9e22643" providerId="LiveId" clId="{F0B9C950-5C19-45BA-B39E-FADB59417D97}" dt="2025-06-25T15:13:51.292" v="1448" actId="21"/>
           <ac:spMkLst>
@@ -2041,6 +2257,14 @@
             <ac:spMk id="28" creationId="{E596FB15-C5C4-A883-D8B1-8941F744109D}"/>
           </ac:spMkLst>
         </pc:spChg>
+        <pc:spChg chg="add mod">
+          <ac:chgData name="Fatima Pillosu" userId="a6295d4dc9e22643" providerId="LiveId" clId="{F0B9C950-5C19-45BA-B39E-FADB59417D97}" dt="2025-06-25T16:43:01.281" v="3396" actId="1035"/>
+          <ac:spMkLst>
+            <pc:docMk/>
+            <pc:sldMk cId="4289110639" sldId="257"/>
+            <ac:spMk id="29" creationId="{65CF77BB-AB79-BDF7-1AD9-C8ABDB188BCE}"/>
+          </ac:spMkLst>
+        </pc:spChg>
         <pc:spChg chg="add del mod">
           <ac:chgData name="Fatima Pillosu" userId="a6295d4dc9e22643" providerId="LiveId" clId="{F0B9C950-5C19-45BA-B39E-FADB59417D97}" dt="2025-06-25T15:13:51.292" v="1448" actId="21"/>
           <ac:spMkLst>
@@ -2057,6 +2281,22 @@
             <ac:spMk id="30" creationId="{09AA91AB-0F00-9123-C1B1-2024DAA6ECFC}"/>
           </ac:spMkLst>
         </pc:spChg>
+        <pc:spChg chg="add mod">
+          <ac:chgData name="Fatima Pillosu" userId="a6295d4dc9e22643" providerId="LiveId" clId="{F0B9C950-5C19-45BA-B39E-FADB59417D97}" dt="2025-06-25T16:43:01.281" v="3396" actId="1035"/>
+          <ac:spMkLst>
+            <pc:docMk/>
+            <pc:sldMk cId="4289110639" sldId="257"/>
+            <ac:spMk id="30" creationId="{CE0D8E67-F738-7066-FAAB-7F1C9C0D3446}"/>
+          </ac:spMkLst>
+        </pc:spChg>
+        <pc:spChg chg="add mod">
+          <ac:chgData name="Fatima Pillosu" userId="a6295d4dc9e22643" providerId="LiveId" clId="{F0B9C950-5C19-45BA-B39E-FADB59417D97}" dt="2025-06-25T16:43:01.281" v="3396" actId="1035"/>
+          <ac:spMkLst>
+            <pc:docMk/>
+            <pc:sldMk cId="4289110639" sldId="257"/>
+            <ac:spMk id="31" creationId="{716E92A3-A5CC-93CB-1E03-1C50F1F6DD03}"/>
+          </ac:spMkLst>
+        </pc:spChg>
         <pc:spChg chg="add del mod">
           <ac:chgData name="Fatima Pillosu" userId="a6295d4dc9e22643" providerId="LiveId" clId="{F0B9C950-5C19-45BA-B39E-FADB59417D97}" dt="2025-06-25T15:13:51.292" v="1448" actId="21"/>
           <ac:spMkLst>
@@ -2073,6 +2313,22 @@
             <ac:spMk id="32" creationId="{A443D769-35EA-ACBB-55BC-2A7FE9B1D174}"/>
           </ac:spMkLst>
         </pc:spChg>
+        <pc:spChg chg="add mod">
+          <ac:chgData name="Fatima Pillosu" userId="a6295d4dc9e22643" providerId="LiveId" clId="{F0B9C950-5C19-45BA-B39E-FADB59417D97}" dt="2025-06-25T16:43:01.281" v="3396" actId="1035"/>
+          <ac:spMkLst>
+            <pc:docMk/>
+            <pc:sldMk cId="4289110639" sldId="257"/>
+            <ac:spMk id="32" creationId="{C0C067FC-01D1-B083-6206-56A46662729A}"/>
+          </ac:spMkLst>
+        </pc:spChg>
+        <pc:spChg chg="add mod">
+          <ac:chgData name="Fatima Pillosu" userId="a6295d4dc9e22643" providerId="LiveId" clId="{F0B9C950-5C19-45BA-B39E-FADB59417D97}" dt="2025-06-25T16:43:01.281" v="3396" actId="1035"/>
+          <ac:spMkLst>
+            <pc:docMk/>
+            <pc:sldMk cId="4289110639" sldId="257"/>
+            <ac:spMk id="33" creationId="{649A66B3-B899-4304-E071-230DD34AFBC3}"/>
+          </ac:spMkLst>
+        </pc:spChg>
         <pc:spChg chg="add del mod">
           <ac:chgData name="Fatima Pillosu" userId="a6295d4dc9e22643" providerId="LiveId" clId="{F0B9C950-5C19-45BA-B39E-FADB59417D97}" dt="2025-06-25T15:13:51.292" v="1448" actId="21"/>
           <ac:spMkLst>
@@ -2081,6 +2337,14 @@
             <ac:spMk id="33" creationId="{ADA3DE8D-1806-5542-AE87-86B40C29C4B6}"/>
           </ac:spMkLst>
         </pc:spChg>
+        <pc:spChg chg="add mod">
+          <ac:chgData name="Fatima Pillosu" userId="a6295d4dc9e22643" providerId="LiveId" clId="{F0B9C950-5C19-45BA-B39E-FADB59417D97}" dt="2025-06-25T16:43:01.281" v="3396" actId="1035"/>
+          <ac:spMkLst>
+            <pc:docMk/>
+            <pc:sldMk cId="4289110639" sldId="257"/>
+            <ac:spMk id="34" creationId="{0949695F-9A1D-9DE9-6A11-1A7363D5D06D}"/>
+          </ac:spMkLst>
+        </pc:spChg>
         <pc:spChg chg="add del mod">
           <ac:chgData name="Fatima Pillosu" userId="a6295d4dc9e22643" providerId="LiveId" clId="{F0B9C950-5C19-45BA-B39E-FADB59417D97}" dt="2025-06-25T15:13:51.292" v="1448" actId="21"/>
           <ac:spMkLst>
@@ -2089,6 +2353,14 @@
             <ac:spMk id="34" creationId="{1E801C4A-0276-1937-0649-23B933A9FD4C}"/>
           </ac:spMkLst>
         </pc:spChg>
+        <pc:spChg chg="add mod">
+          <ac:chgData name="Fatima Pillosu" userId="a6295d4dc9e22643" providerId="LiveId" clId="{F0B9C950-5C19-45BA-B39E-FADB59417D97}" dt="2025-06-25T16:43:01.281" v="3396" actId="1035"/>
+          <ac:spMkLst>
+            <pc:docMk/>
+            <pc:sldMk cId="4289110639" sldId="257"/>
+            <ac:spMk id="35" creationId="{26499A74-7ADD-8575-125F-3A9F7DAB54FD}"/>
+          </ac:spMkLst>
+        </pc:spChg>
         <pc:spChg chg="add del mod">
           <ac:chgData name="Fatima Pillosu" userId="a6295d4dc9e22643" providerId="LiveId" clId="{F0B9C950-5C19-45BA-B39E-FADB59417D97}" dt="2025-06-25T15:13:51.292" v="1448" actId="21"/>
           <ac:spMkLst>
@@ -2097,6 +2369,14 @@
             <ac:spMk id="35" creationId="{6541EEEE-3369-14C3-9119-24FBFEC538F6}"/>
           </ac:spMkLst>
         </pc:spChg>
+        <pc:spChg chg="add mod">
+          <ac:chgData name="Fatima Pillosu" userId="a6295d4dc9e22643" providerId="LiveId" clId="{F0B9C950-5C19-45BA-B39E-FADB59417D97}" dt="2025-06-25T16:43:01.281" v="3396" actId="1035"/>
+          <ac:spMkLst>
+            <pc:docMk/>
+            <pc:sldMk cId="4289110639" sldId="257"/>
+            <ac:spMk id="36" creationId="{87998562-8C2F-313F-516D-39037195BB26}"/>
+          </ac:spMkLst>
+        </pc:spChg>
         <pc:spChg chg="add del mod">
           <ac:chgData name="Fatima Pillosu" userId="a6295d4dc9e22643" providerId="LiveId" clId="{F0B9C950-5C19-45BA-B39E-FADB59417D97}" dt="2025-06-25T15:13:51.292" v="1448" actId="21"/>
           <ac:spMkLst>
@@ -2113,6 +2393,22 @@
             <ac:spMk id="37" creationId="{7E97B7E9-5251-BE9A-AE14-9D7F6768E5D3}"/>
           </ac:spMkLst>
         </pc:spChg>
+        <pc:spChg chg="add mod">
+          <ac:chgData name="Fatima Pillosu" userId="a6295d4dc9e22643" providerId="LiveId" clId="{F0B9C950-5C19-45BA-B39E-FADB59417D97}" dt="2025-06-25T16:43:01.281" v="3396" actId="1035"/>
+          <ac:spMkLst>
+            <pc:docMk/>
+            <pc:sldMk cId="4289110639" sldId="257"/>
+            <ac:spMk id="37" creationId="{80D3517E-1814-BABC-8B8F-AB5B211A3AA1}"/>
+          </ac:spMkLst>
+        </pc:spChg>
+        <pc:spChg chg="add mod">
+          <ac:chgData name="Fatima Pillosu" userId="a6295d4dc9e22643" providerId="LiveId" clId="{F0B9C950-5C19-45BA-B39E-FADB59417D97}" dt="2025-06-25T16:43:01.281" v="3396" actId="1035"/>
+          <ac:spMkLst>
+            <pc:docMk/>
+            <pc:sldMk cId="4289110639" sldId="257"/>
+            <ac:spMk id="38" creationId="{A6BE4838-1365-D3B7-CEDE-D7E2E62B7F31}"/>
+          </ac:spMkLst>
+        </pc:spChg>
         <pc:spChg chg="add del mod">
           <ac:chgData name="Fatima Pillosu" userId="a6295d4dc9e22643" providerId="LiveId" clId="{F0B9C950-5C19-45BA-B39E-FADB59417D97}" dt="2025-06-25T15:13:51.292" v="1448" actId="21"/>
           <ac:spMkLst>
@@ -2129,6 +2425,22 @@
             <ac:spMk id="39" creationId="{3686655B-80AB-878D-8415-307EA53EFB5C}"/>
           </ac:spMkLst>
         </pc:spChg>
+        <pc:spChg chg="add mod">
+          <ac:chgData name="Fatima Pillosu" userId="a6295d4dc9e22643" providerId="LiveId" clId="{F0B9C950-5C19-45BA-B39E-FADB59417D97}" dt="2025-06-25T16:43:01.281" v="3396" actId="1035"/>
+          <ac:spMkLst>
+            <pc:docMk/>
+            <pc:sldMk cId="4289110639" sldId="257"/>
+            <ac:spMk id="39" creationId="{8735F6D1-5555-E7D6-D0BB-A64923855C01}"/>
+          </ac:spMkLst>
+        </pc:spChg>
+        <pc:spChg chg="add mod">
+          <ac:chgData name="Fatima Pillosu" userId="a6295d4dc9e22643" providerId="LiveId" clId="{F0B9C950-5C19-45BA-B39E-FADB59417D97}" dt="2025-06-25T16:43:01.281" v="3396" actId="1035"/>
+          <ac:spMkLst>
+            <pc:docMk/>
+            <pc:sldMk cId="4289110639" sldId="257"/>
+            <ac:spMk id="40" creationId="{2B972E94-DE4C-66D0-A6A3-F1E9C69D6169}"/>
+          </ac:spMkLst>
+        </pc:spChg>
         <pc:spChg chg="add del mod">
           <ac:chgData name="Fatima Pillosu" userId="a6295d4dc9e22643" providerId="LiveId" clId="{F0B9C950-5C19-45BA-B39E-FADB59417D97}" dt="2025-06-25T15:13:51.292" v="1448" actId="21"/>
           <ac:spMkLst>
@@ -2137,6 +2449,14 @@
             <ac:spMk id="40" creationId="{59E5FA53-1F3C-04E3-0ED3-C7DC994CB669}"/>
           </ac:spMkLst>
         </pc:spChg>
+        <pc:spChg chg="add mod">
+          <ac:chgData name="Fatima Pillosu" userId="a6295d4dc9e22643" providerId="LiveId" clId="{F0B9C950-5C19-45BA-B39E-FADB59417D97}" dt="2025-06-25T16:43:01.281" v="3396" actId="1035"/>
+          <ac:spMkLst>
+            <pc:docMk/>
+            <pc:sldMk cId="4289110639" sldId="257"/>
+            <ac:spMk id="41" creationId="{0F40EDD3-6828-DA92-C5B8-A892A73FD4CE}"/>
+          </ac:spMkLst>
+        </pc:spChg>
         <pc:spChg chg="add del mod">
           <ac:chgData name="Fatima Pillosu" userId="a6295d4dc9e22643" providerId="LiveId" clId="{F0B9C950-5C19-45BA-B39E-FADB59417D97}" dt="2025-06-25T15:13:51.292" v="1448" actId="21"/>
           <ac:spMkLst>
@@ -2145,6 +2465,14 @@
             <ac:spMk id="41" creationId="{A0097D71-B402-A483-CFFA-F86F3C56053E}"/>
           </ac:spMkLst>
         </pc:spChg>
+        <pc:spChg chg="add mod">
+          <ac:chgData name="Fatima Pillosu" userId="a6295d4dc9e22643" providerId="LiveId" clId="{F0B9C950-5C19-45BA-B39E-FADB59417D97}" dt="2025-06-25T16:43:01.281" v="3396" actId="1035"/>
+          <ac:spMkLst>
+            <pc:docMk/>
+            <pc:sldMk cId="4289110639" sldId="257"/>
+            <ac:spMk id="42" creationId="{4BC09263-C830-303A-BB0C-2207AFEFF22B}"/>
+          </ac:spMkLst>
+        </pc:spChg>
         <pc:spChg chg="add del mod">
           <ac:chgData name="Fatima Pillosu" userId="a6295d4dc9e22643" providerId="LiveId" clId="{F0B9C950-5C19-45BA-B39E-FADB59417D97}" dt="2025-06-25T15:13:51.292" v="1448" actId="21"/>
           <ac:spMkLst>
@@ -2161,6 +2489,46 @@
             <ac:spMk id="43" creationId="{77F6A371-1CCF-3C24-C1E6-C283E45C2C4D}"/>
           </ac:spMkLst>
         </pc:spChg>
+        <pc:spChg chg="add mod">
+          <ac:chgData name="Fatima Pillosu" userId="a6295d4dc9e22643" providerId="LiveId" clId="{F0B9C950-5C19-45BA-B39E-FADB59417D97}" dt="2025-06-25T16:43:01.281" v="3396" actId="1035"/>
+          <ac:spMkLst>
+            <pc:docMk/>
+            <pc:sldMk cId="4289110639" sldId="257"/>
+            <ac:spMk id="43" creationId="{8BFC4AA3-C582-B088-949F-3006D7236AAA}"/>
+          </ac:spMkLst>
+        </pc:spChg>
+        <pc:spChg chg="add mod">
+          <ac:chgData name="Fatima Pillosu" userId="a6295d4dc9e22643" providerId="LiveId" clId="{F0B9C950-5C19-45BA-B39E-FADB59417D97}" dt="2025-06-25T16:43:01.281" v="3396" actId="1035"/>
+          <ac:spMkLst>
+            <pc:docMk/>
+            <pc:sldMk cId="4289110639" sldId="257"/>
+            <ac:spMk id="44" creationId="{17A4B2C5-47D5-3495-68D8-2CB424DC7257}"/>
+          </ac:spMkLst>
+        </pc:spChg>
+        <pc:spChg chg="add mod">
+          <ac:chgData name="Fatima Pillosu" userId="a6295d4dc9e22643" providerId="LiveId" clId="{F0B9C950-5C19-45BA-B39E-FADB59417D97}" dt="2025-06-25T16:43:01.281" v="3396" actId="1035"/>
+          <ac:spMkLst>
+            <pc:docMk/>
+            <pc:sldMk cId="4289110639" sldId="257"/>
+            <ac:spMk id="45" creationId="{DC1CA93F-6FAF-42B3-BBBF-433BE0D7EC13}"/>
+          </ac:spMkLst>
+        </pc:spChg>
+        <pc:spChg chg="add mod">
+          <ac:chgData name="Fatima Pillosu" userId="a6295d4dc9e22643" providerId="LiveId" clId="{F0B9C950-5C19-45BA-B39E-FADB59417D97}" dt="2025-06-25T16:43:01.281" v="3396" actId="1035"/>
+          <ac:spMkLst>
+            <pc:docMk/>
+            <pc:sldMk cId="4289110639" sldId="257"/>
+            <ac:spMk id="46" creationId="{0C8CE056-7612-0128-B393-AE3D0105B0B0}"/>
+          </ac:spMkLst>
+        </pc:spChg>
+        <pc:spChg chg="add mod">
+          <ac:chgData name="Fatima Pillosu" userId="a6295d4dc9e22643" providerId="LiveId" clId="{F0B9C950-5C19-45BA-B39E-FADB59417D97}" dt="2025-06-25T16:43:01.281" v="3396" actId="1035"/>
+          <ac:spMkLst>
+            <pc:docMk/>
+            <pc:sldMk cId="4289110639" sldId="257"/>
+            <ac:spMk id="47" creationId="{26E5001B-6DEC-3779-E01A-0A27FF325B8B}"/>
+          </ac:spMkLst>
+        </pc:spChg>
         <pc:spChg chg="add del mod">
           <ac:chgData name="Fatima Pillosu" userId="a6295d4dc9e22643" providerId="LiveId" clId="{F0B9C950-5C19-45BA-B39E-FADB59417D97}" dt="2025-06-25T15:13:51.292" v="1448" actId="21"/>
           <ac:spMkLst>
@@ -2177,6 +2545,14 @@
             <ac:spMk id="48" creationId="{16EB6FA0-CBE1-9983-F1CC-346BCA2848D4}"/>
           </ac:spMkLst>
         </pc:spChg>
+        <pc:spChg chg="add mod">
+          <ac:chgData name="Fatima Pillosu" userId="a6295d4dc9e22643" providerId="LiveId" clId="{F0B9C950-5C19-45BA-B39E-FADB59417D97}" dt="2025-06-25T16:43:01.281" v="3396" actId="1035"/>
+          <ac:spMkLst>
+            <pc:docMk/>
+            <pc:sldMk cId="4289110639" sldId="257"/>
+            <ac:spMk id="48" creationId="{9725519F-3CA2-8003-2FF8-53A9447B36EA}"/>
+          </ac:spMkLst>
+        </pc:spChg>
         <pc:spChg chg="add del mod">
           <ac:chgData name="Fatima Pillosu" userId="a6295d4dc9e22643" providerId="LiveId" clId="{F0B9C950-5C19-45BA-B39E-FADB59417D97}" dt="2025-06-25T15:13:51.292" v="1448" actId="21"/>
           <ac:spMkLst>
@@ -2185,6 +2561,14 @@
             <ac:spMk id="49" creationId="{6E0A576C-FEB4-8631-B956-C0ECE587A165}"/>
           </ac:spMkLst>
         </pc:spChg>
+        <pc:spChg chg="add mod">
+          <ac:chgData name="Fatima Pillosu" userId="a6295d4dc9e22643" providerId="LiveId" clId="{F0B9C950-5C19-45BA-B39E-FADB59417D97}" dt="2025-06-25T16:43:01.281" v="3396" actId="1035"/>
+          <ac:spMkLst>
+            <pc:docMk/>
+            <pc:sldMk cId="4289110639" sldId="257"/>
+            <ac:spMk id="49" creationId="{E8D2B8E7-039B-1A09-2DDC-C83E14EB46DF}"/>
+          </ac:spMkLst>
+        </pc:spChg>
         <pc:spChg chg="add del mod">
           <ac:chgData name="Fatima Pillosu" userId="a6295d4dc9e22643" providerId="LiveId" clId="{F0B9C950-5C19-45BA-B39E-FADB59417D97}" dt="2025-06-25T15:13:51.292" v="1448" actId="21"/>
           <ac:spMkLst>
@@ -2193,6 +2577,14 @@
             <ac:spMk id="50" creationId="{5137CFD3-310B-C4B7-5CBF-D6EBE8384DFF}"/>
           </ac:spMkLst>
         </pc:spChg>
+        <pc:spChg chg="add mod">
+          <ac:chgData name="Fatima Pillosu" userId="a6295d4dc9e22643" providerId="LiveId" clId="{F0B9C950-5C19-45BA-B39E-FADB59417D97}" dt="2025-06-25T16:43:01.281" v="3396" actId="1035"/>
+          <ac:spMkLst>
+            <pc:docMk/>
+            <pc:sldMk cId="4289110639" sldId="257"/>
+            <ac:spMk id="50" creationId="{C12365C0-1DFD-9105-1FAE-06F580451ED3}"/>
+          </ac:spMkLst>
+        </pc:spChg>
         <pc:spChg chg="add del mod">
           <ac:chgData name="Fatima Pillosu" userId="a6295d4dc9e22643" providerId="LiveId" clId="{F0B9C950-5C19-45BA-B39E-FADB59417D97}" dt="2025-06-25T15:13:51.292" v="1448" actId="21"/>
           <ac:spMkLst>
@@ -2201,6 +2593,22 @@
             <ac:spMk id="51" creationId="{3A5CD0EB-6B55-2725-6E3F-17726052CCE4}"/>
           </ac:spMkLst>
         </pc:spChg>
+        <pc:spChg chg="add mod">
+          <ac:chgData name="Fatima Pillosu" userId="a6295d4dc9e22643" providerId="LiveId" clId="{F0B9C950-5C19-45BA-B39E-FADB59417D97}" dt="2025-06-25T16:43:01.281" v="3396" actId="1035"/>
+          <ac:spMkLst>
+            <pc:docMk/>
+            <pc:sldMk cId="4289110639" sldId="257"/>
+            <ac:spMk id="51" creationId="{75EFEC79-3C2A-8CE1-D040-35A21318F4DF}"/>
+          </ac:spMkLst>
+        </pc:spChg>
+        <pc:spChg chg="add mod">
+          <ac:chgData name="Fatima Pillosu" userId="a6295d4dc9e22643" providerId="LiveId" clId="{F0B9C950-5C19-45BA-B39E-FADB59417D97}" dt="2025-06-25T16:43:01.281" v="3396" actId="1035"/>
+          <ac:spMkLst>
+            <pc:docMk/>
+            <pc:sldMk cId="4289110639" sldId="257"/>
+            <ac:spMk id="52" creationId="{2E5BBF82-039A-99DB-1291-B984EF2722D0}"/>
+          </ac:spMkLst>
+        </pc:spChg>
         <pc:spChg chg="add del mod">
           <ac:chgData name="Fatima Pillosu" userId="a6295d4dc9e22643" providerId="LiveId" clId="{F0B9C950-5C19-45BA-B39E-FADB59417D97}" dt="2025-06-25T15:13:51.292" v="1448" actId="21"/>
           <ac:spMkLst>
@@ -2215,6 +2623,14 @@
             <pc:docMk/>
             <pc:sldMk cId="4289110639" sldId="257"/>
             <ac:spMk id="53" creationId="{E90C6C9F-C26A-BA0C-97C9-D400337436C7}"/>
+          </ac:spMkLst>
+        </pc:spChg>
+        <pc:spChg chg="add mod">
+          <ac:chgData name="Fatima Pillosu" userId="a6295d4dc9e22643" providerId="LiveId" clId="{F0B9C950-5C19-45BA-B39E-FADB59417D97}" dt="2025-06-25T16:43:01.281" v="3396" actId="1035"/>
+          <ac:spMkLst>
+            <pc:docMk/>
+            <pc:sldMk cId="4289110639" sldId="257"/>
+            <ac:spMk id="53" creationId="{F1B50902-05E1-2214-2377-74DDCE112879}"/>
           </ac:spMkLst>
         </pc:spChg>
         <pc:spChg chg="add del mod">
@@ -3009,392 +3425,392 @@
             <ac:spMk id="168" creationId="{525F4261-8B02-B6DC-FEE2-729101C4AD07}"/>
           </ac:spMkLst>
         </pc:spChg>
-        <pc:spChg chg="add mod">
-          <ac:chgData name="Fatima Pillosu" userId="a6295d4dc9e22643" providerId="LiveId" clId="{F0B9C950-5C19-45BA-B39E-FADB59417D97}" dt="2025-06-25T15:39:07.187" v="1903"/>
+        <pc:spChg chg="add del mod">
+          <ac:chgData name="Fatima Pillosu" userId="a6295d4dc9e22643" providerId="LiveId" clId="{F0B9C950-5C19-45BA-B39E-FADB59417D97}" dt="2025-06-25T16:42:46.024" v="3394" actId="21"/>
           <ac:spMkLst>
             <pc:docMk/>
             <pc:sldMk cId="4289110639" sldId="257"/>
             <ac:spMk id="169" creationId="{DDAF3D54-885E-2A29-8D7C-F2C70C58F5B5}"/>
           </ac:spMkLst>
         </pc:spChg>
-        <pc:spChg chg="add mod">
-          <ac:chgData name="Fatima Pillosu" userId="a6295d4dc9e22643" providerId="LiveId" clId="{F0B9C950-5C19-45BA-B39E-FADB59417D97}" dt="2025-06-25T15:39:07.187" v="1903"/>
+        <pc:spChg chg="add del mod">
+          <ac:chgData name="Fatima Pillosu" userId="a6295d4dc9e22643" providerId="LiveId" clId="{F0B9C950-5C19-45BA-B39E-FADB59417D97}" dt="2025-06-25T16:42:46.024" v="3394" actId="21"/>
           <ac:spMkLst>
             <pc:docMk/>
             <pc:sldMk cId="4289110639" sldId="257"/>
             <ac:spMk id="179" creationId="{2CE8AC50-A4E3-9DB6-F606-EB886BE8550D}"/>
           </ac:spMkLst>
         </pc:spChg>
-        <pc:spChg chg="add mod">
-          <ac:chgData name="Fatima Pillosu" userId="a6295d4dc9e22643" providerId="LiveId" clId="{F0B9C950-5C19-45BA-B39E-FADB59417D97}" dt="2025-06-25T15:39:07.187" v="1903"/>
+        <pc:spChg chg="add del mod">
+          <ac:chgData name="Fatima Pillosu" userId="a6295d4dc9e22643" providerId="LiveId" clId="{F0B9C950-5C19-45BA-B39E-FADB59417D97}" dt="2025-06-25T15:57:57.482" v="2014" actId="478"/>
           <ac:spMkLst>
             <pc:docMk/>
             <pc:sldMk cId="4289110639" sldId="257"/>
             <ac:spMk id="180" creationId="{8BF45082-5DBA-2BDA-6B3B-1CE304EDBB0F}"/>
           </ac:spMkLst>
         </pc:spChg>
-        <pc:spChg chg="add mod">
-          <ac:chgData name="Fatima Pillosu" userId="a6295d4dc9e22643" providerId="LiveId" clId="{F0B9C950-5C19-45BA-B39E-FADB59417D97}" dt="2025-06-25T15:39:07.187" v="1903"/>
+        <pc:spChg chg="add del mod">
+          <ac:chgData name="Fatima Pillosu" userId="a6295d4dc9e22643" providerId="LiveId" clId="{F0B9C950-5C19-45BA-B39E-FADB59417D97}" dt="2025-06-25T16:42:46.024" v="3394" actId="21"/>
           <ac:spMkLst>
             <pc:docMk/>
             <pc:sldMk cId="4289110639" sldId="257"/>
             <ac:spMk id="181" creationId="{DC34E010-EA2E-EFF4-B042-AAD8E29801DE}"/>
           </ac:spMkLst>
         </pc:spChg>
-        <pc:spChg chg="add mod">
-          <ac:chgData name="Fatima Pillosu" userId="a6295d4dc9e22643" providerId="LiveId" clId="{F0B9C950-5C19-45BA-B39E-FADB59417D97}" dt="2025-06-25T15:39:07.187" v="1903"/>
+        <pc:spChg chg="add del mod">
+          <ac:chgData name="Fatima Pillosu" userId="a6295d4dc9e22643" providerId="LiveId" clId="{F0B9C950-5C19-45BA-B39E-FADB59417D97}" dt="2025-06-25T15:54:43.399" v="1904" actId="478"/>
           <ac:spMkLst>
             <pc:docMk/>
             <pc:sldMk cId="4289110639" sldId="257"/>
             <ac:spMk id="182" creationId="{E596FB15-C5C4-A883-D8B1-8941F744109D}"/>
           </ac:spMkLst>
         </pc:spChg>
-        <pc:spChg chg="add mod">
-          <ac:chgData name="Fatima Pillosu" userId="a6295d4dc9e22643" providerId="LiveId" clId="{F0B9C950-5C19-45BA-B39E-FADB59417D97}" dt="2025-06-25T15:39:07.187" v="1903"/>
+        <pc:spChg chg="add del mod">
+          <ac:chgData name="Fatima Pillosu" userId="a6295d4dc9e22643" providerId="LiveId" clId="{F0B9C950-5C19-45BA-B39E-FADB59417D97}" dt="2025-06-25T15:54:43.399" v="1904" actId="478"/>
           <ac:spMkLst>
             <pc:docMk/>
             <pc:sldMk cId="4289110639" sldId="257"/>
             <ac:spMk id="183" creationId="{942EDCB3-530B-AEEA-AFDB-D0EC689D20F0}"/>
           </ac:spMkLst>
         </pc:spChg>
-        <pc:spChg chg="add mod">
-          <ac:chgData name="Fatima Pillosu" userId="a6295d4dc9e22643" providerId="LiveId" clId="{F0B9C950-5C19-45BA-B39E-FADB59417D97}" dt="2025-06-25T15:39:07.187" v="1903"/>
+        <pc:spChg chg="add del mod">
+          <ac:chgData name="Fatima Pillosu" userId="a6295d4dc9e22643" providerId="LiveId" clId="{F0B9C950-5C19-45BA-B39E-FADB59417D97}" dt="2025-06-25T15:54:43.399" v="1904" actId="478"/>
           <ac:spMkLst>
             <pc:docMk/>
             <pc:sldMk cId="4289110639" sldId="257"/>
             <ac:spMk id="184" creationId="{09AA91AB-0F00-9123-C1B1-2024DAA6ECFC}"/>
           </ac:spMkLst>
         </pc:spChg>
-        <pc:spChg chg="add mod">
-          <ac:chgData name="Fatima Pillosu" userId="a6295d4dc9e22643" providerId="LiveId" clId="{F0B9C950-5C19-45BA-B39E-FADB59417D97}" dt="2025-06-25T15:39:07.187" v="1903"/>
+        <pc:spChg chg="add del mod">
+          <ac:chgData name="Fatima Pillosu" userId="a6295d4dc9e22643" providerId="LiveId" clId="{F0B9C950-5C19-45BA-B39E-FADB59417D97}" dt="2025-06-25T15:55:09.984" v="1925" actId="478"/>
           <ac:spMkLst>
             <pc:docMk/>
             <pc:sldMk cId="4289110639" sldId="257"/>
             <ac:spMk id="185" creationId="{BD607AC0-72FD-2A38-E500-5793D9FCFE8C}"/>
           </ac:spMkLst>
         </pc:spChg>
-        <pc:spChg chg="add mod">
-          <ac:chgData name="Fatima Pillosu" userId="a6295d4dc9e22643" providerId="LiveId" clId="{F0B9C950-5C19-45BA-B39E-FADB59417D97}" dt="2025-06-25T15:39:07.187" v="1903"/>
+        <pc:spChg chg="add del mod">
+          <ac:chgData name="Fatima Pillosu" userId="a6295d4dc9e22643" providerId="LiveId" clId="{F0B9C950-5C19-45BA-B39E-FADB59417D97}" dt="2025-06-25T16:42:46.024" v="3394" actId="21"/>
           <ac:spMkLst>
             <pc:docMk/>
             <pc:sldMk cId="4289110639" sldId="257"/>
             <ac:spMk id="186" creationId="{A443D769-35EA-ACBB-55BC-2A7FE9B1D174}"/>
           </ac:spMkLst>
         </pc:spChg>
-        <pc:spChg chg="add mod">
-          <ac:chgData name="Fatima Pillosu" userId="a6295d4dc9e22643" providerId="LiveId" clId="{F0B9C950-5C19-45BA-B39E-FADB59417D97}" dt="2025-06-25T15:39:07.187" v="1903"/>
+        <pc:spChg chg="add del mod">
+          <ac:chgData name="Fatima Pillosu" userId="a6295d4dc9e22643" providerId="LiveId" clId="{F0B9C950-5C19-45BA-B39E-FADB59417D97}" dt="2025-06-25T15:54:43.399" v="1904" actId="478"/>
           <ac:spMkLst>
             <pc:docMk/>
             <pc:sldMk cId="4289110639" sldId="257"/>
             <ac:spMk id="187" creationId="{ADA3DE8D-1806-5542-AE87-86B40C29C4B6}"/>
           </ac:spMkLst>
         </pc:spChg>
-        <pc:spChg chg="add mod">
-          <ac:chgData name="Fatima Pillosu" userId="a6295d4dc9e22643" providerId="LiveId" clId="{F0B9C950-5C19-45BA-B39E-FADB59417D97}" dt="2025-06-25T15:39:07.187" v="1903"/>
+        <pc:spChg chg="add del mod">
+          <ac:chgData name="Fatima Pillosu" userId="a6295d4dc9e22643" providerId="LiveId" clId="{F0B9C950-5C19-45BA-B39E-FADB59417D97}" dt="2025-06-25T15:54:43.399" v="1904" actId="478"/>
           <ac:spMkLst>
             <pc:docMk/>
             <pc:sldMk cId="4289110639" sldId="257"/>
             <ac:spMk id="188" creationId="{1E801C4A-0276-1937-0649-23B933A9FD4C}"/>
           </ac:spMkLst>
         </pc:spChg>
-        <pc:spChg chg="add mod">
-          <ac:chgData name="Fatima Pillosu" userId="a6295d4dc9e22643" providerId="LiveId" clId="{F0B9C950-5C19-45BA-B39E-FADB59417D97}" dt="2025-06-25T15:39:07.187" v="1903"/>
+        <pc:spChg chg="add del mod">
+          <ac:chgData name="Fatima Pillosu" userId="a6295d4dc9e22643" providerId="LiveId" clId="{F0B9C950-5C19-45BA-B39E-FADB59417D97}" dt="2025-06-25T16:42:46.024" v="3394" actId="21"/>
           <ac:spMkLst>
             <pc:docMk/>
             <pc:sldMk cId="4289110639" sldId="257"/>
             <ac:spMk id="189" creationId="{6541EEEE-3369-14C3-9119-24FBFEC538F6}"/>
           </ac:spMkLst>
         </pc:spChg>
-        <pc:spChg chg="add mod">
-          <ac:chgData name="Fatima Pillosu" userId="a6295d4dc9e22643" providerId="LiveId" clId="{F0B9C950-5C19-45BA-B39E-FADB59417D97}" dt="2025-06-25T15:39:07.187" v="1903"/>
+        <pc:spChg chg="add del mod">
+          <ac:chgData name="Fatima Pillosu" userId="a6295d4dc9e22643" providerId="LiveId" clId="{F0B9C950-5C19-45BA-B39E-FADB59417D97}" dt="2025-06-25T16:42:46.024" v="3394" actId="21"/>
           <ac:spMkLst>
             <pc:docMk/>
             <pc:sldMk cId="4289110639" sldId="257"/>
             <ac:spMk id="190" creationId="{A668C935-54EA-6F8F-0BB1-E7014CC096D7}"/>
           </ac:spMkLst>
         </pc:spChg>
-        <pc:spChg chg="add mod">
-          <ac:chgData name="Fatima Pillosu" userId="a6295d4dc9e22643" providerId="LiveId" clId="{F0B9C950-5C19-45BA-B39E-FADB59417D97}" dt="2025-06-25T15:39:07.187" v="1903"/>
+        <pc:spChg chg="add del mod">
+          <ac:chgData name="Fatima Pillosu" userId="a6295d4dc9e22643" providerId="LiveId" clId="{F0B9C950-5C19-45BA-B39E-FADB59417D97}" dt="2025-06-25T15:54:43.399" v="1904" actId="478"/>
           <ac:spMkLst>
             <pc:docMk/>
             <pc:sldMk cId="4289110639" sldId="257"/>
             <ac:spMk id="191" creationId="{7E97B7E9-5251-BE9A-AE14-9D7F6768E5D3}"/>
           </ac:spMkLst>
         </pc:spChg>
-        <pc:spChg chg="add mod">
-          <ac:chgData name="Fatima Pillosu" userId="a6295d4dc9e22643" providerId="LiveId" clId="{F0B9C950-5C19-45BA-B39E-FADB59417D97}" dt="2025-06-25T15:39:07.187" v="1903"/>
+        <pc:spChg chg="add del mod">
+          <ac:chgData name="Fatima Pillosu" userId="a6295d4dc9e22643" providerId="LiveId" clId="{F0B9C950-5C19-45BA-B39E-FADB59417D97}" dt="2025-06-25T16:42:46.024" v="3394" actId="21"/>
           <ac:spMkLst>
             <pc:docMk/>
             <pc:sldMk cId="4289110639" sldId="257"/>
             <ac:spMk id="192" creationId="{DEEE2271-5967-5ABD-F72A-2D4C2F26C2AA}"/>
           </ac:spMkLst>
         </pc:spChg>
-        <pc:spChg chg="add mod">
-          <ac:chgData name="Fatima Pillosu" userId="a6295d4dc9e22643" providerId="LiveId" clId="{F0B9C950-5C19-45BA-B39E-FADB59417D97}" dt="2025-06-25T15:39:07.187" v="1903"/>
+        <pc:spChg chg="add del mod">
+          <ac:chgData name="Fatima Pillosu" userId="a6295d4dc9e22643" providerId="LiveId" clId="{F0B9C950-5C19-45BA-B39E-FADB59417D97}" dt="2025-06-25T15:54:43.399" v="1904" actId="478"/>
           <ac:spMkLst>
             <pc:docMk/>
             <pc:sldMk cId="4289110639" sldId="257"/>
             <ac:spMk id="193" creationId="{3686655B-80AB-878D-8415-307EA53EFB5C}"/>
           </ac:spMkLst>
         </pc:spChg>
-        <pc:spChg chg="add mod">
-          <ac:chgData name="Fatima Pillosu" userId="a6295d4dc9e22643" providerId="LiveId" clId="{F0B9C950-5C19-45BA-B39E-FADB59417D97}" dt="2025-06-25T15:39:07.187" v="1903"/>
+        <pc:spChg chg="add del mod">
+          <ac:chgData name="Fatima Pillosu" userId="a6295d4dc9e22643" providerId="LiveId" clId="{F0B9C950-5C19-45BA-B39E-FADB59417D97}" dt="2025-06-25T15:55:11.299" v="1926" actId="478"/>
           <ac:spMkLst>
             <pc:docMk/>
             <pc:sldMk cId="4289110639" sldId="257"/>
             <ac:spMk id="194" creationId="{A0097D71-B402-A483-CFFA-F86F3C56053E}"/>
           </ac:spMkLst>
         </pc:spChg>
-        <pc:spChg chg="add mod">
-          <ac:chgData name="Fatima Pillosu" userId="a6295d4dc9e22643" providerId="LiveId" clId="{F0B9C950-5C19-45BA-B39E-FADB59417D97}" dt="2025-06-25T15:39:07.187" v="1903"/>
+        <pc:spChg chg="add del mod">
+          <ac:chgData name="Fatima Pillosu" userId="a6295d4dc9e22643" providerId="LiveId" clId="{F0B9C950-5C19-45BA-B39E-FADB59417D97}" dt="2025-06-25T15:54:43.399" v="1904" actId="478"/>
           <ac:spMkLst>
             <pc:docMk/>
             <pc:sldMk cId="4289110639" sldId="257"/>
             <ac:spMk id="195" creationId="{AC12668F-DD4B-D648-D773-7F3063B04CBF}"/>
           </ac:spMkLst>
         </pc:spChg>
-        <pc:spChg chg="add mod">
-          <ac:chgData name="Fatima Pillosu" userId="a6295d4dc9e22643" providerId="LiveId" clId="{F0B9C950-5C19-45BA-B39E-FADB59417D97}" dt="2025-06-25T15:39:07.187" v="1903"/>
+        <pc:spChg chg="add del mod">
+          <ac:chgData name="Fatima Pillosu" userId="a6295d4dc9e22643" providerId="LiveId" clId="{F0B9C950-5C19-45BA-B39E-FADB59417D97}" dt="2025-06-25T15:54:43.399" v="1904" actId="478"/>
           <ac:spMkLst>
             <pc:docMk/>
             <pc:sldMk cId="4289110639" sldId="257"/>
             <ac:spMk id="196" creationId="{77F6A371-1CCF-3C24-C1E6-C283E45C2C4D}"/>
           </ac:spMkLst>
         </pc:spChg>
-        <pc:spChg chg="add mod">
-          <ac:chgData name="Fatima Pillosu" userId="a6295d4dc9e22643" providerId="LiveId" clId="{F0B9C950-5C19-45BA-B39E-FADB59417D97}" dt="2025-06-25T15:39:07.187" v="1903"/>
+        <pc:spChg chg="add del mod">
+          <ac:chgData name="Fatima Pillosu" userId="a6295d4dc9e22643" providerId="LiveId" clId="{F0B9C950-5C19-45BA-B39E-FADB59417D97}" dt="2025-06-25T16:42:46.024" v="3394" actId="21"/>
           <ac:spMkLst>
             <pc:docMk/>
             <pc:sldMk cId="4289110639" sldId="257"/>
             <ac:spMk id="200" creationId="{BE24FD28-FAFB-884F-4CE7-E4FD5429F6E3}"/>
           </ac:spMkLst>
         </pc:spChg>
-        <pc:spChg chg="add mod">
-          <ac:chgData name="Fatima Pillosu" userId="a6295d4dc9e22643" providerId="LiveId" clId="{F0B9C950-5C19-45BA-B39E-FADB59417D97}" dt="2025-06-25T15:39:07.187" v="1903"/>
+        <pc:spChg chg="add del mod">
+          <ac:chgData name="Fatima Pillosu" userId="a6295d4dc9e22643" providerId="LiveId" clId="{F0B9C950-5C19-45BA-B39E-FADB59417D97}" dt="2025-06-25T16:42:46.024" v="3394" actId="21"/>
           <ac:spMkLst>
             <pc:docMk/>
             <pc:sldMk cId="4289110639" sldId="257"/>
             <ac:spMk id="201" creationId="{16EB6FA0-CBE1-9983-F1CC-346BCA2848D4}"/>
           </ac:spMkLst>
         </pc:spChg>
-        <pc:spChg chg="add mod">
-          <ac:chgData name="Fatima Pillosu" userId="a6295d4dc9e22643" providerId="LiveId" clId="{F0B9C950-5C19-45BA-B39E-FADB59417D97}" dt="2025-06-25T15:39:07.187" v="1903"/>
+        <pc:spChg chg="add del mod">
+          <ac:chgData name="Fatima Pillosu" userId="a6295d4dc9e22643" providerId="LiveId" clId="{F0B9C950-5C19-45BA-B39E-FADB59417D97}" dt="2025-06-25T16:42:46.024" v="3394" actId="21"/>
           <ac:spMkLst>
             <pc:docMk/>
             <pc:sldMk cId="4289110639" sldId="257"/>
             <ac:spMk id="202" creationId="{5137CFD3-310B-C4B7-5CBF-D6EBE8384DFF}"/>
           </ac:spMkLst>
         </pc:spChg>
-        <pc:spChg chg="add mod">
-          <ac:chgData name="Fatima Pillosu" userId="a6295d4dc9e22643" providerId="LiveId" clId="{F0B9C950-5C19-45BA-B39E-FADB59417D97}" dt="2025-06-25T15:39:07.187" v="1903"/>
+        <pc:spChg chg="add del mod">
+          <ac:chgData name="Fatima Pillosu" userId="a6295d4dc9e22643" providerId="LiveId" clId="{F0B9C950-5C19-45BA-B39E-FADB59417D97}" dt="2025-06-25T16:42:46.024" v="3394" actId="21"/>
           <ac:spMkLst>
             <pc:docMk/>
             <pc:sldMk cId="4289110639" sldId="257"/>
             <ac:spMk id="203" creationId="{9097776E-A046-4D6E-89DA-50B1F5A3FAF4}"/>
           </ac:spMkLst>
         </pc:spChg>
-        <pc:spChg chg="add mod">
-          <ac:chgData name="Fatima Pillosu" userId="a6295d4dc9e22643" providerId="LiveId" clId="{F0B9C950-5C19-45BA-B39E-FADB59417D97}" dt="2025-06-25T15:39:07.187" v="1903"/>
+        <pc:spChg chg="add del mod">
+          <ac:chgData name="Fatima Pillosu" userId="a6295d4dc9e22643" providerId="LiveId" clId="{F0B9C950-5C19-45BA-B39E-FADB59417D97}" dt="2025-06-25T16:42:46.024" v="3394" actId="21"/>
           <ac:spMkLst>
             <pc:docMk/>
             <pc:sldMk cId="4289110639" sldId="257"/>
             <ac:spMk id="204" creationId="{1402EF05-0A8D-81FE-F96A-820C0CB99803}"/>
           </ac:spMkLst>
         </pc:spChg>
-        <pc:spChg chg="add mod">
-          <ac:chgData name="Fatima Pillosu" userId="a6295d4dc9e22643" providerId="LiveId" clId="{F0B9C950-5C19-45BA-B39E-FADB59417D97}" dt="2025-06-25T15:39:07.187" v="1903"/>
+        <pc:spChg chg="add del mod">
+          <ac:chgData name="Fatima Pillosu" userId="a6295d4dc9e22643" providerId="LiveId" clId="{F0B9C950-5C19-45BA-B39E-FADB59417D97}" dt="2025-06-25T16:42:46.024" v="3394" actId="21"/>
           <ac:spMkLst>
             <pc:docMk/>
             <pc:sldMk cId="4289110639" sldId="257"/>
             <ac:spMk id="205" creationId="{4CDF8D29-A1A4-B6EF-CC2D-02154951F423}"/>
           </ac:spMkLst>
         </pc:spChg>
-        <pc:spChg chg="add mod">
-          <ac:chgData name="Fatima Pillosu" userId="a6295d4dc9e22643" providerId="LiveId" clId="{F0B9C950-5C19-45BA-B39E-FADB59417D97}" dt="2025-06-25T15:39:07.187" v="1903"/>
+        <pc:spChg chg="add del mod">
+          <ac:chgData name="Fatima Pillosu" userId="a6295d4dc9e22643" providerId="LiveId" clId="{F0B9C950-5C19-45BA-B39E-FADB59417D97}" dt="2025-06-25T16:42:46.024" v="3394" actId="21"/>
           <ac:spMkLst>
             <pc:docMk/>
             <pc:sldMk cId="4289110639" sldId="257"/>
             <ac:spMk id="206" creationId="{C5F22480-43D2-EC6C-C595-536DDF09AC46}"/>
           </ac:spMkLst>
         </pc:spChg>
-        <pc:spChg chg="add mod">
-          <ac:chgData name="Fatima Pillosu" userId="a6295d4dc9e22643" providerId="LiveId" clId="{F0B9C950-5C19-45BA-B39E-FADB59417D97}" dt="2025-06-25T15:39:07.187" v="1903"/>
+        <pc:spChg chg="add del mod">
+          <ac:chgData name="Fatima Pillosu" userId="a6295d4dc9e22643" providerId="LiveId" clId="{F0B9C950-5C19-45BA-B39E-FADB59417D97}" dt="2025-06-25T16:42:46.024" v="3394" actId="21"/>
           <ac:spMkLst>
             <pc:docMk/>
             <pc:sldMk cId="4289110639" sldId="257"/>
             <ac:spMk id="207" creationId="{65CF77BB-AB79-BDF7-1AD9-C8ABDB188BCE}"/>
           </ac:spMkLst>
         </pc:spChg>
-        <pc:spChg chg="add mod">
-          <ac:chgData name="Fatima Pillosu" userId="a6295d4dc9e22643" providerId="LiveId" clId="{F0B9C950-5C19-45BA-B39E-FADB59417D97}" dt="2025-06-25T15:39:07.187" v="1903"/>
+        <pc:spChg chg="add del mod">
+          <ac:chgData name="Fatima Pillosu" userId="a6295d4dc9e22643" providerId="LiveId" clId="{F0B9C950-5C19-45BA-B39E-FADB59417D97}" dt="2025-06-25T16:42:46.024" v="3394" actId="21"/>
           <ac:spMkLst>
             <pc:docMk/>
             <pc:sldMk cId="4289110639" sldId="257"/>
             <ac:spMk id="208" creationId="{CE0D8E67-F738-7066-FAAB-7F1C9C0D3446}"/>
           </ac:spMkLst>
         </pc:spChg>
-        <pc:spChg chg="add mod">
-          <ac:chgData name="Fatima Pillosu" userId="a6295d4dc9e22643" providerId="LiveId" clId="{F0B9C950-5C19-45BA-B39E-FADB59417D97}" dt="2025-06-25T15:39:07.187" v="1903"/>
+        <pc:spChg chg="add del mod">
+          <ac:chgData name="Fatima Pillosu" userId="a6295d4dc9e22643" providerId="LiveId" clId="{F0B9C950-5C19-45BA-B39E-FADB59417D97}" dt="2025-06-25T16:42:46.024" v="3394" actId="21"/>
           <ac:spMkLst>
             <pc:docMk/>
             <pc:sldMk cId="4289110639" sldId="257"/>
             <ac:spMk id="209" creationId="{716E92A3-A5CC-93CB-1E03-1C50F1F6DD03}"/>
           </ac:spMkLst>
         </pc:spChg>
-        <pc:spChg chg="add mod">
-          <ac:chgData name="Fatima Pillosu" userId="a6295d4dc9e22643" providerId="LiveId" clId="{F0B9C950-5C19-45BA-B39E-FADB59417D97}" dt="2025-06-25T15:39:07.187" v="1903"/>
+        <pc:spChg chg="add del mod">
+          <ac:chgData name="Fatima Pillosu" userId="a6295d4dc9e22643" providerId="LiveId" clId="{F0B9C950-5C19-45BA-B39E-FADB59417D97}" dt="2025-06-25T16:42:46.024" v="3394" actId="21"/>
           <ac:spMkLst>
             <pc:docMk/>
             <pc:sldMk cId="4289110639" sldId="257"/>
             <ac:spMk id="210" creationId="{C0C067FC-01D1-B083-6206-56A46662729A}"/>
           </ac:spMkLst>
         </pc:spChg>
-        <pc:spChg chg="add mod">
-          <ac:chgData name="Fatima Pillosu" userId="a6295d4dc9e22643" providerId="LiveId" clId="{F0B9C950-5C19-45BA-B39E-FADB59417D97}" dt="2025-06-25T15:39:07.187" v="1903"/>
+        <pc:spChg chg="add del mod">
+          <ac:chgData name="Fatima Pillosu" userId="a6295d4dc9e22643" providerId="LiveId" clId="{F0B9C950-5C19-45BA-B39E-FADB59417D97}" dt="2025-06-25T16:35:07.291" v="3251" actId="478"/>
           <ac:spMkLst>
             <pc:docMk/>
             <pc:sldMk cId="4289110639" sldId="257"/>
             <ac:spMk id="211" creationId="{2D7F4AD5-25B7-BAEA-8569-DB83FEE43849}"/>
           </ac:spMkLst>
         </pc:spChg>
-        <pc:spChg chg="add mod">
-          <ac:chgData name="Fatima Pillosu" userId="a6295d4dc9e22643" providerId="LiveId" clId="{F0B9C950-5C19-45BA-B39E-FADB59417D97}" dt="2025-06-25T15:39:07.187" v="1903"/>
+        <pc:spChg chg="add del mod">
+          <ac:chgData name="Fatima Pillosu" userId="a6295d4dc9e22643" providerId="LiveId" clId="{F0B9C950-5C19-45BA-B39E-FADB59417D97}" dt="2025-06-25T16:41:32.468" v="3383" actId="478"/>
           <ac:spMkLst>
             <pc:docMk/>
             <pc:sldMk cId="4289110639" sldId="257"/>
             <ac:spMk id="212" creationId="{3B6A9FC9-F3C1-5895-CA5F-B15DBB77577A}"/>
           </ac:spMkLst>
         </pc:spChg>
-        <pc:spChg chg="add mod">
-          <ac:chgData name="Fatima Pillosu" userId="a6295d4dc9e22643" providerId="LiveId" clId="{F0B9C950-5C19-45BA-B39E-FADB59417D97}" dt="2025-06-25T15:39:07.187" v="1903"/>
+        <pc:spChg chg="add del mod">
+          <ac:chgData name="Fatima Pillosu" userId="a6295d4dc9e22643" providerId="LiveId" clId="{F0B9C950-5C19-45BA-B39E-FADB59417D97}" dt="2025-06-25T16:41:32.468" v="3383" actId="478"/>
           <ac:spMkLst>
             <pc:docMk/>
             <pc:sldMk cId="4289110639" sldId="257"/>
             <ac:spMk id="213" creationId="{25CF1250-8412-5C11-F69E-0FAB83004366}"/>
           </ac:spMkLst>
         </pc:spChg>
-        <pc:spChg chg="add mod">
-          <ac:chgData name="Fatima Pillosu" userId="a6295d4dc9e22643" providerId="LiveId" clId="{F0B9C950-5C19-45BA-B39E-FADB59417D97}" dt="2025-06-25T15:39:07.187" v="1903"/>
+        <pc:spChg chg="add del mod">
+          <ac:chgData name="Fatima Pillosu" userId="a6295d4dc9e22643" providerId="LiveId" clId="{F0B9C950-5C19-45BA-B39E-FADB59417D97}" dt="2025-06-25T16:42:46.024" v="3394" actId="21"/>
           <ac:spMkLst>
             <pc:docMk/>
             <pc:sldMk cId="4289110639" sldId="257"/>
             <ac:spMk id="214" creationId="{649A66B3-B899-4304-E071-230DD34AFBC3}"/>
           </ac:spMkLst>
         </pc:spChg>
-        <pc:spChg chg="add mod">
-          <ac:chgData name="Fatima Pillosu" userId="a6295d4dc9e22643" providerId="LiveId" clId="{F0B9C950-5C19-45BA-B39E-FADB59417D97}" dt="2025-06-25T15:39:07.187" v="1903"/>
+        <pc:spChg chg="add del mod">
+          <ac:chgData name="Fatima Pillosu" userId="a6295d4dc9e22643" providerId="LiveId" clId="{F0B9C950-5C19-45BA-B39E-FADB59417D97}" dt="2025-06-25T16:42:46.024" v="3394" actId="21"/>
           <ac:spMkLst>
             <pc:docMk/>
             <pc:sldMk cId="4289110639" sldId="257"/>
             <ac:spMk id="215" creationId="{0949695F-9A1D-9DE9-6A11-1A7363D5D06D}"/>
           </ac:spMkLst>
         </pc:spChg>
-        <pc:spChg chg="add mod">
-          <ac:chgData name="Fatima Pillosu" userId="a6295d4dc9e22643" providerId="LiveId" clId="{F0B9C950-5C19-45BA-B39E-FADB59417D97}" dt="2025-06-25T15:39:07.187" v="1903"/>
+        <pc:spChg chg="add del mod">
+          <ac:chgData name="Fatima Pillosu" userId="a6295d4dc9e22643" providerId="LiveId" clId="{F0B9C950-5C19-45BA-B39E-FADB59417D97}" dt="2025-06-25T16:42:46.024" v="3394" actId="21"/>
           <ac:spMkLst>
             <pc:docMk/>
             <pc:sldMk cId="4289110639" sldId="257"/>
             <ac:spMk id="216" creationId="{26499A74-7ADD-8575-125F-3A9F7DAB54FD}"/>
           </ac:spMkLst>
         </pc:spChg>
-        <pc:spChg chg="add mod">
-          <ac:chgData name="Fatima Pillosu" userId="a6295d4dc9e22643" providerId="LiveId" clId="{F0B9C950-5C19-45BA-B39E-FADB59417D97}" dt="2025-06-25T15:39:07.187" v="1903"/>
+        <pc:spChg chg="add del mod">
+          <ac:chgData name="Fatima Pillosu" userId="a6295d4dc9e22643" providerId="LiveId" clId="{F0B9C950-5C19-45BA-B39E-FADB59417D97}" dt="2025-06-25T16:42:46.024" v="3394" actId="21"/>
           <ac:spMkLst>
             <pc:docMk/>
             <pc:sldMk cId="4289110639" sldId="257"/>
             <ac:spMk id="217" creationId="{87998562-8C2F-313F-516D-39037195BB26}"/>
           </ac:spMkLst>
         </pc:spChg>
-        <pc:spChg chg="add mod">
-          <ac:chgData name="Fatima Pillosu" userId="a6295d4dc9e22643" providerId="LiveId" clId="{F0B9C950-5C19-45BA-B39E-FADB59417D97}" dt="2025-06-25T15:39:07.187" v="1903"/>
+        <pc:spChg chg="add del mod">
+          <ac:chgData name="Fatima Pillosu" userId="a6295d4dc9e22643" providerId="LiveId" clId="{F0B9C950-5C19-45BA-B39E-FADB59417D97}" dt="2025-06-25T16:41:32.468" v="3383" actId="478"/>
           <ac:spMkLst>
             <pc:docMk/>
             <pc:sldMk cId="4289110639" sldId="257"/>
             <ac:spMk id="218" creationId="{F9DCB9E7-9969-30B1-1527-F3C1B48C49B7}"/>
           </ac:spMkLst>
         </pc:spChg>
-        <pc:spChg chg="add mod">
-          <ac:chgData name="Fatima Pillosu" userId="a6295d4dc9e22643" providerId="LiveId" clId="{F0B9C950-5C19-45BA-B39E-FADB59417D97}" dt="2025-06-25T15:39:07.187" v="1903"/>
+        <pc:spChg chg="add del mod">
+          <ac:chgData name="Fatima Pillosu" userId="a6295d4dc9e22643" providerId="LiveId" clId="{F0B9C950-5C19-45BA-B39E-FADB59417D97}" dt="2025-06-25T16:41:32.468" v="3383" actId="478"/>
           <ac:spMkLst>
             <pc:docMk/>
             <pc:sldMk cId="4289110639" sldId="257"/>
             <ac:spMk id="219" creationId="{4F274C89-4394-9AD6-7151-D15B4347E65E}"/>
           </ac:spMkLst>
         </pc:spChg>
-        <pc:spChg chg="add mod">
-          <ac:chgData name="Fatima Pillosu" userId="a6295d4dc9e22643" providerId="LiveId" clId="{F0B9C950-5C19-45BA-B39E-FADB59417D97}" dt="2025-06-25T15:39:07.187" v="1903"/>
+        <pc:spChg chg="add del mod">
+          <ac:chgData name="Fatima Pillosu" userId="a6295d4dc9e22643" providerId="LiveId" clId="{F0B9C950-5C19-45BA-B39E-FADB59417D97}" dt="2025-06-25T16:41:32.468" v="3383" actId="478"/>
           <ac:spMkLst>
             <pc:docMk/>
             <pc:sldMk cId="4289110639" sldId="257"/>
             <ac:spMk id="220" creationId="{772E2B6A-3C18-0834-C5C4-DEC2F51BF4EB}"/>
           </ac:spMkLst>
         </pc:spChg>
-        <pc:spChg chg="add mod">
-          <ac:chgData name="Fatima Pillosu" userId="a6295d4dc9e22643" providerId="LiveId" clId="{F0B9C950-5C19-45BA-B39E-FADB59417D97}" dt="2025-06-25T15:39:07.187" v="1903"/>
+        <pc:spChg chg="add del mod">
+          <ac:chgData name="Fatima Pillosu" userId="a6295d4dc9e22643" providerId="LiveId" clId="{F0B9C950-5C19-45BA-B39E-FADB59417D97}" dt="2025-06-25T16:42:46.024" v="3394" actId="21"/>
           <ac:spMkLst>
             <pc:docMk/>
             <pc:sldMk cId="4289110639" sldId="257"/>
             <ac:spMk id="221" creationId="{80D3517E-1814-BABC-8B8F-AB5B211A3AA1}"/>
           </ac:spMkLst>
         </pc:spChg>
-        <pc:spChg chg="add mod">
-          <ac:chgData name="Fatima Pillosu" userId="a6295d4dc9e22643" providerId="LiveId" clId="{F0B9C950-5C19-45BA-B39E-FADB59417D97}" dt="2025-06-25T15:39:07.187" v="1903"/>
+        <pc:spChg chg="add del mod">
+          <ac:chgData name="Fatima Pillosu" userId="a6295d4dc9e22643" providerId="LiveId" clId="{F0B9C950-5C19-45BA-B39E-FADB59417D97}" dt="2025-06-25T16:42:46.024" v="3394" actId="21"/>
           <ac:spMkLst>
             <pc:docMk/>
             <pc:sldMk cId="4289110639" sldId="257"/>
             <ac:spMk id="222" creationId="{A6BE4838-1365-D3B7-CEDE-D7E2E62B7F31}"/>
           </ac:spMkLst>
         </pc:spChg>
-        <pc:spChg chg="add mod">
-          <ac:chgData name="Fatima Pillosu" userId="a6295d4dc9e22643" providerId="LiveId" clId="{F0B9C950-5C19-45BA-B39E-FADB59417D97}" dt="2025-06-25T15:39:07.187" v="1903"/>
+        <pc:spChg chg="add del mod">
+          <ac:chgData name="Fatima Pillosu" userId="a6295d4dc9e22643" providerId="LiveId" clId="{F0B9C950-5C19-45BA-B39E-FADB59417D97}" dt="2025-06-25T16:42:46.024" v="3394" actId="21"/>
           <ac:spMkLst>
             <pc:docMk/>
             <pc:sldMk cId="4289110639" sldId="257"/>
             <ac:spMk id="223" creationId="{8735F6D1-5555-E7D6-D0BB-A64923855C01}"/>
           </ac:spMkLst>
         </pc:spChg>
-        <pc:spChg chg="add mod">
-          <ac:chgData name="Fatima Pillosu" userId="a6295d4dc9e22643" providerId="LiveId" clId="{F0B9C950-5C19-45BA-B39E-FADB59417D97}" dt="2025-06-25T15:39:07.187" v="1903"/>
+        <pc:spChg chg="add del mod">
+          <ac:chgData name="Fatima Pillosu" userId="a6295d4dc9e22643" providerId="LiveId" clId="{F0B9C950-5C19-45BA-B39E-FADB59417D97}" dt="2025-06-25T16:42:46.024" v="3394" actId="21"/>
           <ac:spMkLst>
             <pc:docMk/>
             <pc:sldMk cId="4289110639" sldId="257"/>
             <ac:spMk id="224" creationId="{2B972E94-DE4C-66D0-A6A3-F1E9C69D6169}"/>
           </ac:spMkLst>
         </pc:spChg>
-        <pc:spChg chg="add mod">
-          <ac:chgData name="Fatima Pillosu" userId="a6295d4dc9e22643" providerId="LiveId" clId="{F0B9C950-5C19-45BA-B39E-FADB59417D97}" dt="2025-06-25T15:39:07.187" v="1903"/>
+        <pc:spChg chg="add del mod">
+          <ac:chgData name="Fatima Pillosu" userId="a6295d4dc9e22643" providerId="LiveId" clId="{F0B9C950-5C19-45BA-B39E-FADB59417D97}" dt="2025-06-25T16:42:46.024" v="3394" actId="21"/>
           <ac:spMkLst>
             <pc:docMk/>
             <pc:sldMk cId="4289110639" sldId="257"/>
             <ac:spMk id="225" creationId="{0F40EDD3-6828-DA92-C5B8-A892A73FD4CE}"/>
           </ac:spMkLst>
         </pc:spChg>
-        <pc:spChg chg="add mod">
-          <ac:chgData name="Fatima Pillosu" userId="a6295d4dc9e22643" providerId="LiveId" clId="{F0B9C950-5C19-45BA-B39E-FADB59417D97}" dt="2025-06-25T15:39:07.187" v="1903"/>
+        <pc:spChg chg="add del mod">
+          <ac:chgData name="Fatima Pillosu" userId="a6295d4dc9e22643" providerId="LiveId" clId="{F0B9C950-5C19-45BA-B39E-FADB59417D97}" dt="2025-06-25T16:42:46.024" v="3394" actId="21"/>
           <ac:spMkLst>
             <pc:docMk/>
             <pc:sldMk cId="4289110639" sldId="257"/>
             <ac:spMk id="226" creationId="{4BC09263-C830-303A-BB0C-2207AFEFF22B}"/>
           </ac:spMkLst>
         </pc:spChg>
-        <pc:spChg chg="add mod">
-          <ac:chgData name="Fatima Pillosu" userId="a6295d4dc9e22643" providerId="LiveId" clId="{F0B9C950-5C19-45BA-B39E-FADB59417D97}" dt="2025-06-25T15:39:07.187" v="1903"/>
+        <pc:spChg chg="add del mod">
+          <ac:chgData name="Fatima Pillosu" userId="a6295d4dc9e22643" providerId="LiveId" clId="{F0B9C950-5C19-45BA-B39E-FADB59417D97}" dt="2025-06-25T16:42:46.024" v="3394" actId="21"/>
           <ac:spMkLst>
             <pc:docMk/>
             <pc:sldMk cId="4289110639" sldId="257"/>
             <ac:spMk id="227" creationId="{8BFC4AA3-C582-B088-949F-3006D7236AAA}"/>
           </ac:spMkLst>
         </pc:spChg>
-        <pc:spChg chg="add mod">
-          <ac:chgData name="Fatima Pillosu" userId="a6295d4dc9e22643" providerId="LiveId" clId="{F0B9C950-5C19-45BA-B39E-FADB59417D97}" dt="2025-06-25T15:39:07.187" v="1903"/>
+        <pc:spChg chg="add del mod">
+          <ac:chgData name="Fatima Pillosu" userId="a6295d4dc9e22643" providerId="LiveId" clId="{F0B9C950-5C19-45BA-B39E-FADB59417D97}" dt="2025-06-25T16:42:46.024" v="3394" actId="21"/>
           <ac:spMkLst>
             <pc:docMk/>
             <pc:sldMk cId="4289110639" sldId="257"/>
             <ac:spMk id="228" creationId="{17A4B2C5-47D5-3495-68D8-2CB424DC7257}"/>
           </ac:spMkLst>
         </pc:spChg>
-        <pc:spChg chg="add mod">
-          <ac:chgData name="Fatima Pillosu" userId="a6295d4dc9e22643" providerId="LiveId" clId="{F0B9C950-5C19-45BA-B39E-FADB59417D97}" dt="2025-06-25T15:39:07.187" v="1903"/>
+        <pc:spChg chg="add del mod">
+          <ac:chgData name="Fatima Pillosu" userId="a6295d4dc9e22643" providerId="LiveId" clId="{F0B9C950-5C19-45BA-B39E-FADB59417D97}" dt="2025-06-25T16:42:46.024" v="3394" actId="21"/>
           <ac:spMkLst>
             <pc:docMk/>
             <pc:sldMk cId="4289110639" sldId="257"/>
@@ -3625,96 +4041,96 @@
             <ac:cxnSpMk id="112" creationId="{37CC8F6F-2172-8D1D-B066-74AD5E0FCC53}"/>
           </ac:cxnSpMkLst>
         </pc:cxnChg>
-        <pc:cxnChg chg="add mod">
-          <ac:chgData name="Fatima Pillosu" userId="a6295d4dc9e22643" providerId="LiveId" clId="{F0B9C950-5C19-45BA-B39E-FADB59417D97}" dt="2025-06-25T15:39:07.187" v="1903"/>
+        <pc:cxnChg chg="add del mod">
+          <ac:chgData name="Fatima Pillosu" userId="a6295d4dc9e22643" providerId="LiveId" clId="{F0B9C950-5C19-45BA-B39E-FADB59417D97}" dt="2025-06-25T16:20:21.758" v="2899" actId="478"/>
           <ac:cxnSpMkLst>
             <pc:docMk/>
             <pc:sldMk cId="4289110639" sldId="257"/>
             <ac:cxnSpMk id="170" creationId="{5EFB0F9E-EAA7-196F-C228-8E60F991BC87}"/>
           </ac:cxnSpMkLst>
         </pc:cxnChg>
-        <pc:cxnChg chg="add mod">
-          <ac:chgData name="Fatima Pillosu" userId="a6295d4dc9e22643" providerId="LiveId" clId="{F0B9C950-5C19-45BA-B39E-FADB59417D97}" dt="2025-06-25T15:39:07.187" v="1903"/>
+        <pc:cxnChg chg="add del mod">
+          <ac:chgData name="Fatima Pillosu" userId="a6295d4dc9e22643" providerId="LiveId" clId="{F0B9C950-5C19-45BA-B39E-FADB59417D97}" dt="2025-06-25T16:20:21.758" v="2899" actId="478"/>
           <ac:cxnSpMkLst>
             <pc:docMk/>
             <pc:sldMk cId="4289110639" sldId="257"/>
             <ac:cxnSpMk id="171" creationId="{F48F0C27-A3C0-0D22-B0DD-982C250DDB9F}"/>
           </ac:cxnSpMkLst>
         </pc:cxnChg>
-        <pc:cxnChg chg="add mod">
-          <ac:chgData name="Fatima Pillosu" userId="a6295d4dc9e22643" providerId="LiveId" clId="{F0B9C950-5C19-45BA-B39E-FADB59417D97}" dt="2025-06-25T15:39:07.187" v="1903"/>
+        <pc:cxnChg chg="add del mod">
+          <ac:chgData name="Fatima Pillosu" userId="a6295d4dc9e22643" providerId="LiveId" clId="{F0B9C950-5C19-45BA-B39E-FADB59417D97}" dt="2025-06-25T16:20:21.758" v="2899" actId="478"/>
           <ac:cxnSpMkLst>
             <pc:docMk/>
             <pc:sldMk cId="4289110639" sldId="257"/>
             <ac:cxnSpMk id="172" creationId="{CC470C04-2752-3CD1-E53B-F6F66EE54B50}"/>
           </ac:cxnSpMkLst>
         </pc:cxnChg>
-        <pc:cxnChg chg="add mod">
-          <ac:chgData name="Fatima Pillosu" userId="a6295d4dc9e22643" providerId="LiveId" clId="{F0B9C950-5C19-45BA-B39E-FADB59417D97}" dt="2025-06-25T15:39:07.187" v="1903"/>
+        <pc:cxnChg chg="add del mod">
+          <ac:chgData name="Fatima Pillosu" userId="a6295d4dc9e22643" providerId="LiveId" clId="{F0B9C950-5C19-45BA-B39E-FADB59417D97}" dt="2025-06-25T16:20:21.758" v="2899" actId="478"/>
           <ac:cxnSpMkLst>
             <pc:docMk/>
             <pc:sldMk cId="4289110639" sldId="257"/>
             <ac:cxnSpMk id="173" creationId="{AB9E2BD3-3D4A-E412-8599-2EA772B259AF}"/>
           </ac:cxnSpMkLst>
         </pc:cxnChg>
-        <pc:cxnChg chg="add mod">
-          <ac:chgData name="Fatima Pillosu" userId="a6295d4dc9e22643" providerId="LiveId" clId="{F0B9C950-5C19-45BA-B39E-FADB59417D97}" dt="2025-06-25T15:39:07.187" v="1903"/>
+        <pc:cxnChg chg="add del mod">
+          <ac:chgData name="Fatima Pillosu" userId="a6295d4dc9e22643" providerId="LiveId" clId="{F0B9C950-5C19-45BA-B39E-FADB59417D97}" dt="2025-06-25T16:20:21.758" v="2899" actId="478"/>
           <ac:cxnSpMkLst>
             <pc:docMk/>
             <pc:sldMk cId="4289110639" sldId="257"/>
             <ac:cxnSpMk id="174" creationId="{25D0FF50-2781-0DCC-C0D9-ADA0C1ACED07}"/>
           </ac:cxnSpMkLst>
         </pc:cxnChg>
-        <pc:cxnChg chg="add mod">
-          <ac:chgData name="Fatima Pillosu" userId="a6295d4dc9e22643" providerId="LiveId" clId="{F0B9C950-5C19-45BA-B39E-FADB59417D97}" dt="2025-06-25T15:39:07.187" v="1903"/>
+        <pc:cxnChg chg="add del mod">
+          <ac:chgData name="Fatima Pillosu" userId="a6295d4dc9e22643" providerId="LiveId" clId="{F0B9C950-5C19-45BA-B39E-FADB59417D97}" dt="2025-06-25T16:20:21.758" v="2899" actId="478"/>
           <ac:cxnSpMkLst>
             <pc:docMk/>
             <pc:sldMk cId="4289110639" sldId="257"/>
             <ac:cxnSpMk id="175" creationId="{4E896ECB-2E59-82BB-E40E-2987D28298F2}"/>
           </ac:cxnSpMkLst>
         </pc:cxnChg>
-        <pc:cxnChg chg="add mod">
-          <ac:chgData name="Fatima Pillosu" userId="a6295d4dc9e22643" providerId="LiveId" clId="{F0B9C950-5C19-45BA-B39E-FADB59417D97}" dt="2025-06-25T15:39:07.187" v="1903"/>
+        <pc:cxnChg chg="add del mod">
+          <ac:chgData name="Fatima Pillosu" userId="a6295d4dc9e22643" providerId="LiveId" clId="{F0B9C950-5C19-45BA-B39E-FADB59417D97}" dt="2025-06-25T16:20:21.758" v="2899" actId="478"/>
           <ac:cxnSpMkLst>
             <pc:docMk/>
             <pc:sldMk cId="4289110639" sldId="257"/>
             <ac:cxnSpMk id="176" creationId="{260B3181-DDCD-E837-7B28-B4A995A3010D}"/>
           </ac:cxnSpMkLst>
         </pc:cxnChg>
-        <pc:cxnChg chg="add mod">
-          <ac:chgData name="Fatima Pillosu" userId="a6295d4dc9e22643" providerId="LiveId" clId="{F0B9C950-5C19-45BA-B39E-FADB59417D97}" dt="2025-06-25T15:39:07.187" v="1903"/>
+        <pc:cxnChg chg="add del mod">
+          <ac:chgData name="Fatima Pillosu" userId="a6295d4dc9e22643" providerId="LiveId" clId="{F0B9C950-5C19-45BA-B39E-FADB59417D97}" dt="2025-06-25T16:20:21.758" v="2899" actId="478"/>
           <ac:cxnSpMkLst>
             <pc:docMk/>
             <pc:sldMk cId="4289110639" sldId="257"/>
             <ac:cxnSpMk id="177" creationId="{E278A098-4DC1-9194-A43E-2FDA922541F6}"/>
           </ac:cxnSpMkLst>
         </pc:cxnChg>
-        <pc:cxnChg chg="add mod">
-          <ac:chgData name="Fatima Pillosu" userId="a6295d4dc9e22643" providerId="LiveId" clId="{F0B9C950-5C19-45BA-B39E-FADB59417D97}" dt="2025-06-25T15:39:07.187" v="1903"/>
+        <pc:cxnChg chg="add del mod">
+          <ac:chgData name="Fatima Pillosu" userId="a6295d4dc9e22643" providerId="LiveId" clId="{F0B9C950-5C19-45BA-B39E-FADB59417D97}" dt="2025-06-25T16:20:21.758" v="2899" actId="478"/>
           <ac:cxnSpMkLst>
             <pc:docMk/>
             <pc:sldMk cId="4289110639" sldId="257"/>
             <ac:cxnSpMk id="178" creationId="{B1DD1F03-A5DE-B5B4-998E-5B323E581E66}"/>
           </ac:cxnSpMkLst>
         </pc:cxnChg>
-        <pc:cxnChg chg="add mod">
-          <ac:chgData name="Fatima Pillosu" userId="a6295d4dc9e22643" providerId="LiveId" clId="{F0B9C950-5C19-45BA-B39E-FADB59417D97}" dt="2025-06-25T15:39:07.187" v="1903"/>
+        <pc:cxnChg chg="add del mod">
+          <ac:chgData name="Fatima Pillosu" userId="a6295d4dc9e22643" providerId="LiveId" clId="{F0B9C950-5C19-45BA-B39E-FADB59417D97}" dt="2025-06-25T15:54:43.399" v="1904" actId="478"/>
           <ac:cxnSpMkLst>
             <pc:docMk/>
             <pc:sldMk cId="4289110639" sldId="257"/>
             <ac:cxnSpMk id="197" creationId="{2B7862D4-1298-4201-3E9B-0C0AE48A6334}"/>
           </ac:cxnSpMkLst>
         </pc:cxnChg>
-        <pc:cxnChg chg="add mod">
-          <ac:chgData name="Fatima Pillosu" userId="a6295d4dc9e22643" providerId="LiveId" clId="{F0B9C950-5C19-45BA-B39E-FADB59417D97}" dt="2025-06-25T15:39:07.187" v="1903"/>
+        <pc:cxnChg chg="add del mod">
+          <ac:chgData name="Fatima Pillosu" userId="a6295d4dc9e22643" providerId="LiveId" clId="{F0B9C950-5C19-45BA-B39E-FADB59417D97}" dt="2025-06-25T15:54:43.399" v="1904" actId="478"/>
           <ac:cxnSpMkLst>
             <pc:docMk/>
             <pc:sldMk cId="4289110639" sldId="257"/>
             <ac:cxnSpMk id="198" creationId="{28886F03-706D-F1B0-335A-D2C6E14F7178}"/>
           </ac:cxnSpMkLst>
         </pc:cxnChg>
-        <pc:cxnChg chg="add mod">
-          <ac:chgData name="Fatima Pillosu" userId="a6295d4dc9e22643" providerId="LiveId" clId="{F0B9C950-5C19-45BA-B39E-FADB59417D97}" dt="2025-06-25T15:39:07.187" v="1903"/>
+        <pc:cxnChg chg="add del mod">
+          <ac:chgData name="Fatima Pillosu" userId="a6295d4dc9e22643" providerId="LiveId" clId="{F0B9C950-5C19-45BA-B39E-FADB59417D97}" dt="2025-06-25T15:54:43.399" v="1904" actId="478"/>
           <ac:cxnSpMkLst>
             <pc:docMk/>
             <pc:sldMk cId="4289110639" sldId="257"/>
@@ -5515,8 +5931,8 @@
         </p:nvSpPr>
         <p:spPr>
           <a:xfrm>
-            <a:off x="2386013" y="1143000"/>
-            <a:ext cx="2085975" cy="3086100"/>
+            <a:off x="2162175" y="1143000"/>
+            <a:ext cx="2533650" cy="3086100"/>
           </a:xfrm>
           <a:prstGeom prst="rect">
             <a:avLst/>
@@ -5794,8 +6210,8 @@
         </p:nvSpPr>
         <p:spPr>
           <a:xfrm>
-            <a:off x="310515" y="1001553"/>
-            <a:ext cx="3519170" cy="2130602"/>
+            <a:off x="310515" y="824885"/>
+            <a:ext cx="3519170" cy="1754776"/>
           </a:xfrm>
         </p:spPr>
         <p:txBody>
@@ -5826,8 +6242,8 @@
         </p:nvSpPr>
         <p:spPr>
           <a:xfrm>
-            <a:off x="517525" y="3214319"/>
-            <a:ext cx="3105150" cy="1477538"/>
+            <a:off x="517525" y="2647331"/>
+            <a:ext cx="3105150" cy="1216909"/>
           </a:xfrm>
         </p:spPr>
         <p:txBody>
@@ -5947,7 +6363,7 @@
     </p:spTree>
     <p:extLst>
       <p:ext uri="{BB962C8B-B14F-4D97-AF65-F5344CB8AC3E}">
-        <p14:creationId xmlns:p14="http://schemas.microsoft.com/office/powerpoint/2010/main" val="3744149337"/>
+        <p14:creationId xmlns:p14="http://schemas.microsoft.com/office/powerpoint/2010/main" val="428286738"/>
       </p:ext>
     </p:extLst>
   </p:cSld>
@@ -6117,7 +6533,7 @@
     </p:spTree>
     <p:extLst>
       <p:ext uri="{BB962C8B-B14F-4D97-AF65-F5344CB8AC3E}">
-        <p14:creationId xmlns:p14="http://schemas.microsoft.com/office/powerpoint/2010/main" val="968158112"/>
+        <p14:creationId xmlns:p14="http://schemas.microsoft.com/office/powerpoint/2010/main" val="135288123"/>
       </p:ext>
     </p:extLst>
   </p:cSld>
@@ -6156,8 +6572,8 @@
         </p:nvSpPr>
         <p:spPr>
           <a:xfrm>
-            <a:off x="2962831" y="325823"/>
-            <a:ext cx="892731" cy="5186259"/>
+            <a:off x="2962831" y="268350"/>
+            <a:ext cx="892731" cy="4271432"/>
           </a:xfrm>
         </p:spPr>
         <p:txBody>
@@ -6184,8 +6600,8 @@
         </p:nvSpPr>
         <p:spPr>
           <a:xfrm>
-            <a:off x="284639" y="325823"/>
-            <a:ext cx="2626439" cy="5186259"/>
+            <a:off x="284639" y="268350"/>
+            <a:ext cx="2626439" cy="4271432"/>
           </a:xfrm>
         </p:spPr>
         <p:txBody>
@@ -6297,7 +6713,7 @@
     </p:spTree>
     <p:extLst>
       <p:ext uri="{BB962C8B-B14F-4D97-AF65-F5344CB8AC3E}">
-        <p14:creationId xmlns:p14="http://schemas.microsoft.com/office/powerpoint/2010/main" val="675075677"/>
+        <p14:creationId xmlns:p14="http://schemas.microsoft.com/office/powerpoint/2010/main" val="2587756895"/>
       </p:ext>
     </p:extLst>
   </p:cSld>
@@ -6467,7 +6883,7 @@
     </p:spTree>
     <p:extLst>
       <p:ext uri="{BB962C8B-B14F-4D97-AF65-F5344CB8AC3E}">
-        <p14:creationId xmlns:p14="http://schemas.microsoft.com/office/powerpoint/2010/main" val="2382312001"/>
+        <p14:creationId xmlns:p14="http://schemas.microsoft.com/office/powerpoint/2010/main" val="51771822"/>
       </p:ext>
     </p:extLst>
   </p:cSld>
@@ -6506,8 +6922,8 @@
         </p:nvSpPr>
         <p:spPr>
           <a:xfrm>
-            <a:off x="282482" y="1525705"/>
-            <a:ext cx="3570923" cy="2545672"/>
+            <a:off x="282482" y="1256579"/>
+            <a:ext cx="3570923" cy="2096630"/>
           </a:xfrm>
         </p:spPr>
         <p:txBody>
@@ -6538,8 +6954,8 @@
         </p:nvSpPr>
         <p:spPr>
           <a:xfrm>
-            <a:off x="282482" y="4095460"/>
-            <a:ext cx="3570923" cy="1338709"/>
+            <a:off x="282482" y="3373044"/>
+            <a:ext cx="3570923" cy="1102568"/>
           </a:xfrm>
         </p:spPr>
         <p:txBody>
@@ -6713,7 +7129,7 @@
     </p:spTree>
     <p:extLst>
       <p:ext uri="{BB962C8B-B14F-4D97-AF65-F5344CB8AC3E}">
-        <p14:creationId xmlns:p14="http://schemas.microsoft.com/office/powerpoint/2010/main" val="3233793927"/>
+        <p14:creationId xmlns:p14="http://schemas.microsoft.com/office/powerpoint/2010/main" val="3185760430"/>
       </p:ext>
     </p:extLst>
   </p:cSld>
@@ -6775,8 +7191,8 @@
         </p:nvSpPr>
         <p:spPr>
           <a:xfrm>
-            <a:off x="284639" y="1629117"/>
-            <a:ext cx="1759585" cy="3882965"/>
+            <a:off x="284639" y="1341750"/>
+            <a:ext cx="1759585" cy="3198032"/>
           </a:xfrm>
         </p:spPr>
         <p:txBody>
@@ -6832,8 +7248,8 @@
         </p:nvSpPr>
         <p:spPr>
           <a:xfrm>
-            <a:off x="2095976" y="1629117"/>
-            <a:ext cx="1759585" cy="3882965"/>
+            <a:off x="2095976" y="1341750"/>
+            <a:ext cx="1759585" cy="3198032"/>
           </a:xfrm>
         </p:spPr>
         <p:txBody>
@@ -6945,7 +7361,7 @@
     </p:spTree>
     <p:extLst>
       <p:ext uri="{BB962C8B-B14F-4D97-AF65-F5344CB8AC3E}">
-        <p14:creationId xmlns:p14="http://schemas.microsoft.com/office/powerpoint/2010/main" val="2174599920"/>
+        <p14:creationId xmlns:p14="http://schemas.microsoft.com/office/powerpoint/2010/main" val="4256952753"/>
       </p:ext>
     </p:extLst>
   </p:cSld>
@@ -6984,8 +7400,8 @@
         </p:nvSpPr>
         <p:spPr>
           <a:xfrm>
-            <a:off x="285178" y="325825"/>
-            <a:ext cx="3570923" cy="1182881"/>
+            <a:off x="285178" y="268351"/>
+            <a:ext cx="3570923" cy="974228"/>
           </a:xfrm>
         </p:spPr>
         <p:txBody>
@@ -7012,8 +7428,8 @@
         </p:nvSpPr>
         <p:spPr>
           <a:xfrm>
-            <a:off x="285179" y="1500205"/>
-            <a:ext cx="1751498" cy="735227"/>
+            <a:off x="285179" y="1235577"/>
+            <a:ext cx="1751498" cy="605537"/>
           </a:xfrm>
         </p:spPr>
         <p:txBody>
@@ -7077,8 +7493,8 @@
         </p:nvSpPr>
         <p:spPr>
           <a:xfrm>
-            <a:off x="285179" y="2235432"/>
-            <a:ext cx="1751498" cy="3287983"/>
+            <a:off x="285179" y="1841114"/>
+            <a:ext cx="1751498" cy="2708002"/>
           </a:xfrm>
         </p:spPr>
         <p:txBody>
@@ -7134,8 +7550,8 @@
         </p:nvSpPr>
         <p:spPr>
           <a:xfrm>
-            <a:off x="2095977" y="1500205"/>
-            <a:ext cx="1760124" cy="735227"/>
+            <a:off x="2095977" y="1235577"/>
+            <a:ext cx="1760124" cy="605537"/>
           </a:xfrm>
         </p:spPr>
         <p:txBody>
@@ -7199,8 +7615,8 @@
         </p:nvSpPr>
         <p:spPr>
           <a:xfrm>
-            <a:off x="2095977" y="2235432"/>
-            <a:ext cx="1760124" cy="3287983"/>
+            <a:off x="2095977" y="1841114"/>
+            <a:ext cx="1760124" cy="2708002"/>
           </a:xfrm>
         </p:spPr>
         <p:txBody>
@@ -7312,7 +7728,7 @@
     </p:spTree>
     <p:extLst>
       <p:ext uri="{BB962C8B-B14F-4D97-AF65-F5344CB8AC3E}">
-        <p14:creationId xmlns:p14="http://schemas.microsoft.com/office/powerpoint/2010/main" val="3433368444"/>
+        <p14:creationId xmlns:p14="http://schemas.microsoft.com/office/powerpoint/2010/main" val="506908511"/>
       </p:ext>
     </p:extLst>
   </p:cSld>
@@ -7430,7 +7846,7 @@
     </p:spTree>
     <p:extLst>
       <p:ext uri="{BB962C8B-B14F-4D97-AF65-F5344CB8AC3E}">
-        <p14:creationId xmlns:p14="http://schemas.microsoft.com/office/powerpoint/2010/main" val="2960370727"/>
+        <p14:creationId xmlns:p14="http://schemas.microsoft.com/office/powerpoint/2010/main" val="1181273483"/>
       </p:ext>
     </p:extLst>
   </p:cSld>
@@ -7525,7 +7941,7 @@
     </p:spTree>
     <p:extLst>
       <p:ext uri="{BB962C8B-B14F-4D97-AF65-F5344CB8AC3E}">
-        <p14:creationId xmlns:p14="http://schemas.microsoft.com/office/powerpoint/2010/main" val="881782159"/>
+        <p14:creationId xmlns:p14="http://schemas.microsoft.com/office/powerpoint/2010/main" val="1099287452"/>
       </p:ext>
     </p:extLst>
   </p:cSld>
@@ -7564,8 +7980,8 @@
         </p:nvSpPr>
         <p:spPr>
           <a:xfrm>
-            <a:off x="285178" y="407988"/>
-            <a:ext cx="1335322" cy="1427956"/>
+            <a:off x="285178" y="336021"/>
+            <a:ext cx="1335322" cy="1176073"/>
           </a:xfrm>
         </p:spPr>
         <p:txBody>
@@ -7596,8 +8012,8 @@
         </p:nvSpPr>
         <p:spPr>
           <a:xfrm>
-            <a:off x="1760124" y="881141"/>
-            <a:ext cx="2095976" cy="4349034"/>
+            <a:off x="1760124" y="725713"/>
+            <a:ext cx="2095976" cy="3581889"/>
           </a:xfrm>
         </p:spPr>
         <p:txBody>
@@ -7681,8 +8097,8 @@
         </p:nvSpPr>
         <p:spPr>
           <a:xfrm>
-            <a:off x="285178" y="1835944"/>
-            <a:ext cx="1335322" cy="3401313"/>
+            <a:off x="285178" y="1512094"/>
+            <a:ext cx="1335322" cy="2801341"/>
           </a:xfrm>
         </p:spPr>
         <p:txBody>
@@ -7802,7 +8218,7 @@
     </p:spTree>
     <p:extLst>
       <p:ext uri="{BB962C8B-B14F-4D97-AF65-F5344CB8AC3E}">
-        <p14:creationId xmlns:p14="http://schemas.microsoft.com/office/powerpoint/2010/main" val="3152062782"/>
+        <p14:creationId xmlns:p14="http://schemas.microsoft.com/office/powerpoint/2010/main" val="1536859938"/>
       </p:ext>
     </p:extLst>
   </p:cSld>
@@ -7841,8 +8257,8 @@
         </p:nvSpPr>
         <p:spPr>
           <a:xfrm>
-            <a:off x="285178" y="407988"/>
-            <a:ext cx="1335322" cy="1427956"/>
+            <a:off x="285178" y="336021"/>
+            <a:ext cx="1335322" cy="1176073"/>
           </a:xfrm>
         </p:spPr>
         <p:txBody>
@@ -7873,8 +8289,8 @@
         </p:nvSpPr>
         <p:spPr>
           <a:xfrm>
-            <a:off x="1760124" y="881141"/>
-            <a:ext cx="2095976" cy="4349034"/>
+            <a:off x="1760124" y="725713"/>
+            <a:ext cx="2095976" cy="3581889"/>
           </a:xfrm>
         </p:spPr>
         <p:txBody>
@@ -7938,8 +8354,8 @@
         </p:nvSpPr>
         <p:spPr>
           <a:xfrm>
-            <a:off x="285178" y="1835944"/>
-            <a:ext cx="1335322" cy="3401313"/>
+            <a:off x="285178" y="1512094"/>
+            <a:ext cx="1335322" cy="2801341"/>
           </a:xfrm>
         </p:spPr>
         <p:txBody>
@@ -8059,7 +8475,7 @@
     </p:spTree>
     <p:extLst>
       <p:ext uri="{BB962C8B-B14F-4D97-AF65-F5344CB8AC3E}">
-        <p14:creationId xmlns:p14="http://schemas.microsoft.com/office/powerpoint/2010/main" val="1059960770"/>
+        <p14:creationId xmlns:p14="http://schemas.microsoft.com/office/powerpoint/2010/main" val="2662241505"/>
       </p:ext>
     </p:extLst>
   </p:cSld>
@@ -8103,8 +8519,8 @@
         </p:nvSpPr>
         <p:spPr>
           <a:xfrm>
-            <a:off x="284639" y="325825"/>
-            <a:ext cx="3570923" cy="1182881"/>
+            <a:off x="284639" y="268351"/>
+            <a:ext cx="3570923" cy="974228"/>
           </a:xfrm>
           <a:prstGeom prst="rect">
             <a:avLst/>
@@ -8136,8 +8552,8 @@
         </p:nvSpPr>
         <p:spPr>
           <a:xfrm>
-            <a:off x="284639" y="1629117"/>
-            <a:ext cx="3570923" cy="3882965"/>
+            <a:off x="284639" y="1341750"/>
+            <a:ext cx="3570923" cy="3198032"/>
           </a:xfrm>
           <a:prstGeom prst="rect">
             <a:avLst/>
@@ -8198,8 +8614,8 @@
         </p:nvSpPr>
         <p:spPr>
           <a:xfrm>
-            <a:off x="284639" y="5672162"/>
-            <a:ext cx="931545" cy="325823"/>
+            <a:off x="284639" y="4671625"/>
+            <a:ext cx="931545" cy="268350"/>
           </a:xfrm>
           <a:prstGeom prst="rect">
             <a:avLst/>
@@ -8239,8 +8655,8 @@
         </p:nvSpPr>
         <p:spPr>
           <a:xfrm>
-            <a:off x="1371441" y="5672162"/>
-            <a:ext cx="1397318" cy="325823"/>
+            <a:off x="1371441" y="4671625"/>
+            <a:ext cx="1397318" cy="268350"/>
           </a:xfrm>
           <a:prstGeom prst="rect">
             <a:avLst/>
@@ -8276,8 +8692,8 @@
         </p:nvSpPr>
         <p:spPr>
           <a:xfrm>
-            <a:off x="2924016" y="5672162"/>
-            <a:ext cx="931545" cy="325823"/>
+            <a:off x="2924016" y="4671625"/>
+            <a:ext cx="931545" cy="268350"/>
           </a:xfrm>
           <a:prstGeom prst="rect">
             <a:avLst/>
@@ -8308,23 +8724,23 @@
     </p:spTree>
     <p:extLst>
       <p:ext uri="{BB962C8B-B14F-4D97-AF65-F5344CB8AC3E}">
-        <p14:creationId xmlns:p14="http://schemas.microsoft.com/office/powerpoint/2010/main" val="2696508739"/>
+        <p14:creationId xmlns:p14="http://schemas.microsoft.com/office/powerpoint/2010/main" val="3622676394"/>
       </p:ext>
     </p:extLst>
   </p:cSld>
   <p:clrMap bg1="lt1" tx1="dk1" bg2="lt2" tx2="dk2" accent1="accent1" accent2="accent2" accent3="accent3" accent4="accent4" accent5="accent5" accent6="accent6" hlink="hlink" folHlink="folHlink"/>
   <p:sldLayoutIdLst>
-    <p:sldLayoutId id="2147483829" r:id="rId1"/>
-    <p:sldLayoutId id="2147483830" r:id="rId2"/>
-    <p:sldLayoutId id="2147483831" r:id="rId3"/>
-    <p:sldLayoutId id="2147483832" r:id="rId4"/>
-    <p:sldLayoutId id="2147483833" r:id="rId5"/>
-    <p:sldLayoutId id="2147483834" r:id="rId6"/>
-    <p:sldLayoutId id="2147483835" r:id="rId7"/>
-    <p:sldLayoutId id="2147483836" r:id="rId8"/>
-    <p:sldLayoutId id="2147483837" r:id="rId9"/>
-    <p:sldLayoutId id="2147483838" r:id="rId10"/>
-    <p:sldLayoutId id="2147483839" r:id="rId11"/>
+    <p:sldLayoutId id="2147483841" r:id="rId1"/>
+    <p:sldLayoutId id="2147483842" r:id="rId2"/>
+    <p:sldLayoutId id="2147483843" r:id="rId3"/>
+    <p:sldLayoutId id="2147483844" r:id="rId4"/>
+    <p:sldLayoutId id="2147483845" r:id="rId5"/>
+    <p:sldLayoutId id="2147483846" r:id="rId6"/>
+    <p:sldLayoutId id="2147483847" r:id="rId7"/>
+    <p:sldLayoutId id="2147483848" r:id="rId8"/>
+    <p:sldLayoutId id="2147483849" r:id="rId9"/>
+    <p:sldLayoutId id="2147483850" r:id="rId10"/>
+    <p:sldLayoutId id="2147483851" r:id="rId11"/>
   </p:sldLayoutIdLst>
   <p:txStyles>
     <p:titleStyle>
@@ -8628,7 +9044,7 @@
       </p:grpSpPr>
       <p:sp>
         <p:nvSpPr>
-          <p:cNvPr id="169" name="Rectangle 168">
+          <p:cNvPr id="15" name="Rectangle 14">
             <a:extLst>
               <a:ext uri="{FF2B5EF4-FFF2-40B4-BE49-F238E27FC236}">
                 <a16:creationId xmlns:a16="http://schemas.microsoft.com/office/drawing/2014/main" id="{DDAF3D54-885E-2A29-8D7C-F2C70C58F5B5}"/>
@@ -8640,8 +9056,8 @@
         </p:nvSpPr>
         <p:spPr>
           <a:xfrm>
-            <a:off x="77605" y="730399"/>
-            <a:ext cx="1224000" cy="216000"/>
+            <a:off x="226098" y="729378"/>
+            <a:ext cx="1260000" cy="216000"/>
           </a:xfrm>
           <a:prstGeom prst="rect">
             <a:avLst/>
@@ -8697,438 +9113,9 @@
           </a:p>
         </p:txBody>
       </p:sp>
-      <p:cxnSp>
-        <p:nvCxnSpPr>
-          <p:cNvPr id="170" name="Straight Connector 169">
-            <a:extLst>
-              <a:ext uri="{FF2B5EF4-FFF2-40B4-BE49-F238E27FC236}">
-                <a16:creationId xmlns:a16="http://schemas.microsoft.com/office/drawing/2014/main" id="{5EFB0F9E-EAA7-196F-C228-8E60F991BC87}"/>
-              </a:ext>
-            </a:extLst>
-          </p:cNvPr>
-          <p:cNvCxnSpPr>
-            <a:cxnSpLocks/>
-          </p:cNvCxnSpPr>
-          <p:nvPr/>
-        </p:nvCxnSpPr>
-        <p:spPr>
-          <a:xfrm>
-            <a:off x="913466" y="3310447"/>
-            <a:ext cx="0" cy="144000"/>
-          </a:xfrm>
-          <a:prstGeom prst="line">
-            <a:avLst/>
-          </a:prstGeom>
-          <a:ln w="9525">
-            <a:solidFill>
-              <a:schemeClr val="tx1">
-                <a:lumMod val="50000"/>
-                <a:lumOff val="50000"/>
-              </a:schemeClr>
-            </a:solidFill>
-            <a:prstDash val="dash"/>
-          </a:ln>
-        </p:spPr>
-        <p:style>
-          <a:lnRef idx="2">
-            <a:schemeClr val="accent1"/>
-          </a:lnRef>
-          <a:fillRef idx="0">
-            <a:schemeClr val="accent1"/>
-          </a:fillRef>
-          <a:effectRef idx="1">
-            <a:schemeClr val="accent1"/>
-          </a:effectRef>
-          <a:fontRef idx="minor">
-            <a:schemeClr val="tx1"/>
-          </a:fontRef>
-        </p:style>
-      </p:cxnSp>
-      <p:cxnSp>
-        <p:nvCxnSpPr>
-          <p:cNvPr id="171" name="Straight Connector 170">
-            <a:extLst>
-              <a:ext uri="{FF2B5EF4-FFF2-40B4-BE49-F238E27FC236}">
-                <a16:creationId xmlns:a16="http://schemas.microsoft.com/office/drawing/2014/main" id="{F48F0C27-A3C0-0D22-B0DD-982C250DDB9F}"/>
-              </a:ext>
-            </a:extLst>
-          </p:cNvPr>
-          <p:cNvCxnSpPr>
-            <a:cxnSpLocks/>
-          </p:cNvCxnSpPr>
-          <p:nvPr/>
-        </p:nvCxnSpPr>
-        <p:spPr>
-          <a:xfrm>
-            <a:off x="913466" y="3455685"/>
-            <a:ext cx="948765" cy="0"/>
-          </a:xfrm>
-          <a:prstGeom prst="line">
-            <a:avLst/>
-          </a:prstGeom>
-          <a:ln w="9525">
-            <a:solidFill>
-              <a:schemeClr val="tx1">
-                <a:lumMod val="50000"/>
-                <a:lumOff val="50000"/>
-              </a:schemeClr>
-            </a:solidFill>
-            <a:prstDash val="dash"/>
-          </a:ln>
-        </p:spPr>
-        <p:style>
-          <a:lnRef idx="2">
-            <a:schemeClr val="accent1"/>
-          </a:lnRef>
-          <a:fillRef idx="0">
-            <a:schemeClr val="accent1"/>
-          </a:fillRef>
-          <a:effectRef idx="1">
-            <a:schemeClr val="accent1"/>
-          </a:effectRef>
-          <a:fontRef idx="minor">
-            <a:schemeClr val="tx1"/>
-          </a:fontRef>
-        </p:style>
-      </p:cxnSp>
-      <p:cxnSp>
-        <p:nvCxnSpPr>
-          <p:cNvPr id="172" name="Straight Connector 171">
-            <a:extLst>
-              <a:ext uri="{FF2B5EF4-FFF2-40B4-BE49-F238E27FC236}">
-                <a16:creationId xmlns:a16="http://schemas.microsoft.com/office/drawing/2014/main" id="{CC470C04-2752-3CD1-E53B-F6F66EE54B50}"/>
-              </a:ext>
-            </a:extLst>
-          </p:cNvPr>
-          <p:cNvCxnSpPr>
-            <a:cxnSpLocks/>
-          </p:cNvCxnSpPr>
-          <p:nvPr/>
-        </p:nvCxnSpPr>
-        <p:spPr>
-          <a:xfrm>
-            <a:off x="1855841" y="3310447"/>
-            <a:ext cx="0" cy="144000"/>
-          </a:xfrm>
-          <a:prstGeom prst="line">
-            <a:avLst/>
-          </a:prstGeom>
-          <a:ln w="9525">
-            <a:solidFill>
-              <a:schemeClr val="tx1">
-                <a:lumMod val="50000"/>
-                <a:lumOff val="50000"/>
-              </a:schemeClr>
-            </a:solidFill>
-            <a:prstDash val="dash"/>
-            <a:headEnd type="triangle" w="sm" len="sm"/>
-            <a:tailEnd type="none" w="med" len="med"/>
-          </a:ln>
-        </p:spPr>
-        <p:style>
-          <a:lnRef idx="2">
-            <a:schemeClr val="accent1"/>
-          </a:lnRef>
-          <a:fillRef idx="0">
-            <a:schemeClr val="accent1"/>
-          </a:fillRef>
-          <a:effectRef idx="1">
-            <a:schemeClr val="accent1"/>
-          </a:effectRef>
-          <a:fontRef idx="minor">
-            <a:schemeClr val="tx1"/>
-          </a:fontRef>
-        </p:style>
-      </p:cxnSp>
-      <p:cxnSp>
-        <p:nvCxnSpPr>
-          <p:cNvPr id="173" name="Straight Connector 172">
-            <a:extLst>
-              <a:ext uri="{FF2B5EF4-FFF2-40B4-BE49-F238E27FC236}">
-                <a16:creationId xmlns:a16="http://schemas.microsoft.com/office/drawing/2014/main" id="{AB9E2BD3-3D4A-E412-8599-2EA772B259AF}"/>
-              </a:ext>
-            </a:extLst>
-          </p:cNvPr>
-          <p:cNvCxnSpPr>
-            <a:cxnSpLocks/>
-          </p:cNvCxnSpPr>
-          <p:nvPr/>
-        </p:nvCxnSpPr>
-        <p:spPr>
-          <a:xfrm>
-            <a:off x="434019" y="3310447"/>
-            <a:ext cx="0" cy="199347"/>
-          </a:xfrm>
-          <a:prstGeom prst="line">
-            <a:avLst/>
-          </a:prstGeom>
-          <a:ln w="9525">
-            <a:solidFill>
-              <a:schemeClr val="tx1">
-                <a:lumMod val="50000"/>
-                <a:lumOff val="50000"/>
-              </a:schemeClr>
-            </a:solidFill>
-            <a:prstDash val="dash"/>
-          </a:ln>
-        </p:spPr>
-        <p:style>
-          <a:lnRef idx="2">
-            <a:schemeClr val="accent1"/>
-          </a:lnRef>
-          <a:fillRef idx="0">
-            <a:schemeClr val="accent1"/>
-          </a:fillRef>
-          <a:effectRef idx="1">
-            <a:schemeClr val="accent1"/>
-          </a:effectRef>
-          <a:fontRef idx="minor">
-            <a:schemeClr val="tx1"/>
-          </a:fontRef>
-        </p:style>
-      </p:cxnSp>
-      <p:cxnSp>
-        <p:nvCxnSpPr>
-          <p:cNvPr id="174" name="Straight Connector 173">
-            <a:extLst>
-              <a:ext uri="{FF2B5EF4-FFF2-40B4-BE49-F238E27FC236}">
-                <a16:creationId xmlns:a16="http://schemas.microsoft.com/office/drawing/2014/main" id="{25D0FF50-2781-0DCC-C0D9-ADA0C1ACED07}"/>
-              </a:ext>
-            </a:extLst>
-          </p:cNvPr>
-          <p:cNvCxnSpPr>
-            <a:cxnSpLocks/>
-          </p:cNvCxnSpPr>
-          <p:nvPr/>
-        </p:nvCxnSpPr>
-        <p:spPr>
-          <a:xfrm>
-            <a:off x="434019" y="3509794"/>
-            <a:ext cx="3259034" cy="0"/>
-          </a:xfrm>
-          <a:prstGeom prst="line">
-            <a:avLst/>
-          </a:prstGeom>
-          <a:ln w="9525">
-            <a:solidFill>
-              <a:schemeClr val="tx1">
-                <a:lumMod val="50000"/>
-                <a:lumOff val="50000"/>
-              </a:schemeClr>
-            </a:solidFill>
-            <a:prstDash val="dash"/>
-          </a:ln>
-        </p:spPr>
-        <p:style>
-          <a:lnRef idx="2">
-            <a:schemeClr val="accent1"/>
-          </a:lnRef>
-          <a:fillRef idx="0">
-            <a:schemeClr val="accent1"/>
-          </a:fillRef>
-          <a:effectRef idx="1">
-            <a:schemeClr val="accent1"/>
-          </a:effectRef>
-          <a:fontRef idx="minor">
-            <a:schemeClr val="tx1"/>
-          </a:fontRef>
-        </p:style>
-      </p:cxnSp>
-      <p:cxnSp>
-        <p:nvCxnSpPr>
-          <p:cNvPr id="175" name="Straight Connector 174">
-            <a:extLst>
-              <a:ext uri="{FF2B5EF4-FFF2-40B4-BE49-F238E27FC236}">
-                <a16:creationId xmlns:a16="http://schemas.microsoft.com/office/drawing/2014/main" id="{4E896ECB-2E59-82BB-E40E-2987D28298F2}"/>
-              </a:ext>
-            </a:extLst>
-          </p:cNvPr>
-          <p:cNvCxnSpPr>
-            <a:cxnSpLocks/>
-          </p:cNvCxnSpPr>
-          <p:nvPr/>
-        </p:nvCxnSpPr>
-        <p:spPr>
-          <a:xfrm>
-            <a:off x="3693053" y="3310447"/>
-            <a:ext cx="0" cy="199347"/>
-          </a:xfrm>
-          <a:prstGeom prst="line">
-            <a:avLst/>
-          </a:prstGeom>
-          <a:ln w="9525">
-            <a:solidFill>
-              <a:schemeClr val="tx1">
-                <a:lumMod val="50000"/>
-                <a:lumOff val="50000"/>
-              </a:schemeClr>
-            </a:solidFill>
-            <a:prstDash val="dash"/>
-            <a:headEnd type="triangle" w="sm" len="sm"/>
-            <a:tailEnd type="none" w="med" len="med"/>
-          </a:ln>
-        </p:spPr>
-        <p:style>
-          <a:lnRef idx="2">
-            <a:schemeClr val="accent1"/>
-          </a:lnRef>
-          <a:fillRef idx="0">
-            <a:schemeClr val="accent1"/>
-          </a:fillRef>
-          <a:effectRef idx="1">
-            <a:schemeClr val="accent1"/>
-          </a:effectRef>
-          <a:fontRef idx="minor">
-            <a:schemeClr val="tx1"/>
-          </a:fontRef>
-        </p:style>
-      </p:cxnSp>
-      <p:cxnSp>
-        <p:nvCxnSpPr>
-          <p:cNvPr id="176" name="Straight Connector 175">
-            <a:extLst>
-              <a:ext uri="{FF2B5EF4-FFF2-40B4-BE49-F238E27FC236}">
-                <a16:creationId xmlns:a16="http://schemas.microsoft.com/office/drawing/2014/main" id="{260B3181-DDCD-E837-7B28-B4A995A3010D}"/>
-              </a:ext>
-            </a:extLst>
-          </p:cNvPr>
-          <p:cNvCxnSpPr>
-            <a:cxnSpLocks/>
-          </p:cNvCxnSpPr>
-          <p:nvPr/>
-        </p:nvCxnSpPr>
-        <p:spPr>
-          <a:xfrm>
-            <a:off x="2290708" y="3310447"/>
-            <a:ext cx="0" cy="144000"/>
-          </a:xfrm>
-          <a:prstGeom prst="line">
-            <a:avLst/>
-          </a:prstGeom>
-          <a:ln w="9525">
-            <a:solidFill>
-              <a:schemeClr val="tx1">
-                <a:lumMod val="50000"/>
-                <a:lumOff val="50000"/>
-              </a:schemeClr>
-            </a:solidFill>
-            <a:prstDash val="dash"/>
-          </a:ln>
-        </p:spPr>
-        <p:style>
-          <a:lnRef idx="2">
-            <a:schemeClr val="accent1"/>
-          </a:lnRef>
-          <a:fillRef idx="0">
-            <a:schemeClr val="accent1"/>
-          </a:fillRef>
-          <a:effectRef idx="1">
-            <a:schemeClr val="accent1"/>
-          </a:effectRef>
-          <a:fontRef idx="minor">
-            <a:schemeClr val="tx1"/>
-          </a:fontRef>
-        </p:style>
-      </p:cxnSp>
-      <p:cxnSp>
-        <p:nvCxnSpPr>
-          <p:cNvPr id="177" name="Straight Connector 176">
-            <a:extLst>
-              <a:ext uri="{FF2B5EF4-FFF2-40B4-BE49-F238E27FC236}">
-                <a16:creationId xmlns:a16="http://schemas.microsoft.com/office/drawing/2014/main" id="{E278A098-4DC1-9194-A43E-2FDA922541F6}"/>
-              </a:ext>
-            </a:extLst>
-          </p:cNvPr>
-          <p:cNvCxnSpPr>
-            <a:cxnSpLocks/>
-          </p:cNvCxnSpPr>
-          <p:nvPr/>
-        </p:nvCxnSpPr>
-        <p:spPr>
-          <a:xfrm flipV="1">
-            <a:off x="2280221" y="3454447"/>
-            <a:ext cx="947044" cy="1238"/>
-          </a:xfrm>
-          <a:prstGeom prst="line">
-            <a:avLst/>
-          </a:prstGeom>
-          <a:ln w="9525">
-            <a:solidFill>
-              <a:schemeClr val="tx1">
-                <a:lumMod val="50000"/>
-                <a:lumOff val="50000"/>
-              </a:schemeClr>
-            </a:solidFill>
-            <a:prstDash val="dash"/>
-          </a:ln>
-        </p:spPr>
-        <p:style>
-          <a:lnRef idx="2">
-            <a:schemeClr val="accent1"/>
-          </a:lnRef>
-          <a:fillRef idx="0">
-            <a:schemeClr val="accent1"/>
-          </a:fillRef>
-          <a:effectRef idx="1">
-            <a:schemeClr val="accent1"/>
-          </a:effectRef>
-          <a:fontRef idx="minor">
-            <a:schemeClr val="tx1"/>
-          </a:fontRef>
-        </p:style>
-      </p:cxnSp>
-      <p:cxnSp>
-        <p:nvCxnSpPr>
-          <p:cNvPr id="178" name="Straight Connector 177">
-            <a:extLst>
-              <a:ext uri="{FF2B5EF4-FFF2-40B4-BE49-F238E27FC236}">
-                <a16:creationId xmlns:a16="http://schemas.microsoft.com/office/drawing/2014/main" id="{B1DD1F03-A5DE-B5B4-998E-5B323E581E66}"/>
-              </a:ext>
-            </a:extLst>
-          </p:cNvPr>
-          <p:cNvCxnSpPr>
-            <a:cxnSpLocks/>
-          </p:cNvCxnSpPr>
-          <p:nvPr/>
-        </p:nvCxnSpPr>
-        <p:spPr>
-          <a:xfrm>
-            <a:off x="3227265" y="3303529"/>
-            <a:ext cx="0" cy="150918"/>
-          </a:xfrm>
-          <a:prstGeom prst="line">
-            <a:avLst/>
-          </a:prstGeom>
-          <a:ln w="9525">
-            <a:solidFill>
-              <a:schemeClr val="tx1">
-                <a:lumMod val="50000"/>
-                <a:lumOff val="50000"/>
-              </a:schemeClr>
-            </a:solidFill>
-            <a:prstDash val="dash"/>
-            <a:headEnd type="triangle" w="sm" len="sm"/>
-            <a:tailEnd type="none" w="med" len="med"/>
-          </a:ln>
-        </p:spPr>
-        <p:style>
-          <a:lnRef idx="2">
-            <a:schemeClr val="accent1"/>
-          </a:lnRef>
-          <a:fillRef idx="0">
-            <a:schemeClr val="accent1"/>
-          </a:fillRef>
-          <a:effectRef idx="1">
-            <a:schemeClr val="accent1"/>
-          </a:effectRef>
-          <a:fontRef idx="minor">
-            <a:schemeClr val="tx1"/>
-          </a:fontRef>
-        </p:style>
-      </p:cxnSp>
       <p:sp>
         <p:nvSpPr>
-          <p:cNvPr id="179" name="TextBox 178">
+          <p:cNvPr id="16" name="TextBox 15">
             <a:extLst>
               <a:ext uri="{FF2B5EF4-FFF2-40B4-BE49-F238E27FC236}">
                 <a16:creationId xmlns:a16="http://schemas.microsoft.com/office/drawing/2014/main" id="{2CE8AC50-A4E3-9DB6-F606-EB886BE8550D}"/>
@@ -9140,8 +9127,8 @@
         </p:nvSpPr>
         <p:spPr>
           <a:xfrm>
-            <a:off x="218756" y="1038538"/>
-            <a:ext cx="1106260" cy="954107"/>
+            <a:off x="259371" y="1121974"/>
+            <a:ext cx="1260000" cy="954107"/>
           </a:xfrm>
           <a:prstGeom prst="rect">
             <a:avLst/>
@@ -9163,78 +9150,14 @@
                 <a:latin typeface="Calibri" panose="020F0502020204030204" pitchFamily="34" charset="0"/>
                 <a:cs typeface="Calibri" panose="020F0502020204030204" pitchFamily="34" charset="0"/>
               </a:rPr>
-              <a:t>Can post-processed global NWP rainfall forecasts successfully identify areas at risk of flash floods up to medium-range lead times? </a:t>
+              <a:t>Development of a flash-flood-focused verification framework that compares predictions of areas at risk of flash flood against flash flood impact reports. </a:t>
             </a:r>
           </a:p>
         </p:txBody>
       </p:sp>
       <p:sp>
         <p:nvSpPr>
-          <p:cNvPr id="180" name="Rectangle 179">
-            <a:extLst>
-              <a:ext uri="{FF2B5EF4-FFF2-40B4-BE49-F238E27FC236}">
-                <a16:creationId xmlns:a16="http://schemas.microsoft.com/office/drawing/2014/main" id="{8BF45082-5DBA-2BDA-6B3B-1CE304EDBB0F}"/>
-              </a:ext>
-            </a:extLst>
-          </p:cNvPr>
-          <p:cNvSpPr/>
-          <p:nvPr/>
-        </p:nvSpPr>
-        <p:spPr>
-          <a:xfrm>
-            <a:off x="79300" y="974072"/>
-            <a:ext cx="198000" cy="1075908"/>
-          </a:xfrm>
-          <a:prstGeom prst="rect">
-            <a:avLst/>
-          </a:prstGeom>
-          <a:solidFill>
-            <a:srgbClr val="FF595E"/>
-          </a:solidFill>
-          <a:ln>
-            <a:noFill/>
-          </a:ln>
-        </p:spPr>
-        <p:style>
-          <a:lnRef idx="2">
-            <a:schemeClr val="accent1">
-              <a:shade val="15000"/>
-            </a:schemeClr>
-          </a:lnRef>
-          <a:fillRef idx="1">
-            <a:schemeClr val="accent1"/>
-          </a:fillRef>
-          <a:effectRef idx="0">
-            <a:schemeClr val="accent1"/>
-          </a:effectRef>
-          <a:fontRef idx="minor">
-            <a:schemeClr val="lt1"/>
-          </a:fontRef>
-        </p:style>
-        <p:txBody>
-          <a:bodyPr vert="vert270" rtlCol="0" anchor="ctr"/>
-          <a:lstStyle/>
-          <a:p>
-            <a:pPr algn="ctr"/>
-            <a:r>
-              <a:rPr lang="en-US" sz="800" dirty="0">
-                <a:solidFill>
-                  <a:schemeClr val="bg1"/>
-                </a:solidFill>
-              </a:rPr>
-              <a:t>Research Question 1</a:t>
-            </a:r>
-            <a:endParaRPr lang="en-GB" sz="800" dirty="0">
-              <a:solidFill>
-                <a:schemeClr val="bg1"/>
-              </a:solidFill>
-            </a:endParaRPr>
-          </a:p>
-        </p:txBody>
-      </p:sp>
-      <p:sp>
-        <p:nvSpPr>
-          <p:cNvPr id="181" name="Rectangle 180">
+          <p:cNvPr id="17" name="Rectangle 16">
             <a:extLst>
               <a:ext uri="{FF2B5EF4-FFF2-40B4-BE49-F238E27FC236}">
                 <a16:creationId xmlns:a16="http://schemas.microsoft.com/office/drawing/2014/main" id="{DC34E010-EA2E-EFF4-B042-AAD8E29801DE}"/>
@@ -9246,8 +9169,8 @@
         </p:nvSpPr>
         <p:spPr>
           <a:xfrm>
-            <a:off x="79300" y="972661"/>
-            <a:ext cx="1224000" cy="1071000"/>
+            <a:off x="227793" y="951991"/>
+            <a:ext cx="1260000" cy="1260000"/>
           </a:xfrm>
           <a:prstGeom prst="rect">
             <a:avLst/>
@@ -9296,259 +9219,7 @@
       </p:sp>
       <p:sp>
         <p:nvSpPr>
-          <p:cNvPr id="182" name="Rectangle 181">
-            <a:extLst>
-              <a:ext uri="{FF2B5EF4-FFF2-40B4-BE49-F238E27FC236}">
-                <a16:creationId xmlns:a16="http://schemas.microsoft.com/office/drawing/2014/main" id="{E596FB15-C5C4-A883-D8B1-8941F744109D}"/>
-              </a:ext>
-            </a:extLst>
-          </p:cNvPr>
-          <p:cNvSpPr/>
-          <p:nvPr/>
-        </p:nvSpPr>
-        <p:spPr>
-          <a:xfrm>
-            <a:off x="79300" y="2054767"/>
-            <a:ext cx="198000" cy="1251853"/>
-          </a:xfrm>
-          <a:prstGeom prst="rect">
-            <a:avLst/>
-          </a:prstGeom>
-          <a:solidFill>
-            <a:srgbClr val="FF595E"/>
-          </a:solidFill>
-          <a:ln>
-            <a:noFill/>
-          </a:ln>
-        </p:spPr>
-        <p:style>
-          <a:lnRef idx="2">
-            <a:schemeClr val="accent1">
-              <a:shade val="15000"/>
-            </a:schemeClr>
-          </a:lnRef>
-          <a:fillRef idx="1">
-            <a:schemeClr val="accent1"/>
-          </a:fillRef>
-          <a:effectRef idx="0">
-            <a:schemeClr val="accent1"/>
-          </a:effectRef>
-          <a:fontRef idx="minor">
-            <a:schemeClr val="lt1"/>
-          </a:fontRef>
-        </p:style>
-        <p:txBody>
-          <a:bodyPr vert="vert270" rtlCol="0" anchor="ctr"/>
-          <a:lstStyle/>
-          <a:p>
-            <a:pPr algn="ctr"/>
-            <a:r>
-              <a:rPr lang="en-US" sz="800" dirty="0">
-                <a:solidFill>
-                  <a:schemeClr val="bg1"/>
-                </a:solidFill>
-              </a:rPr>
-              <a:t>Contribution to knowledge</a:t>
-            </a:r>
-            <a:endParaRPr lang="en-GB" sz="800" dirty="0">
-              <a:solidFill>
-                <a:schemeClr val="bg1"/>
-              </a:solidFill>
-            </a:endParaRPr>
-          </a:p>
-        </p:txBody>
-      </p:sp>
-      <p:sp>
-        <p:nvSpPr>
-          <p:cNvPr id="183" name="Rectangle 182">
-            <a:extLst>
-              <a:ext uri="{FF2B5EF4-FFF2-40B4-BE49-F238E27FC236}">
-                <a16:creationId xmlns:a16="http://schemas.microsoft.com/office/drawing/2014/main" id="{942EDCB3-530B-AEEA-AFDB-D0EC689D20F0}"/>
-              </a:ext>
-            </a:extLst>
-          </p:cNvPr>
-          <p:cNvSpPr/>
-          <p:nvPr/>
-        </p:nvSpPr>
-        <p:spPr>
-          <a:xfrm>
-            <a:off x="79300" y="2044515"/>
-            <a:ext cx="1224000" cy="1253267"/>
-          </a:xfrm>
-          <a:prstGeom prst="rect">
-            <a:avLst/>
-          </a:prstGeom>
-          <a:noFill/>
-          <a:ln w="28575">
-            <a:solidFill>
-              <a:srgbClr val="FF595E"/>
-            </a:solidFill>
-            <a:prstDash val="solid"/>
-          </a:ln>
-        </p:spPr>
-        <p:style>
-          <a:lnRef idx="2">
-            <a:schemeClr val="accent1">
-              <a:shade val="15000"/>
-            </a:schemeClr>
-          </a:lnRef>
-          <a:fillRef idx="1">
-            <a:schemeClr val="accent1"/>
-          </a:fillRef>
-          <a:effectRef idx="0">
-            <a:schemeClr val="accent1"/>
-          </a:effectRef>
-          <a:fontRef idx="minor">
-            <a:schemeClr val="lt1"/>
-          </a:fontRef>
-        </p:style>
-        <p:txBody>
-          <a:bodyPr rtlCol="0" anchor="ctr"/>
-          <a:lstStyle/>
-          <a:p>
-            <a:pPr algn="ctr"/>
-            <a:endParaRPr lang="en-GB" sz="1000">
-              <a:solidFill>
-                <a:schemeClr val="tx1">
-                  <a:lumMod val="75000"/>
-                  <a:lumOff val="25000"/>
-                </a:schemeClr>
-              </a:solidFill>
-              <a:latin typeface="Calibri Light" panose="020F0302020204030204" pitchFamily="34" charset="0"/>
-              <a:cs typeface="Calibri Light" panose="020F0302020204030204" pitchFamily="34" charset="0"/>
-            </a:endParaRPr>
-          </a:p>
-        </p:txBody>
-      </p:sp>
-      <p:sp>
-        <p:nvSpPr>
-          <p:cNvPr id="184" name="TextBox 183">
-            <a:extLst>
-              <a:ext uri="{FF2B5EF4-FFF2-40B4-BE49-F238E27FC236}">
-                <a16:creationId xmlns:a16="http://schemas.microsoft.com/office/drawing/2014/main" id="{09AA91AB-0F00-9123-C1B1-2024DAA6ECFC}"/>
-              </a:ext>
-            </a:extLst>
-          </p:cNvPr>
-          <p:cNvSpPr txBox="1"/>
-          <p:nvPr/>
-        </p:nvSpPr>
-        <p:spPr>
-          <a:xfrm>
-            <a:off x="191017" y="2013881"/>
-            <a:ext cx="1188918" cy="1323439"/>
-          </a:xfrm>
-          <a:prstGeom prst="rect">
-            <a:avLst/>
-          </a:prstGeom>
-          <a:noFill/>
-        </p:spPr>
-        <p:txBody>
-          <a:bodyPr wrap="square" rtlCol="0">
-            <a:spAutoFit/>
-          </a:bodyPr>
-          <a:lstStyle/>
-          <a:p>
-            <a:pPr algn="ctr"/>
-            <a:r>
-              <a:rPr lang="en-US" sz="800" dirty="0">
-                <a:solidFill>
-                  <a:srgbClr val="FF595E"/>
-                </a:solidFill>
-                <a:latin typeface="Calibri" panose="020F0502020204030204" pitchFamily="34" charset="0"/>
-                <a:cs typeface="Calibri" panose="020F0502020204030204" pitchFamily="34" charset="0"/>
-              </a:rPr>
-              <a:t>Development of a </a:t>
-            </a:r>
-          </a:p>
-          <a:p>
-            <a:pPr algn="ctr"/>
-            <a:r>
-              <a:rPr lang="en-US" sz="800" dirty="0">
-                <a:solidFill>
-                  <a:srgbClr val="FF595E"/>
-                </a:solidFill>
-                <a:latin typeface="Calibri" panose="020F0502020204030204" pitchFamily="34" charset="0"/>
-                <a:cs typeface="Calibri" panose="020F0502020204030204" pitchFamily="34" charset="0"/>
-              </a:rPr>
-              <a:t>flash-flood-focused verification framework &amp; benchmark rainfall-based predictions performance for comparative assessment against more sophisticated predictions.</a:t>
-            </a:r>
-            <a:endParaRPr lang="en-GB" sz="800" dirty="0">
-              <a:solidFill>
-                <a:srgbClr val="FF595E"/>
-              </a:solidFill>
-              <a:latin typeface="Calibri" panose="020F0502020204030204" pitchFamily="34" charset="0"/>
-              <a:cs typeface="Calibri" panose="020F0502020204030204" pitchFamily="34" charset="0"/>
-            </a:endParaRPr>
-          </a:p>
-        </p:txBody>
-      </p:sp>
-      <p:sp>
-        <p:nvSpPr>
-          <p:cNvPr id="185" name="Rectangle 184">
-            <a:extLst>
-              <a:ext uri="{FF2B5EF4-FFF2-40B4-BE49-F238E27FC236}">
-                <a16:creationId xmlns:a16="http://schemas.microsoft.com/office/drawing/2014/main" id="{BD607AC0-72FD-2A38-E500-5793D9FCFE8C}"/>
-              </a:ext>
-            </a:extLst>
-          </p:cNvPr>
-          <p:cNvSpPr/>
-          <p:nvPr/>
-        </p:nvSpPr>
-        <p:spPr>
-          <a:xfrm>
-            <a:off x="1450393" y="974072"/>
-            <a:ext cx="198000" cy="1075908"/>
-          </a:xfrm>
-          <a:prstGeom prst="rect">
-            <a:avLst/>
-          </a:prstGeom>
-          <a:solidFill>
-            <a:srgbClr val="E68301"/>
-          </a:solidFill>
-          <a:ln>
-            <a:noFill/>
-          </a:ln>
-        </p:spPr>
-        <p:style>
-          <a:lnRef idx="2">
-            <a:schemeClr val="accent1">
-              <a:shade val="15000"/>
-            </a:schemeClr>
-          </a:lnRef>
-          <a:fillRef idx="1">
-            <a:schemeClr val="accent1"/>
-          </a:fillRef>
-          <a:effectRef idx="0">
-            <a:schemeClr val="accent1"/>
-          </a:effectRef>
-          <a:fontRef idx="minor">
-            <a:schemeClr val="lt1"/>
-          </a:fontRef>
-        </p:style>
-        <p:txBody>
-          <a:bodyPr vert="vert270" rtlCol="0" anchor="ctr"/>
-          <a:lstStyle/>
-          <a:p>
-            <a:pPr algn="ctr"/>
-            <a:r>
-              <a:rPr lang="en-US" sz="800" dirty="0">
-                <a:solidFill>
-                  <a:schemeClr val="bg1"/>
-                </a:solidFill>
-              </a:rPr>
-              <a:t>Research Question 2</a:t>
-            </a:r>
-            <a:endParaRPr lang="en-GB" sz="800" dirty="0">
-              <a:solidFill>
-                <a:schemeClr val="bg1"/>
-              </a:solidFill>
-            </a:endParaRPr>
-          </a:p>
-        </p:txBody>
-      </p:sp>
-      <p:sp>
-        <p:nvSpPr>
-          <p:cNvPr id="186" name="Rectangle 185">
+          <p:cNvPr id="18" name="Rectangle 17">
             <a:extLst>
               <a:ext uri="{FF2B5EF4-FFF2-40B4-BE49-F238E27FC236}">
                 <a16:creationId xmlns:a16="http://schemas.microsoft.com/office/drawing/2014/main" id="{A443D769-35EA-ACBB-55BC-2A7FE9B1D174}"/>
@@ -9560,8 +9231,8 @@
         </p:nvSpPr>
         <p:spPr>
           <a:xfrm>
-            <a:off x="1450393" y="972661"/>
-            <a:ext cx="1224000" cy="1071000"/>
+            <a:off x="1540269" y="951991"/>
+            <a:ext cx="1260000" cy="1260000"/>
           </a:xfrm>
           <a:prstGeom prst="rect">
             <a:avLst/>
@@ -9610,72 +9281,10 @@
       </p:sp>
       <p:sp>
         <p:nvSpPr>
-          <p:cNvPr id="187" name="Rectangle 186">
+          <p:cNvPr id="19" name="TextBox 18">
             <a:extLst>
               <a:ext uri="{FF2B5EF4-FFF2-40B4-BE49-F238E27FC236}">
-                <a16:creationId xmlns:a16="http://schemas.microsoft.com/office/drawing/2014/main" id="{ADA3DE8D-1806-5542-AE87-86B40C29C4B6}"/>
-              </a:ext>
-            </a:extLst>
-          </p:cNvPr>
-          <p:cNvSpPr/>
-          <p:nvPr/>
-        </p:nvSpPr>
-        <p:spPr>
-          <a:xfrm>
-            <a:off x="1450393" y="2044515"/>
-            <a:ext cx="1224000" cy="1253524"/>
-          </a:xfrm>
-          <a:prstGeom prst="rect">
-            <a:avLst/>
-          </a:prstGeom>
-          <a:noFill/>
-          <a:ln w="28575">
-            <a:solidFill>
-              <a:srgbClr val="E68301"/>
-            </a:solidFill>
-            <a:prstDash val="solid"/>
-          </a:ln>
-        </p:spPr>
-        <p:style>
-          <a:lnRef idx="2">
-            <a:schemeClr val="accent1">
-              <a:shade val="15000"/>
-            </a:schemeClr>
-          </a:lnRef>
-          <a:fillRef idx="1">
-            <a:schemeClr val="accent1"/>
-          </a:fillRef>
-          <a:effectRef idx="0">
-            <a:schemeClr val="accent1"/>
-          </a:effectRef>
-          <a:fontRef idx="minor">
-            <a:schemeClr val="lt1"/>
-          </a:fontRef>
-        </p:style>
-        <p:txBody>
-          <a:bodyPr rtlCol="0" anchor="ctr"/>
-          <a:lstStyle/>
-          <a:p>
-            <a:pPr algn="ctr"/>
-            <a:endParaRPr lang="en-GB" sz="1000">
-              <a:solidFill>
-                <a:schemeClr val="tx1">
-                  <a:lumMod val="75000"/>
-                  <a:lumOff val="25000"/>
-                </a:schemeClr>
-              </a:solidFill>
-              <a:latin typeface="Calibri Light" panose="020F0302020204030204" pitchFamily="34" charset="0"/>
-              <a:cs typeface="Calibri Light" panose="020F0302020204030204" pitchFamily="34" charset="0"/>
-            </a:endParaRPr>
-          </a:p>
-        </p:txBody>
-      </p:sp>
-      <p:sp>
-        <p:nvSpPr>
-          <p:cNvPr id="188" name="TextBox 187">
-            <a:extLst>
-              <a:ext uri="{FF2B5EF4-FFF2-40B4-BE49-F238E27FC236}">
-                <a16:creationId xmlns:a16="http://schemas.microsoft.com/office/drawing/2014/main" id="{1E801C4A-0276-1937-0649-23B933A9FD4C}"/>
+                <a16:creationId xmlns:a16="http://schemas.microsoft.com/office/drawing/2014/main" id="{6541EEEE-3369-14C3-9119-24FBFEC538F6}"/>
               </a:ext>
             </a:extLst>
           </p:cNvPr>
@@ -9684,8 +9293,8 @@
         </p:nvSpPr>
         <p:spPr>
           <a:xfrm>
-            <a:off x="1549393" y="2013881"/>
-            <a:ext cx="1209121" cy="1323439"/>
+            <a:off x="1502300" y="981827"/>
+            <a:ext cx="1332407" cy="1200329"/>
           </a:xfrm>
           <a:prstGeom prst="rect">
             <a:avLst/>
@@ -9707,7 +9316,7 @@
                 <a:latin typeface="Calibri" panose="020F0502020204030204" pitchFamily="34" charset="0"/>
                 <a:cs typeface="Calibri" panose="020F0502020204030204" pitchFamily="34" charset="0"/>
               </a:rPr>
-              <a:t>Establishment of feasibility/predictability of medium-range data-driven prediction of areas at risk of flash floods &amp; comparative performance assessment against rainfall-based predictions.</a:t>
+              <a:t>Development of data-driven models that integrate hydro-met variables from global reanalysis and forecasts, and flash flood impact reports to predict areas at risk of flash flood up to medium-range lead times.</a:t>
             </a:r>
             <a:endParaRPr lang="en-GB" sz="800" dirty="0">
               <a:solidFill>
@@ -9721,56 +9330,7 @@
       </p:sp>
       <p:sp>
         <p:nvSpPr>
-          <p:cNvPr id="189" name="TextBox 188">
-            <a:extLst>
-              <a:ext uri="{FF2B5EF4-FFF2-40B4-BE49-F238E27FC236}">
-                <a16:creationId xmlns:a16="http://schemas.microsoft.com/office/drawing/2014/main" id="{6541EEEE-3369-14C3-9119-24FBFEC538F6}"/>
-              </a:ext>
-            </a:extLst>
-          </p:cNvPr>
-          <p:cNvSpPr txBox="1"/>
-          <p:nvPr/>
-        </p:nvSpPr>
-        <p:spPr>
-          <a:xfrm>
-            <a:off x="1567992" y="976982"/>
-            <a:ext cx="1164772" cy="1077218"/>
-          </a:xfrm>
-          <a:prstGeom prst="rect">
-            <a:avLst/>
-          </a:prstGeom>
-          <a:noFill/>
-        </p:spPr>
-        <p:txBody>
-          <a:bodyPr wrap="square" rtlCol="0">
-            <a:spAutoFit/>
-          </a:bodyPr>
-          <a:lstStyle/>
-          <a:p>
-            <a:pPr algn="ctr"/>
-            <a:r>
-              <a:rPr lang="en-US" sz="800" dirty="0">
-                <a:solidFill>
-                  <a:srgbClr val="E68301"/>
-                </a:solidFill>
-                <a:latin typeface="Calibri" panose="020F0502020204030204" pitchFamily="34" charset="0"/>
-                <a:cs typeface="Calibri" panose="020F0502020204030204" pitchFamily="34" charset="0"/>
-              </a:rPr>
-              <a:t>Are medium-range data-driven hydro-met predictions of areas at risk of flash floods feasible with global reanalysis, forecasts, and impact flash flood reports?</a:t>
-            </a:r>
-            <a:endParaRPr lang="en-GB" sz="800" dirty="0">
-              <a:solidFill>
-                <a:srgbClr val="E68301"/>
-              </a:solidFill>
-              <a:latin typeface="Calibri" panose="020F0502020204030204" pitchFamily="34" charset="0"/>
-              <a:cs typeface="Calibri" panose="020F0502020204030204" pitchFamily="34" charset="0"/>
-            </a:endParaRPr>
-          </a:p>
-        </p:txBody>
-      </p:sp>
-      <p:sp>
-        <p:nvSpPr>
-          <p:cNvPr id="190" name="Rectangle 189">
+          <p:cNvPr id="20" name="Rectangle 19">
             <a:extLst>
               <a:ext uri="{FF2B5EF4-FFF2-40B4-BE49-F238E27FC236}">
                 <a16:creationId xmlns:a16="http://schemas.microsoft.com/office/drawing/2014/main" id="{A668C935-54EA-6F8F-0BB1-E7014CC096D7}"/>
@@ -9782,8 +9342,8 @@
         </p:nvSpPr>
         <p:spPr>
           <a:xfrm>
-            <a:off x="2821485" y="972661"/>
-            <a:ext cx="1224000" cy="1071000"/>
+            <a:off x="2852745" y="951991"/>
+            <a:ext cx="1260000" cy="1260000"/>
           </a:xfrm>
           <a:prstGeom prst="rect">
             <a:avLst/>
@@ -9832,69 +9392,7 @@
       </p:sp>
       <p:sp>
         <p:nvSpPr>
-          <p:cNvPr id="191" name="Rectangle 190">
-            <a:extLst>
-              <a:ext uri="{FF2B5EF4-FFF2-40B4-BE49-F238E27FC236}">
-                <a16:creationId xmlns:a16="http://schemas.microsoft.com/office/drawing/2014/main" id="{7E97B7E9-5251-BE9A-AE14-9D7F6768E5D3}"/>
-              </a:ext>
-            </a:extLst>
-          </p:cNvPr>
-          <p:cNvSpPr/>
-          <p:nvPr/>
-        </p:nvSpPr>
-        <p:spPr>
-          <a:xfrm>
-            <a:off x="2821485" y="2044515"/>
-            <a:ext cx="1224000" cy="1253263"/>
-          </a:xfrm>
-          <a:prstGeom prst="rect">
-            <a:avLst/>
-          </a:prstGeom>
-          <a:noFill/>
-          <a:ln w="28575">
-            <a:solidFill>
-              <a:srgbClr val="3F37C9"/>
-            </a:solidFill>
-            <a:prstDash val="solid"/>
-          </a:ln>
-        </p:spPr>
-        <p:style>
-          <a:lnRef idx="2">
-            <a:schemeClr val="accent1">
-              <a:shade val="15000"/>
-            </a:schemeClr>
-          </a:lnRef>
-          <a:fillRef idx="1">
-            <a:schemeClr val="accent1"/>
-          </a:fillRef>
-          <a:effectRef idx="0">
-            <a:schemeClr val="accent1"/>
-          </a:effectRef>
-          <a:fontRef idx="minor">
-            <a:schemeClr val="lt1"/>
-          </a:fontRef>
-        </p:style>
-        <p:txBody>
-          <a:bodyPr rtlCol="0" anchor="ctr"/>
-          <a:lstStyle/>
-          <a:p>
-            <a:pPr algn="ctr"/>
-            <a:endParaRPr lang="en-GB" sz="1000">
-              <a:solidFill>
-                <a:schemeClr val="tx1">
-                  <a:lumMod val="75000"/>
-                  <a:lumOff val="25000"/>
-                </a:schemeClr>
-              </a:solidFill>
-              <a:latin typeface="Calibri Light" panose="020F0302020204030204" pitchFamily="34" charset="0"/>
-              <a:cs typeface="Calibri Light" panose="020F0302020204030204" pitchFamily="34" charset="0"/>
-            </a:endParaRPr>
-          </a:p>
-        </p:txBody>
-      </p:sp>
-      <p:sp>
-        <p:nvSpPr>
-          <p:cNvPr id="192" name="TextBox 191">
+          <p:cNvPr id="21" name="TextBox 20">
             <a:extLst>
               <a:ext uri="{FF2B5EF4-FFF2-40B4-BE49-F238E27FC236}">
                 <a16:creationId xmlns:a16="http://schemas.microsoft.com/office/drawing/2014/main" id="{DEEE2271-5967-5ABD-F72A-2D4C2F26C2AA}"/>
@@ -9906,8 +9404,8 @@
         </p:nvSpPr>
         <p:spPr>
           <a:xfrm>
-            <a:off x="2945613" y="976982"/>
-            <a:ext cx="1153410" cy="1077218"/>
+            <a:off x="2803065" y="981827"/>
+            <a:ext cx="1362155" cy="1200329"/>
           </a:xfrm>
           <a:prstGeom prst="rect">
             <a:avLst/>
@@ -9929,7 +9427,7 @@
                 <a:latin typeface="Calibri" panose="020F0502020204030204" pitchFamily="34" charset="0"/>
                 <a:cs typeface="Calibri" panose="020F0502020204030204" pitchFamily="34" charset="0"/>
               </a:rPr>
-              <a:t>How does coverage-density trade-off influence training data strategies to develop predictions of areas at risk of flash flood over a continuous global domain?</a:t>
+              <a:t>Assessment - through a systematic empirical sensitivity analysis - of how coverage-density trade-offs may influence training data strategies when creating global predictions with regionally-trained data-driven models.  </a:t>
             </a:r>
             <a:endParaRPr lang="en-GB" sz="800" dirty="0">
               <a:solidFill>
@@ -9943,377 +9441,7 @@
       </p:sp>
       <p:sp>
         <p:nvSpPr>
-          <p:cNvPr id="193" name="TextBox 192">
-            <a:extLst>
-              <a:ext uri="{FF2B5EF4-FFF2-40B4-BE49-F238E27FC236}">
-                <a16:creationId xmlns:a16="http://schemas.microsoft.com/office/drawing/2014/main" id="{3686655B-80AB-878D-8415-307EA53EFB5C}"/>
-              </a:ext>
-            </a:extLst>
-          </p:cNvPr>
-          <p:cNvSpPr txBox="1"/>
-          <p:nvPr/>
-        </p:nvSpPr>
-        <p:spPr>
-          <a:xfrm>
-            <a:off x="2948744" y="2013881"/>
-            <a:ext cx="1153410" cy="1323439"/>
-          </a:xfrm>
-          <a:prstGeom prst="rect">
-            <a:avLst/>
-          </a:prstGeom>
-          <a:noFill/>
-        </p:spPr>
-        <p:txBody>
-          <a:bodyPr wrap="square" rtlCol="0">
-            <a:spAutoFit/>
-          </a:bodyPr>
-          <a:lstStyle/>
-          <a:p>
-            <a:pPr algn="ctr"/>
-            <a:r>
-              <a:rPr lang="en-US" sz="800" dirty="0">
-                <a:solidFill>
-                  <a:srgbClr val="3F37C9"/>
-                </a:solidFill>
-                <a:latin typeface="Calibri" panose="020F0502020204030204" pitchFamily="34" charset="0"/>
-                <a:cs typeface="Calibri" panose="020F0502020204030204" pitchFamily="34" charset="0"/>
-              </a:rPr>
-              <a:t>Systematic empirical sensitivity analysis of training data strategies for global predictions of areas at risk of flash floods under coverage-density trade-off &amp; predictions assessment outside the training domain.</a:t>
-            </a:r>
-            <a:endParaRPr lang="en-GB" sz="800" dirty="0">
-              <a:solidFill>
-                <a:srgbClr val="3F37C9"/>
-              </a:solidFill>
-              <a:latin typeface="Calibri" panose="020F0502020204030204" pitchFamily="34" charset="0"/>
-              <a:cs typeface="Calibri" panose="020F0502020204030204" pitchFamily="34" charset="0"/>
-            </a:endParaRPr>
-          </a:p>
-        </p:txBody>
-      </p:sp>
-      <p:sp>
-        <p:nvSpPr>
-          <p:cNvPr id="194" name="Rectangle 193">
-            <a:extLst>
-              <a:ext uri="{FF2B5EF4-FFF2-40B4-BE49-F238E27FC236}">
-                <a16:creationId xmlns:a16="http://schemas.microsoft.com/office/drawing/2014/main" id="{A0097D71-B402-A483-CFFA-F86F3C56053E}"/>
-              </a:ext>
-            </a:extLst>
-          </p:cNvPr>
-          <p:cNvSpPr/>
-          <p:nvPr/>
-        </p:nvSpPr>
-        <p:spPr>
-          <a:xfrm>
-            <a:off x="2821485" y="978645"/>
-            <a:ext cx="198000" cy="1075908"/>
-          </a:xfrm>
-          <a:prstGeom prst="rect">
-            <a:avLst/>
-          </a:prstGeom>
-          <a:solidFill>
-            <a:srgbClr val="3F37C9"/>
-          </a:solidFill>
-          <a:ln>
-            <a:noFill/>
-          </a:ln>
-        </p:spPr>
-        <p:style>
-          <a:lnRef idx="2">
-            <a:schemeClr val="accent1">
-              <a:shade val="15000"/>
-            </a:schemeClr>
-          </a:lnRef>
-          <a:fillRef idx="1">
-            <a:schemeClr val="accent1"/>
-          </a:fillRef>
-          <a:effectRef idx="0">
-            <a:schemeClr val="accent1"/>
-          </a:effectRef>
-          <a:fontRef idx="minor">
-            <a:schemeClr val="lt1"/>
-          </a:fontRef>
-        </p:style>
-        <p:txBody>
-          <a:bodyPr vert="vert270" rtlCol="0" anchor="ctr"/>
-          <a:lstStyle/>
-          <a:p>
-            <a:pPr algn="ctr"/>
-            <a:r>
-              <a:rPr lang="en-US" sz="800" dirty="0">
-                <a:solidFill>
-                  <a:schemeClr val="bg1"/>
-                </a:solidFill>
-              </a:rPr>
-              <a:t>Research Question 3</a:t>
-            </a:r>
-            <a:endParaRPr lang="en-GB" sz="800" dirty="0">
-              <a:solidFill>
-                <a:schemeClr val="bg1"/>
-              </a:solidFill>
-            </a:endParaRPr>
-          </a:p>
-        </p:txBody>
-      </p:sp>
-      <p:sp>
-        <p:nvSpPr>
-          <p:cNvPr id="195" name="Rectangle 194">
-            <a:extLst>
-              <a:ext uri="{FF2B5EF4-FFF2-40B4-BE49-F238E27FC236}">
-                <a16:creationId xmlns:a16="http://schemas.microsoft.com/office/drawing/2014/main" id="{AC12668F-DD4B-D648-D773-7F3063B04CBF}"/>
-              </a:ext>
-            </a:extLst>
-          </p:cNvPr>
-          <p:cNvSpPr/>
-          <p:nvPr/>
-        </p:nvSpPr>
-        <p:spPr>
-          <a:xfrm>
-            <a:off x="1450393" y="2059107"/>
-            <a:ext cx="198000" cy="1251853"/>
-          </a:xfrm>
-          <a:prstGeom prst="rect">
-            <a:avLst/>
-          </a:prstGeom>
-          <a:solidFill>
-            <a:srgbClr val="E68301"/>
-          </a:solidFill>
-          <a:ln>
-            <a:noFill/>
-          </a:ln>
-        </p:spPr>
-        <p:style>
-          <a:lnRef idx="2">
-            <a:schemeClr val="accent1">
-              <a:shade val="15000"/>
-            </a:schemeClr>
-          </a:lnRef>
-          <a:fillRef idx="1">
-            <a:schemeClr val="accent1"/>
-          </a:fillRef>
-          <a:effectRef idx="0">
-            <a:schemeClr val="accent1"/>
-          </a:effectRef>
-          <a:fontRef idx="minor">
-            <a:schemeClr val="lt1"/>
-          </a:fontRef>
-        </p:style>
-        <p:txBody>
-          <a:bodyPr vert="vert270" rtlCol="0" anchor="ctr"/>
-          <a:lstStyle/>
-          <a:p>
-            <a:pPr algn="ctr"/>
-            <a:r>
-              <a:rPr lang="en-US" sz="800" dirty="0">
-                <a:solidFill>
-                  <a:schemeClr val="bg1"/>
-                </a:solidFill>
-              </a:rPr>
-              <a:t>Contribution to knowledge</a:t>
-            </a:r>
-            <a:endParaRPr lang="en-GB" sz="800" dirty="0">
-              <a:solidFill>
-                <a:schemeClr val="bg1"/>
-              </a:solidFill>
-            </a:endParaRPr>
-          </a:p>
-        </p:txBody>
-      </p:sp>
-      <p:sp>
-        <p:nvSpPr>
-          <p:cNvPr id="196" name="Rectangle 195">
-            <a:extLst>
-              <a:ext uri="{FF2B5EF4-FFF2-40B4-BE49-F238E27FC236}">
-                <a16:creationId xmlns:a16="http://schemas.microsoft.com/office/drawing/2014/main" id="{77F6A371-1CCF-3C24-C1E6-C283E45C2C4D}"/>
-              </a:ext>
-            </a:extLst>
-          </p:cNvPr>
-          <p:cNvSpPr/>
-          <p:nvPr/>
-        </p:nvSpPr>
-        <p:spPr>
-          <a:xfrm>
-            <a:off x="2821485" y="2059107"/>
-            <a:ext cx="198000" cy="1251853"/>
-          </a:xfrm>
-          <a:prstGeom prst="rect">
-            <a:avLst/>
-          </a:prstGeom>
-          <a:solidFill>
-            <a:srgbClr val="3F37C9"/>
-          </a:solidFill>
-          <a:ln>
-            <a:noFill/>
-          </a:ln>
-        </p:spPr>
-        <p:style>
-          <a:lnRef idx="2">
-            <a:schemeClr val="accent1">
-              <a:shade val="15000"/>
-            </a:schemeClr>
-          </a:lnRef>
-          <a:fillRef idx="1">
-            <a:schemeClr val="accent1"/>
-          </a:fillRef>
-          <a:effectRef idx="0">
-            <a:schemeClr val="accent1"/>
-          </a:effectRef>
-          <a:fontRef idx="minor">
-            <a:schemeClr val="lt1"/>
-          </a:fontRef>
-        </p:style>
-        <p:txBody>
-          <a:bodyPr vert="vert270" rtlCol="0" anchor="ctr"/>
-          <a:lstStyle/>
-          <a:p>
-            <a:pPr algn="ctr"/>
-            <a:r>
-              <a:rPr lang="en-US" sz="800" dirty="0">
-                <a:solidFill>
-                  <a:schemeClr val="bg1"/>
-                </a:solidFill>
-              </a:rPr>
-              <a:t>Contribution to knowledge</a:t>
-            </a:r>
-            <a:endParaRPr lang="en-GB" sz="800" dirty="0">
-              <a:solidFill>
-                <a:schemeClr val="bg1"/>
-              </a:solidFill>
-            </a:endParaRPr>
-          </a:p>
-        </p:txBody>
-      </p:sp>
-      <p:cxnSp>
-        <p:nvCxnSpPr>
-          <p:cNvPr id="197" name="Straight Connector 196">
-            <a:extLst>
-              <a:ext uri="{FF2B5EF4-FFF2-40B4-BE49-F238E27FC236}">
-                <a16:creationId xmlns:a16="http://schemas.microsoft.com/office/drawing/2014/main" id="{2B7862D4-1298-4201-3E9B-0C0AE48A6334}"/>
-              </a:ext>
-            </a:extLst>
-          </p:cNvPr>
-          <p:cNvCxnSpPr>
-            <a:cxnSpLocks/>
-          </p:cNvCxnSpPr>
-          <p:nvPr/>
-        </p:nvCxnSpPr>
-        <p:spPr>
-          <a:xfrm flipH="1">
-            <a:off x="54269" y="2043661"/>
-            <a:ext cx="216000" cy="0"/>
-          </a:xfrm>
-          <a:prstGeom prst="line">
-            <a:avLst/>
-          </a:prstGeom>
-          <a:ln w="28575">
-            <a:solidFill>
-              <a:schemeClr val="bg1"/>
-            </a:solidFill>
-          </a:ln>
-        </p:spPr>
-        <p:style>
-          <a:lnRef idx="2">
-            <a:schemeClr val="accent1"/>
-          </a:lnRef>
-          <a:fillRef idx="0">
-            <a:schemeClr val="accent1"/>
-          </a:fillRef>
-          <a:effectRef idx="1">
-            <a:schemeClr val="accent1"/>
-          </a:effectRef>
-          <a:fontRef idx="minor">
-            <a:schemeClr val="tx1"/>
-          </a:fontRef>
-        </p:style>
-      </p:cxnSp>
-      <p:cxnSp>
-        <p:nvCxnSpPr>
-          <p:cNvPr id="198" name="Straight Connector 197">
-            <a:extLst>
-              <a:ext uri="{FF2B5EF4-FFF2-40B4-BE49-F238E27FC236}">
-                <a16:creationId xmlns:a16="http://schemas.microsoft.com/office/drawing/2014/main" id="{28886F03-706D-F1B0-335A-D2C6E14F7178}"/>
-              </a:ext>
-            </a:extLst>
-          </p:cNvPr>
-          <p:cNvCxnSpPr>
-            <a:cxnSpLocks/>
-          </p:cNvCxnSpPr>
-          <p:nvPr/>
-        </p:nvCxnSpPr>
-        <p:spPr>
-          <a:xfrm flipH="1">
-            <a:off x="1431665" y="2043661"/>
-            <a:ext cx="216000" cy="0"/>
-          </a:xfrm>
-          <a:prstGeom prst="line">
-            <a:avLst/>
-          </a:prstGeom>
-          <a:ln w="28575">
-            <a:solidFill>
-              <a:schemeClr val="bg1"/>
-            </a:solidFill>
-          </a:ln>
-        </p:spPr>
-        <p:style>
-          <a:lnRef idx="2">
-            <a:schemeClr val="accent1"/>
-          </a:lnRef>
-          <a:fillRef idx="0">
-            <a:schemeClr val="accent1"/>
-          </a:fillRef>
-          <a:effectRef idx="1">
-            <a:schemeClr val="accent1"/>
-          </a:effectRef>
-          <a:fontRef idx="minor">
-            <a:schemeClr val="tx1"/>
-          </a:fontRef>
-        </p:style>
-      </p:cxnSp>
-      <p:cxnSp>
-        <p:nvCxnSpPr>
-          <p:cNvPr id="199" name="Straight Connector 198">
-            <a:extLst>
-              <a:ext uri="{FF2B5EF4-FFF2-40B4-BE49-F238E27FC236}">
-                <a16:creationId xmlns:a16="http://schemas.microsoft.com/office/drawing/2014/main" id="{37CC8F6F-2172-8D1D-B066-74AD5E0FCC53}"/>
-              </a:ext>
-            </a:extLst>
-          </p:cNvPr>
-          <p:cNvCxnSpPr>
-            <a:cxnSpLocks/>
-          </p:cNvCxnSpPr>
-          <p:nvPr/>
-        </p:nvCxnSpPr>
-        <p:spPr>
-          <a:xfrm flipH="1">
-            <a:off x="2798970" y="2043661"/>
-            <a:ext cx="216000" cy="0"/>
-          </a:xfrm>
-          <a:prstGeom prst="line">
-            <a:avLst/>
-          </a:prstGeom>
-          <a:ln w="28575">
-            <a:solidFill>
-              <a:schemeClr val="bg1"/>
-            </a:solidFill>
-          </a:ln>
-        </p:spPr>
-        <p:style>
-          <a:lnRef idx="2">
-            <a:schemeClr val="accent1"/>
-          </a:lnRef>
-          <a:fillRef idx="0">
-            <a:schemeClr val="accent1"/>
-          </a:fillRef>
-          <a:effectRef idx="1">
-            <a:schemeClr val="accent1"/>
-          </a:effectRef>
-          <a:fontRef idx="minor">
-            <a:schemeClr val="tx1"/>
-          </a:fontRef>
-        </p:style>
-      </p:cxnSp>
-      <p:sp>
-        <p:nvSpPr>
-          <p:cNvPr id="200" name="TextBox 199">
+          <p:cNvPr id="22" name="TextBox 21">
             <a:extLst>
               <a:ext uri="{FF2B5EF4-FFF2-40B4-BE49-F238E27FC236}">
                 <a16:creationId xmlns:a16="http://schemas.microsoft.com/office/drawing/2014/main" id="{BE24FD28-FAFB-884F-4CE7-E4FD5429F6E3}"/>
@@ -10325,8 +9453,8 @@
         </p:nvSpPr>
         <p:spPr>
           <a:xfrm>
-            <a:off x="172856" y="508342"/>
-            <a:ext cx="3776818" cy="215444"/>
+            <a:off x="226098" y="507321"/>
+            <a:ext cx="3884812" cy="215444"/>
           </a:xfrm>
           <a:prstGeom prst="rect">
             <a:avLst/>
@@ -10346,10 +9474,7 @@
             <a:r>
               <a:rPr lang="en-GB" sz="800" b="1" u="sng" dirty="0">
                 <a:solidFill>
-                  <a:schemeClr val="tx1">
-                    <a:lumMod val="95000"/>
-                    <a:lumOff val="5000"/>
-                  </a:schemeClr>
+                  <a:srgbClr val="222222"/>
                 </a:solidFill>
                 <a:latin typeface="Calibri" panose="020F0502020204030204" pitchFamily="34" charset="0"/>
                 <a:cs typeface="Calibri" panose="020F0502020204030204" pitchFamily="34" charset="0"/>
@@ -10359,10 +9484,7 @@
             <a:r>
               <a:rPr lang="en-GB" sz="800" dirty="0">
                 <a:solidFill>
-                  <a:schemeClr val="tx1">
-                    <a:lumMod val="95000"/>
-                    <a:lumOff val="5000"/>
-                  </a:schemeClr>
+                  <a:srgbClr val="222222"/>
                 </a:solidFill>
                 <a:latin typeface="Calibri Light" panose="020F0302020204030204" pitchFamily="34" charset="0"/>
                 <a:cs typeface="Calibri Light" panose="020F0302020204030204" pitchFamily="34" charset="0"/>
@@ -10374,7 +9496,7 @@
       </p:sp>
       <p:sp>
         <p:nvSpPr>
-          <p:cNvPr id="201" name="TextBox 200">
+          <p:cNvPr id="23" name="TextBox 22">
             <a:extLst>
               <a:ext uri="{FF2B5EF4-FFF2-40B4-BE49-F238E27FC236}">
                 <a16:creationId xmlns:a16="http://schemas.microsoft.com/office/drawing/2014/main" id="{16EB6FA0-CBE1-9983-F1CC-346BCA2848D4}"/>
@@ -10386,8 +9508,8 @@
         </p:nvSpPr>
         <p:spPr>
           <a:xfrm>
-            <a:off x="-81390" y="-77490"/>
-            <a:ext cx="4600575" cy="584775"/>
+            <a:off x="-81390" y="-78511"/>
+            <a:ext cx="4246609" cy="584775"/>
           </a:xfrm>
           <a:prstGeom prst="rect">
             <a:avLst/>
@@ -10403,10 +9525,7 @@
             <a:r>
               <a:rPr lang="en-US" sz="1200" b="1" dirty="0">
                 <a:solidFill>
-                  <a:schemeClr val="tx1">
-                    <a:lumMod val="75000"/>
-                    <a:lumOff val="25000"/>
-                  </a:schemeClr>
+                  <a:srgbClr val="222222"/>
                 </a:solidFill>
                 <a:latin typeface="Calibri" panose="020F0502020204030204" pitchFamily="34" charset="0"/>
                 <a:cs typeface="Calibri" panose="020F0502020204030204" pitchFamily="34" charset="0"/>
@@ -10418,10 +9537,7 @@
             <a:r>
               <a:rPr lang="en-US" sz="1000" u="sng" dirty="0">
                 <a:solidFill>
-                  <a:schemeClr val="tx1">
-                    <a:lumMod val="75000"/>
-                    <a:lumOff val="25000"/>
-                  </a:schemeClr>
+                  <a:srgbClr val="222222"/>
                 </a:solidFill>
                 <a:latin typeface="Calibri Light" panose="020F0302020204030204" pitchFamily="34" charset="0"/>
                 <a:cs typeface="Calibri Light" panose="020F0302020204030204" pitchFamily="34" charset="0"/>
@@ -10431,22 +9547,16 @@
             <a:r>
               <a:rPr lang="en-US" sz="1000" dirty="0">
                 <a:solidFill>
-                  <a:schemeClr val="tx1">
-                    <a:lumMod val="75000"/>
-                    <a:lumOff val="25000"/>
-                  </a:schemeClr>
+                  <a:srgbClr val="222222"/>
                 </a:solidFill>
                 <a:latin typeface="Calibri Light" panose="020F0302020204030204" pitchFamily="34" charset="0"/>
                 <a:cs typeface="Calibri Light" panose="020F0302020204030204" pitchFamily="34" charset="0"/>
               </a:rPr>
-              <a:t> underlying the research components outlined by the research questions in each main analysis chapter</a:t>
+              <a:t> underlying the research objectives presented in each main analysis chapter</a:t>
             </a:r>
             <a:endParaRPr lang="en-GB" sz="1000" dirty="0">
               <a:solidFill>
-                <a:schemeClr val="tx1">
-                  <a:lumMod val="75000"/>
-                  <a:lumOff val="25000"/>
-                </a:schemeClr>
+                <a:srgbClr val="222222"/>
               </a:solidFill>
               <a:latin typeface="Calibri Light" panose="020F0302020204030204" pitchFamily="34" charset="0"/>
               <a:cs typeface="Calibri Light" panose="020F0302020204030204" pitchFamily="34" charset="0"/>
@@ -10456,7 +9566,7 @@
       </p:sp>
       <p:sp>
         <p:nvSpPr>
-          <p:cNvPr id="202" name="Rectangle 201">
+          <p:cNvPr id="24" name="Rectangle 23">
             <a:extLst>
               <a:ext uri="{FF2B5EF4-FFF2-40B4-BE49-F238E27FC236}">
                 <a16:creationId xmlns:a16="http://schemas.microsoft.com/office/drawing/2014/main" id="{5137CFD3-310B-C4B7-5CBF-D6EBE8384DFF}"/>
@@ -10468,7 +9578,7 @@
         </p:nvSpPr>
         <p:spPr>
           <a:xfrm>
-            <a:off x="27388" y="3649228"/>
+            <a:off x="27388" y="2568336"/>
             <a:ext cx="4083522" cy="2447326"/>
           </a:xfrm>
           <a:prstGeom prst="rect">
@@ -10477,8 +9587,9 @@
           <a:noFill/>
           <a:ln w="12700">
             <a:solidFill>
-              <a:schemeClr val="bg1">
-                <a:lumMod val="85000"/>
+              <a:schemeClr val="tx1">
+                <a:lumMod val="50000"/>
+                <a:lumOff val="50000"/>
               </a:schemeClr>
             </a:solidFill>
             <a:prstDash val="lgDash"/>
@@ -10514,13 +9625,17 @@
           <a:lstStyle/>
           <a:p>
             <a:pPr algn="ctr"/>
-            <a:endParaRPr lang="en-GB"/>
+            <a:endParaRPr lang="en-GB">
+              <a:solidFill>
+                <a:srgbClr val="222222"/>
+              </a:solidFill>
+            </a:endParaRPr>
           </a:p>
         </p:txBody>
       </p:sp>
       <p:sp>
         <p:nvSpPr>
-          <p:cNvPr id="203" name="TextBox 202">
+          <p:cNvPr id="25" name="TextBox 24">
             <a:extLst>
               <a:ext uri="{FF2B5EF4-FFF2-40B4-BE49-F238E27FC236}">
                 <a16:creationId xmlns:a16="http://schemas.microsoft.com/office/drawing/2014/main" id="{9097776E-A046-4D6E-89DA-50B1F5A3FAF4}"/>
@@ -10532,8 +9647,8 @@
         </p:nvSpPr>
         <p:spPr>
           <a:xfrm>
-            <a:off x="-48406" y="3717608"/>
-            <a:ext cx="553998" cy="2309583"/>
+            <a:off x="14151" y="2651719"/>
+            <a:ext cx="369332" cy="2309583"/>
           </a:xfrm>
           <a:prstGeom prst="rect">
             <a:avLst/>
@@ -10553,38 +9668,19 @@
             <a:r>
               <a:rPr lang="en-GB" sz="1200" b="1" dirty="0">
                 <a:solidFill>
-                  <a:schemeClr val="tx1">
-                    <a:lumMod val="95000"/>
-                    <a:lumOff val="5000"/>
-                  </a:schemeClr>
+                  <a:srgbClr val="222222"/>
                 </a:solidFill>
                 <a:latin typeface="Calibri" panose="020F0502020204030204" pitchFamily="34" charset="0"/>
                 <a:cs typeface="Calibri" panose="020F0502020204030204" pitchFamily="34" charset="0"/>
               </a:rPr>
-              <a:t>METHODOLOGICAL </a:t>
-            </a:r>
-          </a:p>
-          <a:p>
-            <a:pPr algn="ctr"/>
-            <a:r>
-              <a:rPr lang="en-GB" sz="1200" b="1" dirty="0">
-                <a:solidFill>
-                  <a:schemeClr val="tx1">
-                    <a:lumMod val="95000"/>
-                    <a:lumOff val="5000"/>
-                  </a:schemeClr>
-                </a:solidFill>
-                <a:latin typeface="Calibri" panose="020F0502020204030204" pitchFamily="34" charset="0"/>
-                <a:cs typeface="Calibri" panose="020F0502020204030204" pitchFamily="34" charset="0"/>
-              </a:rPr>
-              <a:t>DECISIONS</a:t>
+              <a:t>METHODOLOGICAL DECISIONS</a:t>
             </a:r>
           </a:p>
         </p:txBody>
       </p:sp>
       <p:sp>
         <p:nvSpPr>
-          <p:cNvPr id="204" name="Rectangle 203">
+          <p:cNvPr id="26" name="Rectangle 25">
             <a:extLst>
               <a:ext uri="{FF2B5EF4-FFF2-40B4-BE49-F238E27FC236}">
                 <a16:creationId xmlns:a16="http://schemas.microsoft.com/office/drawing/2014/main" id="{1402EF05-0A8D-81FE-F96A-820C0CB99803}"/>
@@ -10596,7 +9692,7 @@
         </p:nvSpPr>
         <p:spPr>
           <a:xfrm>
-            <a:off x="1398985" y="5307191"/>
+            <a:off x="1346732" y="4226299"/>
             <a:ext cx="2558970" cy="720000"/>
           </a:xfrm>
           <a:prstGeom prst="rect">
@@ -10636,13 +9732,17 @@
           <a:lstStyle/>
           <a:p>
             <a:pPr algn="ctr"/>
-            <a:endParaRPr lang="en-GB" dirty="0"/>
+            <a:endParaRPr lang="en-GB" dirty="0">
+              <a:solidFill>
+                <a:srgbClr val="222222"/>
+              </a:solidFill>
+            </a:endParaRPr>
           </a:p>
         </p:txBody>
       </p:sp>
       <p:sp>
         <p:nvSpPr>
-          <p:cNvPr id="205" name="Rectangle 204">
+          <p:cNvPr id="27" name="Rectangle 26">
             <a:extLst>
               <a:ext uri="{FF2B5EF4-FFF2-40B4-BE49-F238E27FC236}">
                 <a16:creationId xmlns:a16="http://schemas.microsoft.com/office/drawing/2014/main" id="{4CDF8D29-A1A4-B6EF-CC2D-02154951F423}"/>
@@ -10654,7 +9754,7 @@
         </p:nvSpPr>
         <p:spPr>
           <a:xfrm>
-            <a:off x="430307" y="5306675"/>
+            <a:off x="378054" y="4225783"/>
             <a:ext cx="971299" cy="722308"/>
           </a:xfrm>
           <a:prstGeom prst="rect">
@@ -10694,13 +9794,17 @@
           <a:lstStyle/>
           <a:p>
             <a:pPr algn="ctr"/>
-            <a:endParaRPr lang="en-GB" dirty="0"/>
+            <a:endParaRPr lang="en-GB" dirty="0">
+              <a:solidFill>
+                <a:srgbClr val="222222"/>
+              </a:solidFill>
+            </a:endParaRPr>
           </a:p>
         </p:txBody>
       </p:sp>
       <p:sp>
         <p:nvSpPr>
-          <p:cNvPr id="206" name="TextBox 205">
+          <p:cNvPr id="28" name="TextBox 27">
             <a:extLst>
               <a:ext uri="{FF2B5EF4-FFF2-40B4-BE49-F238E27FC236}">
                 <a16:creationId xmlns:a16="http://schemas.microsoft.com/office/drawing/2014/main" id="{C5F22480-43D2-EC6C-C595-536DDF09AC46}"/>
@@ -10712,7 +9816,7 @@
         </p:nvSpPr>
         <p:spPr>
           <a:xfrm>
-            <a:off x="1398985" y="5334308"/>
+            <a:off x="1346732" y="4253416"/>
             <a:ext cx="2569739" cy="707886"/>
           </a:xfrm>
           <a:prstGeom prst="rect">
@@ -10729,10 +9833,7 @@
             <a:r>
               <a:rPr lang="en-GB" sz="900" b="1" dirty="0">
                 <a:solidFill>
-                  <a:schemeClr val="tx1">
-                    <a:lumMod val="95000"/>
-                    <a:lumOff val="5000"/>
-                  </a:schemeClr>
+                  <a:srgbClr val="222222"/>
                 </a:solidFill>
                 <a:latin typeface="Calibri" panose="020F0502020204030204" pitchFamily="34" charset="0"/>
                 <a:cs typeface="Calibri" panose="020F0502020204030204" pitchFamily="34" charset="0"/>
@@ -10744,10 +9845,7 @@
             <a:r>
               <a:rPr lang="en-GB" sz="1000" dirty="0">
                 <a:solidFill>
-                  <a:schemeClr val="tx1">
-                    <a:lumMod val="95000"/>
-                    <a:lumOff val="5000"/>
-                  </a:schemeClr>
+                  <a:srgbClr val="222222"/>
                 </a:solidFill>
                 <a:latin typeface="Calibri Light" panose="020F0302020204030204" pitchFamily="34" charset="0"/>
                 <a:cs typeface="Calibri Light" panose="020F0302020204030204" pitchFamily="34" charset="0"/>
@@ -10759,7 +9857,7 @@
       </p:sp>
       <p:sp>
         <p:nvSpPr>
-          <p:cNvPr id="207" name="TextBox 206">
+          <p:cNvPr id="29" name="TextBox 28">
             <a:extLst>
               <a:ext uri="{FF2B5EF4-FFF2-40B4-BE49-F238E27FC236}">
                 <a16:creationId xmlns:a16="http://schemas.microsoft.com/office/drawing/2014/main" id="{65CF77BB-AB79-BDF7-1AD9-C8ABDB188BCE}"/>
@@ -10771,7 +9869,7 @@
         </p:nvSpPr>
         <p:spPr>
           <a:xfrm>
-            <a:off x="454940" y="5368219"/>
+            <a:off x="402687" y="4287327"/>
             <a:ext cx="1008000" cy="400110"/>
           </a:xfrm>
           <a:prstGeom prst="rect">
@@ -10800,7 +9898,7 @@
       </p:sp>
       <p:sp>
         <p:nvSpPr>
-          <p:cNvPr id="208" name="TextBox 207">
+          <p:cNvPr id="30" name="TextBox 29">
             <a:extLst>
               <a:ext uri="{FF2B5EF4-FFF2-40B4-BE49-F238E27FC236}">
                 <a16:creationId xmlns:a16="http://schemas.microsoft.com/office/drawing/2014/main" id="{CE0D8E67-F738-7066-FAAB-7F1C9C0D3446}"/>
@@ -10812,7 +9910,7 @@
         </p:nvSpPr>
         <p:spPr>
           <a:xfrm>
-            <a:off x="438464" y="5434831"/>
+            <a:off x="386211" y="4353939"/>
             <a:ext cx="963142" cy="553998"/>
           </a:xfrm>
           <a:prstGeom prst="rect">
@@ -10829,10 +9927,7 @@
             <a:r>
               <a:rPr lang="en-GB" sz="3000" b="1" dirty="0">
                 <a:solidFill>
-                  <a:schemeClr val="tx1">
-                    <a:lumMod val="95000"/>
-                    <a:lumOff val="5000"/>
-                  </a:schemeClr>
+                  <a:srgbClr val="222222"/>
                 </a:solidFill>
                 <a:latin typeface="Calibri" panose="020F0502020204030204" pitchFamily="34" charset="0"/>
                 <a:cs typeface="Calibri" panose="020F0502020204030204" pitchFamily="34" charset="0"/>
@@ -10844,7 +9939,7 @@
       </p:sp>
       <p:sp>
         <p:nvSpPr>
-          <p:cNvPr id="209" name="Rectangle 208">
+          <p:cNvPr id="31" name="Rectangle 30">
             <a:extLst>
               <a:ext uri="{FF2B5EF4-FFF2-40B4-BE49-F238E27FC236}">
                 <a16:creationId xmlns:a16="http://schemas.microsoft.com/office/drawing/2014/main" id="{716E92A3-A5CC-93CB-1E03-1C50F1F6DD03}"/>
@@ -10856,8 +9951,8 @@
         </p:nvSpPr>
         <p:spPr>
           <a:xfrm>
-            <a:off x="1450393" y="730399"/>
-            <a:ext cx="1224000" cy="216000"/>
+            <a:off x="1540269" y="729378"/>
+            <a:ext cx="1260000" cy="216000"/>
           </a:xfrm>
           <a:prstGeom prst="rect">
             <a:avLst/>
@@ -10915,7 +10010,7 @@
       </p:sp>
       <p:sp>
         <p:nvSpPr>
-          <p:cNvPr id="210" name="Rectangle 209">
+          <p:cNvPr id="32" name="Rectangle 31">
             <a:extLst>
               <a:ext uri="{FF2B5EF4-FFF2-40B4-BE49-F238E27FC236}">
                 <a16:creationId xmlns:a16="http://schemas.microsoft.com/office/drawing/2014/main" id="{C0C067FC-01D1-B083-6206-56A46662729A}"/>
@@ -10927,8 +10022,8 @@
         </p:nvSpPr>
         <p:spPr>
           <a:xfrm>
-            <a:off x="2821485" y="730399"/>
-            <a:ext cx="1224000" cy="216000"/>
+            <a:off x="2852745" y="729378"/>
+            <a:ext cx="1260000" cy="216000"/>
           </a:xfrm>
           <a:prstGeom prst="rect">
             <a:avLst/>
@@ -10986,163 +10081,7 @@
       </p:sp>
       <p:sp>
         <p:nvSpPr>
-          <p:cNvPr id="211" name="Rectangle 210">
-            <a:extLst>
-              <a:ext uri="{FF2B5EF4-FFF2-40B4-BE49-F238E27FC236}">
-                <a16:creationId xmlns:a16="http://schemas.microsoft.com/office/drawing/2014/main" id="{2D7F4AD5-25B7-BAEA-8569-DB83FEE43849}"/>
-              </a:ext>
-            </a:extLst>
-          </p:cNvPr>
-          <p:cNvSpPr/>
-          <p:nvPr/>
-        </p:nvSpPr>
-        <p:spPr>
-          <a:xfrm>
-            <a:off x="3992584" y="5354321"/>
-            <a:ext cx="72000" cy="180000"/>
-          </a:xfrm>
-          <a:prstGeom prst="rect">
-            <a:avLst/>
-          </a:prstGeom>
-          <a:solidFill>
-            <a:srgbClr val="FF595E"/>
-          </a:solidFill>
-          <a:ln>
-            <a:noFill/>
-          </a:ln>
-        </p:spPr>
-        <p:style>
-          <a:lnRef idx="2">
-            <a:schemeClr val="accent1">
-              <a:shade val="15000"/>
-            </a:schemeClr>
-          </a:lnRef>
-          <a:fillRef idx="1">
-            <a:schemeClr val="accent1"/>
-          </a:fillRef>
-          <a:effectRef idx="0">
-            <a:schemeClr val="accent1"/>
-          </a:effectRef>
-          <a:fontRef idx="minor">
-            <a:schemeClr val="lt1"/>
-          </a:fontRef>
-        </p:style>
-        <p:txBody>
-          <a:bodyPr rtlCol="0" anchor="ctr"/>
-          <a:lstStyle/>
-          <a:p>
-            <a:pPr algn="ctr"/>
-            <a:endParaRPr lang="en-GB"/>
-          </a:p>
-        </p:txBody>
-      </p:sp>
-      <p:sp>
-        <p:nvSpPr>
-          <p:cNvPr id="212" name="Rectangle 211">
-            <a:extLst>
-              <a:ext uri="{FF2B5EF4-FFF2-40B4-BE49-F238E27FC236}">
-                <a16:creationId xmlns:a16="http://schemas.microsoft.com/office/drawing/2014/main" id="{3B6A9FC9-F3C1-5895-CA5F-B15DBB77577A}"/>
-              </a:ext>
-            </a:extLst>
-          </p:cNvPr>
-          <p:cNvSpPr/>
-          <p:nvPr/>
-        </p:nvSpPr>
-        <p:spPr>
-          <a:xfrm>
-            <a:off x="3992535" y="5577191"/>
-            <a:ext cx="72000" cy="180000"/>
-          </a:xfrm>
-          <a:prstGeom prst="rect">
-            <a:avLst/>
-          </a:prstGeom>
-          <a:solidFill>
-            <a:srgbClr val="E68301"/>
-          </a:solidFill>
-          <a:ln>
-            <a:noFill/>
-          </a:ln>
-        </p:spPr>
-        <p:style>
-          <a:lnRef idx="2">
-            <a:schemeClr val="accent1">
-              <a:shade val="15000"/>
-            </a:schemeClr>
-          </a:lnRef>
-          <a:fillRef idx="1">
-            <a:schemeClr val="accent1"/>
-          </a:fillRef>
-          <a:effectRef idx="0">
-            <a:schemeClr val="accent1"/>
-          </a:effectRef>
-          <a:fontRef idx="minor">
-            <a:schemeClr val="lt1"/>
-          </a:fontRef>
-        </p:style>
-        <p:txBody>
-          <a:bodyPr rtlCol="0" anchor="ctr"/>
-          <a:lstStyle/>
-          <a:p>
-            <a:pPr algn="ctr"/>
-            <a:endParaRPr lang="en-GB"/>
-          </a:p>
-        </p:txBody>
-      </p:sp>
-      <p:sp>
-        <p:nvSpPr>
-          <p:cNvPr id="213" name="Rectangle 212">
-            <a:extLst>
-              <a:ext uri="{FF2B5EF4-FFF2-40B4-BE49-F238E27FC236}">
-                <a16:creationId xmlns:a16="http://schemas.microsoft.com/office/drawing/2014/main" id="{25CF1250-8412-5C11-F69E-0FAB83004366}"/>
-              </a:ext>
-            </a:extLst>
-          </p:cNvPr>
-          <p:cNvSpPr/>
-          <p:nvPr/>
-        </p:nvSpPr>
-        <p:spPr>
-          <a:xfrm>
-            <a:off x="3992535" y="5800061"/>
-            <a:ext cx="72000" cy="180000"/>
-          </a:xfrm>
-          <a:prstGeom prst="rect">
-            <a:avLst/>
-          </a:prstGeom>
-          <a:solidFill>
-            <a:srgbClr val="3F37C9"/>
-          </a:solidFill>
-          <a:ln>
-            <a:noFill/>
-          </a:ln>
-        </p:spPr>
-        <p:style>
-          <a:lnRef idx="2">
-            <a:schemeClr val="accent1">
-              <a:shade val="15000"/>
-            </a:schemeClr>
-          </a:lnRef>
-          <a:fillRef idx="1">
-            <a:schemeClr val="accent1"/>
-          </a:fillRef>
-          <a:effectRef idx="0">
-            <a:schemeClr val="accent1"/>
-          </a:effectRef>
-          <a:fontRef idx="minor">
-            <a:schemeClr val="lt1"/>
-          </a:fontRef>
-        </p:style>
-        <p:txBody>
-          <a:bodyPr rtlCol="0" anchor="ctr"/>
-          <a:lstStyle/>
-          <a:p>
-            <a:pPr algn="ctr"/>
-            <a:endParaRPr lang="en-GB"/>
-          </a:p>
-        </p:txBody>
-      </p:sp>
-      <p:sp>
-        <p:nvSpPr>
-          <p:cNvPr id="214" name="Rectangle 213">
+          <p:cNvPr id="33" name="Rectangle 32">
             <a:extLst>
               <a:ext uri="{FF2B5EF4-FFF2-40B4-BE49-F238E27FC236}">
                 <a16:creationId xmlns:a16="http://schemas.microsoft.com/office/drawing/2014/main" id="{649A66B3-B899-4304-E071-230DD34AFBC3}"/>
@@ -11154,7 +10093,7 @@
         </p:nvSpPr>
         <p:spPr>
           <a:xfrm>
-            <a:off x="1398985" y="4509731"/>
+            <a:off x="1346732" y="3428839"/>
             <a:ext cx="2558970" cy="720000"/>
           </a:xfrm>
           <a:prstGeom prst="rect">
@@ -11194,13 +10133,17 @@
           <a:lstStyle/>
           <a:p>
             <a:pPr algn="ctr"/>
-            <a:endParaRPr lang="en-GB" dirty="0"/>
+            <a:endParaRPr lang="en-GB" dirty="0">
+              <a:solidFill>
+                <a:srgbClr val="222222"/>
+              </a:solidFill>
+            </a:endParaRPr>
           </a:p>
         </p:txBody>
       </p:sp>
       <p:sp>
         <p:nvSpPr>
-          <p:cNvPr id="215" name="Rectangle 214">
+          <p:cNvPr id="34" name="Rectangle 33">
             <a:extLst>
               <a:ext uri="{FF2B5EF4-FFF2-40B4-BE49-F238E27FC236}">
                 <a16:creationId xmlns:a16="http://schemas.microsoft.com/office/drawing/2014/main" id="{0949695F-9A1D-9DE9-6A11-1A7363D5D06D}"/>
@@ -11212,7 +10155,7 @@
         </p:nvSpPr>
         <p:spPr>
           <a:xfrm>
-            <a:off x="430307" y="4509215"/>
+            <a:off x="378054" y="3428323"/>
             <a:ext cx="971299" cy="722308"/>
           </a:xfrm>
           <a:prstGeom prst="rect">
@@ -11252,13 +10195,17 @@
           <a:lstStyle/>
           <a:p>
             <a:pPr algn="ctr"/>
-            <a:endParaRPr lang="en-GB" dirty="0"/>
+            <a:endParaRPr lang="en-GB" dirty="0">
+              <a:solidFill>
+                <a:schemeClr val="bg1"/>
+              </a:solidFill>
+            </a:endParaRPr>
           </a:p>
         </p:txBody>
       </p:sp>
       <p:sp>
         <p:nvSpPr>
-          <p:cNvPr id="216" name="TextBox 215">
+          <p:cNvPr id="35" name="TextBox 34">
             <a:extLst>
               <a:ext uri="{FF2B5EF4-FFF2-40B4-BE49-F238E27FC236}">
                 <a16:creationId xmlns:a16="http://schemas.microsoft.com/office/drawing/2014/main" id="{26499A74-7ADD-8575-125F-3A9F7DAB54FD}"/>
@@ -11270,7 +10217,7 @@
         </p:nvSpPr>
         <p:spPr>
           <a:xfrm>
-            <a:off x="454940" y="4570759"/>
+            <a:off x="402687" y="3489867"/>
             <a:ext cx="1008000" cy="400110"/>
           </a:xfrm>
           <a:prstGeom prst="rect">
@@ -11299,7 +10246,7 @@
       </p:sp>
       <p:sp>
         <p:nvSpPr>
-          <p:cNvPr id="217" name="TextBox 216">
+          <p:cNvPr id="36" name="TextBox 35">
             <a:extLst>
               <a:ext uri="{FF2B5EF4-FFF2-40B4-BE49-F238E27FC236}">
                 <a16:creationId xmlns:a16="http://schemas.microsoft.com/office/drawing/2014/main" id="{87998562-8C2F-313F-516D-39037195BB26}"/>
@@ -11311,7 +10258,7 @@
         </p:nvSpPr>
         <p:spPr>
           <a:xfrm>
-            <a:off x="438464" y="4637371"/>
+            <a:off x="386211" y="3556479"/>
             <a:ext cx="963142" cy="553998"/>
           </a:xfrm>
           <a:prstGeom prst="rect">
@@ -11328,10 +10275,7 @@
             <a:r>
               <a:rPr lang="en-GB" sz="3000" b="1" dirty="0">
                 <a:solidFill>
-                  <a:schemeClr val="tx1">
-                    <a:lumMod val="95000"/>
-                    <a:lumOff val="5000"/>
-                  </a:schemeClr>
+                  <a:srgbClr val="222222"/>
                 </a:solidFill>
                 <a:latin typeface="Calibri" panose="020F0502020204030204" pitchFamily="34" charset="0"/>
                 <a:cs typeface="Calibri" panose="020F0502020204030204" pitchFamily="34" charset="0"/>
@@ -11343,163 +10287,7 @@
       </p:sp>
       <p:sp>
         <p:nvSpPr>
-          <p:cNvPr id="218" name="Rectangle 217">
-            <a:extLst>
-              <a:ext uri="{FF2B5EF4-FFF2-40B4-BE49-F238E27FC236}">
-                <a16:creationId xmlns:a16="http://schemas.microsoft.com/office/drawing/2014/main" id="{F9DCB9E7-9969-30B1-1527-F3C1B48C49B7}"/>
-              </a:ext>
-            </a:extLst>
-          </p:cNvPr>
-          <p:cNvSpPr/>
-          <p:nvPr/>
-        </p:nvSpPr>
-        <p:spPr>
-          <a:xfrm>
-            <a:off x="3992584" y="4556861"/>
-            <a:ext cx="72000" cy="180000"/>
-          </a:xfrm>
-          <a:prstGeom prst="rect">
-            <a:avLst/>
-          </a:prstGeom>
-          <a:solidFill>
-            <a:srgbClr val="FF595E"/>
-          </a:solidFill>
-          <a:ln>
-            <a:noFill/>
-          </a:ln>
-        </p:spPr>
-        <p:style>
-          <a:lnRef idx="2">
-            <a:schemeClr val="accent1">
-              <a:shade val="15000"/>
-            </a:schemeClr>
-          </a:lnRef>
-          <a:fillRef idx="1">
-            <a:schemeClr val="accent1"/>
-          </a:fillRef>
-          <a:effectRef idx="0">
-            <a:schemeClr val="accent1"/>
-          </a:effectRef>
-          <a:fontRef idx="minor">
-            <a:schemeClr val="lt1"/>
-          </a:fontRef>
-        </p:style>
-        <p:txBody>
-          <a:bodyPr rtlCol="0" anchor="ctr"/>
-          <a:lstStyle/>
-          <a:p>
-            <a:pPr algn="ctr"/>
-            <a:endParaRPr lang="en-GB"/>
-          </a:p>
-        </p:txBody>
-      </p:sp>
-      <p:sp>
-        <p:nvSpPr>
-          <p:cNvPr id="219" name="Rectangle 218">
-            <a:extLst>
-              <a:ext uri="{FF2B5EF4-FFF2-40B4-BE49-F238E27FC236}">
-                <a16:creationId xmlns:a16="http://schemas.microsoft.com/office/drawing/2014/main" id="{4F274C89-4394-9AD6-7151-D15B4347E65E}"/>
-              </a:ext>
-            </a:extLst>
-          </p:cNvPr>
-          <p:cNvSpPr/>
-          <p:nvPr/>
-        </p:nvSpPr>
-        <p:spPr>
-          <a:xfrm>
-            <a:off x="3992535" y="4779731"/>
-            <a:ext cx="72000" cy="180000"/>
-          </a:xfrm>
-          <a:prstGeom prst="rect">
-            <a:avLst/>
-          </a:prstGeom>
-          <a:solidFill>
-            <a:srgbClr val="E68301"/>
-          </a:solidFill>
-          <a:ln>
-            <a:noFill/>
-          </a:ln>
-        </p:spPr>
-        <p:style>
-          <a:lnRef idx="2">
-            <a:schemeClr val="accent1">
-              <a:shade val="15000"/>
-            </a:schemeClr>
-          </a:lnRef>
-          <a:fillRef idx="1">
-            <a:schemeClr val="accent1"/>
-          </a:fillRef>
-          <a:effectRef idx="0">
-            <a:schemeClr val="accent1"/>
-          </a:effectRef>
-          <a:fontRef idx="minor">
-            <a:schemeClr val="lt1"/>
-          </a:fontRef>
-        </p:style>
-        <p:txBody>
-          <a:bodyPr rtlCol="0" anchor="ctr"/>
-          <a:lstStyle/>
-          <a:p>
-            <a:pPr algn="ctr"/>
-            <a:endParaRPr lang="en-GB"/>
-          </a:p>
-        </p:txBody>
-      </p:sp>
-      <p:sp>
-        <p:nvSpPr>
-          <p:cNvPr id="220" name="Rectangle 219">
-            <a:extLst>
-              <a:ext uri="{FF2B5EF4-FFF2-40B4-BE49-F238E27FC236}">
-                <a16:creationId xmlns:a16="http://schemas.microsoft.com/office/drawing/2014/main" id="{772E2B6A-3C18-0834-C5C4-DEC2F51BF4EB}"/>
-              </a:ext>
-            </a:extLst>
-          </p:cNvPr>
-          <p:cNvSpPr/>
-          <p:nvPr/>
-        </p:nvSpPr>
-        <p:spPr>
-          <a:xfrm>
-            <a:off x="3992535" y="5002601"/>
-            <a:ext cx="72000" cy="180000"/>
-          </a:xfrm>
-          <a:prstGeom prst="rect">
-            <a:avLst/>
-          </a:prstGeom>
-          <a:solidFill>
-            <a:srgbClr val="3F37C9"/>
-          </a:solidFill>
-          <a:ln>
-            <a:noFill/>
-          </a:ln>
-        </p:spPr>
-        <p:style>
-          <a:lnRef idx="2">
-            <a:schemeClr val="accent1">
-              <a:shade val="15000"/>
-            </a:schemeClr>
-          </a:lnRef>
-          <a:fillRef idx="1">
-            <a:schemeClr val="accent1"/>
-          </a:fillRef>
-          <a:effectRef idx="0">
-            <a:schemeClr val="accent1"/>
-          </a:effectRef>
-          <a:fontRef idx="minor">
-            <a:schemeClr val="lt1"/>
-          </a:fontRef>
-        </p:style>
-        <p:txBody>
-          <a:bodyPr rtlCol="0" anchor="ctr"/>
-          <a:lstStyle/>
-          <a:p>
-            <a:pPr algn="ctr"/>
-            <a:endParaRPr lang="en-GB"/>
-          </a:p>
-        </p:txBody>
-      </p:sp>
-      <p:sp>
-        <p:nvSpPr>
-          <p:cNvPr id="221" name="Rectangle 220">
+          <p:cNvPr id="37" name="Rectangle 36">
             <a:extLst>
               <a:ext uri="{FF2B5EF4-FFF2-40B4-BE49-F238E27FC236}">
                 <a16:creationId xmlns:a16="http://schemas.microsoft.com/office/drawing/2014/main" id="{80D3517E-1814-BABC-8B8F-AB5B211A3AA1}"/>
@@ -11511,7 +10299,7 @@
         </p:nvSpPr>
         <p:spPr>
           <a:xfrm>
-            <a:off x="1398985" y="3717609"/>
+            <a:off x="1346732" y="2636717"/>
             <a:ext cx="2558970" cy="720000"/>
           </a:xfrm>
           <a:prstGeom prst="rect">
@@ -11551,13 +10339,17 @@
           <a:lstStyle/>
           <a:p>
             <a:pPr algn="ctr"/>
-            <a:endParaRPr lang="en-GB" dirty="0"/>
+            <a:endParaRPr lang="en-GB" dirty="0">
+              <a:solidFill>
+                <a:srgbClr val="222222"/>
+              </a:solidFill>
+            </a:endParaRPr>
           </a:p>
         </p:txBody>
       </p:sp>
       <p:sp>
         <p:nvSpPr>
-          <p:cNvPr id="222" name="Rectangle 221">
+          <p:cNvPr id="38" name="Rectangle 37">
             <a:extLst>
               <a:ext uri="{FF2B5EF4-FFF2-40B4-BE49-F238E27FC236}">
                 <a16:creationId xmlns:a16="http://schemas.microsoft.com/office/drawing/2014/main" id="{A6BE4838-1365-D3B7-CEDE-D7E2E62B7F31}"/>
@@ -11569,7 +10361,7 @@
         </p:nvSpPr>
         <p:spPr>
           <a:xfrm>
-            <a:off x="430307" y="3717093"/>
+            <a:off x="378054" y="2636201"/>
             <a:ext cx="971299" cy="722308"/>
           </a:xfrm>
           <a:prstGeom prst="rect">
@@ -11609,13 +10401,17 @@
           <a:lstStyle/>
           <a:p>
             <a:pPr algn="ctr"/>
-            <a:endParaRPr lang="en-GB" dirty="0"/>
+            <a:endParaRPr lang="en-GB" dirty="0">
+              <a:solidFill>
+                <a:srgbClr val="222222"/>
+              </a:solidFill>
+            </a:endParaRPr>
           </a:p>
         </p:txBody>
       </p:sp>
       <p:sp>
         <p:nvSpPr>
-          <p:cNvPr id="223" name="TextBox 222">
+          <p:cNvPr id="39" name="TextBox 38">
             <a:extLst>
               <a:ext uri="{FF2B5EF4-FFF2-40B4-BE49-F238E27FC236}">
                 <a16:creationId xmlns:a16="http://schemas.microsoft.com/office/drawing/2014/main" id="{8735F6D1-5555-E7D6-D0BB-A64923855C01}"/>
@@ -11627,7 +10423,7 @@
         </p:nvSpPr>
         <p:spPr>
           <a:xfrm>
-            <a:off x="454940" y="3778637"/>
+            <a:off x="402687" y="2697745"/>
             <a:ext cx="1008000" cy="400110"/>
           </a:xfrm>
           <a:prstGeom prst="rect">
@@ -11656,7 +10452,7 @@
       </p:sp>
       <p:sp>
         <p:nvSpPr>
-          <p:cNvPr id="224" name="TextBox 223">
+          <p:cNvPr id="40" name="TextBox 39">
             <a:extLst>
               <a:ext uri="{FF2B5EF4-FFF2-40B4-BE49-F238E27FC236}">
                 <a16:creationId xmlns:a16="http://schemas.microsoft.com/office/drawing/2014/main" id="{2B972E94-DE4C-66D0-A6A3-F1E9C69D6169}"/>
@@ -11668,7 +10464,7 @@
         </p:nvSpPr>
         <p:spPr>
           <a:xfrm>
-            <a:off x="438464" y="3845249"/>
+            <a:off x="386211" y="2764357"/>
             <a:ext cx="963142" cy="553998"/>
           </a:xfrm>
           <a:prstGeom prst="rect">
@@ -11685,10 +10481,7 @@
             <a:r>
               <a:rPr lang="en-GB" sz="3000" b="1" dirty="0">
                 <a:solidFill>
-                  <a:schemeClr val="tx1">
-                    <a:lumMod val="95000"/>
-                    <a:lumOff val="5000"/>
-                  </a:schemeClr>
+                  <a:srgbClr val="222222"/>
                 </a:solidFill>
                 <a:latin typeface="Calibri" panose="020F0502020204030204" pitchFamily="34" charset="0"/>
                 <a:cs typeface="Calibri" panose="020F0502020204030204" pitchFamily="34" charset="0"/>
@@ -11700,7 +10493,7 @@
       </p:sp>
       <p:sp>
         <p:nvSpPr>
-          <p:cNvPr id="225" name="Rectangle 224">
+          <p:cNvPr id="41" name="Rectangle 40">
             <a:extLst>
               <a:ext uri="{FF2B5EF4-FFF2-40B4-BE49-F238E27FC236}">
                 <a16:creationId xmlns:a16="http://schemas.microsoft.com/office/drawing/2014/main" id="{0F40EDD3-6828-DA92-C5B8-A892A73FD4CE}"/>
@@ -11712,8 +10505,8 @@
         </p:nvSpPr>
         <p:spPr>
           <a:xfrm>
-            <a:off x="3992584" y="3764739"/>
-            <a:ext cx="72000" cy="180000"/>
+            <a:off x="3940331" y="2636717"/>
+            <a:ext cx="72000" cy="216000"/>
           </a:xfrm>
           <a:prstGeom prst="rect">
             <a:avLst/>
@@ -11746,13 +10539,17 @@
           <a:lstStyle/>
           <a:p>
             <a:pPr algn="ctr"/>
-            <a:endParaRPr lang="en-GB"/>
+            <a:endParaRPr lang="en-GB">
+              <a:solidFill>
+                <a:srgbClr val="222222"/>
+              </a:solidFill>
+            </a:endParaRPr>
           </a:p>
         </p:txBody>
       </p:sp>
       <p:sp>
         <p:nvSpPr>
-          <p:cNvPr id="226" name="Rectangle 225">
+          <p:cNvPr id="42" name="Rectangle 41">
             <a:extLst>
               <a:ext uri="{FF2B5EF4-FFF2-40B4-BE49-F238E27FC236}">
                 <a16:creationId xmlns:a16="http://schemas.microsoft.com/office/drawing/2014/main" id="{4BC09263-C830-303A-BB0C-2207AFEFF22B}"/>
@@ -11764,8 +10561,8 @@
         </p:nvSpPr>
         <p:spPr>
           <a:xfrm>
-            <a:off x="3992535" y="3987609"/>
-            <a:ext cx="72000" cy="180000"/>
+            <a:off x="3940282" y="2888717"/>
+            <a:ext cx="72000" cy="216000"/>
           </a:xfrm>
           <a:prstGeom prst="rect">
             <a:avLst/>
@@ -11798,13 +10595,17 @@
           <a:lstStyle/>
           <a:p>
             <a:pPr algn="ctr"/>
-            <a:endParaRPr lang="en-GB"/>
+            <a:endParaRPr lang="en-GB">
+              <a:solidFill>
+                <a:srgbClr val="222222"/>
+              </a:solidFill>
+            </a:endParaRPr>
           </a:p>
         </p:txBody>
       </p:sp>
       <p:sp>
         <p:nvSpPr>
-          <p:cNvPr id="227" name="Rectangle 226">
+          <p:cNvPr id="43" name="Rectangle 42">
             <a:extLst>
               <a:ext uri="{FF2B5EF4-FFF2-40B4-BE49-F238E27FC236}">
                 <a16:creationId xmlns:a16="http://schemas.microsoft.com/office/drawing/2014/main" id="{8BFC4AA3-C582-B088-949F-3006D7236AAA}"/>
@@ -11816,8 +10617,8 @@
         </p:nvSpPr>
         <p:spPr>
           <a:xfrm>
-            <a:off x="3992535" y="4210479"/>
-            <a:ext cx="72000" cy="180000"/>
+            <a:off x="3940282" y="3140717"/>
+            <a:ext cx="72000" cy="216000"/>
           </a:xfrm>
           <a:prstGeom prst="rect">
             <a:avLst/>
@@ -11850,13 +10651,17 @@
           <a:lstStyle/>
           <a:p>
             <a:pPr algn="ctr"/>
-            <a:endParaRPr lang="en-GB"/>
+            <a:endParaRPr lang="en-GB">
+              <a:solidFill>
+                <a:srgbClr val="222222"/>
+              </a:solidFill>
+            </a:endParaRPr>
           </a:p>
         </p:txBody>
       </p:sp>
       <p:sp>
         <p:nvSpPr>
-          <p:cNvPr id="228" name="TextBox 227">
+          <p:cNvPr id="44" name="TextBox 43">
             <a:extLst>
               <a:ext uri="{FF2B5EF4-FFF2-40B4-BE49-F238E27FC236}">
                 <a16:creationId xmlns:a16="http://schemas.microsoft.com/office/drawing/2014/main" id="{17A4B2C5-47D5-3495-68D8-2CB424DC7257}"/>
@@ -11868,7 +10673,7 @@
         </p:nvSpPr>
         <p:spPr>
           <a:xfrm>
-            <a:off x="1398985" y="3794288"/>
+            <a:off x="1346732" y="2713396"/>
             <a:ext cx="2450431" cy="553998"/>
           </a:xfrm>
           <a:prstGeom prst="rect">
@@ -11885,10 +10690,7 @@
             <a:r>
               <a:rPr lang="en-GB" sz="1000" b="1" dirty="0">
                 <a:solidFill>
-                  <a:schemeClr val="tx1">
-                    <a:lumMod val="95000"/>
-                    <a:lumOff val="5000"/>
-                  </a:schemeClr>
+                  <a:srgbClr val="222222"/>
                 </a:solidFill>
                 <a:latin typeface="Calibri" panose="020F0502020204030204" pitchFamily="34" charset="0"/>
                 <a:cs typeface="Calibri" panose="020F0502020204030204" pitchFamily="34" charset="0"/>
@@ -11900,10 +10702,7 @@
             <a:r>
               <a:rPr lang="en-GB" sz="1000" dirty="0">
                 <a:solidFill>
-                  <a:schemeClr val="tx1">
-                    <a:lumMod val="95000"/>
-                    <a:lumOff val="5000"/>
-                  </a:schemeClr>
+                  <a:srgbClr val="222222"/>
                 </a:solidFill>
                 <a:latin typeface="Calibri Light" panose="020F0302020204030204" pitchFamily="34" charset="0"/>
                 <a:cs typeface="Calibri Light" panose="020F0302020204030204" pitchFamily="34" charset="0"/>
@@ -11915,7 +10714,7 @@
       </p:sp>
       <p:sp>
         <p:nvSpPr>
-          <p:cNvPr id="229" name="TextBox 228">
+          <p:cNvPr id="45" name="TextBox 44">
             <a:extLst>
               <a:ext uri="{FF2B5EF4-FFF2-40B4-BE49-F238E27FC236}">
                 <a16:creationId xmlns:a16="http://schemas.microsoft.com/office/drawing/2014/main" id="{DC1CA93F-6FAF-42B3-BBBF-433BE0D7EC13}"/>
@@ -11927,7 +10726,7 @@
         </p:nvSpPr>
         <p:spPr>
           <a:xfrm>
-            <a:off x="1398985" y="4593378"/>
+            <a:off x="1346732" y="3512486"/>
             <a:ext cx="2396817" cy="553998"/>
           </a:xfrm>
           <a:prstGeom prst="rect">
@@ -11944,10 +10743,7 @@
             <a:r>
               <a:rPr lang="en-GB" sz="1000" b="1" dirty="0">
                 <a:solidFill>
-                  <a:schemeClr val="tx1">
-                    <a:lumMod val="95000"/>
-                    <a:lumOff val="5000"/>
-                  </a:schemeClr>
+                  <a:srgbClr val="222222"/>
                 </a:solidFill>
                 <a:latin typeface="Calibri" panose="020F0502020204030204" pitchFamily="34" charset="0"/>
                 <a:cs typeface="Calibri" panose="020F0502020204030204" pitchFamily="34" charset="0"/>
@@ -11959,16 +10755,485 @@
             <a:r>
               <a:rPr lang="en-GB" sz="1000" dirty="0">
                 <a:solidFill>
-                  <a:schemeClr val="tx1">
-                    <a:lumMod val="95000"/>
-                    <a:lumOff val="5000"/>
-                  </a:schemeClr>
+                  <a:srgbClr val="222222"/>
                 </a:solidFill>
                 <a:latin typeface="Calibri Light" panose="020F0302020204030204" pitchFamily="34" charset="0"/>
                 <a:cs typeface="Calibri Light" panose="020F0302020204030204" pitchFamily="34" charset="0"/>
               </a:rPr>
               <a:t>For rainfall-based and hydro-met predictions of areas at risk of flash floods.</a:t>
             </a:r>
+          </a:p>
+        </p:txBody>
+      </p:sp>
+      <p:sp>
+        <p:nvSpPr>
+          <p:cNvPr id="46" name="TextBox 45">
+            <a:extLst>
+              <a:ext uri="{FF2B5EF4-FFF2-40B4-BE49-F238E27FC236}">
+                <a16:creationId xmlns:a16="http://schemas.microsoft.com/office/drawing/2014/main" id="{0C8CE056-7612-0128-B393-AE3D0105B0B0}"/>
+              </a:ext>
+            </a:extLst>
+          </p:cNvPr>
+          <p:cNvSpPr txBox="1"/>
+          <p:nvPr/>
+        </p:nvSpPr>
+        <p:spPr>
+          <a:xfrm>
+            <a:off x="-48406" y="979454"/>
+            <a:ext cx="307777" cy="1239149"/>
+          </a:xfrm>
+          <a:prstGeom prst="rect">
+            <a:avLst/>
+          </a:prstGeom>
+          <a:noFill/>
+          <a:ln w="6350">
+            <a:noFill/>
+          </a:ln>
+        </p:spPr>
+        <p:txBody>
+          <a:bodyPr vert="vert270" wrap="square" rtlCol="0">
+            <a:spAutoFit/>
+          </a:bodyPr>
+          <a:lstStyle/>
+          <a:p>
+            <a:pPr algn="ctr"/>
+            <a:r>
+              <a:rPr lang="en-GB" sz="800" b="1" dirty="0">
+                <a:solidFill>
+                  <a:srgbClr val="222222"/>
+                </a:solidFill>
+                <a:latin typeface="Calibri" panose="020F0502020204030204" pitchFamily="34" charset="0"/>
+                <a:cs typeface="Calibri" panose="020F0502020204030204" pitchFamily="34" charset="0"/>
+              </a:rPr>
+              <a:t>RESEARCH OBJECTIVES</a:t>
+            </a:r>
+            <a:endParaRPr lang="en-GB" sz="800" dirty="0">
+              <a:solidFill>
+                <a:srgbClr val="222222"/>
+              </a:solidFill>
+              <a:latin typeface="Calibri Light" panose="020F0302020204030204" pitchFamily="34" charset="0"/>
+              <a:cs typeface="Calibri Light" panose="020F0302020204030204" pitchFamily="34" charset="0"/>
+            </a:endParaRPr>
+          </a:p>
+        </p:txBody>
+      </p:sp>
+      <p:sp>
+        <p:nvSpPr>
+          <p:cNvPr id="47" name="Arrow: Pentagon 46">
+            <a:extLst>
+              <a:ext uri="{FF2B5EF4-FFF2-40B4-BE49-F238E27FC236}">
+                <a16:creationId xmlns:a16="http://schemas.microsoft.com/office/drawing/2014/main" id="{26E5001B-6DEC-3779-E01A-0A27FF325B8B}"/>
+              </a:ext>
+            </a:extLst>
+          </p:cNvPr>
+          <p:cNvSpPr/>
+          <p:nvPr/>
+        </p:nvSpPr>
+        <p:spPr>
+          <a:xfrm>
+            <a:off x="217388" y="2257627"/>
+            <a:ext cx="3922812" cy="90000"/>
+          </a:xfrm>
+          <a:prstGeom prst="homePlate">
+            <a:avLst/>
+          </a:prstGeom>
+          <a:gradFill flip="none" rotWithShape="1">
+            <a:gsLst>
+              <a:gs pos="40000">
+                <a:srgbClr val="FE9202"/>
+              </a:gs>
+              <a:gs pos="0">
+                <a:srgbClr val="FF595E"/>
+              </a:gs>
+              <a:gs pos="25000">
+                <a:srgbClr val="FF595E"/>
+              </a:gs>
+              <a:gs pos="75000">
+                <a:srgbClr val="3F37C9"/>
+              </a:gs>
+              <a:gs pos="60000">
+                <a:srgbClr val="FE9202"/>
+              </a:gs>
+              <a:gs pos="100000">
+                <a:srgbClr val="3F37C9"/>
+              </a:gs>
+            </a:gsLst>
+            <a:lin ang="0" scaled="1"/>
+            <a:tileRect/>
+          </a:gradFill>
+          <a:ln>
+            <a:noFill/>
+          </a:ln>
+        </p:spPr>
+        <p:style>
+          <a:lnRef idx="2">
+            <a:schemeClr val="accent1">
+              <a:shade val="15000"/>
+            </a:schemeClr>
+          </a:lnRef>
+          <a:fillRef idx="1">
+            <a:schemeClr val="accent1"/>
+          </a:fillRef>
+          <a:effectRef idx="0">
+            <a:schemeClr val="accent1"/>
+          </a:effectRef>
+          <a:fontRef idx="minor">
+            <a:schemeClr val="lt1"/>
+          </a:fontRef>
+        </p:style>
+        <p:txBody>
+          <a:bodyPr rtlCol="0" anchor="ctr"/>
+          <a:lstStyle/>
+          <a:p>
+            <a:pPr algn="ctr"/>
+            <a:endParaRPr lang="en-GB"/>
+          </a:p>
+        </p:txBody>
+      </p:sp>
+      <p:sp>
+        <p:nvSpPr>
+          <p:cNvPr id="48" name="Arrow: Pentagon 47">
+            <a:extLst>
+              <a:ext uri="{FF2B5EF4-FFF2-40B4-BE49-F238E27FC236}">
+                <a16:creationId xmlns:a16="http://schemas.microsoft.com/office/drawing/2014/main" id="{9725519F-3CA2-8003-2FF8-53A9447B36EA}"/>
+              </a:ext>
+            </a:extLst>
+          </p:cNvPr>
+          <p:cNvSpPr/>
+          <p:nvPr/>
+        </p:nvSpPr>
+        <p:spPr>
+          <a:xfrm>
+            <a:off x="1540268" y="2382857"/>
+            <a:ext cx="2599931" cy="90000"/>
+          </a:xfrm>
+          <a:prstGeom prst="homePlate">
+            <a:avLst/>
+          </a:prstGeom>
+          <a:gradFill flip="none" rotWithShape="1">
+            <a:gsLst>
+              <a:gs pos="0">
+                <a:srgbClr val="FE9202"/>
+              </a:gs>
+              <a:gs pos="65000">
+                <a:srgbClr val="3F37C9"/>
+              </a:gs>
+              <a:gs pos="39000">
+                <a:srgbClr val="FE9202"/>
+              </a:gs>
+              <a:gs pos="100000">
+                <a:srgbClr val="3F37C9"/>
+              </a:gs>
+            </a:gsLst>
+            <a:lin ang="0" scaled="1"/>
+            <a:tileRect/>
+          </a:gradFill>
+          <a:ln>
+            <a:noFill/>
+          </a:ln>
+        </p:spPr>
+        <p:style>
+          <a:lnRef idx="2">
+            <a:schemeClr val="accent1">
+              <a:shade val="15000"/>
+            </a:schemeClr>
+          </a:lnRef>
+          <a:fillRef idx="1">
+            <a:schemeClr val="accent1"/>
+          </a:fillRef>
+          <a:effectRef idx="0">
+            <a:schemeClr val="accent1"/>
+          </a:effectRef>
+          <a:fontRef idx="minor">
+            <a:schemeClr val="lt1"/>
+          </a:fontRef>
+        </p:style>
+        <p:txBody>
+          <a:bodyPr rtlCol="0" anchor="ctr"/>
+          <a:lstStyle/>
+          <a:p>
+            <a:pPr algn="ctr"/>
+            <a:endParaRPr lang="en-GB"/>
+          </a:p>
+        </p:txBody>
+      </p:sp>
+      <p:sp>
+        <p:nvSpPr>
+          <p:cNvPr id="49" name="Rectangle 48">
+            <a:extLst>
+              <a:ext uri="{FF2B5EF4-FFF2-40B4-BE49-F238E27FC236}">
+                <a16:creationId xmlns:a16="http://schemas.microsoft.com/office/drawing/2014/main" id="{E8D2B8E7-039B-1A09-2DDC-C83E14EB46DF}"/>
+              </a:ext>
+            </a:extLst>
+          </p:cNvPr>
+          <p:cNvSpPr/>
+          <p:nvPr/>
+        </p:nvSpPr>
+        <p:spPr>
+          <a:xfrm>
+            <a:off x="3942433" y="3430594"/>
+            <a:ext cx="72000" cy="216000"/>
+          </a:xfrm>
+          <a:prstGeom prst="rect">
+            <a:avLst/>
+          </a:prstGeom>
+          <a:solidFill>
+            <a:srgbClr val="FF595E"/>
+          </a:solidFill>
+          <a:ln>
+            <a:noFill/>
+          </a:ln>
+        </p:spPr>
+        <p:style>
+          <a:lnRef idx="2">
+            <a:schemeClr val="accent1">
+              <a:shade val="15000"/>
+            </a:schemeClr>
+          </a:lnRef>
+          <a:fillRef idx="1">
+            <a:schemeClr val="accent1"/>
+          </a:fillRef>
+          <a:effectRef idx="0">
+            <a:schemeClr val="accent1"/>
+          </a:effectRef>
+          <a:fontRef idx="minor">
+            <a:schemeClr val="lt1"/>
+          </a:fontRef>
+        </p:style>
+        <p:txBody>
+          <a:bodyPr rtlCol="0" anchor="ctr"/>
+          <a:lstStyle/>
+          <a:p>
+            <a:pPr algn="ctr"/>
+            <a:endParaRPr lang="en-GB">
+              <a:solidFill>
+                <a:srgbClr val="222222"/>
+              </a:solidFill>
+            </a:endParaRPr>
+          </a:p>
+        </p:txBody>
+      </p:sp>
+      <p:sp>
+        <p:nvSpPr>
+          <p:cNvPr id="50" name="Rectangle 49">
+            <a:extLst>
+              <a:ext uri="{FF2B5EF4-FFF2-40B4-BE49-F238E27FC236}">
+                <a16:creationId xmlns:a16="http://schemas.microsoft.com/office/drawing/2014/main" id="{C12365C0-1DFD-9105-1FAE-06F580451ED3}"/>
+              </a:ext>
+            </a:extLst>
+          </p:cNvPr>
+          <p:cNvSpPr/>
+          <p:nvPr/>
+        </p:nvSpPr>
+        <p:spPr>
+          <a:xfrm>
+            <a:off x="3942384" y="3682594"/>
+            <a:ext cx="72000" cy="216000"/>
+          </a:xfrm>
+          <a:prstGeom prst="rect">
+            <a:avLst/>
+          </a:prstGeom>
+          <a:solidFill>
+            <a:srgbClr val="E68301"/>
+          </a:solidFill>
+          <a:ln>
+            <a:noFill/>
+          </a:ln>
+        </p:spPr>
+        <p:style>
+          <a:lnRef idx="2">
+            <a:schemeClr val="accent1">
+              <a:shade val="15000"/>
+            </a:schemeClr>
+          </a:lnRef>
+          <a:fillRef idx="1">
+            <a:schemeClr val="accent1"/>
+          </a:fillRef>
+          <a:effectRef idx="0">
+            <a:schemeClr val="accent1"/>
+          </a:effectRef>
+          <a:fontRef idx="minor">
+            <a:schemeClr val="lt1"/>
+          </a:fontRef>
+        </p:style>
+        <p:txBody>
+          <a:bodyPr rtlCol="0" anchor="ctr"/>
+          <a:lstStyle/>
+          <a:p>
+            <a:pPr algn="ctr"/>
+            <a:endParaRPr lang="en-GB">
+              <a:solidFill>
+                <a:srgbClr val="222222"/>
+              </a:solidFill>
+            </a:endParaRPr>
+          </a:p>
+        </p:txBody>
+      </p:sp>
+      <p:sp>
+        <p:nvSpPr>
+          <p:cNvPr id="51" name="Rectangle 50">
+            <a:extLst>
+              <a:ext uri="{FF2B5EF4-FFF2-40B4-BE49-F238E27FC236}">
+                <a16:creationId xmlns:a16="http://schemas.microsoft.com/office/drawing/2014/main" id="{75EFEC79-3C2A-8CE1-D040-35A21318F4DF}"/>
+              </a:ext>
+            </a:extLst>
+          </p:cNvPr>
+          <p:cNvSpPr/>
+          <p:nvPr/>
+        </p:nvSpPr>
+        <p:spPr>
+          <a:xfrm>
+            <a:off x="3942384" y="3934594"/>
+            <a:ext cx="72000" cy="216000"/>
+          </a:xfrm>
+          <a:prstGeom prst="rect">
+            <a:avLst/>
+          </a:prstGeom>
+          <a:solidFill>
+            <a:srgbClr val="3F37C9"/>
+          </a:solidFill>
+          <a:ln>
+            <a:noFill/>
+          </a:ln>
+        </p:spPr>
+        <p:style>
+          <a:lnRef idx="2">
+            <a:schemeClr val="accent1">
+              <a:shade val="15000"/>
+            </a:schemeClr>
+          </a:lnRef>
+          <a:fillRef idx="1">
+            <a:schemeClr val="accent1"/>
+          </a:fillRef>
+          <a:effectRef idx="0">
+            <a:schemeClr val="accent1"/>
+          </a:effectRef>
+          <a:fontRef idx="minor">
+            <a:schemeClr val="lt1"/>
+          </a:fontRef>
+        </p:style>
+        <p:txBody>
+          <a:bodyPr rtlCol="0" anchor="ctr"/>
+          <a:lstStyle/>
+          <a:p>
+            <a:pPr algn="ctr"/>
+            <a:endParaRPr lang="en-GB">
+              <a:solidFill>
+                <a:srgbClr val="222222"/>
+              </a:solidFill>
+            </a:endParaRPr>
+          </a:p>
+        </p:txBody>
+      </p:sp>
+      <p:sp>
+        <p:nvSpPr>
+          <p:cNvPr id="52" name="Rectangle 51">
+            <a:extLst>
+              <a:ext uri="{FF2B5EF4-FFF2-40B4-BE49-F238E27FC236}">
+                <a16:creationId xmlns:a16="http://schemas.microsoft.com/office/drawing/2014/main" id="{2E5BBF82-039A-99DB-1291-B984EF2722D0}"/>
+              </a:ext>
+            </a:extLst>
+          </p:cNvPr>
+          <p:cNvSpPr/>
+          <p:nvPr/>
+        </p:nvSpPr>
+        <p:spPr>
+          <a:xfrm>
+            <a:off x="3941617" y="4482202"/>
+            <a:ext cx="72000" cy="216000"/>
+          </a:xfrm>
+          <a:prstGeom prst="rect">
+            <a:avLst/>
+          </a:prstGeom>
+          <a:solidFill>
+            <a:srgbClr val="E68301"/>
+          </a:solidFill>
+          <a:ln>
+            <a:noFill/>
+          </a:ln>
+        </p:spPr>
+        <p:style>
+          <a:lnRef idx="2">
+            <a:schemeClr val="accent1">
+              <a:shade val="15000"/>
+            </a:schemeClr>
+          </a:lnRef>
+          <a:fillRef idx="1">
+            <a:schemeClr val="accent1"/>
+          </a:fillRef>
+          <a:effectRef idx="0">
+            <a:schemeClr val="accent1"/>
+          </a:effectRef>
+          <a:fontRef idx="minor">
+            <a:schemeClr val="lt1"/>
+          </a:fontRef>
+        </p:style>
+        <p:txBody>
+          <a:bodyPr rtlCol="0" anchor="ctr"/>
+          <a:lstStyle/>
+          <a:p>
+            <a:pPr algn="ctr"/>
+            <a:endParaRPr lang="en-GB">
+              <a:solidFill>
+                <a:srgbClr val="222222"/>
+              </a:solidFill>
+            </a:endParaRPr>
+          </a:p>
+        </p:txBody>
+      </p:sp>
+      <p:sp>
+        <p:nvSpPr>
+          <p:cNvPr id="53" name="Rectangle 52">
+            <a:extLst>
+              <a:ext uri="{FF2B5EF4-FFF2-40B4-BE49-F238E27FC236}">
+                <a16:creationId xmlns:a16="http://schemas.microsoft.com/office/drawing/2014/main" id="{F1B50902-05E1-2214-2377-74DDCE112879}"/>
+              </a:ext>
+            </a:extLst>
+          </p:cNvPr>
+          <p:cNvSpPr/>
+          <p:nvPr/>
+        </p:nvSpPr>
+        <p:spPr>
+          <a:xfrm>
+            <a:off x="3941617" y="4734202"/>
+            <a:ext cx="72000" cy="216000"/>
+          </a:xfrm>
+          <a:prstGeom prst="rect">
+            <a:avLst/>
+          </a:prstGeom>
+          <a:solidFill>
+            <a:srgbClr val="3F37C9"/>
+          </a:solidFill>
+          <a:ln>
+            <a:noFill/>
+          </a:ln>
+        </p:spPr>
+        <p:style>
+          <a:lnRef idx="2">
+            <a:schemeClr val="accent1">
+              <a:shade val="15000"/>
+            </a:schemeClr>
+          </a:lnRef>
+          <a:fillRef idx="1">
+            <a:schemeClr val="accent1"/>
+          </a:fillRef>
+          <a:effectRef idx="0">
+            <a:schemeClr val="accent1"/>
+          </a:effectRef>
+          <a:fontRef idx="minor">
+            <a:schemeClr val="lt1"/>
+          </a:fontRef>
+        </p:style>
+        <p:txBody>
+          <a:bodyPr rtlCol="0" anchor="ctr"/>
+          <a:lstStyle/>
+          <a:p>
+            <a:pPr algn="ctr"/>
+            <a:endParaRPr lang="en-GB">
+              <a:solidFill>
+                <a:srgbClr val="222222"/>
+              </a:solidFill>
+            </a:endParaRPr>
           </a:p>
         </p:txBody>
       </p:sp>

</xml_diff>

<commit_message>
Added the research questions in figure 1 of chapter 3
</commit_message>
<xml_diff>
--- a/chapter_03/figures/integrated_experimental_strategy.pptx
+++ b/chapter_03/figures/integrated_experimental_strategy.pptx
@@ -2,7 +2,7 @@
 <file path=ppt/presentation.xml><?xml version="1.0" encoding="utf-8"?>
 <p:presentation xmlns:a="http://schemas.openxmlformats.org/drawingml/2006/main" xmlns:r="http://schemas.openxmlformats.org/officeDocument/2006/relationships" xmlns:p="http://schemas.openxmlformats.org/presentationml/2006/main" saveSubsetFonts="1">
   <p:sldMasterIdLst>
-    <p:sldMasterId id="2147483840" r:id="rId1"/>
+    <p:sldMasterId id="2147483864" r:id="rId1"/>
   </p:sldMasterIdLst>
   <p:notesMasterIdLst>
     <p:notesMasterId r:id="rId3"/>
@@ -10,7 +10,7 @@
   <p:sldIdLst>
     <p:sldId id="257" r:id="rId2"/>
   </p:sldIdLst>
-  <p:sldSz cx="4140200" cy="5040313"/>
+  <p:sldSz cx="4140200" cy="6011863"/>
   <p:notesSz cx="6858000" cy="9144000"/>
   <p:defaultTextStyle>
     <a:defPPr>
@@ -118,7 +118,7 @@
 <file path=ppt/revisionInfo.xml><?xml version="1.0" encoding="utf-8"?>
 <p1510:revInfo xmlns:a="http://schemas.openxmlformats.org/drawingml/2006/main" xmlns:r="http://schemas.openxmlformats.org/officeDocument/2006/relationships" xmlns:p1510="http://schemas.microsoft.com/office/powerpoint/2015/10/main">
   <p1510:revLst>
-    <p1510:client id="{F0B9C950-5C19-45BA-B39E-FADB59417D97}" v="52" dt="2025-06-25T16:42:57.898"/>
+    <p1510:client id="{F0B9C950-5C19-45BA-B39E-FADB59417D97}" v="58" dt="2025-06-26T03:48:57.247"/>
   </p1510:revLst>
 </p1510:revInfo>
 </file>
@@ -128,7 +128,7 @@
   <pc:docChgLst>
     <pc:chgData name="Fatima Pillosu" userId="a6295d4dc9e22643" providerId="LiveId" clId="{F0B9C950-5C19-45BA-B39E-FADB59417D97}"/>
     <pc:docChg chg="undo redo custSel addSld delSld modSld">
-      <pc:chgData name="Fatima Pillosu" userId="a6295d4dc9e22643" providerId="LiveId" clId="{F0B9C950-5C19-45BA-B39E-FADB59417D97}" dt="2025-06-25T16:43:01.281" v="3396" actId="1035"/>
+      <pc:chgData name="Fatima Pillosu" userId="a6295d4dc9e22643" providerId="LiveId" clId="{F0B9C950-5C19-45BA-B39E-FADB59417D97}" dt="2025-06-26T03:51:30.209" v="3653" actId="1037"/>
       <pc:docMkLst>
         <pc:docMk/>
       </pc:docMkLst>
@@ -1924,7 +1924,7 @@
         </pc:spChg>
       </pc:sldChg>
       <pc:sldChg chg="addSp delSp modSp new mod setBg">
-        <pc:chgData name="Fatima Pillosu" userId="a6295d4dc9e22643" providerId="LiveId" clId="{F0B9C950-5C19-45BA-B39E-FADB59417D97}" dt="2025-06-25T16:43:01.281" v="3396" actId="1035"/>
+        <pc:chgData name="Fatima Pillosu" userId="a6295d4dc9e22643" providerId="LiveId" clId="{F0B9C950-5C19-45BA-B39E-FADB59417D97}" dt="2025-06-26T03:51:30.209" v="3653" actId="1037"/>
         <pc:sldMkLst>
           <pc:docMk/>
           <pc:sldMk cId="4289110639" sldId="257"/>
@@ -1946,11 +1946,27 @@
           </ac:spMkLst>
         </pc:spChg>
         <pc:spChg chg="add del mod">
+          <ac:chgData name="Fatima Pillosu" userId="a6295d4dc9e22643" providerId="LiveId" clId="{F0B9C950-5C19-45BA-B39E-FADB59417D97}" dt="2025-06-26T03:48:39.927" v="3627" actId="21"/>
+          <ac:spMkLst>
+            <pc:docMk/>
+            <pc:sldMk cId="4289110639" sldId="257"/>
+            <ac:spMk id="2" creationId="{DDAF3D54-885E-2A29-8D7C-F2C70C58F5B5}"/>
+          </ac:spMkLst>
+        </pc:spChg>
+        <pc:spChg chg="add del mod">
           <ac:chgData name="Fatima Pillosu" userId="a6295d4dc9e22643" providerId="LiveId" clId="{F0B9C950-5C19-45BA-B39E-FADB59417D97}" dt="2025-06-25T16:19:45.313" v="2891" actId="11529"/>
           <ac:spMkLst>
             <pc:docMk/>
             <pc:sldMk cId="4289110639" sldId="257"/>
             <ac:spMk id="3" creationId="{25F43096-7068-BBBB-F21C-EB070D795068}"/>
+          </ac:spMkLst>
+        </pc:spChg>
+        <pc:spChg chg="add del mod">
+          <ac:chgData name="Fatima Pillosu" userId="a6295d4dc9e22643" providerId="LiveId" clId="{F0B9C950-5C19-45BA-B39E-FADB59417D97}" dt="2025-06-26T03:48:39.927" v="3627" actId="21"/>
+          <ac:spMkLst>
+            <pc:docMk/>
+            <pc:sldMk cId="4289110639" sldId="257"/>
+            <ac:spMk id="3" creationId="{2CE8AC50-A4E3-9DB6-F606-EB886BE8550D}"/>
           </ac:spMkLst>
         </pc:spChg>
         <pc:spChg chg="del">
@@ -1970,6 +1986,14 @@
           </ac:spMkLst>
         </pc:spChg>
         <pc:spChg chg="add del mod">
+          <ac:chgData name="Fatima Pillosu" userId="a6295d4dc9e22643" providerId="LiveId" clId="{F0B9C950-5C19-45BA-B39E-FADB59417D97}" dt="2025-06-26T03:48:39.927" v="3627" actId="21"/>
+          <ac:spMkLst>
+            <pc:docMk/>
+            <pc:sldMk cId="4289110639" sldId="257"/>
+            <ac:spMk id="4" creationId="{DC34E010-EA2E-EFF4-B042-AAD8E29801DE}"/>
+          </ac:spMkLst>
+        </pc:spChg>
+        <pc:spChg chg="add del mod">
           <ac:chgData name="Fatima Pillosu" userId="a6295d4dc9e22643" providerId="LiveId" clId="{F0B9C950-5C19-45BA-B39E-FADB59417D97}" dt="2025-06-25T15:13:51.292" v="1448" actId="21"/>
           <ac:spMkLst>
             <pc:docMk/>
@@ -1986,11 +2010,27 @@
           </ac:spMkLst>
         </pc:spChg>
         <pc:spChg chg="add del mod">
+          <ac:chgData name="Fatima Pillosu" userId="a6295d4dc9e22643" providerId="LiveId" clId="{F0B9C950-5C19-45BA-B39E-FADB59417D97}" dt="2025-06-26T03:48:39.927" v="3627" actId="21"/>
+          <ac:spMkLst>
+            <pc:docMk/>
+            <pc:sldMk cId="4289110639" sldId="257"/>
+            <ac:spMk id="5" creationId="{A443D769-35EA-ACBB-55BC-2A7FE9B1D174}"/>
+          </ac:spMkLst>
+        </pc:spChg>
+        <pc:spChg chg="add del mod">
           <ac:chgData name="Fatima Pillosu" userId="a6295d4dc9e22643" providerId="LiveId" clId="{F0B9C950-5C19-45BA-B39E-FADB59417D97}" dt="2025-06-25T15:13:51.292" v="1448" actId="21"/>
           <ac:spMkLst>
             <pc:docMk/>
             <pc:sldMk cId="4289110639" sldId="257"/>
             <ac:spMk id="5" creationId="{D32C8D70-81C4-AB6A-08D1-810BA67ED33B}"/>
+          </ac:spMkLst>
+        </pc:spChg>
+        <pc:spChg chg="add del mod">
+          <ac:chgData name="Fatima Pillosu" userId="a6295d4dc9e22643" providerId="LiveId" clId="{F0B9C950-5C19-45BA-B39E-FADB59417D97}" dt="2025-06-26T03:48:39.927" v="3627" actId="21"/>
+          <ac:spMkLst>
+            <pc:docMk/>
+            <pc:sldMk cId="4289110639" sldId="257"/>
+            <ac:spMk id="6" creationId="{6541EEEE-3369-14C3-9119-24FBFEC538F6}"/>
           </ac:spMkLst>
         </pc:spChg>
         <pc:spChg chg="add del mod">
@@ -2010,6 +2050,14 @@
           </ac:spMkLst>
         </pc:spChg>
         <pc:spChg chg="add del mod">
+          <ac:chgData name="Fatima Pillosu" userId="a6295d4dc9e22643" providerId="LiveId" clId="{F0B9C950-5C19-45BA-B39E-FADB59417D97}" dt="2025-06-26T03:48:39.927" v="3627" actId="21"/>
+          <ac:spMkLst>
+            <pc:docMk/>
+            <pc:sldMk cId="4289110639" sldId="257"/>
+            <ac:spMk id="7" creationId="{A668C935-54EA-6F8F-0BB1-E7014CC096D7}"/>
+          </ac:spMkLst>
+        </pc:spChg>
+        <pc:spChg chg="add del mod">
           <ac:chgData name="Fatima Pillosu" userId="a6295d4dc9e22643" providerId="LiveId" clId="{F0B9C950-5C19-45BA-B39E-FADB59417D97}" dt="2025-06-25T15:13:51.292" v="1448" actId="21"/>
           <ac:spMkLst>
             <pc:docMk/>
@@ -2034,6 +2082,14 @@
           </ac:spMkLst>
         </pc:spChg>
         <pc:spChg chg="add del mod">
+          <ac:chgData name="Fatima Pillosu" userId="a6295d4dc9e22643" providerId="LiveId" clId="{F0B9C950-5C19-45BA-B39E-FADB59417D97}" dt="2025-06-26T03:48:39.927" v="3627" actId="21"/>
+          <ac:spMkLst>
+            <pc:docMk/>
+            <pc:sldMk cId="4289110639" sldId="257"/>
+            <ac:spMk id="8" creationId="{DEEE2271-5967-5ABD-F72A-2D4C2F26C2AA}"/>
+          </ac:spMkLst>
+        </pc:spChg>
+        <pc:spChg chg="add del mod">
           <ac:chgData name="Fatima Pillosu" userId="a6295d4dc9e22643" providerId="LiveId" clId="{F0B9C950-5C19-45BA-B39E-FADB59417D97}" dt="2025-06-25T16:42:46.024" v="3394" actId="21"/>
           <ac:spMkLst>
             <pc:docMk/>
@@ -2042,6 +2098,14 @@
           </ac:spMkLst>
         </pc:spChg>
         <pc:spChg chg="add del mod">
+          <ac:chgData name="Fatima Pillosu" userId="a6295d4dc9e22643" providerId="LiveId" clId="{F0B9C950-5C19-45BA-B39E-FADB59417D97}" dt="2025-06-26T03:48:39.927" v="3627" actId="21"/>
+          <ac:spMkLst>
+            <pc:docMk/>
+            <pc:sldMk cId="4289110639" sldId="257"/>
+            <ac:spMk id="9" creationId="{BE24FD28-FAFB-884F-4CE7-E4FD5429F6E3}"/>
+          </ac:spMkLst>
+        </pc:spChg>
+        <pc:spChg chg="add del mod">
           <ac:chgData name="Fatima Pillosu" userId="a6295d4dc9e22643" providerId="LiveId" clId="{F0B9C950-5C19-45BA-B39E-FADB59417D97}" dt="2025-06-25T16:42:46.024" v="3394" actId="21"/>
           <ac:spMkLst>
             <pc:docMk/>
@@ -2050,6 +2114,14 @@
           </ac:spMkLst>
         </pc:spChg>
         <pc:spChg chg="add del mod">
+          <ac:chgData name="Fatima Pillosu" userId="a6295d4dc9e22643" providerId="LiveId" clId="{F0B9C950-5C19-45BA-B39E-FADB59417D97}" dt="2025-06-26T03:48:39.927" v="3627" actId="21"/>
+          <ac:spMkLst>
+            <pc:docMk/>
+            <pc:sldMk cId="4289110639" sldId="257"/>
+            <ac:spMk id="10" creationId="{16EB6FA0-CBE1-9983-F1CC-346BCA2848D4}"/>
+          </ac:spMkLst>
+        </pc:spChg>
+        <pc:spChg chg="add del mod">
           <ac:chgData name="Fatima Pillosu" userId="a6295d4dc9e22643" providerId="LiveId" clId="{F0B9C950-5C19-45BA-B39E-FADB59417D97}" dt="2025-06-25T16:42:46.024" v="3394" actId="21"/>
           <ac:spMkLst>
             <pc:docMk/>
@@ -2058,6 +2130,14 @@
           </ac:spMkLst>
         </pc:spChg>
         <pc:spChg chg="add del mod">
+          <ac:chgData name="Fatima Pillosu" userId="a6295d4dc9e22643" providerId="LiveId" clId="{F0B9C950-5C19-45BA-B39E-FADB59417D97}" dt="2025-06-26T03:48:39.927" v="3627" actId="21"/>
+          <ac:spMkLst>
+            <pc:docMk/>
+            <pc:sldMk cId="4289110639" sldId="257"/>
+            <ac:spMk id="11" creationId="{5137CFD3-310B-C4B7-5CBF-D6EBE8384DFF}"/>
+          </ac:spMkLst>
+        </pc:spChg>
+        <pc:spChg chg="add del mod">
           <ac:chgData name="Fatima Pillosu" userId="a6295d4dc9e22643" providerId="LiveId" clId="{F0B9C950-5C19-45BA-B39E-FADB59417D97}" dt="2025-06-25T16:42:10.566" v="3391" actId="478"/>
           <ac:spMkLst>
             <pc:docMk/>
@@ -2071,6 +2151,22 @@
             <pc:docMk/>
             <pc:sldMk cId="4289110639" sldId="257"/>
             <ac:spMk id="12" creationId="{2E5BBF82-039A-99DB-1291-B984EF2722D0}"/>
+          </ac:spMkLst>
+        </pc:spChg>
+        <pc:spChg chg="add del mod">
+          <ac:chgData name="Fatima Pillosu" userId="a6295d4dc9e22643" providerId="LiveId" clId="{F0B9C950-5C19-45BA-B39E-FADB59417D97}" dt="2025-06-26T03:48:39.927" v="3627" actId="21"/>
+          <ac:spMkLst>
+            <pc:docMk/>
+            <pc:sldMk cId="4289110639" sldId="257"/>
+            <ac:spMk id="12" creationId="{9097776E-A046-4D6E-89DA-50B1F5A3FAF4}"/>
+          </ac:spMkLst>
+        </pc:spChg>
+        <pc:spChg chg="add del mod">
+          <ac:chgData name="Fatima Pillosu" userId="a6295d4dc9e22643" providerId="LiveId" clId="{F0B9C950-5C19-45BA-B39E-FADB59417D97}" dt="2025-06-26T03:48:39.927" v="3627" actId="21"/>
+          <ac:spMkLst>
+            <pc:docMk/>
+            <pc:sldMk cId="4289110639" sldId="257"/>
+            <ac:spMk id="13" creationId="{1402EF05-0A8D-81FE-F96A-820C0CB99803}"/>
           </ac:spMkLst>
         </pc:spChg>
         <pc:spChg chg="add del mod">
@@ -2089,972 +2185,1508 @@
             <ac:spMk id="14" creationId="{146AA7D0-AA66-9412-FD7B-6A53D86C4EB9}"/>
           </ac:spMkLst>
         </pc:spChg>
+        <pc:spChg chg="add del mod">
+          <ac:chgData name="Fatima Pillosu" userId="a6295d4dc9e22643" providerId="LiveId" clId="{F0B9C950-5C19-45BA-B39E-FADB59417D97}" dt="2025-06-26T03:48:39.927" v="3627" actId="21"/>
+          <ac:spMkLst>
+            <pc:docMk/>
+            <pc:sldMk cId="4289110639" sldId="257"/>
+            <ac:spMk id="14" creationId="{4CDF8D29-A1A4-B6EF-CC2D-02154951F423}"/>
+          </ac:spMkLst>
+        </pc:spChg>
+        <pc:spChg chg="add del mod">
+          <ac:chgData name="Fatima Pillosu" userId="a6295d4dc9e22643" providerId="LiveId" clId="{F0B9C950-5C19-45BA-B39E-FADB59417D97}" dt="2025-06-26T03:43:11.999" v="3397" actId="21"/>
+          <ac:spMkLst>
+            <pc:docMk/>
+            <pc:sldMk cId="4289110639" sldId="257"/>
+            <ac:spMk id="15" creationId="{DDAF3D54-885E-2A29-8D7C-F2C70C58F5B5}"/>
+          </ac:spMkLst>
+        </pc:spChg>
+        <pc:spChg chg="add del mod">
+          <ac:chgData name="Fatima Pillosu" userId="a6295d4dc9e22643" providerId="LiveId" clId="{F0B9C950-5C19-45BA-B39E-FADB59417D97}" dt="2025-06-26T03:43:11.999" v="3397" actId="21"/>
+          <ac:spMkLst>
+            <pc:docMk/>
+            <pc:sldMk cId="4289110639" sldId="257"/>
+            <ac:spMk id="16" creationId="{2CE8AC50-A4E3-9DB6-F606-EB886BE8550D}"/>
+          </ac:spMkLst>
+        </pc:spChg>
+        <pc:spChg chg="add del mod">
+          <ac:chgData name="Fatima Pillosu" userId="a6295d4dc9e22643" providerId="LiveId" clId="{F0B9C950-5C19-45BA-B39E-FADB59417D97}" dt="2025-06-25T15:13:51.292" v="1448" actId="21"/>
+          <ac:spMkLst>
+            <pc:docMk/>
+            <pc:sldMk cId="4289110639" sldId="257"/>
+            <ac:spMk id="16" creationId="{8993D2BA-C58E-5F46-6E65-8673351E7984}"/>
+          </ac:spMkLst>
+        </pc:spChg>
+        <pc:spChg chg="add del mod">
+          <ac:chgData name="Fatima Pillosu" userId="a6295d4dc9e22643" providerId="LiveId" clId="{F0B9C950-5C19-45BA-B39E-FADB59417D97}" dt="2025-06-25T15:13:51.292" v="1448" actId="21"/>
+          <ac:spMkLst>
+            <pc:docMk/>
+            <pc:sldMk cId="4289110639" sldId="257"/>
+            <ac:spMk id="17" creationId="{3BC980C1-1730-6AF0-AED0-8759A78EA8C6}"/>
+          </ac:spMkLst>
+        </pc:spChg>
+        <pc:spChg chg="add del mod">
+          <ac:chgData name="Fatima Pillosu" userId="a6295d4dc9e22643" providerId="LiveId" clId="{F0B9C950-5C19-45BA-B39E-FADB59417D97}" dt="2025-06-26T03:43:11.999" v="3397" actId="21"/>
+          <ac:spMkLst>
+            <pc:docMk/>
+            <pc:sldMk cId="4289110639" sldId="257"/>
+            <ac:spMk id="17" creationId="{DC34E010-EA2E-EFF4-B042-AAD8E29801DE}"/>
+          </ac:spMkLst>
+        </pc:spChg>
+        <pc:spChg chg="add del mod">
+          <ac:chgData name="Fatima Pillosu" userId="a6295d4dc9e22643" providerId="LiveId" clId="{F0B9C950-5C19-45BA-B39E-FADB59417D97}" dt="2025-06-26T03:43:11.999" v="3397" actId="21"/>
+          <ac:spMkLst>
+            <pc:docMk/>
+            <pc:sldMk cId="4289110639" sldId="257"/>
+            <ac:spMk id="18" creationId="{A443D769-35EA-ACBB-55BC-2A7FE9B1D174}"/>
+          </ac:spMkLst>
+        </pc:spChg>
+        <pc:spChg chg="add del mod">
+          <ac:chgData name="Fatima Pillosu" userId="a6295d4dc9e22643" providerId="LiveId" clId="{F0B9C950-5C19-45BA-B39E-FADB59417D97}" dt="2025-06-25T15:13:51.292" v="1448" actId="21"/>
+          <ac:spMkLst>
+            <pc:docMk/>
+            <pc:sldMk cId="4289110639" sldId="257"/>
+            <ac:spMk id="18" creationId="{C00C6D4F-6379-0107-EFEC-867498B3DF65}"/>
+          </ac:spMkLst>
+        </pc:spChg>
+        <pc:spChg chg="add del mod">
+          <ac:chgData name="Fatima Pillosu" userId="a6295d4dc9e22643" providerId="LiveId" clId="{F0B9C950-5C19-45BA-B39E-FADB59417D97}" dt="2025-06-26T03:43:11.999" v="3397" actId="21"/>
+          <ac:spMkLst>
+            <pc:docMk/>
+            <pc:sldMk cId="4289110639" sldId="257"/>
+            <ac:spMk id="19" creationId="{6541EEEE-3369-14C3-9119-24FBFEC538F6}"/>
+          </ac:spMkLst>
+        </pc:spChg>
+        <pc:spChg chg="add del mod">
+          <ac:chgData name="Fatima Pillosu" userId="a6295d4dc9e22643" providerId="LiveId" clId="{F0B9C950-5C19-45BA-B39E-FADB59417D97}" dt="2025-06-26T03:43:11.999" v="3397" actId="21"/>
+          <ac:spMkLst>
+            <pc:docMk/>
+            <pc:sldMk cId="4289110639" sldId="257"/>
+            <ac:spMk id="20" creationId="{A668C935-54EA-6F8F-0BB1-E7014CC096D7}"/>
+          </ac:spMkLst>
+        </pc:spChg>
+        <pc:spChg chg="add del mod">
+          <ac:chgData name="Fatima Pillosu" userId="a6295d4dc9e22643" providerId="LiveId" clId="{F0B9C950-5C19-45BA-B39E-FADB59417D97}" dt="2025-06-26T03:43:11.999" v="3397" actId="21"/>
+          <ac:spMkLst>
+            <pc:docMk/>
+            <pc:sldMk cId="4289110639" sldId="257"/>
+            <ac:spMk id="21" creationId="{DEEE2271-5967-5ABD-F72A-2D4C2F26C2AA}"/>
+          </ac:spMkLst>
+        </pc:spChg>
+        <pc:spChg chg="add del mod">
+          <ac:chgData name="Fatima Pillosu" userId="a6295d4dc9e22643" providerId="LiveId" clId="{F0B9C950-5C19-45BA-B39E-FADB59417D97}" dt="2025-06-26T03:43:11.999" v="3397" actId="21"/>
+          <ac:spMkLst>
+            <pc:docMk/>
+            <pc:sldMk cId="4289110639" sldId="257"/>
+            <ac:spMk id="22" creationId="{BE24FD28-FAFB-884F-4CE7-E4FD5429F6E3}"/>
+          </ac:spMkLst>
+        </pc:spChg>
+        <pc:spChg chg="add del mod">
+          <ac:chgData name="Fatima Pillosu" userId="a6295d4dc9e22643" providerId="LiveId" clId="{F0B9C950-5C19-45BA-B39E-FADB59417D97}" dt="2025-06-26T03:43:11.999" v="3397" actId="21"/>
+          <ac:spMkLst>
+            <pc:docMk/>
+            <pc:sldMk cId="4289110639" sldId="257"/>
+            <ac:spMk id="23" creationId="{16EB6FA0-CBE1-9983-F1CC-346BCA2848D4}"/>
+          </ac:spMkLst>
+        </pc:spChg>
+        <pc:spChg chg="add del mod">
+          <ac:chgData name="Fatima Pillosu" userId="a6295d4dc9e22643" providerId="LiveId" clId="{F0B9C950-5C19-45BA-B39E-FADB59417D97}" dt="2025-06-26T03:43:11.999" v="3397" actId="21"/>
+          <ac:spMkLst>
+            <pc:docMk/>
+            <pc:sldMk cId="4289110639" sldId="257"/>
+            <ac:spMk id="24" creationId="{5137CFD3-310B-C4B7-5CBF-D6EBE8384DFF}"/>
+          </ac:spMkLst>
+        </pc:spChg>
+        <pc:spChg chg="add del mod">
+          <ac:chgData name="Fatima Pillosu" userId="a6295d4dc9e22643" providerId="LiveId" clId="{F0B9C950-5C19-45BA-B39E-FADB59417D97}" dt="2025-06-25T15:13:51.292" v="1448" actId="21"/>
+          <ac:spMkLst>
+            <pc:docMk/>
+            <pc:sldMk cId="4289110639" sldId="257"/>
+            <ac:spMk id="25" creationId="{2CE8AC50-A4E3-9DB6-F606-EB886BE8550D}"/>
+          </ac:spMkLst>
+        </pc:spChg>
+        <pc:spChg chg="add del mod">
+          <ac:chgData name="Fatima Pillosu" userId="a6295d4dc9e22643" providerId="LiveId" clId="{F0B9C950-5C19-45BA-B39E-FADB59417D97}" dt="2025-06-26T03:43:11.999" v="3397" actId="21"/>
+          <ac:spMkLst>
+            <pc:docMk/>
+            <pc:sldMk cId="4289110639" sldId="257"/>
+            <ac:spMk id="25" creationId="{9097776E-A046-4D6E-89DA-50B1F5A3FAF4}"/>
+          </ac:spMkLst>
+        </pc:spChg>
+        <pc:spChg chg="add del mod">
+          <ac:chgData name="Fatima Pillosu" userId="a6295d4dc9e22643" providerId="LiveId" clId="{F0B9C950-5C19-45BA-B39E-FADB59417D97}" dt="2025-06-26T03:43:11.999" v="3397" actId="21"/>
+          <ac:spMkLst>
+            <pc:docMk/>
+            <pc:sldMk cId="4289110639" sldId="257"/>
+            <ac:spMk id="26" creationId="{1402EF05-0A8D-81FE-F96A-820C0CB99803}"/>
+          </ac:spMkLst>
+        </pc:spChg>
+        <pc:spChg chg="add del mod">
+          <ac:chgData name="Fatima Pillosu" userId="a6295d4dc9e22643" providerId="LiveId" clId="{F0B9C950-5C19-45BA-B39E-FADB59417D97}" dt="2025-06-25T15:13:51.292" v="1448" actId="21"/>
+          <ac:spMkLst>
+            <pc:docMk/>
+            <pc:sldMk cId="4289110639" sldId="257"/>
+            <ac:spMk id="26" creationId="{8BF45082-5DBA-2BDA-6B3B-1CE304EDBB0F}"/>
+          </ac:spMkLst>
+        </pc:spChg>
+        <pc:spChg chg="add del mod">
+          <ac:chgData name="Fatima Pillosu" userId="a6295d4dc9e22643" providerId="LiveId" clId="{F0B9C950-5C19-45BA-B39E-FADB59417D97}" dt="2025-06-26T03:43:11.999" v="3397" actId="21"/>
+          <ac:spMkLst>
+            <pc:docMk/>
+            <pc:sldMk cId="4289110639" sldId="257"/>
+            <ac:spMk id="27" creationId="{4CDF8D29-A1A4-B6EF-CC2D-02154951F423}"/>
+          </ac:spMkLst>
+        </pc:spChg>
+        <pc:spChg chg="add del mod">
+          <ac:chgData name="Fatima Pillosu" userId="a6295d4dc9e22643" providerId="LiveId" clId="{F0B9C950-5C19-45BA-B39E-FADB59417D97}" dt="2025-06-25T15:13:51.292" v="1448" actId="21"/>
+          <ac:spMkLst>
+            <pc:docMk/>
+            <pc:sldMk cId="4289110639" sldId="257"/>
+            <ac:spMk id="27" creationId="{DC34E010-EA2E-EFF4-B042-AAD8E29801DE}"/>
+          </ac:spMkLst>
+        </pc:spChg>
+        <pc:spChg chg="add del mod">
+          <ac:chgData name="Fatima Pillosu" userId="a6295d4dc9e22643" providerId="LiveId" clId="{F0B9C950-5C19-45BA-B39E-FADB59417D97}" dt="2025-06-26T03:43:11.999" v="3397" actId="21"/>
+          <ac:spMkLst>
+            <pc:docMk/>
+            <pc:sldMk cId="4289110639" sldId="257"/>
+            <ac:spMk id="28" creationId="{C5F22480-43D2-EC6C-C595-536DDF09AC46}"/>
+          </ac:spMkLst>
+        </pc:spChg>
+        <pc:spChg chg="add del mod">
+          <ac:chgData name="Fatima Pillosu" userId="a6295d4dc9e22643" providerId="LiveId" clId="{F0B9C950-5C19-45BA-B39E-FADB59417D97}" dt="2025-06-25T15:13:51.292" v="1448" actId="21"/>
+          <ac:spMkLst>
+            <pc:docMk/>
+            <pc:sldMk cId="4289110639" sldId="257"/>
+            <ac:spMk id="28" creationId="{E596FB15-C5C4-A883-D8B1-8941F744109D}"/>
+          </ac:spMkLst>
+        </pc:spChg>
+        <pc:spChg chg="add del mod">
+          <ac:chgData name="Fatima Pillosu" userId="a6295d4dc9e22643" providerId="LiveId" clId="{F0B9C950-5C19-45BA-B39E-FADB59417D97}" dt="2025-06-26T03:43:11.999" v="3397" actId="21"/>
+          <ac:spMkLst>
+            <pc:docMk/>
+            <pc:sldMk cId="4289110639" sldId="257"/>
+            <ac:spMk id="29" creationId="{65CF77BB-AB79-BDF7-1AD9-C8ABDB188BCE}"/>
+          </ac:spMkLst>
+        </pc:spChg>
+        <pc:spChg chg="add del mod">
+          <ac:chgData name="Fatima Pillosu" userId="a6295d4dc9e22643" providerId="LiveId" clId="{F0B9C950-5C19-45BA-B39E-FADB59417D97}" dt="2025-06-25T15:13:51.292" v="1448" actId="21"/>
+          <ac:spMkLst>
+            <pc:docMk/>
+            <pc:sldMk cId="4289110639" sldId="257"/>
+            <ac:spMk id="29" creationId="{942EDCB3-530B-AEEA-AFDB-D0EC689D20F0}"/>
+          </ac:spMkLst>
+        </pc:spChg>
+        <pc:spChg chg="add del mod">
+          <ac:chgData name="Fatima Pillosu" userId="a6295d4dc9e22643" providerId="LiveId" clId="{F0B9C950-5C19-45BA-B39E-FADB59417D97}" dt="2025-06-25T15:13:51.292" v="1448" actId="21"/>
+          <ac:spMkLst>
+            <pc:docMk/>
+            <pc:sldMk cId="4289110639" sldId="257"/>
+            <ac:spMk id="30" creationId="{09AA91AB-0F00-9123-C1B1-2024DAA6ECFC}"/>
+          </ac:spMkLst>
+        </pc:spChg>
+        <pc:spChg chg="add del mod">
+          <ac:chgData name="Fatima Pillosu" userId="a6295d4dc9e22643" providerId="LiveId" clId="{F0B9C950-5C19-45BA-B39E-FADB59417D97}" dt="2025-06-26T03:43:11.999" v="3397" actId="21"/>
+          <ac:spMkLst>
+            <pc:docMk/>
+            <pc:sldMk cId="4289110639" sldId="257"/>
+            <ac:spMk id="30" creationId="{CE0D8E67-F738-7066-FAAB-7F1C9C0D3446}"/>
+          </ac:spMkLst>
+        </pc:spChg>
+        <pc:spChg chg="add del mod">
+          <ac:chgData name="Fatima Pillosu" userId="a6295d4dc9e22643" providerId="LiveId" clId="{F0B9C950-5C19-45BA-B39E-FADB59417D97}" dt="2025-06-26T03:43:11.999" v="3397" actId="21"/>
+          <ac:spMkLst>
+            <pc:docMk/>
+            <pc:sldMk cId="4289110639" sldId="257"/>
+            <ac:spMk id="31" creationId="{716E92A3-A5CC-93CB-1E03-1C50F1F6DD03}"/>
+          </ac:spMkLst>
+        </pc:spChg>
+        <pc:spChg chg="add del mod">
+          <ac:chgData name="Fatima Pillosu" userId="a6295d4dc9e22643" providerId="LiveId" clId="{F0B9C950-5C19-45BA-B39E-FADB59417D97}" dt="2025-06-25T15:13:51.292" v="1448" actId="21"/>
+          <ac:spMkLst>
+            <pc:docMk/>
+            <pc:sldMk cId="4289110639" sldId="257"/>
+            <ac:spMk id="31" creationId="{BD607AC0-72FD-2A38-E500-5793D9FCFE8C}"/>
+          </ac:spMkLst>
+        </pc:spChg>
+        <pc:spChg chg="add del mod">
+          <ac:chgData name="Fatima Pillosu" userId="a6295d4dc9e22643" providerId="LiveId" clId="{F0B9C950-5C19-45BA-B39E-FADB59417D97}" dt="2025-06-25T15:13:51.292" v="1448" actId="21"/>
+          <ac:spMkLst>
+            <pc:docMk/>
+            <pc:sldMk cId="4289110639" sldId="257"/>
+            <ac:spMk id="32" creationId="{A443D769-35EA-ACBB-55BC-2A7FE9B1D174}"/>
+          </ac:spMkLst>
+        </pc:spChg>
+        <pc:spChg chg="add del mod">
+          <ac:chgData name="Fatima Pillosu" userId="a6295d4dc9e22643" providerId="LiveId" clId="{F0B9C950-5C19-45BA-B39E-FADB59417D97}" dt="2025-06-26T03:43:11.999" v="3397" actId="21"/>
+          <ac:spMkLst>
+            <pc:docMk/>
+            <pc:sldMk cId="4289110639" sldId="257"/>
+            <ac:spMk id="32" creationId="{C0C067FC-01D1-B083-6206-56A46662729A}"/>
+          </ac:spMkLst>
+        </pc:spChg>
+        <pc:spChg chg="add del mod">
+          <ac:chgData name="Fatima Pillosu" userId="a6295d4dc9e22643" providerId="LiveId" clId="{F0B9C950-5C19-45BA-B39E-FADB59417D97}" dt="2025-06-26T03:43:11.999" v="3397" actId="21"/>
+          <ac:spMkLst>
+            <pc:docMk/>
+            <pc:sldMk cId="4289110639" sldId="257"/>
+            <ac:spMk id="33" creationId="{649A66B3-B899-4304-E071-230DD34AFBC3}"/>
+          </ac:spMkLst>
+        </pc:spChg>
+        <pc:spChg chg="add del mod">
+          <ac:chgData name="Fatima Pillosu" userId="a6295d4dc9e22643" providerId="LiveId" clId="{F0B9C950-5C19-45BA-B39E-FADB59417D97}" dt="2025-06-25T15:13:51.292" v="1448" actId="21"/>
+          <ac:spMkLst>
+            <pc:docMk/>
+            <pc:sldMk cId="4289110639" sldId="257"/>
+            <ac:spMk id="33" creationId="{ADA3DE8D-1806-5542-AE87-86B40C29C4B6}"/>
+          </ac:spMkLst>
+        </pc:spChg>
+        <pc:spChg chg="add del mod">
+          <ac:chgData name="Fatima Pillosu" userId="a6295d4dc9e22643" providerId="LiveId" clId="{F0B9C950-5C19-45BA-B39E-FADB59417D97}" dt="2025-06-26T03:43:11.999" v="3397" actId="21"/>
+          <ac:spMkLst>
+            <pc:docMk/>
+            <pc:sldMk cId="4289110639" sldId="257"/>
+            <ac:spMk id="34" creationId="{0949695F-9A1D-9DE9-6A11-1A7363D5D06D}"/>
+          </ac:spMkLst>
+        </pc:spChg>
+        <pc:spChg chg="add del mod">
+          <ac:chgData name="Fatima Pillosu" userId="a6295d4dc9e22643" providerId="LiveId" clId="{F0B9C950-5C19-45BA-B39E-FADB59417D97}" dt="2025-06-25T15:13:51.292" v="1448" actId="21"/>
+          <ac:spMkLst>
+            <pc:docMk/>
+            <pc:sldMk cId="4289110639" sldId="257"/>
+            <ac:spMk id="34" creationId="{1E801C4A-0276-1937-0649-23B933A9FD4C}"/>
+          </ac:spMkLst>
+        </pc:spChg>
+        <pc:spChg chg="add del mod">
+          <ac:chgData name="Fatima Pillosu" userId="a6295d4dc9e22643" providerId="LiveId" clId="{F0B9C950-5C19-45BA-B39E-FADB59417D97}" dt="2025-06-26T03:43:11.999" v="3397" actId="21"/>
+          <ac:spMkLst>
+            <pc:docMk/>
+            <pc:sldMk cId="4289110639" sldId="257"/>
+            <ac:spMk id="35" creationId="{26499A74-7ADD-8575-125F-3A9F7DAB54FD}"/>
+          </ac:spMkLst>
+        </pc:spChg>
+        <pc:spChg chg="add del mod">
+          <ac:chgData name="Fatima Pillosu" userId="a6295d4dc9e22643" providerId="LiveId" clId="{F0B9C950-5C19-45BA-B39E-FADB59417D97}" dt="2025-06-25T15:13:51.292" v="1448" actId="21"/>
+          <ac:spMkLst>
+            <pc:docMk/>
+            <pc:sldMk cId="4289110639" sldId="257"/>
+            <ac:spMk id="35" creationId="{6541EEEE-3369-14C3-9119-24FBFEC538F6}"/>
+          </ac:spMkLst>
+        </pc:spChg>
+        <pc:spChg chg="add del mod">
+          <ac:chgData name="Fatima Pillosu" userId="a6295d4dc9e22643" providerId="LiveId" clId="{F0B9C950-5C19-45BA-B39E-FADB59417D97}" dt="2025-06-26T03:43:11.999" v="3397" actId="21"/>
+          <ac:spMkLst>
+            <pc:docMk/>
+            <pc:sldMk cId="4289110639" sldId="257"/>
+            <ac:spMk id="36" creationId="{87998562-8C2F-313F-516D-39037195BB26}"/>
+          </ac:spMkLst>
+        </pc:spChg>
+        <pc:spChg chg="add del mod">
+          <ac:chgData name="Fatima Pillosu" userId="a6295d4dc9e22643" providerId="LiveId" clId="{F0B9C950-5C19-45BA-B39E-FADB59417D97}" dt="2025-06-25T15:13:51.292" v="1448" actId="21"/>
+          <ac:spMkLst>
+            <pc:docMk/>
+            <pc:sldMk cId="4289110639" sldId="257"/>
+            <ac:spMk id="36" creationId="{A668C935-54EA-6F8F-0BB1-E7014CC096D7}"/>
+          </ac:spMkLst>
+        </pc:spChg>
+        <pc:spChg chg="add del mod">
+          <ac:chgData name="Fatima Pillosu" userId="a6295d4dc9e22643" providerId="LiveId" clId="{F0B9C950-5C19-45BA-B39E-FADB59417D97}" dt="2025-06-25T15:13:51.292" v="1448" actId="21"/>
+          <ac:spMkLst>
+            <pc:docMk/>
+            <pc:sldMk cId="4289110639" sldId="257"/>
+            <ac:spMk id="37" creationId="{7E97B7E9-5251-BE9A-AE14-9D7F6768E5D3}"/>
+          </ac:spMkLst>
+        </pc:spChg>
+        <pc:spChg chg="add del mod">
+          <ac:chgData name="Fatima Pillosu" userId="a6295d4dc9e22643" providerId="LiveId" clId="{F0B9C950-5C19-45BA-B39E-FADB59417D97}" dt="2025-06-26T03:43:11.999" v="3397" actId="21"/>
+          <ac:spMkLst>
+            <pc:docMk/>
+            <pc:sldMk cId="4289110639" sldId="257"/>
+            <ac:spMk id="37" creationId="{80D3517E-1814-BABC-8B8F-AB5B211A3AA1}"/>
+          </ac:spMkLst>
+        </pc:spChg>
+        <pc:spChg chg="add del mod">
+          <ac:chgData name="Fatima Pillosu" userId="a6295d4dc9e22643" providerId="LiveId" clId="{F0B9C950-5C19-45BA-B39E-FADB59417D97}" dt="2025-06-26T03:43:11.999" v="3397" actId="21"/>
+          <ac:spMkLst>
+            <pc:docMk/>
+            <pc:sldMk cId="4289110639" sldId="257"/>
+            <ac:spMk id="38" creationId="{A6BE4838-1365-D3B7-CEDE-D7E2E62B7F31}"/>
+          </ac:spMkLst>
+        </pc:spChg>
+        <pc:spChg chg="add del mod">
+          <ac:chgData name="Fatima Pillosu" userId="a6295d4dc9e22643" providerId="LiveId" clId="{F0B9C950-5C19-45BA-B39E-FADB59417D97}" dt="2025-06-25T15:13:51.292" v="1448" actId="21"/>
+          <ac:spMkLst>
+            <pc:docMk/>
+            <pc:sldMk cId="4289110639" sldId="257"/>
+            <ac:spMk id="38" creationId="{DEEE2271-5967-5ABD-F72A-2D4C2F26C2AA}"/>
+          </ac:spMkLst>
+        </pc:spChg>
+        <pc:spChg chg="add del mod">
+          <ac:chgData name="Fatima Pillosu" userId="a6295d4dc9e22643" providerId="LiveId" clId="{F0B9C950-5C19-45BA-B39E-FADB59417D97}" dt="2025-06-25T15:13:51.292" v="1448" actId="21"/>
+          <ac:spMkLst>
+            <pc:docMk/>
+            <pc:sldMk cId="4289110639" sldId="257"/>
+            <ac:spMk id="39" creationId="{3686655B-80AB-878D-8415-307EA53EFB5C}"/>
+          </ac:spMkLst>
+        </pc:spChg>
+        <pc:spChg chg="add del mod">
+          <ac:chgData name="Fatima Pillosu" userId="a6295d4dc9e22643" providerId="LiveId" clId="{F0B9C950-5C19-45BA-B39E-FADB59417D97}" dt="2025-06-26T03:43:11.999" v="3397" actId="21"/>
+          <ac:spMkLst>
+            <pc:docMk/>
+            <pc:sldMk cId="4289110639" sldId="257"/>
+            <ac:spMk id="39" creationId="{8735F6D1-5555-E7D6-D0BB-A64923855C01}"/>
+          </ac:spMkLst>
+        </pc:spChg>
+        <pc:spChg chg="add del mod">
+          <ac:chgData name="Fatima Pillosu" userId="a6295d4dc9e22643" providerId="LiveId" clId="{F0B9C950-5C19-45BA-B39E-FADB59417D97}" dt="2025-06-26T03:43:11.999" v="3397" actId="21"/>
+          <ac:spMkLst>
+            <pc:docMk/>
+            <pc:sldMk cId="4289110639" sldId="257"/>
+            <ac:spMk id="40" creationId="{2B972E94-DE4C-66D0-A6A3-F1E9C69D6169}"/>
+          </ac:spMkLst>
+        </pc:spChg>
+        <pc:spChg chg="add del mod">
+          <ac:chgData name="Fatima Pillosu" userId="a6295d4dc9e22643" providerId="LiveId" clId="{F0B9C950-5C19-45BA-B39E-FADB59417D97}" dt="2025-06-25T15:13:51.292" v="1448" actId="21"/>
+          <ac:spMkLst>
+            <pc:docMk/>
+            <pc:sldMk cId="4289110639" sldId="257"/>
+            <ac:spMk id="40" creationId="{59E5FA53-1F3C-04E3-0ED3-C7DC994CB669}"/>
+          </ac:spMkLst>
+        </pc:spChg>
+        <pc:spChg chg="add del mod">
+          <ac:chgData name="Fatima Pillosu" userId="a6295d4dc9e22643" providerId="LiveId" clId="{F0B9C950-5C19-45BA-B39E-FADB59417D97}" dt="2025-06-26T03:43:11.999" v="3397" actId="21"/>
+          <ac:spMkLst>
+            <pc:docMk/>
+            <pc:sldMk cId="4289110639" sldId="257"/>
+            <ac:spMk id="41" creationId="{0F40EDD3-6828-DA92-C5B8-A892A73FD4CE}"/>
+          </ac:spMkLst>
+        </pc:spChg>
+        <pc:spChg chg="add del mod">
+          <ac:chgData name="Fatima Pillosu" userId="a6295d4dc9e22643" providerId="LiveId" clId="{F0B9C950-5C19-45BA-B39E-FADB59417D97}" dt="2025-06-25T15:13:51.292" v="1448" actId="21"/>
+          <ac:spMkLst>
+            <pc:docMk/>
+            <pc:sldMk cId="4289110639" sldId="257"/>
+            <ac:spMk id="41" creationId="{A0097D71-B402-A483-CFFA-F86F3C56053E}"/>
+          </ac:spMkLst>
+        </pc:spChg>
+        <pc:spChg chg="add del mod">
+          <ac:chgData name="Fatima Pillosu" userId="a6295d4dc9e22643" providerId="LiveId" clId="{F0B9C950-5C19-45BA-B39E-FADB59417D97}" dt="2025-06-26T03:43:11.999" v="3397" actId="21"/>
+          <ac:spMkLst>
+            <pc:docMk/>
+            <pc:sldMk cId="4289110639" sldId="257"/>
+            <ac:spMk id="42" creationId="{4BC09263-C830-303A-BB0C-2207AFEFF22B}"/>
+          </ac:spMkLst>
+        </pc:spChg>
+        <pc:spChg chg="add del mod">
+          <ac:chgData name="Fatima Pillosu" userId="a6295d4dc9e22643" providerId="LiveId" clId="{F0B9C950-5C19-45BA-B39E-FADB59417D97}" dt="2025-06-25T15:13:51.292" v="1448" actId="21"/>
+          <ac:spMkLst>
+            <pc:docMk/>
+            <pc:sldMk cId="4289110639" sldId="257"/>
+            <ac:spMk id="42" creationId="{AC12668F-DD4B-D648-D773-7F3063B04CBF}"/>
+          </ac:spMkLst>
+        </pc:spChg>
+        <pc:spChg chg="add del mod">
+          <ac:chgData name="Fatima Pillosu" userId="a6295d4dc9e22643" providerId="LiveId" clId="{F0B9C950-5C19-45BA-B39E-FADB59417D97}" dt="2025-06-25T15:13:51.292" v="1448" actId="21"/>
+          <ac:spMkLst>
+            <pc:docMk/>
+            <pc:sldMk cId="4289110639" sldId="257"/>
+            <ac:spMk id="43" creationId="{77F6A371-1CCF-3C24-C1E6-C283E45C2C4D}"/>
+          </ac:spMkLst>
+        </pc:spChg>
+        <pc:spChg chg="add del mod">
+          <ac:chgData name="Fatima Pillosu" userId="a6295d4dc9e22643" providerId="LiveId" clId="{F0B9C950-5C19-45BA-B39E-FADB59417D97}" dt="2025-06-26T03:43:11.999" v="3397" actId="21"/>
+          <ac:spMkLst>
+            <pc:docMk/>
+            <pc:sldMk cId="4289110639" sldId="257"/>
+            <ac:spMk id="43" creationId="{8BFC4AA3-C582-B088-949F-3006D7236AAA}"/>
+          </ac:spMkLst>
+        </pc:spChg>
+        <pc:spChg chg="add del mod">
+          <ac:chgData name="Fatima Pillosu" userId="a6295d4dc9e22643" providerId="LiveId" clId="{F0B9C950-5C19-45BA-B39E-FADB59417D97}" dt="2025-06-26T03:43:11.999" v="3397" actId="21"/>
+          <ac:spMkLst>
+            <pc:docMk/>
+            <pc:sldMk cId="4289110639" sldId="257"/>
+            <ac:spMk id="44" creationId="{17A4B2C5-47D5-3495-68D8-2CB424DC7257}"/>
+          </ac:spMkLst>
+        </pc:spChg>
+        <pc:spChg chg="add del mod">
+          <ac:chgData name="Fatima Pillosu" userId="a6295d4dc9e22643" providerId="LiveId" clId="{F0B9C950-5C19-45BA-B39E-FADB59417D97}" dt="2025-06-26T03:43:11.999" v="3397" actId="21"/>
+          <ac:spMkLst>
+            <pc:docMk/>
+            <pc:sldMk cId="4289110639" sldId="257"/>
+            <ac:spMk id="45" creationId="{DC1CA93F-6FAF-42B3-BBBF-433BE0D7EC13}"/>
+          </ac:spMkLst>
+        </pc:spChg>
+        <pc:spChg chg="add del mod">
+          <ac:chgData name="Fatima Pillosu" userId="a6295d4dc9e22643" providerId="LiveId" clId="{F0B9C950-5C19-45BA-B39E-FADB59417D97}" dt="2025-06-26T03:43:11.999" v="3397" actId="21"/>
+          <ac:spMkLst>
+            <pc:docMk/>
+            <pc:sldMk cId="4289110639" sldId="257"/>
+            <ac:spMk id="46" creationId="{0C8CE056-7612-0128-B393-AE3D0105B0B0}"/>
+          </ac:spMkLst>
+        </pc:spChg>
+        <pc:spChg chg="add del mod">
+          <ac:chgData name="Fatima Pillosu" userId="a6295d4dc9e22643" providerId="LiveId" clId="{F0B9C950-5C19-45BA-B39E-FADB59417D97}" dt="2025-06-26T03:43:11.999" v="3397" actId="21"/>
+          <ac:spMkLst>
+            <pc:docMk/>
+            <pc:sldMk cId="4289110639" sldId="257"/>
+            <ac:spMk id="47" creationId="{26E5001B-6DEC-3779-E01A-0A27FF325B8B}"/>
+          </ac:spMkLst>
+        </pc:spChg>
+        <pc:spChg chg="add del mod">
+          <ac:chgData name="Fatima Pillosu" userId="a6295d4dc9e22643" providerId="LiveId" clId="{F0B9C950-5C19-45BA-B39E-FADB59417D97}" dt="2025-06-25T15:13:51.292" v="1448" actId="21"/>
+          <ac:spMkLst>
+            <pc:docMk/>
+            <pc:sldMk cId="4289110639" sldId="257"/>
+            <ac:spMk id="47" creationId="{BE24FD28-FAFB-884F-4CE7-E4FD5429F6E3}"/>
+          </ac:spMkLst>
+        </pc:spChg>
+        <pc:spChg chg="add del mod">
+          <ac:chgData name="Fatima Pillosu" userId="a6295d4dc9e22643" providerId="LiveId" clId="{F0B9C950-5C19-45BA-B39E-FADB59417D97}" dt="2025-06-25T15:13:51.292" v="1448" actId="21"/>
+          <ac:spMkLst>
+            <pc:docMk/>
+            <pc:sldMk cId="4289110639" sldId="257"/>
+            <ac:spMk id="48" creationId="{16EB6FA0-CBE1-9983-F1CC-346BCA2848D4}"/>
+          </ac:spMkLst>
+        </pc:spChg>
+        <pc:spChg chg="add del mod">
+          <ac:chgData name="Fatima Pillosu" userId="a6295d4dc9e22643" providerId="LiveId" clId="{F0B9C950-5C19-45BA-B39E-FADB59417D97}" dt="2025-06-26T03:43:11.999" v="3397" actId="21"/>
+          <ac:spMkLst>
+            <pc:docMk/>
+            <pc:sldMk cId="4289110639" sldId="257"/>
+            <ac:spMk id="48" creationId="{9725519F-3CA2-8003-2FF8-53A9447B36EA}"/>
+          </ac:spMkLst>
+        </pc:spChg>
+        <pc:spChg chg="add del mod">
+          <ac:chgData name="Fatima Pillosu" userId="a6295d4dc9e22643" providerId="LiveId" clId="{F0B9C950-5C19-45BA-B39E-FADB59417D97}" dt="2025-06-25T15:13:51.292" v="1448" actId="21"/>
+          <ac:spMkLst>
+            <pc:docMk/>
+            <pc:sldMk cId="4289110639" sldId="257"/>
+            <ac:spMk id="49" creationId="{6E0A576C-FEB4-8631-B956-C0ECE587A165}"/>
+          </ac:spMkLst>
+        </pc:spChg>
+        <pc:spChg chg="add del mod">
+          <ac:chgData name="Fatima Pillosu" userId="a6295d4dc9e22643" providerId="LiveId" clId="{F0B9C950-5C19-45BA-B39E-FADB59417D97}" dt="2025-06-26T03:43:11.999" v="3397" actId="21"/>
+          <ac:spMkLst>
+            <pc:docMk/>
+            <pc:sldMk cId="4289110639" sldId="257"/>
+            <ac:spMk id="49" creationId="{E8D2B8E7-039B-1A09-2DDC-C83E14EB46DF}"/>
+          </ac:spMkLst>
+        </pc:spChg>
+        <pc:spChg chg="add del mod">
+          <ac:chgData name="Fatima Pillosu" userId="a6295d4dc9e22643" providerId="LiveId" clId="{F0B9C950-5C19-45BA-B39E-FADB59417D97}" dt="2025-06-25T15:13:51.292" v="1448" actId="21"/>
+          <ac:spMkLst>
+            <pc:docMk/>
+            <pc:sldMk cId="4289110639" sldId="257"/>
+            <ac:spMk id="50" creationId="{5137CFD3-310B-C4B7-5CBF-D6EBE8384DFF}"/>
+          </ac:spMkLst>
+        </pc:spChg>
+        <pc:spChg chg="add del mod">
+          <ac:chgData name="Fatima Pillosu" userId="a6295d4dc9e22643" providerId="LiveId" clId="{F0B9C950-5C19-45BA-B39E-FADB59417D97}" dt="2025-06-26T03:43:11.999" v="3397" actId="21"/>
+          <ac:spMkLst>
+            <pc:docMk/>
+            <pc:sldMk cId="4289110639" sldId="257"/>
+            <ac:spMk id="50" creationId="{C12365C0-1DFD-9105-1FAE-06F580451ED3}"/>
+          </ac:spMkLst>
+        </pc:spChg>
+        <pc:spChg chg="add del mod">
+          <ac:chgData name="Fatima Pillosu" userId="a6295d4dc9e22643" providerId="LiveId" clId="{F0B9C950-5C19-45BA-B39E-FADB59417D97}" dt="2025-06-25T15:13:51.292" v="1448" actId="21"/>
+          <ac:spMkLst>
+            <pc:docMk/>
+            <pc:sldMk cId="4289110639" sldId="257"/>
+            <ac:spMk id="51" creationId="{3A5CD0EB-6B55-2725-6E3F-17726052CCE4}"/>
+          </ac:spMkLst>
+        </pc:spChg>
+        <pc:spChg chg="add del mod">
+          <ac:chgData name="Fatima Pillosu" userId="a6295d4dc9e22643" providerId="LiveId" clId="{F0B9C950-5C19-45BA-B39E-FADB59417D97}" dt="2025-06-26T03:43:11.999" v="3397" actId="21"/>
+          <ac:spMkLst>
+            <pc:docMk/>
+            <pc:sldMk cId="4289110639" sldId="257"/>
+            <ac:spMk id="51" creationId="{75EFEC79-3C2A-8CE1-D040-35A21318F4DF}"/>
+          </ac:spMkLst>
+        </pc:spChg>
+        <pc:spChg chg="add del mod">
+          <ac:chgData name="Fatima Pillosu" userId="a6295d4dc9e22643" providerId="LiveId" clId="{F0B9C950-5C19-45BA-B39E-FADB59417D97}" dt="2025-06-26T03:43:11.999" v="3397" actId="21"/>
+          <ac:spMkLst>
+            <pc:docMk/>
+            <pc:sldMk cId="4289110639" sldId="257"/>
+            <ac:spMk id="52" creationId="{2E5BBF82-039A-99DB-1291-B984EF2722D0}"/>
+          </ac:spMkLst>
+        </pc:spChg>
+        <pc:spChg chg="add del mod">
+          <ac:chgData name="Fatima Pillosu" userId="a6295d4dc9e22643" providerId="LiveId" clId="{F0B9C950-5C19-45BA-B39E-FADB59417D97}" dt="2025-06-25T15:13:51.292" v="1448" actId="21"/>
+          <ac:spMkLst>
+            <pc:docMk/>
+            <pc:sldMk cId="4289110639" sldId="257"/>
+            <ac:spMk id="52" creationId="{9097776E-A046-4D6E-89DA-50B1F5A3FAF4}"/>
+          </ac:spMkLst>
+        </pc:spChg>
+        <pc:spChg chg="add del mod">
+          <ac:chgData name="Fatima Pillosu" userId="a6295d4dc9e22643" providerId="LiveId" clId="{F0B9C950-5C19-45BA-B39E-FADB59417D97}" dt="2025-06-25T15:13:51.292" v="1448" actId="21"/>
+          <ac:spMkLst>
+            <pc:docMk/>
+            <pc:sldMk cId="4289110639" sldId="257"/>
+            <ac:spMk id="53" creationId="{E90C6C9F-C26A-BA0C-97C9-D400337436C7}"/>
+          </ac:spMkLst>
+        </pc:spChg>
+        <pc:spChg chg="add del mod">
+          <ac:chgData name="Fatima Pillosu" userId="a6295d4dc9e22643" providerId="LiveId" clId="{F0B9C950-5C19-45BA-B39E-FADB59417D97}" dt="2025-06-26T03:43:11.999" v="3397" actId="21"/>
+          <ac:spMkLst>
+            <pc:docMk/>
+            <pc:sldMk cId="4289110639" sldId="257"/>
+            <ac:spMk id="53" creationId="{F1B50902-05E1-2214-2377-74DDCE112879}"/>
+          </ac:spMkLst>
+        </pc:spChg>
+        <pc:spChg chg="add del mod">
+          <ac:chgData name="Fatima Pillosu" userId="a6295d4dc9e22643" providerId="LiveId" clId="{F0B9C950-5C19-45BA-B39E-FADB59417D97}" dt="2025-06-25T15:13:51.292" v="1448" actId="21"/>
+          <ac:spMkLst>
+            <pc:docMk/>
+            <pc:sldMk cId="4289110639" sldId="257"/>
+            <ac:spMk id="54" creationId="{17A4B2C5-47D5-3495-68D8-2CB424DC7257}"/>
+          </ac:spMkLst>
+        </pc:spChg>
+        <pc:spChg chg="add del mod">
+          <ac:chgData name="Fatima Pillosu" userId="a6295d4dc9e22643" providerId="LiveId" clId="{F0B9C950-5C19-45BA-B39E-FADB59417D97}" dt="2025-06-26T03:48:39.927" v="3627" actId="21"/>
+          <ac:spMkLst>
+            <pc:docMk/>
+            <pc:sldMk cId="4289110639" sldId="257"/>
+            <ac:spMk id="54" creationId="{C5F22480-43D2-EC6C-C595-536DDF09AC46}"/>
+          </ac:spMkLst>
+        </pc:spChg>
+        <pc:spChg chg="add del mod">
+          <ac:chgData name="Fatima Pillosu" userId="a6295d4dc9e22643" providerId="LiveId" clId="{F0B9C950-5C19-45BA-B39E-FADB59417D97}" dt="2025-06-25T15:13:51.292" v="1448" actId="21"/>
+          <ac:spMkLst>
+            <pc:docMk/>
+            <pc:sldMk cId="4289110639" sldId="257"/>
+            <ac:spMk id="55" creationId="{1FE71E37-6166-0490-58E8-888C8B970604}"/>
+          </ac:spMkLst>
+        </pc:spChg>
+        <pc:spChg chg="add del mod">
+          <ac:chgData name="Fatima Pillosu" userId="a6295d4dc9e22643" providerId="LiveId" clId="{F0B9C950-5C19-45BA-B39E-FADB59417D97}" dt="2025-06-26T03:48:39.927" v="3627" actId="21"/>
+          <ac:spMkLst>
+            <pc:docMk/>
+            <pc:sldMk cId="4289110639" sldId="257"/>
+            <ac:spMk id="55" creationId="{65CF77BB-AB79-BDF7-1AD9-C8ABDB188BCE}"/>
+          </ac:spMkLst>
+        </pc:spChg>
+        <pc:spChg chg="add del mod">
+          <ac:chgData name="Fatima Pillosu" userId="a6295d4dc9e22643" providerId="LiveId" clId="{F0B9C950-5C19-45BA-B39E-FADB59417D97}" dt="2025-06-25T15:13:51.292" v="1448" actId="21"/>
+          <ac:spMkLst>
+            <pc:docMk/>
+            <pc:sldMk cId="4289110639" sldId="257"/>
+            <ac:spMk id="56" creationId="{951A946F-24FC-86A6-3A72-C8D4D2433C01}"/>
+          </ac:spMkLst>
+        </pc:spChg>
+        <pc:spChg chg="add del mod">
+          <ac:chgData name="Fatima Pillosu" userId="a6295d4dc9e22643" providerId="LiveId" clId="{F0B9C950-5C19-45BA-B39E-FADB59417D97}" dt="2025-06-26T03:48:39.927" v="3627" actId="21"/>
+          <ac:spMkLst>
+            <pc:docMk/>
+            <pc:sldMk cId="4289110639" sldId="257"/>
+            <ac:spMk id="56" creationId="{CE0D8E67-F738-7066-FAAB-7F1C9C0D3446}"/>
+          </ac:spMkLst>
+        </pc:spChg>
+        <pc:spChg chg="add del mod">
+          <ac:chgData name="Fatima Pillosu" userId="a6295d4dc9e22643" providerId="LiveId" clId="{F0B9C950-5C19-45BA-B39E-FADB59417D97}" dt="2025-06-26T03:48:39.927" v="3627" actId="21"/>
+          <ac:spMkLst>
+            <pc:docMk/>
+            <pc:sldMk cId="4289110639" sldId="257"/>
+            <ac:spMk id="57" creationId="{716E92A3-A5CC-93CB-1E03-1C50F1F6DD03}"/>
+          </ac:spMkLst>
+        </pc:spChg>
+        <pc:spChg chg="add del mod">
+          <ac:chgData name="Fatima Pillosu" userId="a6295d4dc9e22643" providerId="LiveId" clId="{F0B9C950-5C19-45BA-B39E-FADB59417D97}" dt="2025-06-25T15:13:51.292" v="1448" actId="21"/>
+          <ac:spMkLst>
+            <pc:docMk/>
+            <pc:sldMk cId="4289110639" sldId="257"/>
+            <ac:spMk id="57" creationId="{D7B7EA2C-EE98-FF83-48D1-3425D530EEDB}"/>
+          </ac:spMkLst>
+        </pc:spChg>
+        <pc:spChg chg="add del mod">
+          <ac:chgData name="Fatima Pillosu" userId="a6295d4dc9e22643" providerId="LiveId" clId="{F0B9C950-5C19-45BA-B39E-FADB59417D97}" dt="2025-06-25T15:13:51.292" v="1448" actId="21"/>
+          <ac:spMkLst>
+            <pc:docMk/>
+            <pc:sldMk cId="4289110639" sldId="257"/>
+            <ac:spMk id="58" creationId="{441CB6E6-87E2-1A0A-67F8-7F99E4513D1C}"/>
+          </ac:spMkLst>
+        </pc:spChg>
+        <pc:spChg chg="add del mod">
+          <ac:chgData name="Fatima Pillosu" userId="a6295d4dc9e22643" providerId="LiveId" clId="{F0B9C950-5C19-45BA-B39E-FADB59417D97}" dt="2025-06-26T03:48:39.927" v="3627" actId="21"/>
+          <ac:spMkLst>
+            <pc:docMk/>
+            <pc:sldMk cId="4289110639" sldId="257"/>
+            <ac:spMk id="58" creationId="{C0C067FC-01D1-B083-6206-56A46662729A}"/>
+          </ac:spMkLst>
+        </pc:spChg>
+        <pc:spChg chg="add del mod">
+          <ac:chgData name="Fatima Pillosu" userId="a6295d4dc9e22643" providerId="LiveId" clId="{F0B9C950-5C19-45BA-B39E-FADB59417D97}" dt="2025-06-26T03:48:39.927" v="3627" actId="21"/>
+          <ac:spMkLst>
+            <pc:docMk/>
+            <pc:sldMk cId="4289110639" sldId="257"/>
+            <ac:spMk id="59" creationId="{649A66B3-B899-4304-E071-230DD34AFBC3}"/>
+          </ac:spMkLst>
+        </pc:spChg>
+        <pc:spChg chg="add del mod">
+          <ac:chgData name="Fatima Pillosu" userId="a6295d4dc9e22643" providerId="LiveId" clId="{F0B9C950-5C19-45BA-B39E-FADB59417D97}" dt="2025-06-25T15:13:51.292" v="1448" actId="21"/>
+          <ac:spMkLst>
+            <pc:docMk/>
+            <pc:sldMk cId="4289110639" sldId="257"/>
+            <ac:spMk id="59" creationId="{DC1CA93F-6FAF-42B3-BBBF-433BE0D7EC13}"/>
+          </ac:spMkLst>
+        </pc:spChg>
+        <pc:spChg chg="add del mod">
+          <ac:chgData name="Fatima Pillosu" userId="a6295d4dc9e22643" providerId="LiveId" clId="{F0B9C950-5C19-45BA-B39E-FADB59417D97}" dt="2025-06-25T15:13:51.292" v="1448" actId="21"/>
+          <ac:spMkLst>
+            <pc:docMk/>
+            <pc:sldMk cId="4289110639" sldId="257"/>
+            <ac:spMk id="60" creationId="{06561625-E084-10DA-C9D2-DC79AAA113FE}"/>
+          </ac:spMkLst>
+        </pc:spChg>
+        <pc:spChg chg="add del mod">
+          <ac:chgData name="Fatima Pillosu" userId="a6295d4dc9e22643" providerId="LiveId" clId="{F0B9C950-5C19-45BA-B39E-FADB59417D97}" dt="2025-06-26T03:48:39.927" v="3627" actId="21"/>
+          <ac:spMkLst>
+            <pc:docMk/>
+            <pc:sldMk cId="4289110639" sldId="257"/>
+            <ac:spMk id="60" creationId="{0949695F-9A1D-9DE9-6A11-1A7363D5D06D}"/>
+          </ac:spMkLst>
+        </pc:spChg>
+        <pc:spChg chg="add del mod">
+          <ac:chgData name="Fatima Pillosu" userId="a6295d4dc9e22643" providerId="LiveId" clId="{F0B9C950-5C19-45BA-B39E-FADB59417D97}" dt="2025-06-26T03:48:39.927" v="3627" actId="21"/>
+          <ac:spMkLst>
+            <pc:docMk/>
+            <pc:sldMk cId="4289110639" sldId="257"/>
+            <ac:spMk id="61" creationId="{26499A74-7ADD-8575-125F-3A9F7DAB54FD}"/>
+          </ac:spMkLst>
+        </pc:spChg>
+        <pc:spChg chg="add del mod">
+          <ac:chgData name="Fatima Pillosu" userId="a6295d4dc9e22643" providerId="LiveId" clId="{F0B9C950-5C19-45BA-B39E-FADB59417D97}" dt="2025-06-25T15:13:51.292" v="1448" actId="21"/>
+          <ac:spMkLst>
+            <pc:docMk/>
+            <pc:sldMk cId="4289110639" sldId="257"/>
+            <ac:spMk id="61" creationId="{E1DBA1A3-69AC-E204-1AED-E215C8C8CEB0}"/>
+          </ac:spMkLst>
+        </pc:spChg>
+        <pc:spChg chg="add del mod">
+          <ac:chgData name="Fatima Pillosu" userId="a6295d4dc9e22643" providerId="LiveId" clId="{F0B9C950-5C19-45BA-B39E-FADB59417D97}" dt="2025-06-25T15:13:51.292" v="1448" actId="21"/>
+          <ac:spMkLst>
+            <pc:docMk/>
+            <pc:sldMk cId="4289110639" sldId="257"/>
+            <ac:spMk id="62" creationId="{1402EF05-0A8D-81FE-F96A-820C0CB99803}"/>
+          </ac:spMkLst>
+        </pc:spChg>
+        <pc:spChg chg="add del mod">
+          <ac:chgData name="Fatima Pillosu" userId="a6295d4dc9e22643" providerId="LiveId" clId="{F0B9C950-5C19-45BA-B39E-FADB59417D97}" dt="2025-06-26T03:48:39.927" v="3627" actId="21"/>
+          <ac:spMkLst>
+            <pc:docMk/>
+            <pc:sldMk cId="4289110639" sldId="257"/>
+            <ac:spMk id="62" creationId="{87998562-8C2F-313F-516D-39037195BB26}"/>
+          </ac:spMkLst>
+        </pc:spChg>
+        <pc:spChg chg="add del mod">
+          <ac:chgData name="Fatima Pillosu" userId="a6295d4dc9e22643" providerId="LiveId" clId="{F0B9C950-5C19-45BA-B39E-FADB59417D97}" dt="2025-06-25T15:13:51.292" v="1448" actId="21"/>
+          <ac:spMkLst>
+            <pc:docMk/>
+            <pc:sldMk cId="4289110639" sldId="257"/>
+            <ac:spMk id="63" creationId="{4CDF8D29-A1A4-B6EF-CC2D-02154951F423}"/>
+          </ac:spMkLst>
+        </pc:spChg>
+        <pc:spChg chg="add del mod">
+          <ac:chgData name="Fatima Pillosu" userId="a6295d4dc9e22643" providerId="LiveId" clId="{F0B9C950-5C19-45BA-B39E-FADB59417D97}" dt="2025-06-26T03:48:39.927" v="3627" actId="21"/>
+          <ac:spMkLst>
+            <pc:docMk/>
+            <pc:sldMk cId="4289110639" sldId="257"/>
+            <ac:spMk id="63" creationId="{80D3517E-1814-BABC-8B8F-AB5B211A3AA1}"/>
+          </ac:spMkLst>
+        </pc:spChg>
+        <pc:spChg chg="add del mod">
+          <ac:chgData name="Fatima Pillosu" userId="a6295d4dc9e22643" providerId="LiveId" clId="{F0B9C950-5C19-45BA-B39E-FADB59417D97}" dt="2025-06-26T03:48:39.927" v="3627" actId="21"/>
+          <ac:spMkLst>
+            <pc:docMk/>
+            <pc:sldMk cId="4289110639" sldId="257"/>
+            <ac:spMk id="64" creationId="{A6BE4838-1365-D3B7-CEDE-D7E2E62B7F31}"/>
+          </ac:spMkLst>
+        </pc:spChg>
+        <pc:spChg chg="add del mod">
+          <ac:chgData name="Fatima Pillosu" userId="a6295d4dc9e22643" providerId="LiveId" clId="{F0B9C950-5C19-45BA-B39E-FADB59417D97}" dt="2025-06-25T15:13:51.292" v="1448" actId="21"/>
+          <ac:spMkLst>
+            <pc:docMk/>
+            <pc:sldMk cId="4289110639" sldId="257"/>
+            <ac:spMk id="64" creationId="{C5F22480-43D2-EC6C-C595-536DDF09AC46}"/>
+          </ac:spMkLst>
+        </pc:spChg>
+        <pc:spChg chg="add del mod">
+          <ac:chgData name="Fatima Pillosu" userId="a6295d4dc9e22643" providerId="LiveId" clId="{F0B9C950-5C19-45BA-B39E-FADB59417D97}" dt="2025-06-25T15:13:51.292" v="1448" actId="21"/>
+          <ac:spMkLst>
+            <pc:docMk/>
+            <pc:sldMk cId="4289110639" sldId="257"/>
+            <ac:spMk id="65" creationId="{65CF77BB-AB79-BDF7-1AD9-C8ABDB188BCE}"/>
+          </ac:spMkLst>
+        </pc:spChg>
+        <pc:spChg chg="add del mod">
+          <ac:chgData name="Fatima Pillosu" userId="a6295d4dc9e22643" providerId="LiveId" clId="{F0B9C950-5C19-45BA-B39E-FADB59417D97}" dt="2025-06-26T03:48:39.927" v="3627" actId="21"/>
+          <ac:spMkLst>
+            <pc:docMk/>
+            <pc:sldMk cId="4289110639" sldId="257"/>
+            <ac:spMk id="65" creationId="{8735F6D1-5555-E7D6-D0BB-A64923855C01}"/>
+          </ac:spMkLst>
+        </pc:spChg>
+        <pc:spChg chg="add del mod">
+          <ac:chgData name="Fatima Pillosu" userId="a6295d4dc9e22643" providerId="LiveId" clId="{F0B9C950-5C19-45BA-B39E-FADB59417D97}" dt="2025-06-26T03:48:39.927" v="3627" actId="21"/>
+          <ac:spMkLst>
+            <pc:docMk/>
+            <pc:sldMk cId="4289110639" sldId="257"/>
+            <ac:spMk id="66" creationId="{2B972E94-DE4C-66D0-A6A3-F1E9C69D6169}"/>
+          </ac:spMkLst>
+        </pc:spChg>
+        <pc:spChg chg="add del mod">
+          <ac:chgData name="Fatima Pillosu" userId="a6295d4dc9e22643" providerId="LiveId" clId="{F0B9C950-5C19-45BA-B39E-FADB59417D97}" dt="2025-06-25T15:13:51.292" v="1448" actId="21"/>
+          <ac:spMkLst>
+            <pc:docMk/>
+            <pc:sldMk cId="4289110639" sldId="257"/>
+            <ac:spMk id="66" creationId="{CE0D8E67-F738-7066-FAAB-7F1C9C0D3446}"/>
+          </ac:spMkLst>
+        </pc:spChg>
+        <pc:spChg chg="add del mod">
+          <ac:chgData name="Fatima Pillosu" userId="a6295d4dc9e22643" providerId="LiveId" clId="{F0B9C950-5C19-45BA-B39E-FADB59417D97}" dt="2025-06-26T03:48:39.927" v="3627" actId="21"/>
+          <ac:spMkLst>
+            <pc:docMk/>
+            <pc:sldMk cId="4289110639" sldId="257"/>
+            <ac:spMk id="67" creationId="{0F40EDD3-6828-DA92-C5B8-A892A73FD4CE}"/>
+          </ac:spMkLst>
+        </pc:spChg>
+        <pc:spChg chg="add del mod">
+          <ac:chgData name="Fatima Pillosu" userId="a6295d4dc9e22643" providerId="LiveId" clId="{F0B9C950-5C19-45BA-B39E-FADB59417D97}" dt="2025-06-25T15:13:51.292" v="1448" actId="21"/>
+          <ac:spMkLst>
+            <pc:docMk/>
+            <pc:sldMk cId="4289110639" sldId="257"/>
+            <ac:spMk id="67" creationId="{4D8BB4D1-20CB-1DE2-D4F0-75DF1EAC1D67}"/>
+          </ac:spMkLst>
+        </pc:spChg>
+        <pc:spChg chg="add del mod">
+          <ac:chgData name="Fatima Pillosu" userId="a6295d4dc9e22643" providerId="LiveId" clId="{F0B9C950-5C19-45BA-B39E-FADB59417D97}" dt="2025-06-26T03:48:39.927" v="3627" actId="21"/>
+          <ac:spMkLst>
+            <pc:docMk/>
+            <pc:sldMk cId="4289110639" sldId="257"/>
+            <ac:spMk id="68" creationId="{4BC09263-C830-303A-BB0C-2207AFEFF22B}"/>
+          </ac:spMkLst>
+        </pc:spChg>
+        <pc:spChg chg="add del mod">
+          <ac:chgData name="Fatima Pillosu" userId="a6295d4dc9e22643" providerId="LiveId" clId="{F0B9C950-5C19-45BA-B39E-FADB59417D97}" dt="2025-06-25T15:13:51.292" v="1448" actId="21"/>
+          <ac:spMkLst>
+            <pc:docMk/>
+            <pc:sldMk cId="4289110639" sldId="257"/>
+            <ac:spMk id="68" creationId="{50D42DFB-603C-F1E1-00B0-82C244B805A5}"/>
+          </ac:spMkLst>
+        </pc:spChg>
+        <pc:spChg chg="add del mod">
+          <ac:chgData name="Fatima Pillosu" userId="a6295d4dc9e22643" providerId="LiveId" clId="{F0B9C950-5C19-45BA-B39E-FADB59417D97}" dt="2025-06-25T15:13:51.292" v="1448" actId="21"/>
+          <ac:spMkLst>
+            <pc:docMk/>
+            <pc:sldMk cId="4289110639" sldId="257"/>
+            <ac:spMk id="69" creationId="{4CB4D06F-1CFC-86DB-9C76-5F0C3731175E}"/>
+          </ac:spMkLst>
+        </pc:spChg>
+        <pc:spChg chg="add del mod">
+          <ac:chgData name="Fatima Pillosu" userId="a6295d4dc9e22643" providerId="LiveId" clId="{F0B9C950-5C19-45BA-B39E-FADB59417D97}" dt="2025-06-26T03:48:39.927" v="3627" actId="21"/>
+          <ac:spMkLst>
+            <pc:docMk/>
+            <pc:sldMk cId="4289110639" sldId="257"/>
+            <ac:spMk id="69" creationId="{8BFC4AA3-C582-B088-949F-3006D7236AAA}"/>
+          </ac:spMkLst>
+        </pc:spChg>
+        <pc:spChg chg="add del mod">
+          <ac:chgData name="Fatima Pillosu" userId="a6295d4dc9e22643" providerId="LiveId" clId="{F0B9C950-5C19-45BA-B39E-FADB59417D97}" dt="2025-06-26T03:48:39.927" v="3627" actId="21"/>
+          <ac:spMkLst>
+            <pc:docMk/>
+            <pc:sldMk cId="4289110639" sldId="257"/>
+            <ac:spMk id="70" creationId="{17A4B2C5-47D5-3495-68D8-2CB424DC7257}"/>
+          </ac:spMkLst>
+        </pc:spChg>
+        <pc:spChg chg="add del mod">
+          <ac:chgData name="Fatima Pillosu" userId="a6295d4dc9e22643" providerId="LiveId" clId="{F0B9C950-5C19-45BA-B39E-FADB59417D97}" dt="2025-06-25T15:13:51.292" v="1448" actId="21"/>
+          <ac:spMkLst>
+            <pc:docMk/>
+            <pc:sldMk cId="4289110639" sldId="257"/>
+            <ac:spMk id="70" creationId="{3677E649-7591-CF6E-4DD8-9E544C86BDA1}"/>
+          </ac:spMkLst>
+        </pc:spChg>
+        <pc:spChg chg="add del mod">
+          <ac:chgData name="Fatima Pillosu" userId="a6295d4dc9e22643" providerId="LiveId" clId="{F0B9C950-5C19-45BA-B39E-FADB59417D97}" dt="2025-06-25T15:13:51.292" v="1448" actId="21"/>
+          <ac:spMkLst>
+            <pc:docMk/>
+            <pc:sldMk cId="4289110639" sldId="257"/>
+            <ac:spMk id="71" creationId="{2BFE8251-FDEF-457C-6AFD-2E5AF06DF895}"/>
+          </ac:spMkLst>
+        </pc:spChg>
+        <pc:spChg chg="add del mod">
+          <ac:chgData name="Fatima Pillosu" userId="a6295d4dc9e22643" providerId="LiveId" clId="{F0B9C950-5C19-45BA-B39E-FADB59417D97}" dt="2025-06-26T03:48:39.927" v="3627" actId="21"/>
+          <ac:spMkLst>
+            <pc:docMk/>
+            <pc:sldMk cId="4289110639" sldId="257"/>
+            <ac:spMk id="71" creationId="{DC1CA93F-6FAF-42B3-BBBF-433BE0D7EC13}"/>
+          </ac:spMkLst>
+        </pc:spChg>
+        <pc:spChg chg="add del mod">
+          <ac:chgData name="Fatima Pillosu" userId="a6295d4dc9e22643" providerId="LiveId" clId="{F0B9C950-5C19-45BA-B39E-FADB59417D97}" dt="2025-06-26T03:48:39.927" v="3627" actId="21"/>
+          <ac:spMkLst>
+            <pc:docMk/>
+            <pc:sldMk cId="4289110639" sldId="257"/>
+            <ac:spMk id="72" creationId="{0C8CE056-7612-0128-B393-AE3D0105B0B0}"/>
+          </ac:spMkLst>
+        </pc:spChg>
+        <pc:spChg chg="add del mod">
+          <ac:chgData name="Fatima Pillosu" userId="a6295d4dc9e22643" providerId="LiveId" clId="{F0B9C950-5C19-45BA-B39E-FADB59417D97}" dt="2025-06-25T15:13:51.292" v="1448" actId="21"/>
+          <ac:spMkLst>
+            <pc:docMk/>
+            <pc:sldMk cId="4289110639" sldId="257"/>
+            <ac:spMk id="72" creationId="{36D3542B-779B-AA13-5BF1-D5B361BB166D}"/>
+          </ac:spMkLst>
+        </pc:spChg>
+        <pc:spChg chg="add del mod">
+          <ac:chgData name="Fatima Pillosu" userId="a6295d4dc9e22643" providerId="LiveId" clId="{F0B9C950-5C19-45BA-B39E-FADB59417D97}" dt="2025-06-26T03:48:39.927" v="3627" actId="21"/>
+          <ac:spMkLst>
+            <pc:docMk/>
+            <pc:sldMk cId="4289110639" sldId="257"/>
+            <ac:spMk id="73" creationId="{26E5001B-6DEC-3779-E01A-0A27FF325B8B}"/>
+          </ac:spMkLst>
+        </pc:spChg>
+        <pc:spChg chg="add del mod">
+          <ac:chgData name="Fatima Pillosu" userId="a6295d4dc9e22643" providerId="LiveId" clId="{F0B9C950-5C19-45BA-B39E-FADB59417D97}" dt="2025-06-25T15:13:51.292" v="1448" actId="21"/>
+          <ac:spMkLst>
+            <pc:docMk/>
+            <pc:sldMk cId="4289110639" sldId="257"/>
+            <ac:spMk id="73" creationId="{DFF9F863-65F7-D89A-853C-C1170C80C088}"/>
+          </ac:spMkLst>
+        </pc:spChg>
+        <pc:spChg chg="add del mod">
+          <ac:chgData name="Fatima Pillosu" userId="a6295d4dc9e22643" providerId="LiveId" clId="{F0B9C950-5C19-45BA-B39E-FADB59417D97}" dt="2025-06-26T03:48:39.927" v="3627" actId="21"/>
+          <ac:spMkLst>
+            <pc:docMk/>
+            <pc:sldMk cId="4289110639" sldId="257"/>
+            <ac:spMk id="74" creationId="{9725519F-3CA2-8003-2FF8-53A9447B36EA}"/>
+          </ac:spMkLst>
+        </pc:spChg>
+        <pc:spChg chg="add del mod">
+          <ac:chgData name="Fatima Pillosu" userId="a6295d4dc9e22643" providerId="LiveId" clId="{F0B9C950-5C19-45BA-B39E-FADB59417D97}" dt="2025-06-25T15:14:56.879" v="1473" actId="478"/>
+          <ac:spMkLst>
+            <pc:docMk/>
+            <pc:sldMk cId="4289110639" sldId="257"/>
+            <ac:spMk id="74" creationId="{EF31E25C-48D4-6C90-AFFC-3A37A8EA7E78}"/>
+          </ac:spMkLst>
+        </pc:spChg>
+        <pc:spChg chg="add del mod">
+          <ac:chgData name="Fatima Pillosu" userId="a6295d4dc9e22643" providerId="LiveId" clId="{F0B9C950-5C19-45BA-B39E-FADB59417D97}" dt="2025-06-25T15:14:54.927" v="1472" actId="478"/>
+          <ac:spMkLst>
+            <pc:docMk/>
+            <pc:sldMk cId="4289110639" sldId="257"/>
+            <ac:spMk id="75" creationId="{D32C8D70-81C4-AB6A-08D1-810BA67ED33B}"/>
+          </ac:spMkLst>
+        </pc:spChg>
+        <pc:spChg chg="add del mod">
+          <ac:chgData name="Fatima Pillosu" userId="a6295d4dc9e22643" providerId="LiveId" clId="{F0B9C950-5C19-45BA-B39E-FADB59417D97}" dt="2025-06-26T03:48:39.927" v="3627" actId="21"/>
+          <ac:spMkLst>
+            <pc:docMk/>
+            <pc:sldMk cId="4289110639" sldId="257"/>
+            <ac:spMk id="75" creationId="{E8D2B8E7-039B-1A09-2DDC-C83E14EB46DF}"/>
+          </ac:spMkLst>
+        </pc:spChg>
+        <pc:spChg chg="add del mod">
+          <ac:chgData name="Fatima Pillosu" userId="a6295d4dc9e22643" providerId="LiveId" clId="{F0B9C950-5C19-45BA-B39E-FADB59417D97}" dt="2025-06-26T03:48:39.927" v="3627" actId="21"/>
+          <ac:spMkLst>
+            <pc:docMk/>
+            <pc:sldMk cId="4289110639" sldId="257"/>
+            <ac:spMk id="76" creationId="{C12365C0-1DFD-9105-1FAE-06F580451ED3}"/>
+          </ac:spMkLst>
+        </pc:spChg>
+        <pc:spChg chg="add del mod">
+          <ac:chgData name="Fatima Pillosu" userId="a6295d4dc9e22643" providerId="LiveId" clId="{F0B9C950-5C19-45BA-B39E-FADB59417D97}" dt="2025-06-25T15:14:50.744" v="1471" actId="478"/>
+          <ac:spMkLst>
+            <pc:docMk/>
+            <pc:sldMk cId="4289110639" sldId="257"/>
+            <ac:spMk id="76" creationId="{C67831BC-0460-0F59-5119-29984C4351EE}"/>
+          </ac:spMkLst>
+        </pc:spChg>
+        <pc:spChg chg="add del mod">
+          <ac:chgData name="Fatima Pillosu" userId="a6295d4dc9e22643" providerId="LiveId" clId="{F0B9C950-5C19-45BA-B39E-FADB59417D97}" dt="2025-06-26T03:48:39.927" v="3627" actId="21"/>
+          <ac:spMkLst>
+            <pc:docMk/>
+            <pc:sldMk cId="4289110639" sldId="257"/>
+            <ac:spMk id="77" creationId="{75EFEC79-3C2A-8CE1-D040-35A21318F4DF}"/>
+          </ac:spMkLst>
+        </pc:spChg>
+        <pc:spChg chg="add del mod">
+          <ac:chgData name="Fatima Pillosu" userId="a6295d4dc9e22643" providerId="LiveId" clId="{F0B9C950-5C19-45BA-B39E-FADB59417D97}" dt="2025-06-25T15:16:13.902" v="1494" actId="478"/>
+          <ac:spMkLst>
+            <pc:docMk/>
+            <pc:sldMk cId="4289110639" sldId="257"/>
+            <ac:spMk id="77" creationId="{A96FCC34-B663-485A-1B91-366A6782D098}"/>
+          </ac:spMkLst>
+        </pc:spChg>
+        <pc:spChg chg="add del mod">
+          <ac:chgData name="Fatima Pillosu" userId="a6295d4dc9e22643" providerId="LiveId" clId="{F0B9C950-5C19-45BA-B39E-FADB59417D97}" dt="2025-06-26T03:48:39.927" v="3627" actId="21"/>
+          <ac:spMkLst>
+            <pc:docMk/>
+            <pc:sldMk cId="4289110639" sldId="257"/>
+            <ac:spMk id="78" creationId="{2E5BBF82-039A-99DB-1291-B984EF2722D0}"/>
+          </ac:spMkLst>
+        </pc:spChg>
+        <pc:spChg chg="add del mod">
+          <ac:chgData name="Fatima Pillosu" userId="a6295d4dc9e22643" providerId="LiveId" clId="{F0B9C950-5C19-45BA-B39E-FADB59417D97}" dt="2025-06-25T15:38:58.332" v="1902" actId="21"/>
+          <ac:spMkLst>
+            <pc:docMk/>
+            <pc:sldMk cId="4289110639" sldId="257"/>
+            <ac:spMk id="78" creationId="{DDAF3D54-885E-2A29-8D7C-F2C70C58F5B5}"/>
+          </ac:spMkLst>
+        </pc:spChg>
+        <pc:spChg chg="add del mod">
+          <ac:chgData name="Fatima Pillosu" userId="a6295d4dc9e22643" providerId="LiveId" clId="{F0B9C950-5C19-45BA-B39E-FADB59417D97}" dt="2025-06-26T03:48:39.927" v="3627" actId="21"/>
+          <ac:spMkLst>
+            <pc:docMk/>
+            <pc:sldMk cId="4289110639" sldId="257"/>
+            <ac:spMk id="79" creationId="{F1B50902-05E1-2214-2377-74DDCE112879}"/>
+          </ac:spMkLst>
+        </pc:spChg>
+        <pc:spChg chg="add del mod">
+          <ac:chgData name="Fatima Pillosu" userId="a6295d4dc9e22643" providerId="LiveId" clId="{F0B9C950-5C19-45BA-B39E-FADB59417D97}" dt="2025-06-26T03:48:39.927" v="3627" actId="21"/>
+          <ac:spMkLst>
+            <pc:docMk/>
+            <pc:sldMk cId="4289110639" sldId="257"/>
+            <ac:spMk id="80" creationId="{B136B25A-C0BC-62CA-3885-7F8305C6C703}"/>
+          </ac:spMkLst>
+        </pc:spChg>
+        <pc:spChg chg="add del mod">
+          <ac:chgData name="Fatima Pillosu" userId="a6295d4dc9e22643" providerId="LiveId" clId="{F0B9C950-5C19-45BA-B39E-FADB59417D97}" dt="2025-06-26T03:48:39.927" v="3627" actId="21"/>
+          <ac:spMkLst>
+            <pc:docMk/>
+            <pc:sldMk cId="4289110639" sldId="257"/>
+            <ac:spMk id="81" creationId="{D0E6682D-921D-2405-877D-EC86849DB85A}"/>
+          </ac:spMkLst>
+        </pc:spChg>
+        <pc:spChg chg="add del mod">
+          <ac:chgData name="Fatima Pillosu" userId="a6295d4dc9e22643" providerId="LiveId" clId="{F0B9C950-5C19-45BA-B39E-FADB59417D97}" dt="2025-06-25T15:15:40.326" v="1488" actId="478"/>
+          <ac:spMkLst>
+            <pc:docMk/>
+            <pc:sldMk cId="4289110639" sldId="257"/>
+            <ac:spMk id="82" creationId="{8993D2BA-C58E-5F46-6E65-8673351E7984}"/>
+          </ac:spMkLst>
+        </pc:spChg>
+        <pc:spChg chg="add del mod">
+          <ac:chgData name="Fatima Pillosu" userId="a6295d4dc9e22643" providerId="LiveId" clId="{F0B9C950-5C19-45BA-B39E-FADB59417D97}" dt="2025-06-26T03:48:39.927" v="3627" actId="21"/>
+          <ac:spMkLst>
+            <pc:docMk/>
+            <pc:sldMk cId="4289110639" sldId="257"/>
+            <ac:spMk id="82" creationId="{DD14B712-37F6-3D77-C944-61E7F4FCA0AC}"/>
+          </ac:spMkLst>
+        </pc:spChg>
+        <pc:spChg chg="add del mod">
+          <ac:chgData name="Fatima Pillosu" userId="a6295d4dc9e22643" providerId="LiveId" clId="{F0B9C950-5C19-45BA-B39E-FADB59417D97}" dt="2025-06-26T03:48:39.927" v="3627" actId="21"/>
+          <ac:spMkLst>
+            <pc:docMk/>
+            <pc:sldMk cId="4289110639" sldId="257"/>
+            <ac:spMk id="83" creationId="{0C95B8AD-5ACB-2E85-B61D-1A867AAB576F}"/>
+          </ac:spMkLst>
+        </pc:spChg>
+        <pc:spChg chg="add del mod">
+          <ac:chgData name="Fatima Pillosu" userId="a6295d4dc9e22643" providerId="LiveId" clId="{F0B9C950-5C19-45BA-B39E-FADB59417D97}" dt="2025-06-25T15:15:41.649" v="1489" actId="478"/>
+          <ac:spMkLst>
+            <pc:docMk/>
+            <pc:sldMk cId="4289110639" sldId="257"/>
+            <ac:spMk id="83" creationId="{3BC980C1-1730-6AF0-AED0-8759A78EA8C6}"/>
+          </ac:spMkLst>
+        </pc:spChg>
+        <pc:spChg chg="add del mod">
+          <ac:chgData name="Fatima Pillosu" userId="a6295d4dc9e22643" providerId="LiveId" clId="{F0B9C950-5C19-45BA-B39E-FADB59417D97}" dt="2025-06-25T15:15:43.114" v="1490" actId="478"/>
+          <ac:spMkLst>
+            <pc:docMk/>
+            <pc:sldMk cId="4289110639" sldId="257"/>
+            <ac:spMk id="84" creationId="{C00C6D4F-6379-0107-EFEC-867498B3DF65}"/>
+          </ac:spMkLst>
+        </pc:spChg>
+        <pc:spChg chg="add del mod">
+          <ac:chgData name="Fatima Pillosu" userId="a6295d4dc9e22643" providerId="LiveId" clId="{F0B9C950-5C19-45BA-B39E-FADB59417D97}" dt="2025-06-26T03:48:39.927" v="3627" actId="21"/>
+          <ac:spMkLst>
+            <pc:docMk/>
+            <pc:sldMk cId="4289110639" sldId="257"/>
+            <ac:spMk id="84" creationId="{D94A1280-B2A5-2EF1-0443-7D818E56F280}"/>
+          </ac:spMkLst>
+        </pc:spChg>
+        <pc:spChg chg="add del mod">
+          <ac:chgData name="Fatima Pillosu" userId="a6295d4dc9e22643" providerId="LiveId" clId="{F0B9C950-5C19-45BA-B39E-FADB59417D97}" dt="2025-06-26T03:48:39.927" v="3627" actId="21"/>
+          <ac:spMkLst>
+            <pc:docMk/>
+            <pc:sldMk cId="4289110639" sldId="257"/>
+            <ac:spMk id="85" creationId="{59155F2D-DBF5-0F9C-EC3B-2ACFE1F662A9}"/>
+          </ac:spMkLst>
+        </pc:spChg>
+        <pc:spChg chg="add del mod">
+          <ac:chgData name="Fatima Pillosu" userId="a6295d4dc9e22643" providerId="LiveId" clId="{F0B9C950-5C19-45BA-B39E-FADB59417D97}" dt="2025-06-26T03:48:39.927" v="3627" actId="21"/>
+          <ac:spMkLst>
+            <pc:docMk/>
+            <pc:sldMk cId="4289110639" sldId="257"/>
+            <ac:spMk id="86" creationId="{750E6499-AEDD-05B1-0F02-F5A5C33BAA43}"/>
+          </ac:spMkLst>
+        </pc:spChg>
+        <pc:spChg chg="add del">
+          <ac:chgData name="Fatima Pillosu" userId="a6295d4dc9e22643" providerId="LiveId" clId="{F0B9C950-5C19-45BA-B39E-FADB59417D97}" dt="2025-06-26T03:48:38.274" v="3626" actId="478"/>
+          <ac:spMkLst>
+            <pc:docMk/>
+            <pc:sldMk cId="4289110639" sldId="257"/>
+            <ac:spMk id="87" creationId="{657DB3ED-98A0-02EA-6172-CEF1D1B6FD89}"/>
+          </ac:spMkLst>
+        </pc:spChg>
         <pc:spChg chg="add mod">
-          <ac:chgData name="Fatima Pillosu" userId="a6295d4dc9e22643" providerId="LiveId" clId="{F0B9C950-5C19-45BA-B39E-FADB59417D97}" dt="2025-06-25T16:43:01.281" v="3396" actId="1035"/>
-          <ac:spMkLst>
-            <pc:docMk/>
-            <pc:sldMk cId="4289110639" sldId="257"/>
-            <ac:spMk id="15" creationId="{DDAF3D54-885E-2A29-8D7C-F2C70C58F5B5}"/>
+          <ac:chgData name="Fatima Pillosu" userId="a6295d4dc9e22643" providerId="LiveId" clId="{F0B9C950-5C19-45BA-B39E-FADB59417D97}" dt="2025-06-26T03:51:30.209" v="3653" actId="1037"/>
+          <ac:spMkLst>
+            <pc:docMk/>
+            <pc:sldMk cId="4289110639" sldId="257"/>
+            <ac:spMk id="88" creationId="{DDAF3D54-885E-2A29-8D7C-F2C70C58F5B5}"/>
           </ac:spMkLst>
         </pc:spChg>
         <pc:spChg chg="add mod">
-          <ac:chgData name="Fatima Pillosu" userId="a6295d4dc9e22643" providerId="LiveId" clId="{F0B9C950-5C19-45BA-B39E-FADB59417D97}" dt="2025-06-25T16:43:01.281" v="3396" actId="1035"/>
-          <ac:spMkLst>
-            <pc:docMk/>
-            <pc:sldMk cId="4289110639" sldId="257"/>
-            <ac:spMk id="16" creationId="{2CE8AC50-A4E3-9DB6-F606-EB886BE8550D}"/>
-          </ac:spMkLst>
-        </pc:spChg>
-        <pc:spChg chg="add del mod">
-          <ac:chgData name="Fatima Pillosu" userId="a6295d4dc9e22643" providerId="LiveId" clId="{F0B9C950-5C19-45BA-B39E-FADB59417D97}" dt="2025-06-25T15:13:51.292" v="1448" actId="21"/>
-          <ac:spMkLst>
-            <pc:docMk/>
-            <pc:sldMk cId="4289110639" sldId="257"/>
-            <ac:spMk id="16" creationId="{8993D2BA-C58E-5F46-6E65-8673351E7984}"/>
-          </ac:spMkLst>
-        </pc:spChg>
-        <pc:spChg chg="add del mod">
-          <ac:chgData name="Fatima Pillosu" userId="a6295d4dc9e22643" providerId="LiveId" clId="{F0B9C950-5C19-45BA-B39E-FADB59417D97}" dt="2025-06-25T15:13:51.292" v="1448" actId="21"/>
-          <ac:spMkLst>
-            <pc:docMk/>
-            <pc:sldMk cId="4289110639" sldId="257"/>
-            <ac:spMk id="17" creationId="{3BC980C1-1730-6AF0-AED0-8759A78EA8C6}"/>
+          <ac:chgData name="Fatima Pillosu" userId="a6295d4dc9e22643" providerId="LiveId" clId="{F0B9C950-5C19-45BA-B39E-FADB59417D97}" dt="2025-06-26T03:51:30.209" v="3653" actId="1037"/>
+          <ac:spMkLst>
+            <pc:docMk/>
+            <pc:sldMk cId="4289110639" sldId="257"/>
+            <ac:spMk id="89" creationId="{2CE8AC50-A4E3-9DB6-F606-EB886BE8550D}"/>
           </ac:spMkLst>
         </pc:spChg>
         <pc:spChg chg="add mod">
-          <ac:chgData name="Fatima Pillosu" userId="a6295d4dc9e22643" providerId="LiveId" clId="{F0B9C950-5C19-45BA-B39E-FADB59417D97}" dt="2025-06-25T16:43:01.281" v="3396" actId="1035"/>
-          <ac:spMkLst>
-            <pc:docMk/>
-            <pc:sldMk cId="4289110639" sldId="257"/>
-            <ac:spMk id="17" creationId="{DC34E010-EA2E-EFF4-B042-AAD8E29801DE}"/>
+          <ac:chgData name="Fatima Pillosu" userId="a6295d4dc9e22643" providerId="LiveId" clId="{F0B9C950-5C19-45BA-B39E-FADB59417D97}" dt="2025-06-26T03:51:30.209" v="3653" actId="1037"/>
+          <ac:spMkLst>
+            <pc:docMk/>
+            <pc:sldMk cId="4289110639" sldId="257"/>
+            <ac:spMk id="90" creationId="{DC34E010-EA2E-EFF4-B042-AAD8E29801DE}"/>
+          </ac:spMkLst>
+        </pc:spChg>
+        <pc:spChg chg="add del mod">
+          <ac:chgData name="Fatima Pillosu" userId="a6295d4dc9e22643" providerId="LiveId" clId="{F0B9C950-5C19-45BA-B39E-FADB59417D97}" dt="2025-06-25T15:38:58.332" v="1902" actId="21"/>
+          <ac:spMkLst>
+            <pc:docMk/>
+            <pc:sldMk cId="4289110639" sldId="257"/>
+            <ac:spMk id="91" creationId="{2CE8AC50-A4E3-9DB6-F606-EB886BE8550D}"/>
           </ac:spMkLst>
         </pc:spChg>
         <pc:spChg chg="add mod">
-          <ac:chgData name="Fatima Pillosu" userId="a6295d4dc9e22643" providerId="LiveId" clId="{F0B9C950-5C19-45BA-B39E-FADB59417D97}" dt="2025-06-25T16:43:01.281" v="3396" actId="1035"/>
-          <ac:spMkLst>
-            <pc:docMk/>
-            <pc:sldMk cId="4289110639" sldId="257"/>
-            <ac:spMk id="18" creationId="{A443D769-35EA-ACBB-55BC-2A7FE9B1D174}"/>
-          </ac:spMkLst>
-        </pc:spChg>
-        <pc:spChg chg="add del mod">
-          <ac:chgData name="Fatima Pillosu" userId="a6295d4dc9e22643" providerId="LiveId" clId="{F0B9C950-5C19-45BA-B39E-FADB59417D97}" dt="2025-06-25T15:13:51.292" v="1448" actId="21"/>
-          <ac:spMkLst>
-            <pc:docMk/>
-            <pc:sldMk cId="4289110639" sldId="257"/>
-            <ac:spMk id="18" creationId="{C00C6D4F-6379-0107-EFEC-867498B3DF65}"/>
+          <ac:chgData name="Fatima Pillosu" userId="a6295d4dc9e22643" providerId="LiveId" clId="{F0B9C950-5C19-45BA-B39E-FADB59417D97}" dt="2025-06-26T03:51:06.791" v="3651" actId="12788"/>
+          <ac:spMkLst>
+            <pc:docMk/>
+            <pc:sldMk cId="4289110639" sldId="257"/>
+            <ac:spMk id="91" creationId="{A443D769-35EA-ACBB-55BC-2A7FE9B1D174}"/>
           </ac:spMkLst>
         </pc:spChg>
         <pc:spChg chg="add mod">
-          <ac:chgData name="Fatima Pillosu" userId="a6295d4dc9e22643" providerId="LiveId" clId="{F0B9C950-5C19-45BA-B39E-FADB59417D97}" dt="2025-06-25T16:43:01.281" v="3396" actId="1035"/>
-          <ac:spMkLst>
-            <pc:docMk/>
-            <pc:sldMk cId="4289110639" sldId="257"/>
-            <ac:spMk id="19" creationId="{6541EEEE-3369-14C3-9119-24FBFEC538F6}"/>
+          <ac:chgData name="Fatima Pillosu" userId="a6295d4dc9e22643" providerId="LiveId" clId="{F0B9C950-5C19-45BA-B39E-FADB59417D97}" dt="2025-06-26T03:51:06.791" v="3651" actId="12788"/>
+          <ac:spMkLst>
+            <pc:docMk/>
+            <pc:sldMk cId="4289110639" sldId="257"/>
+            <ac:spMk id="92" creationId="{6541EEEE-3369-14C3-9119-24FBFEC538F6}"/>
+          </ac:spMkLst>
+        </pc:spChg>
+        <pc:spChg chg="add del mod">
+          <ac:chgData name="Fatima Pillosu" userId="a6295d4dc9e22643" providerId="LiveId" clId="{F0B9C950-5C19-45BA-B39E-FADB59417D97}" dt="2025-06-25T15:38:58.332" v="1902" actId="21"/>
+          <ac:spMkLst>
+            <pc:docMk/>
+            <pc:sldMk cId="4289110639" sldId="257"/>
+            <ac:spMk id="92" creationId="{8BF45082-5DBA-2BDA-6B3B-1CE304EDBB0F}"/>
           </ac:spMkLst>
         </pc:spChg>
         <pc:spChg chg="add mod">
-          <ac:chgData name="Fatima Pillosu" userId="a6295d4dc9e22643" providerId="LiveId" clId="{F0B9C950-5C19-45BA-B39E-FADB59417D97}" dt="2025-06-25T16:43:01.281" v="3396" actId="1035"/>
-          <ac:spMkLst>
-            <pc:docMk/>
-            <pc:sldMk cId="4289110639" sldId="257"/>
-            <ac:spMk id="20" creationId="{A668C935-54EA-6F8F-0BB1-E7014CC096D7}"/>
+          <ac:chgData name="Fatima Pillosu" userId="a6295d4dc9e22643" providerId="LiveId" clId="{F0B9C950-5C19-45BA-B39E-FADB59417D97}" dt="2025-06-26T03:51:18.109" v="3652" actId="12788"/>
+          <ac:spMkLst>
+            <pc:docMk/>
+            <pc:sldMk cId="4289110639" sldId="257"/>
+            <ac:spMk id="93" creationId="{A668C935-54EA-6F8F-0BB1-E7014CC096D7}"/>
+          </ac:spMkLst>
+        </pc:spChg>
+        <pc:spChg chg="add del mod">
+          <ac:chgData name="Fatima Pillosu" userId="a6295d4dc9e22643" providerId="LiveId" clId="{F0B9C950-5C19-45BA-B39E-FADB59417D97}" dt="2025-06-25T15:38:58.332" v="1902" actId="21"/>
+          <ac:spMkLst>
+            <pc:docMk/>
+            <pc:sldMk cId="4289110639" sldId="257"/>
+            <ac:spMk id="93" creationId="{DC34E010-EA2E-EFF4-B042-AAD8E29801DE}"/>
           </ac:spMkLst>
         </pc:spChg>
         <pc:spChg chg="add mod">
-          <ac:chgData name="Fatima Pillosu" userId="a6295d4dc9e22643" providerId="LiveId" clId="{F0B9C950-5C19-45BA-B39E-FADB59417D97}" dt="2025-06-25T16:43:01.281" v="3396" actId="1035"/>
-          <ac:spMkLst>
-            <pc:docMk/>
-            <pc:sldMk cId="4289110639" sldId="257"/>
-            <ac:spMk id="21" creationId="{DEEE2271-5967-5ABD-F72A-2D4C2F26C2AA}"/>
+          <ac:chgData name="Fatima Pillosu" userId="a6295d4dc9e22643" providerId="LiveId" clId="{F0B9C950-5C19-45BA-B39E-FADB59417D97}" dt="2025-06-26T03:51:18.109" v="3652" actId="12788"/>
+          <ac:spMkLst>
+            <pc:docMk/>
+            <pc:sldMk cId="4289110639" sldId="257"/>
+            <ac:spMk id="94" creationId="{DEEE2271-5967-5ABD-F72A-2D4C2F26C2AA}"/>
+          </ac:spMkLst>
+        </pc:spChg>
+        <pc:spChg chg="add del mod">
+          <ac:chgData name="Fatima Pillosu" userId="a6295d4dc9e22643" providerId="LiveId" clId="{F0B9C950-5C19-45BA-B39E-FADB59417D97}" dt="2025-06-25T15:38:58.332" v="1902" actId="21"/>
+          <ac:spMkLst>
+            <pc:docMk/>
+            <pc:sldMk cId="4289110639" sldId="257"/>
+            <ac:spMk id="94" creationId="{E596FB15-C5C4-A883-D8B1-8941F744109D}"/>
+          </ac:spMkLst>
+        </pc:spChg>
+        <pc:spChg chg="add del mod">
+          <ac:chgData name="Fatima Pillosu" userId="a6295d4dc9e22643" providerId="LiveId" clId="{F0B9C950-5C19-45BA-B39E-FADB59417D97}" dt="2025-06-25T15:38:58.332" v="1902" actId="21"/>
+          <ac:spMkLst>
+            <pc:docMk/>
+            <pc:sldMk cId="4289110639" sldId="257"/>
+            <ac:spMk id="95" creationId="{942EDCB3-530B-AEEA-AFDB-D0EC689D20F0}"/>
           </ac:spMkLst>
         </pc:spChg>
         <pc:spChg chg="add mod">
-          <ac:chgData name="Fatima Pillosu" userId="a6295d4dc9e22643" providerId="LiveId" clId="{F0B9C950-5C19-45BA-B39E-FADB59417D97}" dt="2025-06-25T16:43:01.281" v="3396" actId="1035"/>
-          <ac:spMkLst>
-            <pc:docMk/>
-            <pc:sldMk cId="4289110639" sldId="257"/>
-            <ac:spMk id="22" creationId="{BE24FD28-FAFB-884F-4CE7-E4FD5429F6E3}"/>
+          <ac:chgData name="Fatima Pillosu" userId="a6295d4dc9e22643" providerId="LiveId" clId="{F0B9C950-5C19-45BA-B39E-FADB59417D97}" dt="2025-06-26T03:48:57.247" v="3628"/>
+          <ac:spMkLst>
+            <pc:docMk/>
+            <pc:sldMk cId="4289110639" sldId="257"/>
+            <ac:spMk id="95" creationId="{BE24FD28-FAFB-884F-4CE7-E4FD5429F6E3}"/>
+          </ac:spMkLst>
+        </pc:spChg>
+        <pc:spChg chg="add del mod">
+          <ac:chgData name="Fatima Pillosu" userId="a6295d4dc9e22643" providerId="LiveId" clId="{F0B9C950-5C19-45BA-B39E-FADB59417D97}" dt="2025-06-25T15:38:58.332" v="1902" actId="21"/>
+          <ac:spMkLst>
+            <pc:docMk/>
+            <pc:sldMk cId="4289110639" sldId="257"/>
+            <ac:spMk id="96" creationId="{09AA91AB-0F00-9123-C1B1-2024DAA6ECFC}"/>
           </ac:spMkLst>
         </pc:spChg>
         <pc:spChg chg="add mod">
-          <ac:chgData name="Fatima Pillosu" userId="a6295d4dc9e22643" providerId="LiveId" clId="{F0B9C950-5C19-45BA-B39E-FADB59417D97}" dt="2025-06-25T16:43:01.281" v="3396" actId="1035"/>
-          <ac:spMkLst>
-            <pc:docMk/>
-            <pc:sldMk cId="4289110639" sldId="257"/>
-            <ac:spMk id="23" creationId="{16EB6FA0-CBE1-9983-F1CC-346BCA2848D4}"/>
+          <ac:chgData name="Fatima Pillosu" userId="a6295d4dc9e22643" providerId="LiveId" clId="{F0B9C950-5C19-45BA-B39E-FADB59417D97}" dt="2025-06-26T03:48:57.247" v="3628"/>
+          <ac:spMkLst>
+            <pc:docMk/>
+            <pc:sldMk cId="4289110639" sldId="257"/>
+            <ac:spMk id="96" creationId="{16EB6FA0-CBE1-9983-F1CC-346BCA2848D4}"/>
           </ac:spMkLst>
         </pc:spChg>
         <pc:spChg chg="add mod">
-          <ac:chgData name="Fatima Pillosu" userId="a6295d4dc9e22643" providerId="LiveId" clId="{F0B9C950-5C19-45BA-B39E-FADB59417D97}" dt="2025-06-25T16:43:01.281" v="3396" actId="1035"/>
-          <ac:spMkLst>
-            <pc:docMk/>
-            <pc:sldMk cId="4289110639" sldId="257"/>
-            <ac:spMk id="24" creationId="{5137CFD3-310B-C4B7-5CBF-D6EBE8384DFF}"/>
-          </ac:spMkLst>
-        </pc:spChg>
-        <pc:spChg chg="add del mod">
-          <ac:chgData name="Fatima Pillosu" userId="a6295d4dc9e22643" providerId="LiveId" clId="{F0B9C950-5C19-45BA-B39E-FADB59417D97}" dt="2025-06-25T15:13:51.292" v="1448" actId="21"/>
-          <ac:spMkLst>
-            <pc:docMk/>
-            <pc:sldMk cId="4289110639" sldId="257"/>
-            <ac:spMk id="25" creationId="{2CE8AC50-A4E3-9DB6-F606-EB886BE8550D}"/>
+          <ac:chgData name="Fatima Pillosu" userId="a6295d4dc9e22643" providerId="LiveId" clId="{F0B9C950-5C19-45BA-B39E-FADB59417D97}" dt="2025-06-26T03:48:57.247" v="3628"/>
+          <ac:spMkLst>
+            <pc:docMk/>
+            <pc:sldMk cId="4289110639" sldId="257"/>
+            <ac:spMk id="97" creationId="{5137CFD3-310B-C4B7-5CBF-D6EBE8384DFF}"/>
+          </ac:spMkLst>
+        </pc:spChg>
+        <pc:spChg chg="add del mod">
+          <ac:chgData name="Fatima Pillosu" userId="a6295d4dc9e22643" providerId="LiveId" clId="{F0B9C950-5C19-45BA-B39E-FADB59417D97}" dt="2025-06-25T15:38:58.332" v="1902" actId="21"/>
+          <ac:spMkLst>
+            <pc:docMk/>
+            <pc:sldMk cId="4289110639" sldId="257"/>
+            <ac:spMk id="97" creationId="{BD607AC0-72FD-2A38-E500-5793D9FCFE8C}"/>
           </ac:spMkLst>
         </pc:spChg>
         <pc:spChg chg="add mod">
-          <ac:chgData name="Fatima Pillosu" userId="a6295d4dc9e22643" providerId="LiveId" clId="{F0B9C950-5C19-45BA-B39E-FADB59417D97}" dt="2025-06-25T16:43:01.281" v="3396" actId="1035"/>
-          <ac:spMkLst>
-            <pc:docMk/>
-            <pc:sldMk cId="4289110639" sldId="257"/>
-            <ac:spMk id="25" creationId="{9097776E-A046-4D6E-89DA-50B1F5A3FAF4}"/>
+          <ac:chgData name="Fatima Pillosu" userId="a6295d4dc9e22643" providerId="LiveId" clId="{F0B9C950-5C19-45BA-B39E-FADB59417D97}" dt="2025-06-26T03:48:57.247" v="3628"/>
+          <ac:spMkLst>
+            <pc:docMk/>
+            <pc:sldMk cId="4289110639" sldId="257"/>
+            <ac:spMk id="98" creationId="{9097776E-A046-4D6E-89DA-50B1F5A3FAF4}"/>
+          </ac:spMkLst>
+        </pc:spChg>
+        <pc:spChg chg="add del mod">
+          <ac:chgData name="Fatima Pillosu" userId="a6295d4dc9e22643" providerId="LiveId" clId="{F0B9C950-5C19-45BA-B39E-FADB59417D97}" dt="2025-06-25T15:38:58.332" v="1902" actId="21"/>
+          <ac:spMkLst>
+            <pc:docMk/>
+            <pc:sldMk cId="4289110639" sldId="257"/>
+            <ac:spMk id="98" creationId="{A443D769-35EA-ACBB-55BC-2A7FE9B1D174}"/>
           </ac:spMkLst>
         </pc:spChg>
         <pc:spChg chg="add mod">
-          <ac:chgData name="Fatima Pillosu" userId="a6295d4dc9e22643" providerId="LiveId" clId="{F0B9C950-5C19-45BA-B39E-FADB59417D97}" dt="2025-06-25T16:43:01.281" v="3396" actId="1035"/>
-          <ac:spMkLst>
-            <pc:docMk/>
-            <pc:sldMk cId="4289110639" sldId="257"/>
-            <ac:spMk id="26" creationId="{1402EF05-0A8D-81FE-F96A-820C0CB99803}"/>
-          </ac:spMkLst>
-        </pc:spChg>
-        <pc:spChg chg="add del mod">
-          <ac:chgData name="Fatima Pillosu" userId="a6295d4dc9e22643" providerId="LiveId" clId="{F0B9C950-5C19-45BA-B39E-FADB59417D97}" dt="2025-06-25T15:13:51.292" v="1448" actId="21"/>
-          <ac:spMkLst>
-            <pc:docMk/>
-            <pc:sldMk cId="4289110639" sldId="257"/>
-            <ac:spMk id="26" creationId="{8BF45082-5DBA-2BDA-6B3B-1CE304EDBB0F}"/>
+          <ac:chgData name="Fatima Pillosu" userId="a6295d4dc9e22643" providerId="LiveId" clId="{F0B9C950-5C19-45BA-B39E-FADB59417D97}" dt="2025-06-26T03:48:57.247" v="3628"/>
+          <ac:spMkLst>
+            <pc:docMk/>
+            <pc:sldMk cId="4289110639" sldId="257"/>
+            <ac:spMk id="99" creationId="{1402EF05-0A8D-81FE-F96A-820C0CB99803}"/>
+          </ac:spMkLst>
+        </pc:spChg>
+        <pc:spChg chg="add del mod">
+          <ac:chgData name="Fatima Pillosu" userId="a6295d4dc9e22643" providerId="LiveId" clId="{F0B9C950-5C19-45BA-B39E-FADB59417D97}" dt="2025-06-25T15:38:58.332" v="1902" actId="21"/>
+          <ac:spMkLst>
+            <pc:docMk/>
+            <pc:sldMk cId="4289110639" sldId="257"/>
+            <ac:spMk id="99" creationId="{ADA3DE8D-1806-5542-AE87-86B40C29C4B6}"/>
+          </ac:spMkLst>
+        </pc:spChg>
+        <pc:spChg chg="add del mod">
+          <ac:chgData name="Fatima Pillosu" userId="a6295d4dc9e22643" providerId="LiveId" clId="{F0B9C950-5C19-45BA-B39E-FADB59417D97}" dt="2025-06-25T15:38:58.332" v="1902" actId="21"/>
+          <ac:spMkLst>
+            <pc:docMk/>
+            <pc:sldMk cId="4289110639" sldId="257"/>
+            <ac:spMk id="100" creationId="{1E801C4A-0276-1937-0649-23B933A9FD4C}"/>
           </ac:spMkLst>
         </pc:spChg>
         <pc:spChg chg="add mod">
-          <ac:chgData name="Fatima Pillosu" userId="a6295d4dc9e22643" providerId="LiveId" clId="{F0B9C950-5C19-45BA-B39E-FADB59417D97}" dt="2025-06-25T16:43:01.281" v="3396" actId="1035"/>
-          <ac:spMkLst>
-            <pc:docMk/>
-            <pc:sldMk cId="4289110639" sldId="257"/>
-            <ac:spMk id="27" creationId="{4CDF8D29-A1A4-B6EF-CC2D-02154951F423}"/>
-          </ac:spMkLst>
-        </pc:spChg>
-        <pc:spChg chg="add del mod">
-          <ac:chgData name="Fatima Pillosu" userId="a6295d4dc9e22643" providerId="LiveId" clId="{F0B9C950-5C19-45BA-B39E-FADB59417D97}" dt="2025-06-25T15:13:51.292" v="1448" actId="21"/>
-          <ac:spMkLst>
-            <pc:docMk/>
-            <pc:sldMk cId="4289110639" sldId="257"/>
-            <ac:spMk id="27" creationId="{DC34E010-EA2E-EFF4-B042-AAD8E29801DE}"/>
+          <ac:chgData name="Fatima Pillosu" userId="a6295d4dc9e22643" providerId="LiveId" clId="{F0B9C950-5C19-45BA-B39E-FADB59417D97}" dt="2025-06-26T03:48:57.247" v="3628"/>
+          <ac:spMkLst>
+            <pc:docMk/>
+            <pc:sldMk cId="4289110639" sldId="257"/>
+            <ac:spMk id="100" creationId="{4CDF8D29-A1A4-B6EF-CC2D-02154951F423}"/>
+          </ac:spMkLst>
+        </pc:spChg>
+        <pc:spChg chg="add del mod">
+          <ac:chgData name="Fatima Pillosu" userId="a6295d4dc9e22643" providerId="LiveId" clId="{F0B9C950-5C19-45BA-B39E-FADB59417D97}" dt="2025-06-25T15:38:58.332" v="1902" actId="21"/>
+          <ac:spMkLst>
+            <pc:docMk/>
+            <pc:sldMk cId="4289110639" sldId="257"/>
+            <ac:spMk id="101" creationId="{6541EEEE-3369-14C3-9119-24FBFEC538F6}"/>
           </ac:spMkLst>
         </pc:spChg>
         <pc:spChg chg="add mod">
-          <ac:chgData name="Fatima Pillosu" userId="a6295d4dc9e22643" providerId="LiveId" clId="{F0B9C950-5C19-45BA-B39E-FADB59417D97}" dt="2025-06-25T16:43:01.281" v="3396" actId="1035"/>
-          <ac:spMkLst>
-            <pc:docMk/>
-            <pc:sldMk cId="4289110639" sldId="257"/>
-            <ac:spMk id="28" creationId="{C5F22480-43D2-EC6C-C595-536DDF09AC46}"/>
-          </ac:spMkLst>
-        </pc:spChg>
-        <pc:spChg chg="add del mod">
-          <ac:chgData name="Fatima Pillosu" userId="a6295d4dc9e22643" providerId="LiveId" clId="{F0B9C950-5C19-45BA-B39E-FADB59417D97}" dt="2025-06-25T15:13:51.292" v="1448" actId="21"/>
-          <ac:spMkLst>
-            <pc:docMk/>
-            <pc:sldMk cId="4289110639" sldId="257"/>
-            <ac:spMk id="28" creationId="{E596FB15-C5C4-A883-D8B1-8941F744109D}"/>
+          <ac:chgData name="Fatima Pillosu" userId="a6295d4dc9e22643" providerId="LiveId" clId="{F0B9C950-5C19-45BA-B39E-FADB59417D97}" dt="2025-06-26T03:48:57.247" v="3628"/>
+          <ac:spMkLst>
+            <pc:docMk/>
+            <pc:sldMk cId="4289110639" sldId="257"/>
+            <ac:spMk id="101" creationId="{C5F22480-43D2-EC6C-C595-536DDF09AC46}"/>
           </ac:spMkLst>
         </pc:spChg>
         <pc:spChg chg="add mod">
-          <ac:chgData name="Fatima Pillosu" userId="a6295d4dc9e22643" providerId="LiveId" clId="{F0B9C950-5C19-45BA-B39E-FADB59417D97}" dt="2025-06-25T16:43:01.281" v="3396" actId="1035"/>
-          <ac:spMkLst>
-            <pc:docMk/>
-            <pc:sldMk cId="4289110639" sldId="257"/>
-            <ac:spMk id="29" creationId="{65CF77BB-AB79-BDF7-1AD9-C8ABDB188BCE}"/>
-          </ac:spMkLst>
-        </pc:spChg>
-        <pc:spChg chg="add del mod">
-          <ac:chgData name="Fatima Pillosu" userId="a6295d4dc9e22643" providerId="LiveId" clId="{F0B9C950-5C19-45BA-B39E-FADB59417D97}" dt="2025-06-25T15:13:51.292" v="1448" actId="21"/>
-          <ac:spMkLst>
-            <pc:docMk/>
-            <pc:sldMk cId="4289110639" sldId="257"/>
-            <ac:spMk id="29" creationId="{942EDCB3-530B-AEEA-AFDB-D0EC689D20F0}"/>
-          </ac:spMkLst>
-        </pc:spChg>
-        <pc:spChg chg="add del mod">
-          <ac:chgData name="Fatima Pillosu" userId="a6295d4dc9e22643" providerId="LiveId" clId="{F0B9C950-5C19-45BA-B39E-FADB59417D97}" dt="2025-06-25T15:13:51.292" v="1448" actId="21"/>
-          <ac:spMkLst>
-            <pc:docMk/>
-            <pc:sldMk cId="4289110639" sldId="257"/>
-            <ac:spMk id="30" creationId="{09AA91AB-0F00-9123-C1B1-2024DAA6ECFC}"/>
+          <ac:chgData name="Fatima Pillosu" userId="a6295d4dc9e22643" providerId="LiveId" clId="{F0B9C950-5C19-45BA-B39E-FADB59417D97}" dt="2025-06-26T03:48:57.247" v="3628"/>
+          <ac:spMkLst>
+            <pc:docMk/>
+            <pc:sldMk cId="4289110639" sldId="257"/>
+            <ac:spMk id="102" creationId="{65CF77BB-AB79-BDF7-1AD9-C8ABDB188BCE}"/>
+          </ac:spMkLst>
+        </pc:spChg>
+        <pc:spChg chg="add del mod">
+          <ac:chgData name="Fatima Pillosu" userId="a6295d4dc9e22643" providerId="LiveId" clId="{F0B9C950-5C19-45BA-B39E-FADB59417D97}" dt="2025-06-25T15:38:58.332" v="1902" actId="21"/>
+          <ac:spMkLst>
+            <pc:docMk/>
+            <pc:sldMk cId="4289110639" sldId="257"/>
+            <ac:spMk id="102" creationId="{A668C935-54EA-6F8F-0BB1-E7014CC096D7}"/>
+          </ac:spMkLst>
+        </pc:spChg>
+        <pc:spChg chg="add del mod">
+          <ac:chgData name="Fatima Pillosu" userId="a6295d4dc9e22643" providerId="LiveId" clId="{F0B9C950-5C19-45BA-B39E-FADB59417D97}" dt="2025-06-25T15:38:58.332" v="1902" actId="21"/>
+          <ac:spMkLst>
+            <pc:docMk/>
+            <pc:sldMk cId="4289110639" sldId="257"/>
+            <ac:spMk id="103" creationId="{7E97B7E9-5251-BE9A-AE14-9D7F6768E5D3}"/>
           </ac:spMkLst>
         </pc:spChg>
         <pc:spChg chg="add mod">
-          <ac:chgData name="Fatima Pillosu" userId="a6295d4dc9e22643" providerId="LiveId" clId="{F0B9C950-5C19-45BA-B39E-FADB59417D97}" dt="2025-06-25T16:43:01.281" v="3396" actId="1035"/>
-          <ac:spMkLst>
-            <pc:docMk/>
-            <pc:sldMk cId="4289110639" sldId="257"/>
-            <ac:spMk id="30" creationId="{CE0D8E67-F738-7066-FAAB-7F1C9C0D3446}"/>
+          <ac:chgData name="Fatima Pillosu" userId="a6295d4dc9e22643" providerId="LiveId" clId="{F0B9C950-5C19-45BA-B39E-FADB59417D97}" dt="2025-06-26T03:48:57.247" v="3628"/>
+          <ac:spMkLst>
+            <pc:docMk/>
+            <pc:sldMk cId="4289110639" sldId="257"/>
+            <ac:spMk id="103" creationId="{CE0D8E67-F738-7066-FAAB-7F1C9C0D3446}"/>
           </ac:spMkLst>
         </pc:spChg>
         <pc:spChg chg="add mod">
-          <ac:chgData name="Fatima Pillosu" userId="a6295d4dc9e22643" providerId="LiveId" clId="{F0B9C950-5C19-45BA-B39E-FADB59417D97}" dt="2025-06-25T16:43:01.281" v="3396" actId="1035"/>
-          <ac:spMkLst>
-            <pc:docMk/>
-            <pc:sldMk cId="4289110639" sldId="257"/>
-            <ac:spMk id="31" creationId="{716E92A3-A5CC-93CB-1E03-1C50F1F6DD03}"/>
-          </ac:spMkLst>
-        </pc:spChg>
-        <pc:spChg chg="add del mod">
-          <ac:chgData name="Fatima Pillosu" userId="a6295d4dc9e22643" providerId="LiveId" clId="{F0B9C950-5C19-45BA-B39E-FADB59417D97}" dt="2025-06-25T15:13:51.292" v="1448" actId="21"/>
-          <ac:spMkLst>
-            <pc:docMk/>
-            <pc:sldMk cId="4289110639" sldId="257"/>
-            <ac:spMk id="31" creationId="{BD607AC0-72FD-2A38-E500-5793D9FCFE8C}"/>
-          </ac:spMkLst>
-        </pc:spChg>
-        <pc:spChg chg="add del mod">
-          <ac:chgData name="Fatima Pillosu" userId="a6295d4dc9e22643" providerId="LiveId" clId="{F0B9C950-5C19-45BA-B39E-FADB59417D97}" dt="2025-06-25T15:13:51.292" v="1448" actId="21"/>
-          <ac:spMkLst>
-            <pc:docMk/>
-            <pc:sldMk cId="4289110639" sldId="257"/>
-            <ac:spMk id="32" creationId="{A443D769-35EA-ACBB-55BC-2A7FE9B1D174}"/>
+          <ac:chgData name="Fatima Pillosu" userId="a6295d4dc9e22643" providerId="LiveId" clId="{F0B9C950-5C19-45BA-B39E-FADB59417D97}" dt="2025-06-26T03:51:06.791" v="3651" actId="12788"/>
+          <ac:spMkLst>
+            <pc:docMk/>
+            <pc:sldMk cId="4289110639" sldId="257"/>
+            <ac:spMk id="104" creationId="{716E92A3-A5CC-93CB-1E03-1C50F1F6DD03}"/>
+          </ac:spMkLst>
+        </pc:spChg>
+        <pc:spChg chg="add del mod">
+          <ac:chgData name="Fatima Pillosu" userId="a6295d4dc9e22643" providerId="LiveId" clId="{F0B9C950-5C19-45BA-B39E-FADB59417D97}" dt="2025-06-25T15:38:58.332" v="1902" actId="21"/>
+          <ac:spMkLst>
+            <pc:docMk/>
+            <pc:sldMk cId="4289110639" sldId="257"/>
+            <ac:spMk id="104" creationId="{DEEE2271-5967-5ABD-F72A-2D4C2F26C2AA}"/>
+          </ac:spMkLst>
+        </pc:spChg>
+        <pc:spChg chg="add del mod">
+          <ac:chgData name="Fatima Pillosu" userId="a6295d4dc9e22643" providerId="LiveId" clId="{F0B9C950-5C19-45BA-B39E-FADB59417D97}" dt="2025-06-25T15:38:58.332" v="1902" actId="21"/>
+          <ac:spMkLst>
+            <pc:docMk/>
+            <pc:sldMk cId="4289110639" sldId="257"/>
+            <ac:spMk id="105" creationId="{3686655B-80AB-878D-8415-307EA53EFB5C}"/>
           </ac:spMkLst>
         </pc:spChg>
         <pc:spChg chg="add mod">
-          <ac:chgData name="Fatima Pillosu" userId="a6295d4dc9e22643" providerId="LiveId" clId="{F0B9C950-5C19-45BA-B39E-FADB59417D97}" dt="2025-06-25T16:43:01.281" v="3396" actId="1035"/>
-          <ac:spMkLst>
-            <pc:docMk/>
-            <pc:sldMk cId="4289110639" sldId="257"/>
-            <ac:spMk id="32" creationId="{C0C067FC-01D1-B083-6206-56A46662729A}"/>
+          <ac:chgData name="Fatima Pillosu" userId="a6295d4dc9e22643" providerId="LiveId" clId="{F0B9C950-5C19-45BA-B39E-FADB59417D97}" dt="2025-06-26T03:51:18.109" v="3652" actId="12788"/>
+          <ac:spMkLst>
+            <pc:docMk/>
+            <pc:sldMk cId="4289110639" sldId="257"/>
+            <ac:spMk id="105" creationId="{C0C067FC-01D1-B083-6206-56A46662729A}"/>
+          </ac:spMkLst>
+        </pc:spChg>
+        <pc:spChg chg="add del mod">
+          <ac:chgData name="Fatima Pillosu" userId="a6295d4dc9e22643" providerId="LiveId" clId="{F0B9C950-5C19-45BA-B39E-FADB59417D97}" dt="2025-06-25T15:16:14.678" v="1495" actId="478"/>
+          <ac:spMkLst>
+            <pc:docMk/>
+            <pc:sldMk cId="4289110639" sldId="257"/>
+            <ac:spMk id="106" creationId="{59E5FA53-1F3C-04E3-0ED3-C7DC994CB669}"/>
           </ac:spMkLst>
         </pc:spChg>
         <pc:spChg chg="add mod">
-          <ac:chgData name="Fatima Pillosu" userId="a6295d4dc9e22643" providerId="LiveId" clId="{F0B9C950-5C19-45BA-B39E-FADB59417D97}" dt="2025-06-25T16:43:01.281" v="3396" actId="1035"/>
-          <ac:spMkLst>
-            <pc:docMk/>
-            <pc:sldMk cId="4289110639" sldId="257"/>
-            <ac:spMk id="33" creationId="{649A66B3-B899-4304-E071-230DD34AFBC3}"/>
-          </ac:spMkLst>
-        </pc:spChg>
-        <pc:spChg chg="add del mod">
-          <ac:chgData name="Fatima Pillosu" userId="a6295d4dc9e22643" providerId="LiveId" clId="{F0B9C950-5C19-45BA-B39E-FADB59417D97}" dt="2025-06-25T15:13:51.292" v="1448" actId="21"/>
-          <ac:spMkLst>
-            <pc:docMk/>
-            <pc:sldMk cId="4289110639" sldId="257"/>
-            <ac:spMk id="33" creationId="{ADA3DE8D-1806-5542-AE87-86B40C29C4B6}"/>
+          <ac:chgData name="Fatima Pillosu" userId="a6295d4dc9e22643" providerId="LiveId" clId="{F0B9C950-5C19-45BA-B39E-FADB59417D97}" dt="2025-06-26T03:48:57.247" v="3628"/>
+          <ac:spMkLst>
+            <pc:docMk/>
+            <pc:sldMk cId="4289110639" sldId="257"/>
+            <ac:spMk id="106" creationId="{649A66B3-B899-4304-E071-230DD34AFBC3}"/>
           </ac:spMkLst>
         </pc:spChg>
         <pc:spChg chg="add mod">
-          <ac:chgData name="Fatima Pillosu" userId="a6295d4dc9e22643" providerId="LiveId" clId="{F0B9C950-5C19-45BA-B39E-FADB59417D97}" dt="2025-06-25T16:43:01.281" v="3396" actId="1035"/>
-          <ac:spMkLst>
-            <pc:docMk/>
-            <pc:sldMk cId="4289110639" sldId="257"/>
-            <ac:spMk id="34" creationId="{0949695F-9A1D-9DE9-6A11-1A7363D5D06D}"/>
-          </ac:spMkLst>
-        </pc:spChg>
-        <pc:spChg chg="add del mod">
-          <ac:chgData name="Fatima Pillosu" userId="a6295d4dc9e22643" providerId="LiveId" clId="{F0B9C950-5C19-45BA-B39E-FADB59417D97}" dt="2025-06-25T15:13:51.292" v="1448" actId="21"/>
-          <ac:spMkLst>
-            <pc:docMk/>
-            <pc:sldMk cId="4289110639" sldId="257"/>
-            <ac:spMk id="34" creationId="{1E801C4A-0276-1937-0649-23B933A9FD4C}"/>
+          <ac:chgData name="Fatima Pillosu" userId="a6295d4dc9e22643" providerId="LiveId" clId="{F0B9C950-5C19-45BA-B39E-FADB59417D97}" dt="2025-06-26T03:48:57.247" v="3628"/>
+          <ac:spMkLst>
+            <pc:docMk/>
+            <pc:sldMk cId="4289110639" sldId="257"/>
+            <ac:spMk id="107" creationId="{0949695F-9A1D-9DE9-6A11-1A7363D5D06D}"/>
+          </ac:spMkLst>
+        </pc:spChg>
+        <pc:spChg chg="add del mod">
+          <ac:chgData name="Fatima Pillosu" userId="a6295d4dc9e22643" providerId="LiveId" clId="{F0B9C950-5C19-45BA-B39E-FADB59417D97}" dt="2025-06-25T15:38:58.332" v="1902" actId="21"/>
+          <ac:spMkLst>
+            <pc:docMk/>
+            <pc:sldMk cId="4289110639" sldId="257"/>
+            <ac:spMk id="107" creationId="{A0097D71-B402-A483-CFFA-F86F3C56053E}"/>
           </ac:spMkLst>
         </pc:spChg>
         <pc:spChg chg="add mod">
-          <ac:chgData name="Fatima Pillosu" userId="a6295d4dc9e22643" providerId="LiveId" clId="{F0B9C950-5C19-45BA-B39E-FADB59417D97}" dt="2025-06-25T16:43:01.281" v="3396" actId="1035"/>
-          <ac:spMkLst>
-            <pc:docMk/>
-            <pc:sldMk cId="4289110639" sldId="257"/>
-            <ac:spMk id="35" creationId="{26499A74-7ADD-8575-125F-3A9F7DAB54FD}"/>
-          </ac:spMkLst>
-        </pc:spChg>
-        <pc:spChg chg="add del mod">
-          <ac:chgData name="Fatima Pillosu" userId="a6295d4dc9e22643" providerId="LiveId" clId="{F0B9C950-5C19-45BA-B39E-FADB59417D97}" dt="2025-06-25T15:13:51.292" v="1448" actId="21"/>
-          <ac:spMkLst>
-            <pc:docMk/>
-            <pc:sldMk cId="4289110639" sldId="257"/>
-            <ac:spMk id="35" creationId="{6541EEEE-3369-14C3-9119-24FBFEC538F6}"/>
+          <ac:chgData name="Fatima Pillosu" userId="a6295d4dc9e22643" providerId="LiveId" clId="{F0B9C950-5C19-45BA-B39E-FADB59417D97}" dt="2025-06-26T03:48:57.247" v="3628"/>
+          <ac:spMkLst>
+            <pc:docMk/>
+            <pc:sldMk cId="4289110639" sldId="257"/>
+            <ac:spMk id="108" creationId="{26499A74-7ADD-8575-125F-3A9F7DAB54FD}"/>
+          </ac:spMkLst>
+        </pc:spChg>
+        <pc:spChg chg="add del mod">
+          <ac:chgData name="Fatima Pillosu" userId="a6295d4dc9e22643" providerId="LiveId" clId="{F0B9C950-5C19-45BA-B39E-FADB59417D97}" dt="2025-06-25T15:38:58.332" v="1902" actId="21"/>
+          <ac:spMkLst>
+            <pc:docMk/>
+            <pc:sldMk cId="4289110639" sldId="257"/>
+            <ac:spMk id="108" creationId="{AC12668F-DD4B-D648-D773-7F3063B04CBF}"/>
+          </ac:spMkLst>
+        </pc:spChg>
+        <pc:spChg chg="add del mod">
+          <ac:chgData name="Fatima Pillosu" userId="a6295d4dc9e22643" providerId="LiveId" clId="{F0B9C950-5C19-45BA-B39E-FADB59417D97}" dt="2025-06-25T15:38:58.332" v="1902" actId="21"/>
+          <ac:spMkLst>
+            <pc:docMk/>
+            <pc:sldMk cId="4289110639" sldId="257"/>
+            <ac:spMk id="109" creationId="{77F6A371-1CCF-3C24-C1E6-C283E45C2C4D}"/>
           </ac:spMkLst>
         </pc:spChg>
         <pc:spChg chg="add mod">
-          <ac:chgData name="Fatima Pillosu" userId="a6295d4dc9e22643" providerId="LiveId" clId="{F0B9C950-5C19-45BA-B39E-FADB59417D97}" dt="2025-06-25T16:43:01.281" v="3396" actId="1035"/>
-          <ac:spMkLst>
-            <pc:docMk/>
-            <pc:sldMk cId="4289110639" sldId="257"/>
-            <ac:spMk id="36" creationId="{87998562-8C2F-313F-516D-39037195BB26}"/>
-          </ac:spMkLst>
-        </pc:spChg>
-        <pc:spChg chg="add del mod">
-          <ac:chgData name="Fatima Pillosu" userId="a6295d4dc9e22643" providerId="LiveId" clId="{F0B9C950-5C19-45BA-B39E-FADB59417D97}" dt="2025-06-25T15:13:51.292" v="1448" actId="21"/>
-          <ac:spMkLst>
-            <pc:docMk/>
-            <pc:sldMk cId="4289110639" sldId="257"/>
-            <ac:spMk id="36" creationId="{A668C935-54EA-6F8F-0BB1-E7014CC096D7}"/>
-          </ac:spMkLst>
-        </pc:spChg>
-        <pc:spChg chg="add del mod">
-          <ac:chgData name="Fatima Pillosu" userId="a6295d4dc9e22643" providerId="LiveId" clId="{F0B9C950-5C19-45BA-B39E-FADB59417D97}" dt="2025-06-25T15:13:51.292" v="1448" actId="21"/>
-          <ac:spMkLst>
-            <pc:docMk/>
-            <pc:sldMk cId="4289110639" sldId="257"/>
-            <ac:spMk id="37" creationId="{7E97B7E9-5251-BE9A-AE14-9D7F6768E5D3}"/>
+          <ac:chgData name="Fatima Pillosu" userId="a6295d4dc9e22643" providerId="LiveId" clId="{F0B9C950-5C19-45BA-B39E-FADB59417D97}" dt="2025-06-26T03:48:57.247" v="3628"/>
+          <ac:spMkLst>
+            <pc:docMk/>
+            <pc:sldMk cId="4289110639" sldId="257"/>
+            <ac:spMk id="109" creationId="{87998562-8C2F-313F-516D-39037195BB26}"/>
           </ac:spMkLst>
         </pc:spChg>
         <pc:spChg chg="add mod">
-          <ac:chgData name="Fatima Pillosu" userId="a6295d4dc9e22643" providerId="LiveId" clId="{F0B9C950-5C19-45BA-B39E-FADB59417D97}" dt="2025-06-25T16:43:01.281" v="3396" actId="1035"/>
-          <ac:spMkLst>
-            <pc:docMk/>
-            <pc:sldMk cId="4289110639" sldId="257"/>
-            <ac:spMk id="37" creationId="{80D3517E-1814-BABC-8B8F-AB5B211A3AA1}"/>
+          <ac:chgData name="Fatima Pillosu" userId="a6295d4dc9e22643" providerId="LiveId" clId="{F0B9C950-5C19-45BA-B39E-FADB59417D97}" dt="2025-06-26T03:48:57.247" v="3628"/>
+          <ac:spMkLst>
+            <pc:docMk/>
+            <pc:sldMk cId="4289110639" sldId="257"/>
+            <ac:spMk id="110" creationId="{80D3517E-1814-BABC-8B8F-AB5B211A3AA1}"/>
           </ac:spMkLst>
         </pc:spChg>
         <pc:spChg chg="add mod">
-          <ac:chgData name="Fatima Pillosu" userId="a6295d4dc9e22643" providerId="LiveId" clId="{F0B9C950-5C19-45BA-B39E-FADB59417D97}" dt="2025-06-25T16:43:01.281" v="3396" actId="1035"/>
-          <ac:spMkLst>
-            <pc:docMk/>
-            <pc:sldMk cId="4289110639" sldId="257"/>
-            <ac:spMk id="38" creationId="{A6BE4838-1365-D3B7-CEDE-D7E2E62B7F31}"/>
-          </ac:spMkLst>
-        </pc:spChg>
-        <pc:spChg chg="add del mod">
-          <ac:chgData name="Fatima Pillosu" userId="a6295d4dc9e22643" providerId="LiveId" clId="{F0B9C950-5C19-45BA-B39E-FADB59417D97}" dt="2025-06-25T15:13:51.292" v="1448" actId="21"/>
-          <ac:spMkLst>
-            <pc:docMk/>
-            <pc:sldMk cId="4289110639" sldId="257"/>
-            <ac:spMk id="38" creationId="{DEEE2271-5967-5ABD-F72A-2D4C2F26C2AA}"/>
-          </ac:spMkLst>
-        </pc:spChg>
-        <pc:spChg chg="add del mod">
-          <ac:chgData name="Fatima Pillosu" userId="a6295d4dc9e22643" providerId="LiveId" clId="{F0B9C950-5C19-45BA-B39E-FADB59417D97}" dt="2025-06-25T15:13:51.292" v="1448" actId="21"/>
-          <ac:spMkLst>
-            <pc:docMk/>
-            <pc:sldMk cId="4289110639" sldId="257"/>
-            <ac:spMk id="39" creationId="{3686655B-80AB-878D-8415-307EA53EFB5C}"/>
+          <ac:chgData name="Fatima Pillosu" userId="a6295d4dc9e22643" providerId="LiveId" clId="{F0B9C950-5C19-45BA-B39E-FADB59417D97}" dt="2025-06-26T03:48:57.247" v="3628"/>
+          <ac:spMkLst>
+            <pc:docMk/>
+            <pc:sldMk cId="4289110639" sldId="257"/>
+            <ac:spMk id="111" creationId="{A6BE4838-1365-D3B7-CEDE-D7E2E62B7F31}"/>
           </ac:spMkLst>
         </pc:spChg>
         <pc:spChg chg="add mod">
-          <ac:chgData name="Fatima Pillosu" userId="a6295d4dc9e22643" providerId="LiveId" clId="{F0B9C950-5C19-45BA-B39E-FADB59417D97}" dt="2025-06-25T16:43:01.281" v="3396" actId="1035"/>
-          <ac:spMkLst>
-            <pc:docMk/>
-            <pc:sldMk cId="4289110639" sldId="257"/>
-            <ac:spMk id="39" creationId="{8735F6D1-5555-E7D6-D0BB-A64923855C01}"/>
+          <ac:chgData name="Fatima Pillosu" userId="a6295d4dc9e22643" providerId="LiveId" clId="{F0B9C950-5C19-45BA-B39E-FADB59417D97}" dt="2025-06-26T03:48:57.247" v="3628"/>
+          <ac:spMkLst>
+            <pc:docMk/>
+            <pc:sldMk cId="4289110639" sldId="257"/>
+            <ac:spMk id="112" creationId="{8735F6D1-5555-E7D6-D0BB-A64923855C01}"/>
           </ac:spMkLst>
         </pc:spChg>
         <pc:spChg chg="add mod">
-          <ac:chgData name="Fatima Pillosu" userId="a6295d4dc9e22643" providerId="LiveId" clId="{F0B9C950-5C19-45BA-B39E-FADB59417D97}" dt="2025-06-25T16:43:01.281" v="3396" actId="1035"/>
-          <ac:spMkLst>
-            <pc:docMk/>
-            <pc:sldMk cId="4289110639" sldId="257"/>
-            <ac:spMk id="40" creationId="{2B972E94-DE4C-66D0-A6A3-F1E9C69D6169}"/>
-          </ac:spMkLst>
-        </pc:spChg>
-        <pc:spChg chg="add del mod">
-          <ac:chgData name="Fatima Pillosu" userId="a6295d4dc9e22643" providerId="LiveId" clId="{F0B9C950-5C19-45BA-B39E-FADB59417D97}" dt="2025-06-25T15:13:51.292" v="1448" actId="21"/>
-          <ac:spMkLst>
-            <pc:docMk/>
-            <pc:sldMk cId="4289110639" sldId="257"/>
-            <ac:spMk id="40" creationId="{59E5FA53-1F3C-04E3-0ED3-C7DC994CB669}"/>
+          <ac:chgData name="Fatima Pillosu" userId="a6295d4dc9e22643" providerId="LiveId" clId="{F0B9C950-5C19-45BA-B39E-FADB59417D97}" dt="2025-06-26T03:48:57.247" v="3628"/>
+          <ac:spMkLst>
+            <pc:docMk/>
+            <pc:sldMk cId="4289110639" sldId="257"/>
+            <ac:spMk id="113" creationId="{2B972E94-DE4C-66D0-A6A3-F1E9C69D6169}"/>
+          </ac:spMkLst>
+        </pc:spChg>
+        <pc:spChg chg="add del mod">
+          <ac:chgData name="Fatima Pillosu" userId="a6295d4dc9e22643" providerId="LiveId" clId="{F0B9C950-5C19-45BA-B39E-FADB59417D97}" dt="2025-06-25T15:38:58.332" v="1902" actId="21"/>
+          <ac:spMkLst>
+            <pc:docMk/>
+            <pc:sldMk cId="4289110639" sldId="257"/>
+            <ac:spMk id="113" creationId="{BE24FD28-FAFB-884F-4CE7-E4FD5429F6E3}"/>
           </ac:spMkLst>
         </pc:spChg>
         <pc:spChg chg="add mod">
-          <ac:chgData name="Fatima Pillosu" userId="a6295d4dc9e22643" providerId="LiveId" clId="{F0B9C950-5C19-45BA-B39E-FADB59417D97}" dt="2025-06-25T16:43:01.281" v="3396" actId="1035"/>
-          <ac:spMkLst>
-            <pc:docMk/>
-            <pc:sldMk cId="4289110639" sldId="257"/>
-            <ac:spMk id="41" creationId="{0F40EDD3-6828-DA92-C5B8-A892A73FD4CE}"/>
-          </ac:spMkLst>
-        </pc:spChg>
-        <pc:spChg chg="add del mod">
-          <ac:chgData name="Fatima Pillosu" userId="a6295d4dc9e22643" providerId="LiveId" clId="{F0B9C950-5C19-45BA-B39E-FADB59417D97}" dt="2025-06-25T15:13:51.292" v="1448" actId="21"/>
-          <ac:spMkLst>
-            <pc:docMk/>
-            <pc:sldMk cId="4289110639" sldId="257"/>
-            <ac:spMk id="41" creationId="{A0097D71-B402-A483-CFFA-F86F3C56053E}"/>
+          <ac:chgData name="Fatima Pillosu" userId="a6295d4dc9e22643" providerId="LiveId" clId="{F0B9C950-5C19-45BA-B39E-FADB59417D97}" dt="2025-06-26T03:48:57.247" v="3628"/>
+          <ac:spMkLst>
+            <pc:docMk/>
+            <pc:sldMk cId="4289110639" sldId="257"/>
+            <ac:spMk id="114" creationId="{0F40EDD3-6828-DA92-C5B8-A892A73FD4CE}"/>
+          </ac:spMkLst>
+        </pc:spChg>
+        <pc:spChg chg="add del mod">
+          <ac:chgData name="Fatima Pillosu" userId="a6295d4dc9e22643" providerId="LiveId" clId="{F0B9C950-5C19-45BA-B39E-FADB59417D97}" dt="2025-06-25T15:38:58.332" v="1902" actId="21"/>
+          <ac:spMkLst>
+            <pc:docMk/>
+            <pc:sldMk cId="4289110639" sldId="257"/>
+            <ac:spMk id="114" creationId="{16EB6FA0-CBE1-9983-F1CC-346BCA2848D4}"/>
           </ac:spMkLst>
         </pc:spChg>
         <pc:spChg chg="add mod">
-          <ac:chgData name="Fatima Pillosu" userId="a6295d4dc9e22643" providerId="LiveId" clId="{F0B9C950-5C19-45BA-B39E-FADB59417D97}" dt="2025-06-25T16:43:01.281" v="3396" actId="1035"/>
-          <ac:spMkLst>
-            <pc:docMk/>
-            <pc:sldMk cId="4289110639" sldId="257"/>
-            <ac:spMk id="42" creationId="{4BC09263-C830-303A-BB0C-2207AFEFF22B}"/>
-          </ac:spMkLst>
-        </pc:spChg>
-        <pc:spChg chg="add del mod">
-          <ac:chgData name="Fatima Pillosu" userId="a6295d4dc9e22643" providerId="LiveId" clId="{F0B9C950-5C19-45BA-B39E-FADB59417D97}" dt="2025-06-25T15:13:51.292" v="1448" actId="21"/>
-          <ac:spMkLst>
-            <pc:docMk/>
-            <pc:sldMk cId="4289110639" sldId="257"/>
-            <ac:spMk id="42" creationId="{AC12668F-DD4B-D648-D773-7F3063B04CBF}"/>
-          </ac:spMkLst>
-        </pc:spChg>
-        <pc:spChg chg="add del mod">
-          <ac:chgData name="Fatima Pillosu" userId="a6295d4dc9e22643" providerId="LiveId" clId="{F0B9C950-5C19-45BA-B39E-FADB59417D97}" dt="2025-06-25T15:13:51.292" v="1448" actId="21"/>
-          <ac:spMkLst>
-            <pc:docMk/>
-            <pc:sldMk cId="4289110639" sldId="257"/>
-            <ac:spMk id="43" creationId="{77F6A371-1CCF-3C24-C1E6-C283E45C2C4D}"/>
+          <ac:chgData name="Fatima Pillosu" userId="a6295d4dc9e22643" providerId="LiveId" clId="{F0B9C950-5C19-45BA-B39E-FADB59417D97}" dt="2025-06-26T03:48:57.247" v="3628"/>
+          <ac:spMkLst>
+            <pc:docMk/>
+            <pc:sldMk cId="4289110639" sldId="257"/>
+            <ac:spMk id="115" creationId="{4BC09263-C830-303A-BB0C-2207AFEFF22B}"/>
+          </ac:spMkLst>
+        </pc:spChg>
+        <pc:spChg chg="add del mod">
+          <ac:chgData name="Fatima Pillosu" userId="a6295d4dc9e22643" providerId="LiveId" clId="{F0B9C950-5C19-45BA-B39E-FADB59417D97}" dt="2025-06-25T15:31:33.664" v="1751" actId="478"/>
+          <ac:spMkLst>
+            <pc:docMk/>
+            <pc:sldMk cId="4289110639" sldId="257"/>
+            <ac:spMk id="115" creationId="{6E0A576C-FEB4-8631-B956-C0ECE587A165}"/>
+          </ac:spMkLst>
+        </pc:spChg>
+        <pc:spChg chg="add del mod">
+          <ac:chgData name="Fatima Pillosu" userId="a6295d4dc9e22643" providerId="LiveId" clId="{F0B9C950-5C19-45BA-B39E-FADB59417D97}" dt="2025-06-25T15:38:58.332" v="1902" actId="21"/>
+          <ac:spMkLst>
+            <pc:docMk/>
+            <pc:sldMk cId="4289110639" sldId="257"/>
+            <ac:spMk id="116" creationId="{5137CFD3-310B-C4B7-5CBF-D6EBE8384DFF}"/>
           </ac:spMkLst>
         </pc:spChg>
         <pc:spChg chg="add mod">
-          <ac:chgData name="Fatima Pillosu" userId="a6295d4dc9e22643" providerId="LiveId" clId="{F0B9C950-5C19-45BA-B39E-FADB59417D97}" dt="2025-06-25T16:43:01.281" v="3396" actId="1035"/>
-          <ac:spMkLst>
-            <pc:docMk/>
-            <pc:sldMk cId="4289110639" sldId="257"/>
-            <ac:spMk id="43" creationId="{8BFC4AA3-C582-B088-949F-3006D7236AAA}"/>
+          <ac:chgData name="Fatima Pillosu" userId="a6295d4dc9e22643" providerId="LiveId" clId="{F0B9C950-5C19-45BA-B39E-FADB59417D97}" dt="2025-06-26T03:48:57.247" v="3628"/>
+          <ac:spMkLst>
+            <pc:docMk/>
+            <pc:sldMk cId="4289110639" sldId="257"/>
+            <ac:spMk id="116" creationId="{8BFC4AA3-C582-B088-949F-3006D7236AAA}"/>
           </ac:spMkLst>
         </pc:spChg>
         <pc:spChg chg="add mod">
-          <ac:chgData name="Fatima Pillosu" userId="a6295d4dc9e22643" providerId="LiveId" clId="{F0B9C950-5C19-45BA-B39E-FADB59417D97}" dt="2025-06-25T16:43:01.281" v="3396" actId="1035"/>
-          <ac:spMkLst>
-            <pc:docMk/>
-            <pc:sldMk cId="4289110639" sldId="257"/>
-            <ac:spMk id="44" creationId="{17A4B2C5-47D5-3495-68D8-2CB424DC7257}"/>
+          <ac:chgData name="Fatima Pillosu" userId="a6295d4dc9e22643" providerId="LiveId" clId="{F0B9C950-5C19-45BA-B39E-FADB59417D97}" dt="2025-06-26T03:48:57.247" v="3628"/>
+          <ac:spMkLst>
+            <pc:docMk/>
+            <pc:sldMk cId="4289110639" sldId="257"/>
+            <ac:spMk id="117" creationId="{17A4B2C5-47D5-3495-68D8-2CB424DC7257}"/>
+          </ac:spMkLst>
+        </pc:spChg>
+        <pc:spChg chg="add del mod">
+          <ac:chgData name="Fatima Pillosu" userId="a6295d4dc9e22643" providerId="LiveId" clId="{F0B9C950-5C19-45BA-B39E-FADB59417D97}" dt="2025-06-25T15:35:46.534" v="1865" actId="478"/>
+          <ac:spMkLst>
+            <pc:docMk/>
+            <pc:sldMk cId="4289110639" sldId="257"/>
+            <ac:spMk id="117" creationId="{3A5CD0EB-6B55-2725-6E3F-17726052CCE4}"/>
+          </ac:spMkLst>
+        </pc:spChg>
+        <pc:spChg chg="add del mod">
+          <ac:chgData name="Fatima Pillosu" userId="a6295d4dc9e22643" providerId="LiveId" clId="{F0B9C950-5C19-45BA-B39E-FADB59417D97}" dt="2025-06-25T15:38:58.332" v="1902" actId="21"/>
+          <ac:spMkLst>
+            <pc:docMk/>
+            <pc:sldMk cId="4289110639" sldId="257"/>
+            <ac:spMk id="118" creationId="{9097776E-A046-4D6E-89DA-50B1F5A3FAF4}"/>
           </ac:spMkLst>
         </pc:spChg>
         <pc:spChg chg="add mod">
-          <ac:chgData name="Fatima Pillosu" userId="a6295d4dc9e22643" providerId="LiveId" clId="{F0B9C950-5C19-45BA-B39E-FADB59417D97}" dt="2025-06-25T16:43:01.281" v="3396" actId="1035"/>
-          <ac:spMkLst>
-            <pc:docMk/>
-            <pc:sldMk cId="4289110639" sldId="257"/>
-            <ac:spMk id="45" creationId="{DC1CA93F-6FAF-42B3-BBBF-433BE0D7EC13}"/>
+          <ac:chgData name="Fatima Pillosu" userId="a6295d4dc9e22643" providerId="LiveId" clId="{F0B9C950-5C19-45BA-B39E-FADB59417D97}" dt="2025-06-26T03:48:57.247" v="3628"/>
+          <ac:spMkLst>
+            <pc:docMk/>
+            <pc:sldMk cId="4289110639" sldId="257"/>
+            <ac:spMk id="118" creationId="{DC1CA93F-6FAF-42B3-BBBF-433BE0D7EC13}"/>
           </ac:spMkLst>
         </pc:spChg>
         <pc:spChg chg="add mod">
-          <ac:chgData name="Fatima Pillosu" userId="a6295d4dc9e22643" providerId="LiveId" clId="{F0B9C950-5C19-45BA-B39E-FADB59417D97}" dt="2025-06-25T16:43:01.281" v="3396" actId="1035"/>
-          <ac:spMkLst>
-            <pc:docMk/>
-            <pc:sldMk cId="4289110639" sldId="257"/>
-            <ac:spMk id="46" creationId="{0C8CE056-7612-0128-B393-AE3D0105B0B0}"/>
-          </ac:spMkLst>
-        </pc:spChg>
-        <pc:spChg chg="add mod">
-          <ac:chgData name="Fatima Pillosu" userId="a6295d4dc9e22643" providerId="LiveId" clId="{F0B9C950-5C19-45BA-B39E-FADB59417D97}" dt="2025-06-25T16:43:01.281" v="3396" actId="1035"/>
-          <ac:spMkLst>
-            <pc:docMk/>
-            <pc:sldMk cId="4289110639" sldId="257"/>
-            <ac:spMk id="47" creationId="{26E5001B-6DEC-3779-E01A-0A27FF325B8B}"/>
-          </ac:spMkLst>
-        </pc:spChg>
-        <pc:spChg chg="add del mod">
-          <ac:chgData name="Fatima Pillosu" userId="a6295d4dc9e22643" providerId="LiveId" clId="{F0B9C950-5C19-45BA-B39E-FADB59417D97}" dt="2025-06-25T15:13:51.292" v="1448" actId="21"/>
-          <ac:spMkLst>
-            <pc:docMk/>
-            <pc:sldMk cId="4289110639" sldId="257"/>
-            <ac:spMk id="47" creationId="{BE24FD28-FAFB-884F-4CE7-E4FD5429F6E3}"/>
-          </ac:spMkLst>
-        </pc:spChg>
-        <pc:spChg chg="add del mod">
-          <ac:chgData name="Fatima Pillosu" userId="a6295d4dc9e22643" providerId="LiveId" clId="{F0B9C950-5C19-45BA-B39E-FADB59417D97}" dt="2025-06-25T15:13:51.292" v="1448" actId="21"/>
-          <ac:spMkLst>
-            <pc:docMk/>
-            <pc:sldMk cId="4289110639" sldId="257"/>
-            <ac:spMk id="48" creationId="{16EB6FA0-CBE1-9983-F1CC-346BCA2848D4}"/>
-          </ac:spMkLst>
-        </pc:spChg>
-        <pc:spChg chg="add mod">
-          <ac:chgData name="Fatima Pillosu" userId="a6295d4dc9e22643" providerId="LiveId" clId="{F0B9C950-5C19-45BA-B39E-FADB59417D97}" dt="2025-06-25T16:43:01.281" v="3396" actId="1035"/>
-          <ac:spMkLst>
-            <pc:docMk/>
-            <pc:sldMk cId="4289110639" sldId="257"/>
-            <ac:spMk id="48" creationId="{9725519F-3CA2-8003-2FF8-53A9447B36EA}"/>
-          </ac:spMkLst>
-        </pc:spChg>
-        <pc:spChg chg="add del mod">
-          <ac:chgData name="Fatima Pillosu" userId="a6295d4dc9e22643" providerId="LiveId" clId="{F0B9C950-5C19-45BA-B39E-FADB59417D97}" dt="2025-06-25T15:13:51.292" v="1448" actId="21"/>
-          <ac:spMkLst>
-            <pc:docMk/>
-            <pc:sldMk cId="4289110639" sldId="257"/>
-            <ac:spMk id="49" creationId="{6E0A576C-FEB4-8631-B956-C0ECE587A165}"/>
-          </ac:spMkLst>
-        </pc:spChg>
-        <pc:spChg chg="add mod">
-          <ac:chgData name="Fatima Pillosu" userId="a6295d4dc9e22643" providerId="LiveId" clId="{F0B9C950-5C19-45BA-B39E-FADB59417D97}" dt="2025-06-25T16:43:01.281" v="3396" actId="1035"/>
-          <ac:spMkLst>
-            <pc:docMk/>
-            <pc:sldMk cId="4289110639" sldId="257"/>
-            <ac:spMk id="49" creationId="{E8D2B8E7-039B-1A09-2DDC-C83E14EB46DF}"/>
-          </ac:spMkLst>
-        </pc:spChg>
-        <pc:spChg chg="add del mod">
-          <ac:chgData name="Fatima Pillosu" userId="a6295d4dc9e22643" providerId="LiveId" clId="{F0B9C950-5C19-45BA-B39E-FADB59417D97}" dt="2025-06-25T15:13:51.292" v="1448" actId="21"/>
-          <ac:spMkLst>
-            <pc:docMk/>
-            <pc:sldMk cId="4289110639" sldId="257"/>
-            <ac:spMk id="50" creationId="{5137CFD3-310B-C4B7-5CBF-D6EBE8384DFF}"/>
-          </ac:spMkLst>
-        </pc:spChg>
-        <pc:spChg chg="add mod">
-          <ac:chgData name="Fatima Pillosu" userId="a6295d4dc9e22643" providerId="LiveId" clId="{F0B9C950-5C19-45BA-B39E-FADB59417D97}" dt="2025-06-25T16:43:01.281" v="3396" actId="1035"/>
-          <ac:spMkLst>
-            <pc:docMk/>
-            <pc:sldMk cId="4289110639" sldId="257"/>
-            <ac:spMk id="50" creationId="{C12365C0-1DFD-9105-1FAE-06F580451ED3}"/>
-          </ac:spMkLst>
-        </pc:spChg>
-        <pc:spChg chg="add del mod">
-          <ac:chgData name="Fatima Pillosu" userId="a6295d4dc9e22643" providerId="LiveId" clId="{F0B9C950-5C19-45BA-B39E-FADB59417D97}" dt="2025-06-25T15:13:51.292" v="1448" actId="21"/>
-          <ac:spMkLst>
-            <pc:docMk/>
-            <pc:sldMk cId="4289110639" sldId="257"/>
-            <ac:spMk id="51" creationId="{3A5CD0EB-6B55-2725-6E3F-17726052CCE4}"/>
-          </ac:spMkLst>
-        </pc:spChg>
-        <pc:spChg chg="add mod">
-          <ac:chgData name="Fatima Pillosu" userId="a6295d4dc9e22643" providerId="LiveId" clId="{F0B9C950-5C19-45BA-B39E-FADB59417D97}" dt="2025-06-25T16:43:01.281" v="3396" actId="1035"/>
-          <ac:spMkLst>
-            <pc:docMk/>
-            <pc:sldMk cId="4289110639" sldId="257"/>
-            <ac:spMk id="51" creationId="{75EFEC79-3C2A-8CE1-D040-35A21318F4DF}"/>
-          </ac:spMkLst>
-        </pc:spChg>
-        <pc:spChg chg="add mod">
-          <ac:chgData name="Fatima Pillosu" userId="a6295d4dc9e22643" providerId="LiveId" clId="{F0B9C950-5C19-45BA-B39E-FADB59417D97}" dt="2025-06-25T16:43:01.281" v="3396" actId="1035"/>
-          <ac:spMkLst>
-            <pc:docMk/>
-            <pc:sldMk cId="4289110639" sldId="257"/>
-            <ac:spMk id="52" creationId="{2E5BBF82-039A-99DB-1291-B984EF2722D0}"/>
-          </ac:spMkLst>
-        </pc:spChg>
-        <pc:spChg chg="add del mod">
-          <ac:chgData name="Fatima Pillosu" userId="a6295d4dc9e22643" providerId="LiveId" clId="{F0B9C950-5C19-45BA-B39E-FADB59417D97}" dt="2025-06-25T15:13:51.292" v="1448" actId="21"/>
-          <ac:spMkLst>
-            <pc:docMk/>
-            <pc:sldMk cId="4289110639" sldId="257"/>
-            <ac:spMk id="52" creationId="{9097776E-A046-4D6E-89DA-50B1F5A3FAF4}"/>
-          </ac:spMkLst>
-        </pc:spChg>
-        <pc:spChg chg="add del mod">
-          <ac:chgData name="Fatima Pillosu" userId="a6295d4dc9e22643" providerId="LiveId" clId="{F0B9C950-5C19-45BA-B39E-FADB59417D97}" dt="2025-06-25T15:13:51.292" v="1448" actId="21"/>
-          <ac:spMkLst>
-            <pc:docMk/>
-            <pc:sldMk cId="4289110639" sldId="257"/>
-            <ac:spMk id="53" creationId="{E90C6C9F-C26A-BA0C-97C9-D400337436C7}"/>
-          </ac:spMkLst>
-        </pc:spChg>
-        <pc:spChg chg="add mod">
-          <ac:chgData name="Fatima Pillosu" userId="a6295d4dc9e22643" providerId="LiveId" clId="{F0B9C950-5C19-45BA-B39E-FADB59417D97}" dt="2025-06-25T16:43:01.281" v="3396" actId="1035"/>
-          <ac:spMkLst>
-            <pc:docMk/>
-            <pc:sldMk cId="4289110639" sldId="257"/>
-            <ac:spMk id="53" creationId="{F1B50902-05E1-2214-2377-74DDCE112879}"/>
-          </ac:spMkLst>
-        </pc:spChg>
-        <pc:spChg chg="add del mod">
-          <ac:chgData name="Fatima Pillosu" userId="a6295d4dc9e22643" providerId="LiveId" clId="{F0B9C950-5C19-45BA-B39E-FADB59417D97}" dt="2025-06-25T15:13:51.292" v="1448" actId="21"/>
-          <ac:spMkLst>
-            <pc:docMk/>
-            <pc:sldMk cId="4289110639" sldId="257"/>
-            <ac:spMk id="54" creationId="{17A4B2C5-47D5-3495-68D8-2CB424DC7257}"/>
-          </ac:spMkLst>
-        </pc:spChg>
-        <pc:spChg chg="add del mod">
-          <ac:chgData name="Fatima Pillosu" userId="a6295d4dc9e22643" providerId="LiveId" clId="{F0B9C950-5C19-45BA-B39E-FADB59417D97}" dt="2025-06-25T15:13:51.292" v="1448" actId="21"/>
-          <ac:spMkLst>
-            <pc:docMk/>
-            <pc:sldMk cId="4289110639" sldId="257"/>
-            <ac:spMk id="55" creationId="{1FE71E37-6166-0490-58E8-888C8B970604}"/>
-          </ac:spMkLst>
-        </pc:spChg>
-        <pc:spChg chg="add del mod">
-          <ac:chgData name="Fatima Pillosu" userId="a6295d4dc9e22643" providerId="LiveId" clId="{F0B9C950-5C19-45BA-B39E-FADB59417D97}" dt="2025-06-25T15:13:51.292" v="1448" actId="21"/>
-          <ac:spMkLst>
-            <pc:docMk/>
-            <pc:sldMk cId="4289110639" sldId="257"/>
-            <ac:spMk id="56" creationId="{951A946F-24FC-86A6-3A72-C8D4D2433C01}"/>
-          </ac:spMkLst>
-        </pc:spChg>
-        <pc:spChg chg="add del mod">
-          <ac:chgData name="Fatima Pillosu" userId="a6295d4dc9e22643" providerId="LiveId" clId="{F0B9C950-5C19-45BA-B39E-FADB59417D97}" dt="2025-06-25T15:13:51.292" v="1448" actId="21"/>
-          <ac:spMkLst>
-            <pc:docMk/>
-            <pc:sldMk cId="4289110639" sldId="257"/>
-            <ac:spMk id="57" creationId="{D7B7EA2C-EE98-FF83-48D1-3425D530EEDB}"/>
-          </ac:spMkLst>
-        </pc:spChg>
-        <pc:spChg chg="add del mod">
-          <ac:chgData name="Fatima Pillosu" userId="a6295d4dc9e22643" providerId="LiveId" clId="{F0B9C950-5C19-45BA-B39E-FADB59417D97}" dt="2025-06-25T15:13:51.292" v="1448" actId="21"/>
-          <ac:spMkLst>
-            <pc:docMk/>
-            <pc:sldMk cId="4289110639" sldId="257"/>
-            <ac:spMk id="58" creationId="{441CB6E6-87E2-1A0A-67F8-7F99E4513D1C}"/>
-          </ac:spMkLst>
-        </pc:spChg>
-        <pc:spChg chg="add del mod">
-          <ac:chgData name="Fatima Pillosu" userId="a6295d4dc9e22643" providerId="LiveId" clId="{F0B9C950-5C19-45BA-B39E-FADB59417D97}" dt="2025-06-25T15:13:51.292" v="1448" actId="21"/>
-          <ac:spMkLst>
-            <pc:docMk/>
-            <pc:sldMk cId="4289110639" sldId="257"/>
-            <ac:spMk id="59" creationId="{DC1CA93F-6FAF-42B3-BBBF-433BE0D7EC13}"/>
-          </ac:spMkLst>
-        </pc:spChg>
-        <pc:spChg chg="add del mod">
-          <ac:chgData name="Fatima Pillosu" userId="a6295d4dc9e22643" providerId="LiveId" clId="{F0B9C950-5C19-45BA-B39E-FADB59417D97}" dt="2025-06-25T15:13:51.292" v="1448" actId="21"/>
-          <ac:spMkLst>
-            <pc:docMk/>
-            <pc:sldMk cId="4289110639" sldId="257"/>
-            <ac:spMk id="60" creationId="{06561625-E084-10DA-C9D2-DC79AAA113FE}"/>
-          </ac:spMkLst>
-        </pc:spChg>
-        <pc:spChg chg="add del mod">
-          <ac:chgData name="Fatima Pillosu" userId="a6295d4dc9e22643" providerId="LiveId" clId="{F0B9C950-5C19-45BA-B39E-FADB59417D97}" dt="2025-06-25T15:13:51.292" v="1448" actId="21"/>
-          <ac:spMkLst>
-            <pc:docMk/>
-            <pc:sldMk cId="4289110639" sldId="257"/>
-            <ac:spMk id="61" creationId="{E1DBA1A3-69AC-E204-1AED-E215C8C8CEB0}"/>
-          </ac:spMkLst>
-        </pc:spChg>
-        <pc:spChg chg="add del mod">
-          <ac:chgData name="Fatima Pillosu" userId="a6295d4dc9e22643" providerId="LiveId" clId="{F0B9C950-5C19-45BA-B39E-FADB59417D97}" dt="2025-06-25T15:13:51.292" v="1448" actId="21"/>
-          <ac:spMkLst>
-            <pc:docMk/>
-            <pc:sldMk cId="4289110639" sldId="257"/>
-            <ac:spMk id="62" creationId="{1402EF05-0A8D-81FE-F96A-820C0CB99803}"/>
-          </ac:spMkLst>
-        </pc:spChg>
-        <pc:spChg chg="add del mod">
-          <ac:chgData name="Fatima Pillosu" userId="a6295d4dc9e22643" providerId="LiveId" clId="{F0B9C950-5C19-45BA-B39E-FADB59417D97}" dt="2025-06-25T15:13:51.292" v="1448" actId="21"/>
-          <ac:spMkLst>
-            <pc:docMk/>
-            <pc:sldMk cId="4289110639" sldId="257"/>
-            <ac:spMk id="63" creationId="{4CDF8D29-A1A4-B6EF-CC2D-02154951F423}"/>
-          </ac:spMkLst>
-        </pc:spChg>
-        <pc:spChg chg="add del mod">
-          <ac:chgData name="Fatima Pillosu" userId="a6295d4dc9e22643" providerId="LiveId" clId="{F0B9C950-5C19-45BA-B39E-FADB59417D97}" dt="2025-06-25T15:13:51.292" v="1448" actId="21"/>
-          <ac:spMkLst>
-            <pc:docMk/>
-            <pc:sldMk cId="4289110639" sldId="257"/>
-            <ac:spMk id="64" creationId="{C5F22480-43D2-EC6C-C595-536DDF09AC46}"/>
-          </ac:spMkLst>
-        </pc:spChg>
-        <pc:spChg chg="add del mod">
-          <ac:chgData name="Fatima Pillosu" userId="a6295d4dc9e22643" providerId="LiveId" clId="{F0B9C950-5C19-45BA-B39E-FADB59417D97}" dt="2025-06-25T15:13:51.292" v="1448" actId="21"/>
-          <ac:spMkLst>
-            <pc:docMk/>
-            <pc:sldMk cId="4289110639" sldId="257"/>
-            <ac:spMk id="65" creationId="{65CF77BB-AB79-BDF7-1AD9-C8ABDB188BCE}"/>
-          </ac:spMkLst>
-        </pc:spChg>
-        <pc:spChg chg="add del mod">
-          <ac:chgData name="Fatima Pillosu" userId="a6295d4dc9e22643" providerId="LiveId" clId="{F0B9C950-5C19-45BA-B39E-FADB59417D97}" dt="2025-06-25T15:13:51.292" v="1448" actId="21"/>
-          <ac:spMkLst>
-            <pc:docMk/>
-            <pc:sldMk cId="4289110639" sldId="257"/>
-            <ac:spMk id="66" creationId="{CE0D8E67-F738-7066-FAAB-7F1C9C0D3446}"/>
-          </ac:spMkLst>
-        </pc:spChg>
-        <pc:spChg chg="add del mod">
-          <ac:chgData name="Fatima Pillosu" userId="a6295d4dc9e22643" providerId="LiveId" clId="{F0B9C950-5C19-45BA-B39E-FADB59417D97}" dt="2025-06-25T15:13:51.292" v="1448" actId="21"/>
-          <ac:spMkLst>
-            <pc:docMk/>
-            <pc:sldMk cId="4289110639" sldId="257"/>
-            <ac:spMk id="67" creationId="{4D8BB4D1-20CB-1DE2-D4F0-75DF1EAC1D67}"/>
-          </ac:spMkLst>
-        </pc:spChg>
-        <pc:spChg chg="add del mod">
-          <ac:chgData name="Fatima Pillosu" userId="a6295d4dc9e22643" providerId="LiveId" clId="{F0B9C950-5C19-45BA-B39E-FADB59417D97}" dt="2025-06-25T15:13:51.292" v="1448" actId="21"/>
-          <ac:spMkLst>
-            <pc:docMk/>
-            <pc:sldMk cId="4289110639" sldId="257"/>
-            <ac:spMk id="68" creationId="{50D42DFB-603C-F1E1-00B0-82C244B805A5}"/>
-          </ac:spMkLst>
-        </pc:spChg>
-        <pc:spChg chg="add del mod">
-          <ac:chgData name="Fatima Pillosu" userId="a6295d4dc9e22643" providerId="LiveId" clId="{F0B9C950-5C19-45BA-B39E-FADB59417D97}" dt="2025-06-25T15:13:51.292" v="1448" actId="21"/>
-          <ac:spMkLst>
-            <pc:docMk/>
-            <pc:sldMk cId="4289110639" sldId="257"/>
-            <ac:spMk id="69" creationId="{4CB4D06F-1CFC-86DB-9C76-5F0C3731175E}"/>
-          </ac:spMkLst>
-        </pc:spChg>
-        <pc:spChg chg="add del mod">
-          <ac:chgData name="Fatima Pillosu" userId="a6295d4dc9e22643" providerId="LiveId" clId="{F0B9C950-5C19-45BA-B39E-FADB59417D97}" dt="2025-06-25T15:13:51.292" v="1448" actId="21"/>
-          <ac:spMkLst>
-            <pc:docMk/>
-            <pc:sldMk cId="4289110639" sldId="257"/>
-            <ac:spMk id="70" creationId="{3677E649-7591-CF6E-4DD8-9E544C86BDA1}"/>
-          </ac:spMkLst>
-        </pc:spChg>
-        <pc:spChg chg="add del mod">
-          <ac:chgData name="Fatima Pillosu" userId="a6295d4dc9e22643" providerId="LiveId" clId="{F0B9C950-5C19-45BA-B39E-FADB59417D97}" dt="2025-06-25T15:13:51.292" v="1448" actId="21"/>
-          <ac:spMkLst>
-            <pc:docMk/>
-            <pc:sldMk cId="4289110639" sldId="257"/>
-            <ac:spMk id="71" creationId="{2BFE8251-FDEF-457C-6AFD-2E5AF06DF895}"/>
-          </ac:spMkLst>
-        </pc:spChg>
-        <pc:spChg chg="add del mod">
-          <ac:chgData name="Fatima Pillosu" userId="a6295d4dc9e22643" providerId="LiveId" clId="{F0B9C950-5C19-45BA-B39E-FADB59417D97}" dt="2025-06-25T15:13:51.292" v="1448" actId="21"/>
-          <ac:spMkLst>
-            <pc:docMk/>
-            <pc:sldMk cId="4289110639" sldId="257"/>
-            <ac:spMk id="72" creationId="{36D3542B-779B-AA13-5BF1-D5B361BB166D}"/>
-          </ac:spMkLst>
-        </pc:spChg>
-        <pc:spChg chg="add del mod">
-          <ac:chgData name="Fatima Pillosu" userId="a6295d4dc9e22643" providerId="LiveId" clId="{F0B9C950-5C19-45BA-B39E-FADB59417D97}" dt="2025-06-25T15:13:51.292" v="1448" actId="21"/>
-          <ac:spMkLst>
-            <pc:docMk/>
-            <pc:sldMk cId="4289110639" sldId="257"/>
-            <ac:spMk id="73" creationId="{DFF9F863-65F7-D89A-853C-C1170C80C088}"/>
-          </ac:spMkLst>
-        </pc:spChg>
-        <pc:spChg chg="add del mod">
-          <ac:chgData name="Fatima Pillosu" userId="a6295d4dc9e22643" providerId="LiveId" clId="{F0B9C950-5C19-45BA-B39E-FADB59417D97}" dt="2025-06-25T15:14:56.879" v="1473" actId="478"/>
-          <ac:spMkLst>
-            <pc:docMk/>
-            <pc:sldMk cId="4289110639" sldId="257"/>
-            <ac:spMk id="74" creationId="{EF31E25C-48D4-6C90-AFFC-3A37A8EA7E78}"/>
-          </ac:spMkLst>
-        </pc:spChg>
-        <pc:spChg chg="add del mod">
-          <ac:chgData name="Fatima Pillosu" userId="a6295d4dc9e22643" providerId="LiveId" clId="{F0B9C950-5C19-45BA-B39E-FADB59417D97}" dt="2025-06-25T15:14:54.927" v="1472" actId="478"/>
-          <ac:spMkLst>
-            <pc:docMk/>
-            <pc:sldMk cId="4289110639" sldId="257"/>
-            <ac:spMk id="75" creationId="{D32C8D70-81C4-AB6A-08D1-810BA67ED33B}"/>
-          </ac:spMkLst>
-        </pc:spChg>
-        <pc:spChg chg="add del mod">
-          <ac:chgData name="Fatima Pillosu" userId="a6295d4dc9e22643" providerId="LiveId" clId="{F0B9C950-5C19-45BA-B39E-FADB59417D97}" dt="2025-06-25T15:14:50.744" v="1471" actId="478"/>
-          <ac:spMkLst>
-            <pc:docMk/>
-            <pc:sldMk cId="4289110639" sldId="257"/>
-            <ac:spMk id="76" creationId="{C67831BC-0460-0F59-5119-29984C4351EE}"/>
-          </ac:spMkLst>
-        </pc:spChg>
-        <pc:spChg chg="add del mod">
-          <ac:chgData name="Fatima Pillosu" userId="a6295d4dc9e22643" providerId="LiveId" clId="{F0B9C950-5C19-45BA-B39E-FADB59417D97}" dt="2025-06-25T15:16:13.902" v="1494" actId="478"/>
-          <ac:spMkLst>
-            <pc:docMk/>
-            <pc:sldMk cId="4289110639" sldId="257"/>
-            <ac:spMk id="77" creationId="{A96FCC34-B663-485A-1B91-366A6782D098}"/>
-          </ac:spMkLst>
-        </pc:spChg>
-        <pc:spChg chg="add del mod">
-          <ac:chgData name="Fatima Pillosu" userId="a6295d4dc9e22643" providerId="LiveId" clId="{F0B9C950-5C19-45BA-B39E-FADB59417D97}" dt="2025-06-25T15:38:58.332" v="1902" actId="21"/>
-          <ac:spMkLst>
-            <pc:docMk/>
-            <pc:sldMk cId="4289110639" sldId="257"/>
-            <ac:spMk id="78" creationId="{DDAF3D54-885E-2A29-8D7C-F2C70C58F5B5}"/>
-          </ac:spMkLst>
-        </pc:spChg>
-        <pc:spChg chg="add del mod">
-          <ac:chgData name="Fatima Pillosu" userId="a6295d4dc9e22643" providerId="LiveId" clId="{F0B9C950-5C19-45BA-B39E-FADB59417D97}" dt="2025-06-25T15:15:40.326" v="1488" actId="478"/>
-          <ac:spMkLst>
-            <pc:docMk/>
-            <pc:sldMk cId="4289110639" sldId="257"/>
-            <ac:spMk id="82" creationId="{8993D2BA-C58E-5F46-6E65-8673351E7984}"/>
-          </ac:spMkLst>
-        </pc:spChg>
-        <pc:spChg chg="add del mod">
-          <ac:chgData name="Fatima Pillosu" userId="a6295d4dc9e22643" providerId="LiveId" clId="{F0B9C950-5C19-45BA-B39E-FADB59417D97}" dt="2025-06-25T15:15:41.649" v="1489" actId="478"/>
-          <ac:spMkLst>
-            <pc:docMk/>
-            <pc:sldMk cId="4289110639" sldId="257"/>
-            <ac:spMk id="83" creationId="{3BC980C1-1730-6AF0-AED0-8759A78EA8C6}"/>
-          </ac:spMkLst>
-        </pc:spChg>
-        <pc:spChg chg="add del mod">
-          <ac:chgData name="Fatima Pillosu" userId="a6295d4dc9e22643" providerId="LiveId" clId="{F0B9C950-5C19-45BA-B39E-FADB59417D97}" dt="2025-06-25T15:15:43.114" v="1490" actId="478"/>
-          <ac:spMkLst>
-            <pc:docMk/>
-            <pc:sldMk cId="4289110639" sldId="257"/>
-            <ac:spMk id="84" creationId="{C00C6D4F-6379-0107-EFEC-867498B3DF65}"/>
-          </ac:spMkLst>
-        </pc:spChg>
-        <pc:spChg chg="add del mod">
-          <ac:chgData name="Fatima Pillosu" userId="a6295d4dc9e22643" providerId="LiveId" clId="{F0B9C950-5C19-45BA-B39E-FADB59417D97}" dt="2025-06-25T15:38:58.332" v="1902" actId="21"/>
-          <ac:spMkLst>
-            <pc:docMk/>
-            <pc:sldMk cId="4289110639" sldId="257"/>
-            <ac:spMk id="91" creationId="{2CE8AC50-A4E3-9DB6-F606-EB886BE8550D}"/>
-          </ac:spMkLst>
-        </pc:spChg>
-        <pc:spChg chg="add del mod">
-          <ac:chgData name="Fatima Pillosu" userId="a6295d4dc9e22643" providerId="LiveId" clId="{F0B9C950-5C19-45BA-B39E-FADB59417D97}" dt="2025-06-25T15:38:58.332" v="1902" actId="21"/>
-          <ac:spMkLst>
-            <pc:docMk/>
-            <pc:sldMk cId="4289110639" sldId="257"/>
-            <ac:spMk id="92" creationId="{8BF45082-5DBA-2BDA-6B3B-1CE304EDBB0F}"/>
-          </ac:spMkLst>
-        </pc:spChg>
-        <pc:spChg chg="add del mod">
-          <ac:chgData name="Fatima Pillosu" userId="a6295d4dc9e22643" providerId="LiveId" clId="{F0B9C950-5C19-45BA-B39E-FADB59417D97}" dt="2025-06-25T15:38:58.332" v="1902" actId="21"/>
-          <ac:spMkLst>
-            <pc:docMk/>
-            <pc:sldMk cId="4289110639" sldId="257"/>
-            <ac:spMk id="93" creationId="{DC34E010-EA2E-EFF4-B042-AAD8E29801DE}"/>
-          </ac:spMkLst>
-        </pc:spChg>
-        <pc:spChg chg="add del mod">
-          <ac:chgData name="Fatima Pillosu" userId="a6295d4dc9e22643" providerId="LiveId" clId="{F0B9C950-5C19-45BA-B39E-FADB59417D97}" dt="2025-06-25T15:38:58.332" v="1902" actId="21"/>
-          <ac:spMkLst>
-            <pc:docMk/>
-            <pc:sldMk cId="4289110639" sldId="257"/>
-            <ac:spMk id="94" creationId="{E596FB15-C5C4-A883-D8B1-8941F744109D}"/>
-          </ac:spMkLst>
-        </pc:spChg>
-        <pc:spChg chg="add del mod">
-          <ac:chgData name="Fatima Pillosu" userId="a6295d4dc9e22643" providerId="LiveId" clId="{F0B9C950-5C19-45BA-B39E-FADB59417D97}" dt="2025-06-25T15:38:58.332" v="1902" actId="21"/>
-          <ac:spMkLst>
-            <pc:docMk/>
-            <pc:sldMk cId="4289110639" sldId="257"/>
-            <ac:spMk id="95" creationId="{942EDCB3-530B-AEEA-AFDB-D0EC689D20F0}"/>
-          </ac:spMkLst>
-        </pc:spChg>
-        <pc:spChg chg="add del mod">
-          <ac:chgData name="Fatima Pillosu" userId="a6295d4dc9e22643" providerId="LiveId" clId="{F0B9C950-5C19-45BA-B39E-FADB59417D97}" dt="2025-06-25T15:38:58.332" v="1902" actId="21"/>
-          <ac:spMkLst>
-            <pc:docMk/>
-            <pc:sldMk cId="4289110639" sldId="257"/>
-            <ac:spMk id="96" creationId="{09AA91AB-0F00-9123-C1B1-2024DAA6ECFC}"/>
-          </ac:spMkLst>
-        </pc:spChg>
-        <pc:spChg chg="add del mod">
-          <ac:chgData name="Fatima Pillosu" userId="a6295d4dc9e22643" providerId="LiveId" clId="{F0B9C950-5C19-45BA-B39E-FADB59417D97}" dt="2025-06-25T15:38:58.332" v="1902" actId="21"/>
-          <ac:spMkLst>
-            <pc:docMk/>
-            <pc:sldMk cId="4289110639" sldId="257"/>
-            <ac:spMk id="97" creationId="{BD607AC0-72FD-2A38-E500-5793D9FCFE8C}"/>
-          </ac:spMkLst>
-        </pc:spChg>
-        <pc:spChg chg="add del mod">
-          <ac:chgData name="Fatima Pillosu" userId="a6295d4dc9e22643" providerId="LiveId" clId="{F0B9C950-5C19-45BA-B39E-FADB59417D97}" dt="2025-06-25T15:38:58.332" v="1902" actId="21"/>
-          <ac:spMkLst>
-            <pc:docMk/>
-            <pc:sldMk cId="4289110639" sldId="257"/>
-            <ac:spMk id="98" creationId="{A443D769-35EA-ACBB-55BC-2A7FE9B1D174}"/>
-          </ac:spMkLst>
-        </pc:spChg>
-        <pc:spChg chg="add del mod">
-          <ac:chgData name="Fatima Pillosu" userId="a6295d4dc9e22643" providerId="LiveId" clId="{F0B9C950-5C19-45BA-B39E-FADB59417D97}" dt="2025-06-25T15:38:58.332" v="1902" actId="21"/>
-          <ac:spMkLst>
-            <pc:docMk/>
-            <pc:sldMk cId="4289110639" sldId="257"/>
-            <ac:spMk id="99" creationId="{ADA3DE8D-1806-5542-AE87-86B40C29C4B6}"/>
-          </ac:spMkLst>
-        </pc:spChg>
-        <pc:spChg chg="add del mod">
-          <ac:chgData name="Fatima Pillosu" userId="a6295d4dc9e22643" providerId="LiveId" clId="{F0B9C950-5C19-45BA-B39E-FADB59417D97}" dt="2025-06-25T15:38:58.332" v="1902" actId="21"/>
-          <ac:spMkLst>
-            <pc:docMk/>
-            <pc:sldMk cId="4289110639" sldId="257"/>
-            <ac:spMk id="100" creationId="{1E801C4A-0276-1937-0649-23B933A9FD4C}"/>
-          </ac:spMkLst>
-        </pc:spChg>
-        <pc:spChg chg="add del mod">
-          <ac:chgData name="Fatima Pillosu" userId="a6295d4dc9e22643" providerId="LiveId" clId="{F0B9C950-5C19-45BA-B39E-FADB59417D97}" dt="2025-06-25T15:38:58.332" v="1902" actId="21"/>
-          <ac:spMkLst>
-            <pc:docMk/>
-            <pc:sldMk cId="4289110639" sldId="257"/>
-            <ac:spMk id="101" creationId="{6541EEEE-3369-14C3-9119-24FBFEC538F6}"/>
-          </ac:spMkLst>
-        </pc:spChg>
-        <pc:spChg chg="add del mod">
-          <ac:chgData name="Fatima Pillosu" userId="a6295d4dc9e22643" providerId="LiveId" clId="{F0B9C950-5C19-45BA-B39E-FADB59417D97}" dt="2025-06-25T15:38:58.332" v="1902" actId="21"/>
-          <ac:spMkLst>
-            <pc:docMk/>
-            <pc:sldMk cId="4289110639" sldId="257"/>
-            <ac:spMk id="102" creationId="{A668C935-54EA-6F8F-0BB1-E7014CC096D7}"/>
-          </ac:spMkLst>
-        </pc:spChg>
-        <pc:spChg chg="add del mod">
-          <ac:chgData name="Fatima Pillosu" userId="a6295d4dc9e22643" providerId="LiveId" clId="{F0B9C950-5C19-45BA-B39E-FADB59417D97}" dt="2025-06-25T15:38:58.332" v="1902" actId="21"/>
-          <ac:spMkLst>
-            <pc:docMk/>
-            <pc:sldMk cId="4289110639" sldId="257"/>
-            <ac:spMk id="103" creationId="{7E97B7E9-5251-BE9A-AE14-9D7F6768E5D3}"/>
-          </ac:spMkLst>
-        </pc:spChg>
-        <pc:spChg chg="add del mod">
-          <ac:chgData name="Fatima Pillosu" userId="a6295d4dc9e22643" providerId="LiveId" clId="{F0B9C950-5C19-45BA-B39E-FADB59417D97}" dt="2025-06-25T15:38:58.332" v="1902" actId="21"/>
-          <ac:spMkLst>
-            <pc:docMk/>
-            <pc:sldMk cId="4289110639" sldId="257"/>
-            <ac:spMk id="104" creationId="{DEEE2271-5967-5ABD-F72A-2D4C2F26C2AA}"/>
-          </ac:spMkLst>
-        </pc:spChg>
-        <pc:spChg chg="add del mod">
-          <ac:chgData name="Fatima Pillosu" userId="a6295d4dc9e22643" providerId="LiveId" clId="{F0B9C950-5C19-45BA-B39E-FADB59417D97}" dt="2025-06-25T15:38:58.332" v="1902" actId="21"/>
-          <ac:spMkLst>
-            <pc:docMk/>
-            <pc:sldMk cId="4289110639" sldId="257"/>
-            <ac:spMk id="105" creationId="{3686655B-80AB-878D-8415-307EA53EFB5C}"/>
-          </ac:spMkLst>
-        </pc:spChg>
-        <pc:spChg chg="add del mod">
-          <ac:chgData name="Fatima Pillosu" userId="a6295d4dc9e22643" providerId="LiveId" clId="{F0B9C950-5C19-45BA-B39E-FADB59417D97}" dt="2025-06-25T15:16:14.678" v="1495" actId="478"/>
-          <ac:spMkLst>
-            <pc:docMk/>
-            <pc:sldMk cId="4289110639" sldId="257"/>
-            <ac:spMk id="106" creationId="{59E5FA53-1F3C-04E3-0ED3-C7DC994CB669}"/>
-          </ac:spMkLst>
-        </pc:spChg>
-        <pc:spChg chg="add del mod">
-          <ac:chgData name="Fatima Pillosu" userId="a6295d4dc9e22643" providerId="LiveId" clId="{F0B9C950-5C19-45BA-B39E-FADB59417D97}" dt="2025-06-25T15:38:58.332" v="1902" actId="21"/>
-          <ac:spMkLst>
-            <pc:docMk/>
-            <pc:sldMk cId="4289110639" sldId="257"/>
-            <ac:spMk id="107" creationId="{A0097D71-B402-A483-CFFA-F86F3C56053E}"/>
-          </ac:spMkLst>
-        </pc:spChg>
-        <pc:spChg chg="add del mod">
-          <ac:chgData name="Fatima Pillosu" userId="a6295d4dc9e22643" providerId="LiveId" clId="{F0B9C950-5C19-45BA-B39E-FADB59417D97}" dt="2025-06-25T15:38:58.332" v="1902" actId="21"/>
-          <ac:spMkLst>
-            <pc:docMk/>
-            <pc:sldMk cId="4289110639" sldId="257"/>
-            <ac:spMk id="108" creationId="{AC12668F-DD4B-D648-D773-7F3063B04CBF}"/>
-          </ac:spMkLst>
-        </pc:spChg>
-        <pc:spChg chg="add del mod">
-          <ac:chgData name="Fatima Pillosu" userId="a6295d4dc9e22643" providerId="LiveId" clId="{F0B9C950-5C19-45BA-B39E-FADB59417D97}" dt="2025-06-25T15:38:58.332" v="1902" actId="21"/>
-          <ac:spMkLst>
-            <pc:docMk/>
-            <pc:sldMk cId="4289110639" sldId="257"/>
-            <ac:spMk id="109" creationId="{77F6A371-1CCF-3C24-C1E6-C283E45C2C4D}"/>
-          </ac:spMkLst>
-        </pc:spChg>
-        <pc:spChg chg="add del mod">
-          <ac:chgData name="Fatima Pillosu" userId="a6295d4dc9e22643" providerId="LiveId" clId="{F0B9C950-5C19-45BA-B39E-FADB59417D97}" dt="2025-06-25T15:38:58.332" v="1902" actId="21"/>
-          <ac:spMkLst>
-            <pc:docMk/>
-            <pc:sldMk cId="4289110639" sldId="257"/>
-            <ac:spMk id="113" creationId="{BE24FD28-FAFB-884F-4CE7-E4FD5429F6E3}"/>
-          </ac:spMkLst>
-        </pc:spChg>
-        <pc:spChg chg="add del mod">
-          <ac:chgData name="Fatima Pillosu" userId="a6295d4dc9e22643" providerId="LiveId" clId="{F0B9C950-5C19-45BA-B39E-FADB59417D97}" dt="2025-06-25T15:38:58.332" v="1902" actId="21"/>
-          <ac:spMkLst>
-            <pc:docMk/>
-            <pc:sldMk cId="4289110639" sldId="257"/>
-            <ac:spMk id="114" creationId="{16EB6FA0-CBE1-9983-F1CC-346BCA2848D4}"/>
-          </ac:spMkLst>
-        </pc:spChg>
-        <pc:spChg chg="add del mod">
-          <ac:chgData name="Fatima Pillosu" userId="a6295d4dc9e22643" providerId="LiveId" clId="{F0B9C950-5C19-45BA-B39E-FADB59417D97}" dt="2025-06-25T15:31:33.664" v="1751" actId="478"/>
-          <ac:spMkLst>
-            <pc:docMk/>
-            <pc:sldMk cId="4289110639" sldId="257"/>
-            <ac:spMk id="115" creationId="{6E0A576C-FEB4-8631-B956-C0ECE587A165}"/>
-          </ac:spMkLst>
-        </pc:spChg>
-        <pc:spChg chg="add del mod">
-          <ac:chgData name="Fatima Pillosu" userId="a6295d4dc9e22643" providerId="LiveId" clId="{F0B9C950-5C19-45BA-B39E-FADB59417D97}" dt="2025-06-25T15:38:58.332" v="1902" actId="21"/>
-          <ac:spMkLst>
-            <pc:docMk/>
-            <pc:sldMk cId="4289110639" sldId="257"/>
-            <ac:spMk id="116" creationId="{5137CFD3-310B-C4B7-5CBF-D6EBE8384DFF}"/>
-          </ac:spMkLst>
-        </pc:spChg>
-        <pc:spChg chg="add del mod">
-          <ac:chgData name="Fatima Pillosu" userId="a6295d4dc9e22643" providerId="LiveId" clId="{F0B9C950-5C19-45BA-B39E-FADB59417D97}" dt="2025-06-25T15:35:46.534" v="1865" actId="478"/>
-          <ac:spMkLst>
-            <pc:docMk/>
-            <pc:sldMk cId="4289110639" sldId="257"/>
-            <ac:spMk id="117" creationId="{3A5CD0EB-6B55-2725-6E3F-17726052CCE4}"/>
-          </ac:spMkLst>
-        </pc:spChg>
-        <pc:spChg chg="add del mod">
-          <ac:chgData name="Fatima Pillosu" userId="a6295d4dc9e22643" providerId="LiveId" clId="{F0B9C950-5C19-45BA-B39E-FADB59417D97}" dt="2025-06-25T15:38:58.332" v="1902" actId="21"/>
-          <ac:spMkLst>
-            <pc:docMk/>
-            <pc:sldMk cId="4289110639" sldId="257"/>
-            <ac:spMk id="118" creationId="{9097776E-A046-4D6E-89DA-50B1F5A3FAF4}"/>
+          <ac:chgData name="Fatima Pillosu" userId="a6295d4dc9e22643" providerId="LiveId" clId="{F0B9C950-5C19-45BA-B39E-FADB59417D97}" dt="2025-06-26T03:48:57.247" v="3628"/>
+          <ac:spMkLst>
+            <pc:docMk/>
+            <pc:sldMk cId="4289110639" sldId="257"/>
+            <ac:spMk id="119" creationId="{0C8CE056-7612-0128-B393-AE3D0105B0B0}"/>
           </ac:spMkLst>
         </pc:spChg>
         <pc:spChg chg="add del mod">
@@ -3073,6 +3705,14 @@
             <ac:spMk id="120" creationId="{17A4B2C5-47D5-3495-68D8-2CB424DC7257}"/>
           </ac:spMkLst>
         </pc:spChg>
+        <pc:spChg chg="add mod">
+          <ac:chgData name="Fatima Pillosu" userId="a6295d4dc9e22643" providerId="LiveId" clId="{F0B9C950-5C19-45BA-B39E-FADB59417D97}" dt="2025-06-26T03:48:57.247" v="3628"/>
+          <ac:spMkLst>
+            <pc:docMk/>
+            <pc:sldMk cId="4289110639" sldId="257"/>
+            <ac:spMk id="120" creationId="{26E5001B-6DEC-3779-E01A-0A27FF325B8B}"/>
+          </ac:spMkLst>
+        </pc:spChg>
         <pc:spChg chg="add del mod">
           <ac:chgData name="Fatima Pillosu" userId="a6295d4dc9e22643" providerId="LiveId" clId="{F0B9C950-5C19-45BA-B39E-FADB59417D97}" dt="2025-06-25T15:31:33.664" v="1751" actId="478"/>
           <ac:spMkLst>
@@ -3081,6 +3721,14 @@
             <ac:spMk id="121" creationId="{1FE71E37-6166-0490-58E8-888C8B970604}"/>
           </ac:spMkLst>
         </pc:spChg>
+        <pc:spChg chg="add mod">
+          <ac:chgData name="Fatima Pillosu" userId="a6295d4dc9e22643" providerId="LiveId" clId="{F0B9C950-5C19-45BA-B39E-FADB59417D97}" dt="2025-06-26T03:48:57.247" v="3628"/>
+          <ac:spMkLst>
+            <pc:docMk/>
+            <pc:sldMk cId="4289110639" sldId="257"/>
+            <ac:spMk id="121" creationId="{9725519F-3CA2-8003-2FF8-53A9447B36EA}"/>
+          </ac:spMkLst>
+        </pc:spChg>
         <pc:spChg chg="add del mod">
           <ac:chgData name="Fatima Pillosu" userId="a6295d4dc9e22643" providerId="LiveId" clId="{F0B9C950-5C19-45BA-B39E-FADB59417D97}" dt="2025-06-25T15:31:33.664" v="1751" actId="478"/>
           <ac:spMkLst>
@@ -3089,6 +3737,22 @@
             <ac:spMk id="122" creationId="{951A946F-24FC-86A6-3A72-C8D4D2433C01}"/>
           </ac:spMkLst>
         </pc:spChg>
+        <pc:spChg chg="add mod">
+          <ac:chgData name="Fatima Pillosu" userId="a6295d4dc9e22643" providerId="LiveId" clId="{F0B9C950-5C19-45BA-B39E-FADB59417D97}" dt="2025-06-26T03:48:57.247" v="3628"/>
+          <ac:spMkLst>
+            <pc:docMk/>
+            <pc:sldMk cId="4289110639" sldId="257"/>
+            <ac:spMk id="122" creationId="{E8D2B8E7-039B-1A09-2DDC-C83E14EB46DF}"/>
+          </ac:spMkLst>
+        </pc:spChg>
+        <pc:spChg chg="add mod">
+          <ac:chgData name="Fatima Pillosu" userId="a6295d4dc9e22643" providerId="LiveId" clId="{F0B9C950-5C19-45BA-B39E-FADB59417D97}" dt="2025-06-26T03:48:57.247" v="3628"/>
+          <ac:spMkLst>
+            <pc:docMk/>
+            <pc:sldMk cId="4289110639" sldId="257"/>
+            <ac:spMk id="123" creationId="{C12365C0-1DFD-9105-1FAE-06F580451ED3}"/>
+          </ac:spMkLst>
+        </pc:spChg>
         <pc:spChg chg="add del mod">
           <ac:chgData name="Fatima Pillosu" userId="a6295d4dc9e22643" providerId="LiveId" clId="{F0B9C950-5C19-45BA-B39E-FADB59417D97}" dt="2025-06-25T15:31:31.476" v="1750" actId="478"/>
           <ac:spMkLst>
@@ -3103,6 +3767,22 @@
             <pc:docMk/>
             <pc:sldMk cId="4289110639" sldId="257"/>
             <ac:spMk id="124" creationId="{441CB6E6-87E2-1A0A-67F8-7F99E4513D1C}"/>
+          </ac:spMkLst>
+        </pc:spChg>
+        <pc:spChg chg="add mod">
+          <ac:chgData name="Fatima Pillosu" userId="a6295d4dc9e22643" providerId="LiveId" clId="{F0B9C950-5C19-45BA-B39E-FADB59417D97}" dt="2025-06-26T03:48:57.247" v="3628"/>
+          <ac:spMkLst>
+            <pc:docMk/>
+            <pc:sldMk cId="4289110639" sldId="257"/>
+            <ac:spMk id="124" creationId="{75EFEC79-3C2A-8CE1-D040-35A21318F4DF}"/>
+          </ac:spMkLst>
+        </pc:spChg>
+        <pc:spChg chg="add mod">
+          <ac:chgData name="Fatima Pillosu" userId="a6295d4dc9e22643" providerId="LiveId" clId="{F0B9C950-5C19-45BA-B39E-FADB59417D97}" dt="2025-06-26T03:48:57.247" v="3628"/>
+          <ac:spMkLst>
+            <pc:docMk/>
+            <pc:sldMk cId="4289110639" sldId="257"/>
+            <ac:spMk id="125" creationId="{2E5BBF82-039A-99DB-1291-B984EF2722D0}"/>
           </ac:spMkLst>
         </pc:spChg>
         <pc:spChg chg="add del mod ord">
@@ -3121,6 +3801,22 @@
             <ac:spMk id="126" creationId="{06561625-E084-10DA-C9D2-DC79AAA113FE}"/>
           </ac:spMkLst>
         </pc:spChg>
+        <pc:spChg chg="add mod">
+          <ac:chgData name="Fatima Pillosu" userId="a6295d4dc9e22643" providerId="LiveId" clId="{F0B9C950-5C19-45BA-B39E-FADB59417D97}" dt="2025-06-26T03:48:57.247" v="3628"/>
+          <ac:spMkLst>
+            <pc:docMk/>
+            <pc:sldMk cId="4289110639" sldId="257"/>
+            <ac:spMk id="126" creationId="{F1B50902-05E1-2214-2377-74DDCE112879}"/>
+          </ac:spMkLst>
+        </pc:spChg>
+        <pc:spChg chg="add mod">
+          <ac:chgData name="Fatima Pillosu" userId="a6295d4dc9e22643" providerId="LiveId" clId="{F0B9C950-5C19-45BA-B39E-FADB59417D97}" dt="2025-06-26T03:51:30.209" v="3653" actId="1037"/>
+          <ac:spMkLst>
+            <pc:docMk/>
+            <pc:sldMk cId="4289110639" sldId="257"/>
+            <ac:spMk id="127" creationId="{B136B25A-C0BC-62CA-3885-7F8305C6C703}"/>
+          </ac:spMkLst>
+        </pc:spChg>
         <pc:spChg chg="add del mod">
           <ac:chgData name="Fatima Pillosu" userId="a6295d4dc9e22643" providerId="LiveId" clId="{F0B9C950-5C19-45BA-B39E-FADB59417D97}" dt="2025-06-25T15:31:31.476" v="1750" actId="478"/>
           <ac:spMkLst>
@@ -3137,6 +3833,14 @@
             <ac:spMk id="128" creationId="{1402EF05-0A8D-81FE-F96A-820C0CB99803}"/>
           </ac:spMkLst>
         </pc:spChg>
+        <pc:spChg chg="add mod">
+          <ac:chgData name="Fatima Pillosu" userId="a6295d4dc9e22643" providerId="LiveId" clId="{F0B9C950-5C19-45BA-B39E-FADB59417D97}" dt="2025-06-26T03:51:06.791" v="3651" actId="12788"/>
+          <ac:spMkLst>
+            <pc:docMk/>
+            <pc:sldMk cId="4289110639" sldId="257"/>
+            <ac:spMk id="128" creationId="{D0E6682D-921D-2405-877D-EC86849DB85A}"/>
+          </ac:spMkLst>
+        </pc:spChg>
         <pc:spChg chg="add del mod">
           <ac:chgData name="Fatima Pillosu" userId="a6295d4dc9e22643" providerId="LiveId" clId="{F0B9C950-5C19-45BA-B39E-FADB59417D97}" dt="2025-06-25T15:38:58.332" v="1902" actId="21"/>
           <ac:spMkLst>
@@ -3145,6 +3849,22 @@
             <ac:spMk id="129" creationId="{4CDF8D29-A1A4-B6EF-CC2D-02154951F423}"/>
           </ac:spMkLst>
         </pc:spChg>
+        <pc:spChg chg="add mod">
+          <ac:chgData name="Fatima Pillosu" userId="a6295d4dc9e22643" providerId="LiveId" clId="{F0B9C950-5C19-45BA-B39E-FADB59417D97}" dt="2025-06-26T03:51:18.109" v="3652" actId="12788"/>
+          <ac:spMkLst>
+            <pc:docMk/>
+            <pc:sldMk cId="4289110639" sldId="257"/>
+            <ac:spMk id="129" creationId="{DD14B712-37F6-3D77-C944-61E7F4FCA0AC}"/>
+          </ac:spMkLst>
+        </pc:spChg>
+        <pc:spChg chg="add mod">
+          <ac:chgData name="Fatima Pillosu" userId="a6295d4dc9e22643" providerId="LiveId" clId="{F0B9C950-5C19-45BA-B39E-FADB59417D97}" dt="2025-06-26T03:48:57.247" v="3628"/>
+          <ac:spMkLst>
+            <pc:docMk/>
+            <pc:sldMk cId="4289110639" sldId="257"/>
+            <ac:spMk id="130" creationId="{0C95B8AD-5ACB-2E85-B61D-1A867AAB576F}"/>
+          </ac:spMkLst>
+        </pc:spChg>
         <pc:spChg chg="add del mod">
           <ac:chgData name="Fatima Pillosu" userId="a6295d4dc9e22643" providerId="LiveId" clId="{F0B9C950-5C19-45BA-B39E-FADB59417D97}" dt="2025-06-25T15:38:58.332" v="1902" actId="21"/>
           <ac:spMkLst>
@@ -3161,6 +3881,22 @@
             <ac:spMk id="131" creationId="{65CF77BB-AB79-BDF7-1AD9-C8ABDB188BCE}"/>
           </ac:spMkLst>
         </pc:spChg>
+        <pc:spChg chg="add mod">
+          <ac:chgData name="Fatima Pillosu" userId="a6295d4dc9e22643" providerId="LiveId" clId="{F0B9C950-5C19-45BA-B39E-FADB59417D97}" dt="2025-06-26T03:51:30.209" v="3653" actId="1037"/>
+          <ac:spMkLst>
+            <pc:docMk/>
+            <pc:sldMk cId="4289110639" sldId="257"/>
+            <ac:spMk id="131" creationId="{D94A1280-B2A5-2EF1-0443-7D818E56F280}"/>
+          </ac:spMkLst>
+        </pc:spChg>
+        <pc:spChg chg="add mod">
+          <ac:chgData name="Fatima Pillosu" userId="a6295d4dc9e22643" providerId="LiveId" clId="{F0B9C950-5C19-45BA-B39E-FADB59417D97}" dt="2025-06-26T03:51:06.791" v="3651" actId="12788"/>
+          <ac:spMkLst>
+            <pc:docMk/>
+            <pc:sldMk cId="4289110639" sldId="257"/>
+            <ac:spMk id="132" creationId="{59155F2D-DBF5-0F9C-EC3B-2ACFE1F662A9}"/>
+          </ac:spMkLst>
+        </pc:spChg>
         <pc:spChg chg="add del mod">
           <ac:chgData name="Fatima Pillosu" userId="a6295d4dc9e22643" providerId="LiveId" clId="{F0B9C950-5C19-45BA-B39E-FADB59417D97}" dt="2025-06-25T15:38:58.332" v="1902" actId="21"/>
           <ac:spMkLst>
@@ -3175,6 +3911,14 @@
             <pc:docMk/>
             <pc:sldMk cId="4289110639" sldId="257"/>
             <ac:spMk id="133" creationId="{4D8BB4D1-20CB-1DE2-D4F0-75DF1EAC1D67}"/>
+          </ac:spMkLst>
+        </pc:spChg>
+        <pc:spChg chg="add mod">
+          <ac:chgData name="Fatima Pillosu" userId="a6295d4dc9e22643" providerId="LiveId" clId="{F0B9C950-5C19-45BA-B39E-FADB59417D97}" dt="2025-06-26T03:51:18.109" v="3652" actId="12788"/>
+          <ac:spMkLst>
+            <pc:docMk/>
+            <pc:sldMk cId="4289110639" sldId="257"/>
+            <ac:spMk id="133" creationId="{750E6499-AEDD-05B1-0F02-F5A5C33BAA43}"/>
           </ac:spMkLst>
         </pc:spChg>
         <pc:spChg chg="add del mod">
@@ -5913,7 +6657,7 @@
           <a:p>
             <a:fld id="{976F351E-84E9-41B7-B0E8-3865FDEE6578}" type="datetimeFigureOut">
               <a:rPr lang="en-GB" smtClean="0"/>
-              <a:t>25/06/2025</a:t>
+              <a:t>26/06/2025</a:t>
             </a:fld>
             <a:endParaRPr lang="en-GB"/>
           </a:p>
@@ -5931,8 +6675,8 @@
         </p:nvSpPr>
         <p:spPr>
           <a:xfrm>
-            <a:off x="2162175" y="1143000"/>
-            <a:ext cx="2533650" cy="3086100"/>
+            <a:off x="2366963" y="1143000"/>
+            <a:ext cx="2124075" cy="3086100"/>
           </a:xfrm>
           <a:prstGeom prst="rect">
             <a:avLst/>
@@ -6210,8 +6954,8 @@
         </p:nvSpPr>
         <p:spPr>
           <a:xfrm>
-            <a:off x="310515" y="824885"/>
-            <a:ext cx="3519170" cy="1754776"/>
+            <a:off x="310515" y="983886"/>
+            <a:ext cx="3519170" cy="2093019"/>
           </a:xfrm>
         </p:spPr>
         <p:txBody>
@@ -6242,8 +6986,8 @@
         </p:nvSpPr>
         <p:spPr>
           <a:xfrm>
-            <a:off x="517525" y="2647331"/>
-            <a:ext cx="3105150" cy="1216909"/>
+            <a:off x="517525" y="3157620"/>
+            <a:ext cx="3105150" cy="1451475"/>
           </a:xfrm>
         </p:spPr>
         <p:txBody>
@@ -6312,7 +7056,7 @@
           <a:p>
             <a:fld id="{42C97ECD-701F-43E5-BEEA-27FD7C580DC1}" type="datetimeFigureOut">
               <a:rPr lang="en-GB" smtClean="0"/>
-              <a:t>25/06/2025</a:t>
+              <a:t>26/06/2025</a:t>
             </a:fld>
             <a:endParaRPr lang="en-GB"/>
           </a:p>
@@ -6363,7 +7107,7 @@
     </p:spTree>
     <p:extLst>
       <p:ext uri="{BB962C8B-B14F-4D97-AF65-F5344CB8AC3E}">
-        <p14:creationId xmlns:p14="http://schemas.microsoft.com/office/powerpoint/2010/main" val="428286738"/>
+        <p14:creationId xmlns:p14="http://schemas.microsoft.com/office/powerpoint/2010/main" val="2224528359"/>
       </p:ext>
     </p:extLst>
   </p:cSld>
@@ -6482,7 +7226,7 @@
           <a:p>
             <a:fld id="{42C97ECD-701F-43E5-BEEA-27FD7C580DC1}" type="datetimeFigureOut">
               <a:rPr lang="en-GB" smtClean="0"/>
-              <a:t>25/06/2025</a:t>
+              <a:t>26/06/2025</a:t>
             </a:fld>
             <a:endParaRPr lang="en-GB"/>
           </a:p>
@@ -6533,7 +7277,7 @@
     </p:spTree>
     <p:extLst>
       <p:ext uri="{BB962C8B-B14F-4D97-AF65-F5344CB8AC3E}">
-        <p14:creationId xmlns:p14="http://schemas.microsoft.com/office/powerpoint/2010/main" val="135288123"/>
+        <p14:creationId xmlns:p14="http://schemas.microsoft.com/office/powerpoint/2010/main" val="355656397"/>
       </p:ext>
     </p:extLst>
   </p:cSld>
@@ -6572,8 +7316,8 @@
         </p:nvSpPr>
         <p:spPr>
           <a:xfrm>
-            <a:off x="2962831" y="268350"/>
-            <a:ext cx="892731" cy="4271432"/>
+            <a:off x="2962831" y="320076"/>
+            <a:ext cx="892731" cy="5094776"/>
           </a:xfrm>
         </p:spPr>
         <p:txBody>
@@ -6600,8 +7344,8 @@
         </p:nvSpPr>
         <p:spPr>
           <a:xfrm>
-            <a:off x="284639" y="268350"/>
-            <a:ext cx="2626439" cy="4271432"/>
+            <a:off x="284639" y="320076"/>
+            <a:ext cx="2626439" cy="5094776"/>
           </a:xfrm>
         </p:spPr>
         <p:txBody>
@@ -6662,7 +7406,7 @@
           <a:p>
             <a:fld id="{42C97ECD-701F-43E5-BEEA-27FD7C580DC1}" type="datetimeFigureOut">
               <a:rPr lang="en-GB" smtClean="0"/>
-              <a:t>25/06/2025</a:t>
+              <a:t>26/06/2025</a:t>
             </a:fld>
             <a:endParaRPr lang="en-GB"/>
           </a:p>
@@ -6713,7 +7457,7 @@
     </p:spTree>
     <p:extLst>
       <p:ext uri="{BB962C8B-B14F-4D97-AF65-F5344CB8AC3E}">
-        <p14:creationId xmlns:p14="http://schemas.microsoft.com/office/powerpoint/2010/main" val="2587756895"/>
+        <p14:creationId xmlns:p14="http://schemas.microsoft.com/office/powerpoint/2010/main" val="3865054987"/>
       </p:ext>
     </p:extLst>
   </p:cSld>
@@ -6832,7 +7576,7 @@
           <a:p>
             <a:fld id="{42C97ECD-701F-43E5-BEEA-27FD7C580DC1}" type="datetimeFigureOut">
               <a:rPr lang="en-GB" smtClean="0"/>
-              <a:t>25/06/2025</a:t>
+              <a:t>26/06/2025</a:t>
             </a:fld>
             <a:endParaRPr lang="en-GB"/>
           </a:p>
@@ -6883,7 +7627,7 @@
     </p:spTree>
     <p:extLst>
       <p:ext uri="{BB962C8B-B14F-4D97-AF65-F5344CB8AC3E}">
-        <p14:creationId xmlns:p14="http://schemas.microsoft.com/office/powerpoint/2010/main" val="51771822"/>
+        <p14:creationId xmlns:p14="http://schemas.microsoft.com/office/powerpoint/2010/main" val="3821297889"/>
       </p:ext>
     </p:extLst>
   </p:cSld>
@@ -6922,8 +7666,8 @@
         </p:nvSpPr>
         <p:spPr>
           <a:xfrm>
-            <a:off x="282482" y="1256579"/>
-            <a:ext cx="3570923" cy="2096630"/>
+            <a:off x="282482" y="1498792"/>
+            <a:ext cx="3570923" cy="2500768"/>
           </a:xfrm>
         </p:spPr>
         <p:txBody>
@@ -6954,8 +7698,8 @@
         </p:nvSpPr>
         <p:spPr>
           <a:xfrm>
-            <a:off x="282482" y="3373044"/>
-            <a:ext cx="3570923" cy="1102568"/>
+            <a:off x="282482" y="4023218"/>
+            <a:ext cx="3570923" cy="1315095"/>
           </a:xfrm>
         </p:spPr>
         <p:txBody>
@@ -7078,7 +7822,7 @@
           <a:p>
             <a:fld id="{42C97ECD-701F-43E5-BEEA-27FD7C580DC1}" type="datetimeFigureOut">
               <a:rPr lang="en-GB" smtClean="0"/>
-              <a:t>25/06/2025</a:t>
+              <a:t>26/06/2025</a:t>
             </a:fld>
             <a:endParaRPr lang="en-GB"/>
           </a:p>
@@ -7129,7 +7873,7 @@
     </p:spTree>
     <p:extLst>
       <p:ext uri="{BB962C8B-B14F-4D97-AF65-F5344CB8AC3E}">
-        <p14:creationId xmlns:p14="http://schemas.microsoft.com/office/powerpoint/2010/main" val="3185760430"/>
+        <p14:creationId xmlns:p14="http://schemas.microsoft.com/office/powerpoint/2010/main" val="2085146739"/>
       </p:ext>
     </p:extLst>
   </p:cSld>
@@ -7191,8 +7935,8 @@
         </p:nvSpPr>
         <p:spPr>
           <a:xfrm>
-            <a:off x="284639" y="1341750"/>
-            <a:ext cx="1759585" cy="3198032"/>
+            <a:off x="284639" y="1600380"/>
+            <a:ext cx="1759585" cy="3814472"/>
           </a:xfrm>
         </p:spPr>
         <p:txBody>
@@ -7248,8 +7992,8 @@
         </p:nvSpPr>
         <p:spPr>
           <a:xfrm>
-            <a:off x="2095976" y="1341750"/>
-            <a:ext cx="1759585" cy="3198032"/>
+            <a:off x="2095976" y="1600380"/>
+            <a:ext cx="1759585" cy="3814472"/>
           </a:xfrm>
         </p:spPr>
         <p:txBody>
@@ -7310,7 +8054,7 @@
           <a:p>
             <a:fld id="{42C97ECD-701F-43E5-BEEA-27FD7C580DC1}" type="datetimeFigureOut">
               <a:rPr lang="en-GB" smtClean="0"/>
-              <a:t>25/06/2025</a:t>
+              <a:t>26/06/2025</a:t>
             </a:fld>
             <a:endParaRPr lang="en-GB"/>
           </a:p>
@@ -7361,7 +8105,7 @@
     </p:spTree>
     <p:extLst>
       <p:ext uri="{BB962C8B-B14F-4D97-AF65-F5344CB8AC3E}">
-        <p14:creationId xmlns:p14="http://schemas.microsoft.com/office/powerpoint/2010/main" val="4256952753"/>
+        <p14:creationId xmlns:p14="http://schemas.microsoft.com/office/powerpoint/2010/main" val="295364640"/>
       </p:ext>
     </p:extLst>
   </p:cSld>
@@ -7400,8 +8144,8 @@
         </p:nvSpPr>
         <p:spPr>
           <a:xfrm>
-            <a:off x="285178" y="268351"/>
-            <a:ext cx="3570923" cy="974228"/>
+            <a:off x="285178" y="320077"/>
+            <a:ext cx="3570923" cy="1162016"/>
           </a:xfrm>
         </p:spPr>
         <p:txBody>
@@ -7428,8 +8172,8 @@
         </p:nvSpPr>
         <p:spPr>
           <a:xfrm>
-            <a:off x="285179" y="1235577"/>
-            <a:ext cx="1751498" cy="605537"/>
+            <a:off x="285179" y="1473742"/>
+            <a:ext cx="1751498" cy="722258"/>
           </a:xfrm>
         </p:spPr>
         <p:txBody>
@@ -7493,8 +8237,8 @@
         </p:nvSpPr>
         <p:spPr>
           <a:xfrm>
-            <a:off x="285179" y="1841114"/>
-            <a:ext cx="1751498" cy="2708002"/>
+            <a:off x="285179" y="2196000"/>
+            <a:ext cx="1751498" cy="3229985"/>
           </a:xfrm>
         </p:spPr>
         <p:txBody>
@@ -7550,8 +8294,8 @@
         </p:nvSpPr>
         <p:spPr>
           <a:xfrm>
-            <a:off x="2095977" y="1235577"/>
-            <a:ext cx="1760124" cy="605537"/>
+            <a:off x="2095977" y="1473742"/>
+            <a:ext cx="1760124" cy="722258"/>
           </a:xfrm>
         </p:spPr>
         <p:txBody>
@@ -7615,8 +8359,8 @@
         </p:nvSpPr>
         <p:spPr>
           <a:xfrm>
-            <a:off x="2095977" y="1841114"/>
-            <a:ext cx="1760124" cy="2708002"/>
+            <a:off x="2095977" y="2196000"/>
+            <a:ext cx="1760124" cy="3229985"/>
           </a:xfrm>
         </p:spPr>
         <p:txBody>
@@ -7677,7 +8421,7 @@
           <a:p>
             <a:fld id="{42C97ECD-701F-43E5-BEEA-27FD7C580DC1}" type="datetimeFigureOut">
               <a:rPr lang="en-GB" smtClean="0"/>
-              <a:t>25/06/2025</a:t>
+              <a:t>26/06/2025</a:t>
             </a:fld>
             <a:endParaRPr lang="en-GB"/>
           </a:p>
@@ -7728,7 +8472,7 @@
     </p:spTree>
     <p:extLst>
       <p:ext uri="{BB962C8B-B14F-4D97-AF65-F5344CB8AC3E}">
-        <p14:creationId xmlns:p14="http://schemas.microsoft.com/office/powerpoint/2010/main" val="506908511"/>
+        <p14:creationId xmlns:p14="http://schemas.microsoft.com/office/powerpoint/2010/main" val="4066470649"/>
       </p:ext>
     </p:extLst>
   </p:cSld>
@@ -7795,7 +8539,7 @@
           <a:p>
             <a:fld id="{42C97ECD-701F-43E5-BEEA-27FD7C580DC1}" type="datetimeFigureOut">
               <a:rPr lang="en-GB" smtClean="0"/>
-              <a:t>25/06/2025</a:t>
+              <a:t>26/06/2025</a:t>
             </a:fld>
             <a:endParaRPr lang="en-GB"/>
           </a:p>
@@ -7846,7 +8590,7 @@
     </p:spTree>
     <p:extLst>
       <p:ext uri="{BB962C8B-B14F-4D97-AF65-F5344CB8AC3E}">
-        <p14:creationId xmlns:p14="http://schemas.microsoft.com/office/powerpoint/2010/main" val="1181273483"/>
+        <p14:creationId xmlns:p14="http://schemas.microsoft.com/office/powerpoint/2010/main" val="1046458160"/>
       </p:ext>
     </p:extLst>
   </p:cSld>
@@ -7890,7 +8634,7 @@
           <a:p>
             <a:fld id="{42C97ECD-701F-43E5-BEEA-27FD7C580DC1}" type="datetimeFigureOut">
               <a:rPr lang="en-GB" smtClean="0"/>
-              <a:t>25/06/2025</a:t>
+              <a:t>26/06/2025</a:t>
             </a:fld>
             <a:endParaRPr lang="en-GB"/>
           </a:p>
@@ -7941,7 +8685,7 @@
     </p:spTree>
     <p:extLst>
       <p:ext uri="{BB962C8B-B14F-4D97-AF65-F5344CB8AC3E}">
-        <p14:creationId xmlns:p14="http://schemas.microsoft.com/office/powerpoint/2010/main" val="1099287452"/>
+        <p14:creationId xmlns:p14="http://schemas.microsoft.com/office/powerpoint/2010/main" val="955905022"/>
       </p:ext>
     </p:extLst>
   </p:cSld>
@@ -7980,8 +8724,8 @@
         </p:nvSpPr>
         <p:spPr>
           <a:xfrm>
-            <a:off x="285178" y="336021"/>
-            <a:ext cx="1335322" cy="1176073"/>
+            <a:off x="285178" y="400791"/>
+            <a:ext cx="1335322" cy="1402768"/>
           </a:xfrm>
         </p:spPr>
         <p:txBody>
@@ -8012,8 +8756,8 @@
         </p:nvSpPr>
         <p:spPr>
           <a:xfrm>
-            <a:off x="1760124" y="725713"/>
-            <a:ext cx="2095976" cy="3581889"/>
+            <a:off x="1760124" y="865598"/>
+            <a:ext cx="2095976" cy="4272319"/>
           </a:xfrm>
         </p:spPr>
         <p:txBody>
@@ -8097,8 +8841,8 @@
         </p:nvSpPr>
         <p:spPr>
           <a:xfrm>
-            <a:off x="285178" y="1512094"/>
-            <a:ext cx="1335322" cy="2801341"/>
+            <a:off x="285178" y="1803559"/>
+            <a:ext cx="1335322" cy="3341316"/>
           </a:xfrm>
         </p:spPr>
         <p:txBody>
@@ -8167,7 +8911,7 @@
           <a:p>
             <a:fld id="{42C97ECD-701F-43E5-BEEA-27FD7C580DC1}" type="datetimeFigureOut">
               <a:rPr lang="en-GB" smtClean="0"/>
-              <a:t>25/06/2025</a:t>
+              <a:t>26/06/2025</a:t>
             </a:fld>
             <a:endParaRPr lang="en-GB"/>
           </a:p>
@@ -8218,7 +8962,7 @@
     </p:spTree>
     <p:extLst>
       <p:ext uri="{BB962C8B-B14F-4D97-AF65-F5344CB8AC3E}">
-        <p14:creationId xmlns:p14="http://schemas.microsoft.com/office/powerpoint/2010/main" val="1536859938"/>
+        <p14:creationId xmlns:p14="http://schemas.microsoft.com/office/powerpoint/2010/main" val="1847115457"/>
       </p:ext>
     </p:extLst>
   </p:cSld>
@@ -8257,8 +9001,8 @@
         </p:nvSpPr>
         <p:spPr>
           <a:xfrm>
-            <a:off x="285178" y="336021"/>
-            <a:ext cx="1335322" cy="1176073"/>
+            <a:off x="285178" y="400791"/>
+            <a:ext cx="1335322" cy="1402768"/>
           </a:xfrm>
         </p:spPr>
         <p:txBody>
@@ -8289,8 +9033,8 @@
         </p:nvSpPr>
         <p:spPr>
           <a:xfrm>
-            <a:off x="1760124" y="725713"/>
-            <a:ext cx="2095976" cy="3581889"/>
+            <a:off x="1760124" y="865598"/>
+            <a:ext cx="2095976" cy="4272319"/>
           </a:xfrm>
         </p:spPr>
         <p:txBody>
@@ -8354,8 +9098,8 @@
         </p:nvSpPr>
         <p:spPr>
           <a:xfrm>
-            <a:off x="285178" y="1512094"/>
-            <a:ext cx="1335322" cy="2801341"/>
+            <a:off x="285178" y="1803559"/>
+            <a:ext cx="1335322" cy="3341316"/>
           </a:xfrm>
         </p:spPr>
         <p:txBody>
@@ -8424,7 +9168,7 @@
           <a:p>
             <a:fld id="{42C97ECD-701F-43E5-BEEA-27FD7C580DC1}" type="datetimeFigureOut">
               <a:rPr lang="en-GB" smtClean="0"/>
-              <a:t>25/06/2025</a:t>
+              <a:t>26/06/2025</a:t>
             </a:fld>
             <a:endParaRPr lang="en-GB"/>
           </a:p>
@@ -8475,7 +9219,7 @@
     </p:spTree>
     <p:extLst>
       <p:ext uri="{BB962C8B-B14F-4D97-AF65-F5344CB8AC3E}">
-        <p14:creationId xmlns:p14="http://schemas.microsoft.com/office/powerpoint/2010/main" val="2662241505"/>
+        <p14:creationId xmlns:p14="http://schemas.microsoft.com/office/powerpoint/2010/main" val="1381614412"/>
       </p:ext>
     </p:extLst>
   </p:cSld>
@@ -8519,8 +9263,8 @@
         </p:nvSpPr>
         <p:spPr>
           <a:xfrm>
-            <a:off x="284639" y="268351"/>
-            <a:ext cx="3570923" cy="974228"/>
+            <a:off x="284639" y="320077"/>
+            <a:ext cx="3570923" cy="1162016"/>
           </a:xfrm>
           <a:prstGeom prst="rect">
             <a:avLst/>
@@ -8552,8 +9296,8 @@
         </p:nvSpPr>
         <p:spPr>
           <a:xfrm>
-            <a:off x="284639" y="1341750"/>
-            <a:ext cx="3570923" cy="3198032"/>
+            <a:off x="284639" y="1600380"/>
+            <a:ext cx="3570923" cy="3814472"/>
           </a:xfrm>
           <a:prstGeom prst="rect">
             <a:avLst/>
@@ -8614,8 +9358,8 @@
         </p:nvSpPr>
         <p:spPr>
           <a:xfrm>
-            <a:off x="284639" y="4671625"/>
-            <a:ext cx="931545" cy="268350"/>
+            <a:off x="284639" y="5572108"/>
+            <a:ext cx="931545" cy="320076"/>
           </a:xfrm>
           <a:prstGeom prst="rect">
             <a:avLst/>
@@ -8637,7 +9381,7 @@
           <a:p>
             <a:fld id="{42C97ECD-701F-43E5-BEEA-27FD7C580DC1}" type="datetimeFigureOut">
               <a:rPr lang="en-GB" smtClean="0"/>
-              <a:t>25/06/2025</a:t>
+              <a:t>26/06/2025</a:t>
             </a:fld>
             <a:endParaRPr lang="en-GB"/>
           </a:p>
@@ -8655,8 +9399,8 @@
         </p:nvSpPr>
         <p:spPr>
           <a:xfrm>
-            <a:off x="1371441" y="4671625"/>
-            <a:ext cx="1397318" cy="268350"/>
+            <a:off x="1371441" y="5572108"/>
+            <a:ext cx="1397318" cy="320076"/>
           </a:xfrm>
           <a:prstGeom prst="rect">
             <a:avLst/>
@@ -8692,8 +9436,8 @@
         </p:nvSpPr>
         <p:spPr>
           <a:xfrm>
-            <a:off x="2924016" y="4671625"/>
-            <a:ext cx="931545" cy="268350"/>
+            <a:off x="2924016" y="5572108"/>
+            <a:ext cx="931545" cy="320076"/>
           </a:xfrm>
           <a:prstGeom prst="rect">
             <a:avLst/>
@@ -8724,23 +9468,23 @@
     </p:spTree>
     <p:extLst>
       <p:ext uri="{BB962C8B-B14F-4D97-AF65-F5344CB8AC3E}">
-        <p14:creationId xmlns:p14="http://schemas.microsoft.com/office/powerpoint/2010/main" val="3622676394"/>
+        <p14:creationId xmlns:p14="http://schemas.microsoft.com/office/powerpoint/2010/main" val="3735078304"/>
       </p:ext>
     </p:extLst>
   </p:cSld>
   <p:clrMap bg1="lt1" tx1="dk1" bg2="lt2" tx2="dk2" accent1="accent1" accent2="accent2" accent3="accent3" accent4="accent4" accent5="accent5" accent6="accent6" hlink="hlink" folHlink="folHlink"/>
   <p:sldLayoutIdLst>
-    <p:sldLayoutId id="2147483841" r:id="rId1"/>
-    <p:sldLayoutId id="2147483842" r:id="rId2"/>
-    <p:sldLayoutId id="2147483843" r:id="rId3"/>
-    <p:sldLayoutId id="2147483844" r:id="rId4"/>
-    <p:sldLayoutId id="2147483845" r:id="rId5"/>
-    <p:sldLayoutId id="2147483846" r:id="rId6"/>
-    <p:sldLayoutId id="2147483847" r:id="rId7"/>
-    <p:sldLayoutId id="2147483848" r:id="rId8"/>
-    <p:sldLayoutId id="2147483849" r:id="rId9"/>
-    <p:sldLayoutId id="2147483850" r:id="rId10"/>
-    <p:sldLayoutId id="2147483851" r:id="rId11"/>
+    <p:sldLayoutId id="2147483865" r:id="rId1"/>
+    <p:sldLayoutId id="2147483866" r:id="rId2"/>
+    <p:sldLayoutId id="2147483867" r:id="rId3"/>
+    <p:sldLayoutId id="2147483868" r:id="rId4"/>
+    <p:sldLayoutId id="2147483869" r:id="rId5"/>
+    <p:sldLayoutId id="2147483870" r:id="rId6"/>
+    <p:sldLayoutId id="2147483871" r:id="rId7"/>
+    <p:sldLayoutId id="2147483872" r:id="rId8"/>
+    <p:sldLayoutId id="2147483873" r:id="rId9"/>
+    <p:sldLayoutId id="2147483874" r:id="rId10"/>
+    <p:sldLayoutId id="2147483875" r:id="rId11"/>
   </p:sldLayoutIdLst>
   <p:txStyles>
     <p:titleStyle>
@@ -9044,7 +9788,7 @@
       </p:grpSpPr>
       <p:sp>
         <p:nvSpPr>
-          <p:cNvPr id="15" name="Rectangle 14">
+          <p:cNvPr id="88" name="Rectangle 87">
             <a:extLst>
               <a:ext uri="{FF2B5EF4-FFF2-40B4-BE49-F238E27FC236}">
                 <a16:creationId xmlns:a16="http://schemas.microsoft.com/office/drawing/2014/main" id="{DDAF3D54-885E-2A29-8D7C-F2C70C58F5B5}"/>
@@ -9056,7 +9800,7 @@
         </p:nvSpPr>
         <p:spPr>
           <a:xfrm>
-            <a:off x="226098" y="729378"/>
+            <a:off x="225304" y="729378"/>
             <a:ext cx="1260000" cy="216000"/>
           </a:xfrm>
           <a:prstGeom prst="rect">
@@ -9115,7 +9859,7 @@
       </p:sp>
       <p:sp>
         <p:nvSpPr>
-          <p:cNvPr id="16" name="TextBox 15">
+          <p:cNvPr id="89" name="TextBox 88">
             <a:extLst>
               <a:ext uri="{FF2B5EF4-FFF2-40B4-BE49-F238E27FC236}">
                 <a16:creationId xmlns:a16="http://schemas.microsoft.com/office/drawing/2014/main" id="{2CE8AC50-A4E3-9DB6-F606-EB886BE8550D}"/>
@@ -9127,7 +9871,7 @@
         </p:nvSpPr>
         <p:spPr>
           <a:xfrm>
-            <a:off x="259371" y="1121974"/>
+            <a:off x="225304" y="2103650"/>
             <a:ext cx="1260000" cy="954107"/>
           </a:xfrm>
           <a:prstGeom prst="rect">
@@ -9157,7 +9901,7 @@
       </p:sp>
       <p:sp>
         <p:nvSpPr>
-          <p:cNvPr id="17" name="Rectangle 16">
+          <p:cNvPr id="90" name="Rectangle 89">
             <a:extLst>
               <a:ext uri="{FF2B5EF4-FFF2-40B4-BE49-F238E27FC236}">
                 <a16:creationId xmlns:a16="http://schemas.microsoft.com/office/drawing/2014/main" id="{DC34E010-EA2E-EFF4-B042-AAD8E29801DE}"/>
@@ -9169,8 +9913,8 @@
         </p:nvSpPr>
         <p:spPr>
           <a:xfrm>
-            <a:off x="227793" y="951991"/>
-            <a:ext cx="1260000" cy="1260000"/>
+            <a:off x="225304" y="951991"/>
+            <a:ext cx="1260000" cy="972692"/>
           </a:xfrm>
           <a:prstGeom prst="rect">
             <a:avLst/>
@@ -9219,7 +9963,7 @@
       </p:sp>
       <p:sp>
         <p:nvSpPr>
-          <p:cNvPr id="18" name="Rectangle 17">
+          <p:cNvPr id="91" name="Rectangle 90">
             <a:extLst>
               <a:ext uri="{FF2B5EF4-FFF2-40B4-BE49-F238E27FC236}">
                 <a16:creationId xmlns:a16="http://schemas.microsoft.com/office/drawing/2014/main" id="{A443D769-35EA-ACBB-55BC-2A7FE9B1D174}"/>
@@ -9231,8 +9975,8 @@
         </p:nvSpPr>
         <p:spPr>
           <a:xfrm>
-            <a:off x="1540269" y="951991"/>
-            <a:ext cx="1260000" cy="1260000"/>
+            <a:off x="1538503" y="951991"/>
+            <a:ext cx="1260000" cy="972692"/>
           </a:xfrm>
           <a:prstGeom prst="rect">
             <a:avLst/>
@@ -9281,7 +10025,7 @@
       </p:sp>
       <p:sp>
         <p:nvSpPr>
-          <p:cNvPr id="19" name="TextBox 18">
+          <p:cNvPr id="92" name="TextBox 91">
             <a:extLst>
               <a:ext uri="{FF2B5EF4-FFF2-40B4-BE49-F238E27FC236}">
                 <a16:creationId xmlns:a16="http://schemas.microsoft.com/office/drawing/2014/main" id="{6541EEEE-3369-14C3-9119-24FBFEC538F6}"/>
@@ -9293,7 +10037,7 @@
         </p:nvSpPr>
         <p:spPr>
           <a:xfrm>
-            <a:off x="1502300" y="981827"/>
+            <a:off x="1502300" y="1963503"/>
             <a:ext cx="1332407" cy="1200329"/>
           </a:xfrm>
           <a:prstGeom prst="rect">
@@ -9330,7 +10074,7 @@
       </p:sp>
       <p:sp>
         <p:nvSpPr>
-          <p:cNvPr id="20" name="Rectangle 19">
+          <p:cNvPr id="93" name="Rectangle 92">
             <a:extLst>
               <a:ext uri="{FF2B5EF4-FFF2-40B4-BE49-F238E27FC236}">
                 <a16:creationId xmlns:a16="http://schemas.microsoft.com/office/drawing/2014/main" id="{A668C935-54EA-6F8F-0BB1-E7014CC096D7}"/>
@@ -9342,8 +10086,8 @@
         </p:nvSpPr>
         <p:spPr>
           <a:xfrm>
-            <a:off x="2852745" y="951991"/>
-            <a:ext cx="1260000" cy="1260000"/>
+            <a:off x="2854142" y="951991"/>
+            <a:ext cx="1260000" cy="975512"/>
           </a:xfrm>
           <a:prstGeom prst="rect">
             <a:avLst/>
@@ -9392,7 +10136,7 @@
       </p:sp>
       <p:sp>
         <p:nvSpPr>
-          <p:cNvPr id="21" name="TextBox 20">
+          <p:cNvPr id="94" name="TextBox 93">
             <a:extLst>
               <a:ext uri="{FF2B5EF4-FFF2-40B4-BE49-F238E27FC236}">
                 <a16:creationId xmlns:a16="http://schemas.microsoft.com/office/drawing/2014/main" id="{DEEE2271-5967-5ABD-F72A-2D4C2F26C2AA}"/>
@@ -9404,7 +10148,7 @@
         </p:nvSpPr>
         <p:spPr>
           <a:xfrm>
-            <a:off x="2803065" y="981827"/>
+            <a:off x="2803065" y="1963503"/>
             <a:ext cx="1362155" cy="1200329"/>
           </a:xfrm>
           <a:prstGeom prst="rect">
@@ -9441,7 +10185,7 @@
       </p:sp>
       <p:sp>
         <p:nvSpPr>
-          <p:cNvPr id="22" name="TextBox 21">
+          <p:cNvPr id="95" name="TextBox 94">
             <a:extLst>
               <a:ext uri="{FF2B5EF4-FFF2-40B4-BE49-F238E27FC236}">
                 <a16:creationId xmlns:a16="http://schemas.microsoft.com/office/drawing/2014/main" id="{BE24FD28-FAFB-884F-4CE7-E4FD5429F6E3}"/>
@@ -9496,7 +10240,7 @@
       </p:sp>
       <p:sp>
         <p:nvSpPr>
-          <p:cNvPr id="23" name="TextBox 22">
+          <p:cNvPr id="96" name="TextBox 95">
             <a:extLst>
               <a:ext uri="{FF2B5EF4-FFF2-40B4-BE49-F238E27FC236}">
                 <a16:creationId xmlns:a16="http://schemas.microsoft.com/office/drawing/2014/main" id="{16EB6FA0-CBE1-9983-F1CC-346BCA2848D4}"/>
@@ -9566,7 +10310,7 @@
       </p:sp>
       <p:sp>
         <p:nvSpPr>
-          <p:cNvPr id="24" name="Rectangle 23">
+          <p:cNvPr id="97" name="Rectangle 96">
             <a:extLst>
               <a:ext uri="{FF2B5EF4-FFF2-40B4-BE49-F238E27FC236}">
                 <a16:creationId xmlns:a16="http://schemas.microsoft.com/office/drawing/2014/main" id="{5137CFD3-310B-C4B7-5CBF-D6EBE8384DFF}"/>
@@ -9578,7 +10322,7 @@
         </p:nvSpPr>
         <p:spPr>
           <a:xfrm>
-            <a:off x="27388" y="2568336"/>
+            <a:off x="27388" y="3548643"/>
             <a:ext cx="4083522" cy="2447326"/>
           </a:xfrm>
           <a:prstGeom prst="rect">
@@ -9635,7 +10379,7 @@
       </p:sp>
       <p:sp>
         <p:nvSpPr>
-          <p:cNvPr id="25" name="TextBox 24">
+          <p:cNvPr id="98" name="TextBox 97">
             <a:extLst>
               <a:ext uri="{FF2B5EF4-FFF2-40B4-BE49-F238E27FC236}">
                 <a16:creationId xmlns:a16="http://schemas.microsoft.com/office/drawing/2014/main" id="{9097776E-A046-4D6E-89DA-50B1F5A3FAF4}"/>
@@ -9647,7 +10391,7 @@
         </p:nvSpPr>
         <p:spPr>
           <a:xfrm>
-            <a:off x="14151" y="2651719"/>
+            <a:off x="14151" y="3632026"/>
             <a:ext cx="369332" cy="2309583"/>
           </a:xfrm>
           <a:prstGeom prst="rect">
@@ -9680,7 +10424,7 @@
       </p:sp>
       <p:sp>
         <p:nvSpPr>
-          <p:cNvPr id="26" name="Rectangle 25">
+          <p:cNvPr id="99" name="Rectangle 98">
             <a:extLst>
               <a:ext uri="{FF2B5EF4-FFF2-40B4-BE49-F238E27FC236}">
                 <a16:creationId xmlns:a16="http://schemas.microsoft.com/office/drawing/2014/main" id="{1402EF05-0A8D-81FE-F96A-820C0CB99803}"/>
@@ -9692,7 +10436,7 @@
         </p:nvSpPr>
         <p:spPr>
           <a:xfrm>
-            <a:off x="1346732" y="4226299"/>
+            <a:off x="1346732" y="5206606"/>
             <a:ext cx="2558970" cy="720000"/>
           </a:xfrm>
           <a:prstGeom prst="rect">
@@ -9742,7 +10486,7 @@
       </p:sp>
       <p:sp>
         <p:nvSpPr>
-          <p:cNvPr id="27" name="Rectangle 26">
+          <p:cNvPr id="100" name="Rectangle 99">
             <a:extLst>
               <a:ext uri="{FF2B5EF4-FFF2-40B4-BE49-F238E27FC236}">
                 <a16:creationId xmlns:a16="http://schemas.microsoft.com/office/drawing/2014/main" id="{4CDF8D29-A1A4-B6EF-CC2D-02154951F423}"/>
@@ -9754,7 +10498,7 @@
         </p:nvSpPr>
         <p:spPr>
           <a:xfrm>
-            <a:off x="378054" y="4225783"/>
+            <a:off x="378054" y="5206090"/>
             <a:ext cx="971299" cy="722308"/>
           </a:xfrm>
           <a:prstGeom prst="rect">
@@ -9804,7 +10548,7 @@
       </p:sp>
       <p:sp>
         <p:nvSpPr>
-          <p:cNvPr id="28" name="TextBox 27">
+          <p:cNvPr id="101" name="TextBox 100">
             <a:extLst>
               <a:ext uri="{FF2B5EF4-FFF2-40B4-BE49-F238E27FC236}">
                 <a16:creationId xmlns:a16="http://schemas.microsoft.com/office/drawing/2014/main" id="{C5F22480-43D2-EC6C-C595-536DDF09AC46}"/>
@@ -9816,7 +10560,7 @@
         </p:nvSpPr>
         <p:spPr>
           <a:xfrm>
-            <a:off x="1346732" y="4253416"/>
+            <a:off x="1346732" y="5233723"/>
             <a:ext cx="2569739" cy="707886"/>
           </a:xfrm>
           <a:prstGeom prst="rect">
@@ -9857,7 +10601,7 @@
       </p:sp>
       <p:sp>
         <p:nvSpPr>
-          <p:cNvPr id="29" name="TextBox 28">
+          <p:cNvPr id="102" name="TextBox 101">
             <a:extLst>
               <a:ext uri="{FF2B5EF4-FFF2-40B4-BE49-F238E27FC236}">
                 <a16:creationId xmlns:a16="http://schemas.microsoft.com/office/drawing/2014/main" id="{65CF77BB-AB79-BDF7-1AD9-C8ABDB188BCE}"/>
@@ -9869,7 +10613,7 @@
         </p:nvSpPr>
         <p:spPr>
           <a:xfrm>
-            <a:off x="402687" y="4287327"/>
+            <a:off x="402687" y="5267634"/>
             <a:ext cx="1008000" cy="400110"/>
           </a:xfrm>
           <a:prstGeom prst="rect">
@@ -9898,7 +10642,7 @@
       </p:sp>
       <p:sp>
         <p:nvSpPr>
-          <p:cNvPr id="30" name="TextBox 29">
+          <p:cNvPr id="103" name="TextBox 102">
             <a:extLst>
               <a:ext uri="{FF2B5EF4-FFF2-40B4-BE49-F238E27FC236}">
                 <a16:creationId xmlns:a16="http://schemas.microsoft.com/office/drawing/2014/main" id="{CE0D8E67-F738-7066-FAAB-7F1C9C0D3446}"/>
@@ -9910,7 +10654,7 @@
         </p:nvSpPr>
         <p:spPr>
           <a:xfrm>
-            <a:off x="386211" y="4353939"/>
+            <a:off x="386211" y="5334246"/>
             <a:ext cx="963142" cy="553998"/>
           </a:xfrm>
           <a:prstGeom prst="rect">
@@ -9939,7 +10683,7 @@
       </p:sp>
       <p:sp>
         <p:nvSpPr>
-          <p:cNvPr id="31" name="Rectangle 30">
+          <p:cNvPr id="104" name="Rectangle 103">
             <a:extLst>
               <a:ext uri="{FF2B5EF4-FFF2-40B4-BE49-F238E27FC236}">
                 <a16:creationId xmlns:a16="http://schemas.microsoft.com/office/drawing/2014/main" id="{716E92A3-A5CC-93CB-1E03-1C50F1F6DD03}"/>
@@ -9951,7 +10695,7 @@
         </p:nvSpPr>
         <p:spPr>
           <a:xfrm>
-            <a:off x="1540269" y="729378"/>
+            <a:off x="1538503" y="729378"/>
             <a:ext cx="1260000" cy="216000"/>
           </a:xfrm>
           <a:prstGeom prst="rect">
@@ -10010,7 +10754,7 @@
       </p:sp>
       <p:sp>
         <p:nvSpPr>
-          <p:cNvPr id="32" name="Rectangle 31">
+          <p:cNvPr id="105" name="Rectangle 104">
             <a:extLst>
               <a:ext uri="{FF2B5EF4-FFF2-40B4-BE49-F238E27FC236}">
                 <a16:creationId xmlns:a16="http://schemas.microsoft.com/office/drawing/2014/main" id="{C0C067FC-01D1-B083-6206-56A46662729A}"/>
@@ -10022,7 +10766,7 @@
         </p:nvSpPr>
         <p:spPr>
           <a:xfrm>
-            <a:off x="2852745" y="729378"/>
+            <a:off x="2854142" y="729378"/>
             <a:ext cx="1260000" cy="216000"/>
           </a:xfrm>
           <a:prstGeom prst="rect">
@@ -10081,7 +10825,7 @@
       </p:sp>
       <p:sp>
         <p:nvSpPr>
-          <p:cNvPr id="33" name="Rectangle 32">
+          <p:cNvPr id="106" name="Rectangle 105">
             <a:extLst>
               <a:ext uri="{FF2B5EF4-FFF2-40B4-BE49-F238E27FC236}">
                 <a16:creationId xmlns:a16="http://schemas.microsoft.com/office/drawing/2014/main" id="{649A66B3-B899-4304-E071-230DD34AFBC3}"/>
@@ -10093,7 +10837,7 @@
         </p:nvSpPr>
         <p:spPr>
           <a:xfrm>
-            <a:off x="1346732" y="3428839"/>
+            <a:off x="1346732" y="4409146"/>
             <a:ext cx="2558970" cy="720000"/>
           </a:xfrm>
           <a:prstGeom prst="rect">
@@ -10143,7 +10887,7 @@
       </p:sp>
       <p:sp>
         <p:nvSpPr>
-          <p:cNvPr id="34" name="Rectangle 33">
+          <p:cNvPr id="107" name="Rectangle 106">
             <a:extLst>
               <a:ext uri="{FF2B5EF4-FFF2-40B4-BE49-F238E27FC236}">
                 <a16:creationId xmlns:a16="http://schemas.microsoft.com/office/drawing/2014/main" id="{0949695F-9A1D-9DE9-6A11-1A7363D5D06D}"/>
@@ -10155,7 +10899,7 @@
         </p:nvSpPr>
         <p:spPr>
           <a:xfrm>
-            <a:off x="378054" y="3428323"/>
+            <a:off x="378054" y="4408630"/>
             <a:ext cx="971299" cy="722308"/>
           </a:xfrm>
           <a:prstGeom prst="rect">
@@ -10205,7 +10949,7 @@
       </p:sp>
       <p:sp>
         <p:nvSpPr>
-          <p:cNvPr id="35" name="TextBox 34">
+          <p:cNvPr id="108" name="TextBox 107">
             <a:extLst>
               <a:ext uri="{FF2B5EF4-FFF2-40B4-BE49-F238E27FC236}">
                 <a16:creationId xmlns:a16="http://schemas.microsoft.com/office/drawing/2014/main" id="{26499A74-7ADD-8575-125F-3A9F7DAB54FD}"/>
@@ -10217,7 +10961,7 @@
         </p:nvSpPr>
         <p:spPr>
           <a:xfrm>
-            <a:off x="402687" y="3489867"/>
+            <a:off x="402687" y="4470174"/>
             <a:ext cx="1008000" cy="400110"/>
           </a:xfrm>
           <a:prstGeom prst="rect">
@@ -10246,7 +10990,7 @@
       </p:sp>
       <p:sp>
         <p:nvSpPr>
-          <p:cNvPr id="36" name="TextBox 35">
+          <p:cNvPr id="109" name="TextBox 108">
             <a:extLst>
               <a:ext uri="{FF2B5EF4-FFF2-40B4-BE49-F238E27FC236}">
                 <a16:creationId xmlns:a16="http://schemas.microsoft.com/office/drawing/2014/main" id="{87998562-8C2F-313F-516D-39037195BB26}"/>
@@ -10258,7 +11002,7 @@
         </p:nvSpPr>
         <p:spPr>
           <a:xfrm>
-            <a:off x="386211" y="3556479"/>
+            <a:off x="386211" y="4536786"/>
             <a:ext cx="963142" cy="553998"/>
           </a:xfrm>
           <a:prstGeom prst="rect">
@@ -10287,7 +11031,7 @@
       </p:sp>
       <p:sp>
         <p:nvSpPr>
-          <p:cNvPr id="37" name="Rectangle 36">
+          <p:cNvPr id="110" name="Rectangle 109">
             <a:extLst>
               <a:ext uri="{FF2B5EF4-FFF2-40B4-BE49-F238E27FC236}">
                 <a16:creationId xmlns:a16="http://schemas.microsoft.com/office/drawing/2014/main" id="{80D3517E-1814-BABC-8B8F-AB5B211A3AA1}"/>
@@ -10299,7 +11043,7 @@
         </p:nvSpPr>
         <p:spPr>
           <a:xfrm>
-            <a:off x="1346732" y="2636717"/>
+            <a:off x="1346732" y="3617024"/>
             <a:ext cx="2558970" cy="720000"/>
           </a:xfrm>
           <a:prstGeom prst="rect">
@@ -10349,7 +11093,7 @@
       </p:sp>
       <p:sp>
         <p:nvSpPr>
-          <p:cNvPr id="38" name="Rectangle 37">
+          <p:cNvPr id="111" name="Rectangle 110">
             <a:extLst>
               <a:ext uri="{FF2B5EF4-FFF2-40B4-BE49-F238E27FC236}">
                 <a16:creationId xmlns:a16="http://schemas.microsoft.com/office/drawing/2014/main" id="{A6BE4838-1365-D3B7-CEDE-D7E2E62B7F31}"/>
@@ -10361,7 +11105,7 @@
         </p:nvSpPr>
         <p:spPr>
           <a:xfrm>
-            <a:off x="378054" y="2636201"/>
+            <a:off x="378054" y="3616508"/>
             <a:ext cx="971299" cy="722308"/>
           </a:xfrm>
           <a:prstGeom prst="rect">
@@ -10411,7 +11155,7 @@
       </p:sp>
       <p:sp>
         <p:nvSpPr>
-          <p:cNvPr id="39" name="TextBox 38">
+          <p:cNvPr id="112" name="TextBox 111">
             <a:extLst>
               <a:ext uri="{FF2B5EF4-FFF2-40B4-BE49-F238E27FC236}">
                 <a16:creationId xmlns:a16="http://schemas.microsoft.com/office/drawing/2014/main" id="{8735F6D1-5555-E7D6-D0BB-A64923855C01}"/>
@@ -10423,7 +11167,7 @@
         </p:nvSpPr>
         <p:spPr>
           <a:xfrm>
-            <a:off x="402687" y="2697745"/>
+            <a:off x="402687" y="3678052"/>
             <a:ext cx="1008000" cy="400110"/>
           </a:xfrm>
           <a:prstGeom prst="rect">
@@ -10452,7 +11196,7 @@
       </p:sp>
       <p:sp>
         <p:nvSpPr>
-          <p:cNvPr id="40" name="TextBox 39">
+          <p:cNvPr id="113" name="TextBox 112">
             <a:extLst>
               <a:ext uri="{FF2B5EF4-FFF2-40B4-BE49-F238E27FC236}">
                 <a16:creationId xmlns:a16="http://schemas.microsoft.com/office/drawing/2014/main" id="{2B972E94-DE4C-66D0-A6A3-F1E9C69D6169}"/>
@@ -10464,7 +11208,7 @@
         </p:nvSpPr>
         <p:spPr>
           <a:xfrm>
-            <a:off x="386211" y="2764357"/>
+            <a:off x="386211" y="3744664"/>
             <a:ext cx="963142" cy="553998"/>
           </a:xfrm>
           <a:prstGeom prst="rect">
@@ -10493,7 +11237,7 @@
       </p:sp>
       <p:sp>
         <p:nvSpPr>
-          <p:cNvPr id="41" name="Rectangle 40">
+          <p:cNvPr id="114" name="Rectangle 113">
             <a:extLst>
               <a:ext uri="{FF2B5EF4-FFF2-40B4-BE49-F238E27FC236}">
                 <a16:creationId xmlns:a16="http://schemas.microsoft.com/office/drawing/2014/main" id="{0F40EDD3-6828-DA92-C5B8-A892A73FD4CE}"/>
@@ -10505,7 +11249,7 @@
         </p:nvSpPr>
         <p:spPr>
           <a:xfrm>
-            <a:off x="3940331" y="2636717"/>
+            <a:off x="3940331" y="3617024"/>
             <a:ext cx="72000" cy="216000"/>
           </a:xfrm>
           <a:prstGeom prst="rect">
@@ -10549,7 +11293,7 @@
       </p:sp>
       <p:sp>
         <p:nvSpPr>
-          <p:cNvPr id="42" name="Rectangle 41">
+          <p:cNvPr id="115" name="Rectangle 114">
             <a:extLst>
               <a:ext uri="{FF2B5EF4-FFF2-40B4-BE49-F238E27FC236}">
                 <a16:creationId xmlns:a16="http://schemas.microsoft.com/office/drawing/2014/main" id="{4BC09263-C830-303A-BB0C-2207AFEFF22B}"/>
@@ -10561,7 +11305,7 @@
         </p:nvSpPr>
         <p:spPr>
           <a:xfrm>
-            <a:off x="3940282" y="2888717"/>
+            <a:off x="3940282" y="3869024"/>
             <a:ext cx="72000" cy="216000"/>
           </a:xfrm>
           <a:prstGeom prst="rect">
@@ -10605,7 +11349,7 @@
       </p:sp>
       <p:sp>
         <p:nvSpPr>
-          <p:cNvPr id="43" name="Rectangle 42">
+          <p:cNvPr id="116" name="Rectangle 115">
             <a:extLst>
               <a:ext uri="{FF2B5EF4-FFF2-40B4-BE49-F238E27FC236}">
                 <a16:creationId xmlns:a16="http://schemas.microsoft.com/office/drawing/2014/main" id="{8BFC4AA3-C582-B088-949F-3006D7236AAA}"/>
@@ -10617,7 +11361,7 @@
         </p:nvSpPr>
         <p:spPr>
           <a:xfrm>
-            <a:off x="3940282" y="3140717"/>
+            <a:off x="3940282" y="4121024"/>
             <a:ext cx="72000" cy="216000"/>
           </a:xfrm>
           <a:prstGeom prst="rect">
@@ -10661,7 +11405,7 @@
       </p:sp>
       <p:sp>
         <p:nvSpPr>
-          <p:cNvPr id="44" name="TextBox 43">
+          <p:cNvPr id="117" name="TextBox 116">
             <a:extLst>
               <a:ext uri="{FF2B5EF4-FFF2-40B4-BE49-F238E27FC236}">
                 <a16:creationId xmlns:a16="http://schemas.microsoft.com/office/drawing/2014/main" id="{17A4B2C5-47D5-3495-68D8-2CB424DC7257}"/>
@@ -10673,7 +11417,7 @@
         </p:nvSpPr>
         <p:spPr>
           <a:xfrm>
-            <a:off x="1346732" y="2713396"/>
+            <a:off x="1346732" y="3693703"/>
             <a:ext cx="2450431" cy="553998"/>
           </a:xfrm>
           <a:prstGeom prst="rect">
@@ -10714,7 +11458,7 @@
       </p:sp>
       <p:sp>
         <p:nvSpPr>
-          <p:cNvPr id="45" name="TextBox 44">
+          <p:cNvPr id="118" name="TextBox 117">
             <a:extLst>
               <a:ext uri="{FF2B5EF4-FFF2-40B4-BE49-F238E27FC236}">
                 <a16:creationId xmlns:a16="http://schemas.microsoft.com/office/drawing/2014/main" id="{DC1CA93F-6FAF-42B3-BBBF-433BE0D7EC13}"/>
@@ -10726,7 +11470,7 @@
         </p:nvSpPr>
         <p:spPr>
           <a:xfrm>
-            <a:off x="1346732" y="3512486"/>
+            <a:off x="1346732" y="4492793"/>
             <a:ext cx="2396817" cy="553998"/>
           </a:xfrm>
           <a:prstGeom prst="rect">
@@ -10767,7 +11511,7 @@
       </p:sp>
       <p:sp>
         <p:nvSpPr>
-          <p:cNvPr id="46" name="TextBox 45">
+          <p:cNvPr id="119" name="TextBox 118">
             <a:extLst>
               <a:ext uri="{FF2B5EF4-FFF2-40B4-BE49-F238E27FC236}">
                 <a16:creationId xmlns:a16="http://schemas.microsoft.com/office/drawing/2014/main" id="{0C8CE056-7612-0128-B393-AE3D0105B0B0}"/>
@@ -10779,7 +11523,7 @@
         </p:nvSpPr>
         <p:spPr>
           <a:xfrm>
-            <a:off x="-48406" y="979454"/>
+            <a:off x="-40168" y="831652"/>
             <a:ext cx="307777" cy="1239149"/>
           </a:xfrm>
           <a:prstGeom prst="rect">
@@ -10805,7 +11549,7 @@
                 <a:latin typeface="Calibri" panose="020F0502020204030204" pitchFamily="34" charset="0"/>
                 <a:cs typeface="Calibri" panose="020F0502020204030204" pitchFamily="34" charset="0"/>
               </a:rPr>
-              <a:t>RESEARCH OBJECTIVES</a:t>
+              <a:t>RESEARCH QUESTIONS</a:t>
             </a:r>
             <a:endParaRPr lang="en-GB" sz="800" dirty="0">
               <a:solidFill>
@@ -10819,7 +11563,7 @@
       </p:sp>
       <p:sp>
         <p:nvSpPr>
-          <p:cNvPr id="47" name="Arrow: Pentagon 46">
+          <p:cNvPr id="120" name="Arrow: Pentagon 119">
             <a:extLst>
               <a:ext uri="{FF2B5EF4-FFF2-40B4-BE49-F238E27FC236}">
                 <a16:creationId xmlns:a16="http://schemas.microsoft.com/office/drawing/2014/main" id="{26E5001B-6DEC-3779-E01A-0A27FF325B8B}"/>
@@ -10831,7 +11575,7 @@
         </p:nvSpPr>
         <p:spPr>
           <a:xfrm>
-            <a:off x="217388" y="2257627"/>
+            <a:off x="217388" y="3237934"/>
             <a:ext cx="3922812" cy="90000"/>
           </a:xfrm>
           <a:prstGeom prst="homePlate">
@@ -10892,7 +11636,7 @@
       </p:sp>
       <p:sp>
         <p:nvSpPr>
-          <p:cNvPr id="48" name="Arrow: Pentagon 47">
+          <p:cNvPr id="121" name="Arrow: Pentagon 120">
             <a:extLst>
               <a:ext uri="{FF2B5EF4-FFF2-40B4-BE49-F238E27FC236}">
                 <a16:creationId xmlns:a16="http://schemas.microsoft.com/office/drawing/2014/main" id="{9725519F-3CA2-8003-2FF8-53A9447B36EA}"/>
@@ -10904,7 +11648,7 @@
         </p:nvSpPr>
         <p:spPr>
           <a:xfrm>
-            <a:off x="1540268" y="2382857"/>
+            <a:off x="1540268" y="3363164"/>
             <a:ext cx="2599931" cy="90000"/>
           </a:xfrm>
           <a:prstGeom prst="homePlate">
@@ -10959,7 +11703,7 @@
       </p:sp>
       <p:sp>
         <p:nvSpPr>
-          <p:cNvPr id="49" name="Rectangle 48">
+          <p:cNvPr id="122" name="Rectangle 121">
             <a:extLst>
               <a:ext uri="{FF2B5EF4-FFF2-40B4-BE49-F238E27FC236}">
                 <a16:creationId xmlns:a16="http://schemas.microsoft.com/office/drawing/2014/main" id="{E8D2B8E7-039B-1A09-2DDC-C83E14EB46DF}"/>
@@ -10971,7 +11715,7 @@
         </p:nvSpPr>
         <p:spPr>
           <a:xfrm>
-            <a:off x="3942433" y="3430594"/>
+            <a:off x="3942433" y="4410901"/>
             <a:ext cx="72000" cy="216000"/>
           </a:xfrm>
           <a:prstGeom prst="rect">
@@ -11015,7 +11759,7 @@
       </p:sp>
       <p:sp>
         <p:nvSpPr>
-          <p:cNvPr id="50" name="Rectangle 49">
+          <p:cNvPr id="123" name="Rectangle 122">
             <a:extLst>
               <a:ext uri="{FF2B5EF4-FFF2-40B4-BE49-F238E27FC236}">
                 <a16:creationId xmlns:a16="http://schemas.microsoft.com/office/drawing/2014/main" id="{C12365C0-1DFD-9105-1FAE-06F580451ED3}"/>
@@ -11027,7 +11771,7 @@
         </p:nvSpPr>
         <p:spPr>
           <a:xfrm>
-            <a:off x="3942384" y="3682594"/>
+            <a:off x="3942384" y="4662901"/>
             <a:ext cx="72000" cy="216000"/>
           </a:xfrm>
           <a:prstGeom prst="rect">
@@ -11071,7 +11815,7 @@
       </p:sp>
       <p:sp>
         <p:nvSpPr>
-          <p:cNvPr id="51" name="Rectangle 50">
+          <p:cNvPr id="124" name="Rectangle 123">
             <a:extLst>
               <a:ext uri="{FF2B5EF4-FFF2-40B4-BE49-F238E27FC236}">
                 <a16:creationId xmlns:a16="http://schemas.microsoft.com/office/drawing/2014/main" id="{75EFEC79-3C2A-8CE1-D040-35A21318F4DF}"/>
@@ -11083,7 +11827,7 @@
         </p:nvSpPr>
         <p:spPr>
           <a:xfrm>
-            <a:off x="3942384" y="3934594"/>
+            <a:off x="3942384" y="4914901"/>
             <a:ext cx="72000" cy="216000"/>
           </a:xfrm>
           <a:prstGeom prst="rect">
@@ -11127,7 +11871,7 @@
       </p:sp>
       <p:sp>
         <p:nvSpPr>
-          <p:cNvPr id="52" name="Rectangle 51">
+          <p:cNvPr id="125" name="Rectangle 124">
             <a:extLst>
               <a:ext uri="{FF2B5EF4-FFF2-40B4-BE49-F238E27FC236}">
                 <a16:creationId xmlns:a16="http://schemas.microsoft.com/office/drawing/2014/main" id="{2E5BBF82-039A-99DB-1291-B984EF2722D0}"/>
@@ -11139,7 +11883,7 @@
         </p:nvSpPr>
         <p:spPr>
           <a:xfrm>
-            <a:off x="3941617" y="4482202"/>
+            <a:off x="3941617" y="5462509"/>
             <a:ext cx="72000" cy="216000"/>
           </a:xfrm>
           <a:prstGeom prst="rect">
@@ -11183,7 +11927,7 @@
       </p:sp>
       <p:sp>
         <p:nvSpPr>
-          <p:cNvPr id="53" name="Rectangle 52">
+          <p:cNvPr id="126" name="Rectangle 125">
             <a:extLst>
               <a:ext uri="{FF2B5EF4-FFF2-40B4-BE49-F238E27FC236}">
                 <a16:creationId xmlns:a16="http://schemas.microsoft.com/office/drawing/2014/main" id="{F1B50902-05E1-2214-2377-74DDCE112879}"/>
@@ -11195,7 +11939,7 @@
         </p:nvSpPr>
         <p:spPr>
           <a:xfrm>
-            <a:off x="3941617" y="4734202"/>
+            <a:off x="3941617" y="5714509"/>
             <a:ext cx="72000" cy="216000"/>
           </a:xfrm>
           <a:prstGeom prst="rect">
@@ -11233,6 +11977,384 @@
               <a:solidFill>
                 <a:srgbClr val="222222"/>
               </a:solidFill>
+            </a:endParaRPr>
+          </a:p>
+        </p:txBody>
+      </p:sp>
+      <p:sp>
+        <p:nvSpPr>
+          <p:cNvPr id="127" name="Rectangle 126">
+            <a:extLst>
+              <a:ext uri="{FF2B5EF4-FFF2-40B4-BE49-F238E27FC236}">
+                <a16:creationId xmlns:a16="http://schemas.microsoft.com/office/drawing/2014/main" id="{B136B25A-C0BC-62CA-3885-7F8305C6C703}"/>
+              </a:ext>
+            </a:extLst>
+          </p:cNvPr>
+          <p:cNvSpPr/>
+          <p:nvPr/>
+        </p:nvSpPr>
+        <p:spPr>
+          <a:xfrm>
+            <a:off x="225304" y="1922283"/>
+            <a:ext cx="1260000" cy="1260000"/>
+          </a:xfrm>
+          <a:prstGeom prst="rect">
+            <a:avLst/>
+          </a:prstGeom>
+          <a:noFill/>
+          <a:ln w="28575">
+            <a:solidFill>
+              <a:srgbClr val="FF595E"/>
+            </a:solidFill>
+            <a:prstDash val="solid"/>
+          </a:ln>
+        </p:spPr>
+        <p:style>
+          <a:lnRef idx="2">
+            <a:schemeClr val="accent1">
+              <a:shade val="15000"/>
+            </a:schemeClr>
+          </a:lnRef>
+          <a:fillRef idx="1">
+            <a:schemeClr val="accent1"/>
+          </a:fillRef>
+          <a:effectRef idx="0">
+            <a:schemeClr val="accent1"/>
+          </a:effectRef>
+          <a:fontRef idx="minor">
+            <a:schemeClr val="lt1"/>
+          </a:fontRef>
+        </p:style>
+        <p:txBody>
+          <a:bodyPr rtlCol="0" anchor="ctr"/>
+          <a:lstStyle/>
+          <a:p>
+            <a:pPr algn="ctr"/>
+            <a:endParaRPr lang="en-GB" sz="1000">
+              <a:solidFill>
+                <a:schemeClr val="tx1">
+                  <a:lumMod val="75000"/>
+                  <a:lumOff val="25000"/>
+                </a:schemeClr>
+              </a:solidFill>
+              <a:latin typeface="Calibri Light" panose="020F0302020204030204" pitchFamily="34" charset="0"/>
+              <a:cs typeface="Calibri Light" panose="020F0302020204030204" pitchFamily="34" charset="0"/>
+            </a:endParaRPr>
+          </a:p>
+        </p:txBody>
+      </p:sp>
+      <p:sp>
+        <p:nvSpPr>
+          <p:cNvPr id="128" name="Rectangle 127">
+            <a:extLst>
+              <a:ext uri="{FF2B5EF4-FFF2-40B4-BE49-F238E27FC236}">
+                <a16:creationId xmlns:a16="http://schemas.microsoft.com/office/drawing/2014/main" id="{D0E6682D-921D-2405-877D-EC86849DB85A}"/>
+              </a:ext>
+            </a:extLst>
+          </p:cNvPr>
+          <p:cNvSpPr/>
+          <p:nvPr/>
+        </p:nvSpPr>
+        <p:spPr>
+          <a:xfrm>
+            <a:off x="1538503" y="1922283"/>
+            <a:ext cx="1260000" cy="1260000"/>
+          </a:xfrm>
+          <a:prstGeom prst="rect">
+            <a:avLst/>
+          </a:prstGeom>
+          <a:noFill/>
+          <a:ln w="28575">
+            <a:solidFill>
+              <a:srgbClr val="E68301"/>
+            </a:solidFill>
+            <a:prstDash val="solid"/>
+          </a:ln>
+        </p:spPr>
+        <p:style>
+          <a:lnRef idx="2">
+            <a:schemeClr val="accent1">
+              <a:shade val="15000"/>
+            </a:schemeClr>
+          </a:lnRef>
+          <a:fillRef idx="1">
+            <a:schemeClr val="accent1"/>
+          </a:fillRef>
+          <a:effectRef idx="0">
+            <a:schemeClr val="accent1"/>
+          </a:effectRef>
+          <a:fontRef idx="minor">
+            <a:schemeClr val="lt1"/>
+          </a:fontRef>
+        </p:style>
+        <p:txBody>
+          <a:bodyPr rtlCol="0" anchor="ctr"/>
+          <a:lstStyle/>
+          <a:p>
+            <a:pPr algn="ctr"/>
+            <a:endParaRPr lang="en-GB" sz="1000">
+              <a:solidFill>
+                <a:schemeClr val="tx1">
+                  <a:lumMod val="75000"/>
+                  <a:lumOff val="25000"/>
+                </a:schemeClr>
+              </a:solidFill>
+              <a:latin typeface="Calibri Light" panose="020F0302020204030204" pitchFamily="34" charset="0"/>
+              <a:cs typeface="Calibri Light" panose="020F0302020204030204" pitchFamily="34" charset="0"/>
+            </a:endParaRPr>
+          </a:p>
+        </p:txBody>
+      </p:sp>
+      <p:sp>
+        <p:nvSpPr>
+          <p:cNvPr id="129" name="Rectangle 128">
+            <a:extLst>
+              <a:ext uri="{FF2B5EF4-FFF2-40B4-BE49-F238E27FC236}">
+                <a16:creationId xmlns:a16="http://schemas.microsoft.com/office/drawing/2014/main" id="{DD14B712-37F6-3D77-C944-61E7F4FCA0AC}"/>
+              </a:ext>
+            </a:extLst>
+          </p:cNvPr>
+          <p:cNvSpPr/>
+          <p:nvPr/>
+        </p:nvSpPr>
+        <p:spPr>
+          <a:xfrm>
+            <a:off x="2854142" y="1922283"/>
+            <a:ext cx="1260000" cy="1260000"/>
+          </a:xfrm>
+          <a:prstGeom prst="rect">
+            <a:avLst/>
+          </a:prstGeom>
+          <a:noFill/>
+          <a:ln w="28575">
+            <a:solidFill>
+              <a:srgbClr val="3F37C9"/>
+            </a:solidFill>
+            <a:prstDash val="solid"/>
+          </a:ln>
+        </p:spPr>
+        <p:style>
+          <a:lnRef idx="2">
+            <a:schemeClr val="accent1">
+              <a:shade val="15000"/>
+            </a:schemeClr>
+          </a:lnRef>
+          <a:fillRef idx="1">
+            <a:schemeClr val="accent1"/>
+          </a:fillRef>
+          <a:effectRef idx="0">
+            <a:schemeClr val="accent1"/>
+          </a:effectRef>
+          <a:fontRef idx="minor">
+            <a:schemeClr val="lt1"/>
+          </a:fontRef>
+        </p:style>
+        <p:txBody>
+          <a:bodyPr rtlCol="0" anchor="ctr"/>
+          <a:lstStyle/>
+          <a:p>
+            <a:pPr algn="ctr"/>
+            <a:endParaRPr lang="en-GB" sz="1000">
+              <a:solidFill>
+                <a:schemeClr val="tx1">
+                  <a:lumMod val="75000"/>
+                  <a:lumOff val="25000"/>
+                </a:schemeClr>
+              </a:solidFill>
+              <a:latin typeface="Calibri Light" panose="020F0302020204030204" pitchFamily="34" charset="0"/>
+              <a:cs typeface="Calibri Light" panose="020F0302020204030204" pitchFamily="34" charset="0"/>
+            </a:endParaRPr>
+          </a:p>
+        </p:txBody>
+      </p:sp>
+      <p:sp>
+        <p:nvSpPr>
+          <p:cNvPr id="130" name="TextBox 129">
+            <a:extLst>
+              <a:ext uri="{FF2B5EF4-FFF2-40B4-BE49-F238E27FC236}">
+                <a16:creationId xmlns:a16="http://schemas.microsoft.com/office/drawing/2014/main" id="{0C95B8AD-5ACB-2E85-B61D-1A867AAB576F}"/>
+              </a:ext>
+            </a:extLst>
+          </p:cNvPr>
+          <p:cNvSpPr txBox="1"/>
+          <p:nvPr/>
+        </p:nvSpPr>
+        <p:spPr>
+          <a:xfrm>
+            <a:off x="-40168" y="1957430"/>
+            <a:ext cx="307777" cy="1239149"/>
+          </a:xfrm>
+          <a:prstGeom prst="rect">
+            <a:avLst/>
+          </a:prstGeom>
+          <a:noFill/>
+          <a:ln w="6350">
+            <a:noFill/>
+          </a:ln>
+        </p:spPr>
+        <p:txBody>
+          <a:bodyPr vert="vert270" wrap="square" rtlCol="0">
+            <a:spAutoFit/>
+          </a:bodyPr>
+          <a:lstStyle/>
+          <a:p>
+            <a:pPr algn="ctr"/>
+            <a:r>
+              <a:rPr lang="en-GB" sz="800" b="1" dirty="0">
+                <a:solidFill>
+                  <a:srgbClr val="222222"/>
+                </a:solidFill>
+                <a:latin typeface="Calibri" panose="020F0502020204030204" pitchFamily="34" charset="0"/>
+                <a:cs typeface="Calibri" panose="020F0502020204030204" pitchFamily="34" charset="0"/>
+              </a:rPr>
+              <a:t>RESEARCH OBJECTIVES</a:t>
+            </a:r>
+            <a:endParaRPr lang="en-GB" sz="800" dirty="0">
+              <a:solidFill>
+                <a:srgbClr val="222222"/>
+              </a:solidFill>
+              <a:latin typeface="Calibri Light" panose="020F0302020204030204" pitchFamily="34" charset="0"/>
+              <a:cs typeface="Calibri Light" panose="020F0302020204030204" pitchFamily="34" charset="0"/>
+            </a:endParaRPr>
+          </a:p>
+        </p:txBody>
+      </p:sp>
+      <p:sp>
+        <p:nvSpPr>
+          <p:cNvPr id="131" name="TextBox 130">
+            <a:extLst>
+              <a:ext uri="{FF2B5EF4-FFF2-40B4-BE49-F238E27FC236}">
+                <a16:creationId xmlns:a16="http://schemas.microsoft.com/office/drawing/2014/main" id="{D94A1280-B2A5-2EF1-0443-7D818E56F280}"/>
+              </a:ext>
+            </a:extLst>
+          </p:cNvPr>
+          <p:cNvSpPr txBox="1"/>
+          <p:nvPr/>
+        </p:nvSpPr>
+        <p:spPr>
+          <a:xfrm>
+            <a:off x="207128" y="1093686"/>
+            <a:ext cx="1296352" cy="707886"/>
+          </a:xfrm>
+          <a:prstGeom prst="rect">
+            <a:avLst/>
+          </a:prstGeom>
+          <a:noFill/>
+        </p:spPr>
+        <p:txBody>
+          <a:bodyPr wrap="square" rtlCol="0">
+            <a:spAutoFit/>
+          </a:bodyPr>
+          <a:lstStyle/>
+          <a:p>
+            <a:pPr algn="ctr"/>
+            <a:r>
+              <a:rPr lang="en-GB" sz="800" dirty="0">
+                <a:solidFill>
+                  <a:srgbClr val="FF595E"/>
+                </a:solidFill>
+                <a:latin typeface="Calibri" panose="020F0502020204030204" pitchFamily="34" charset="0"/>
+                <a:cs typeface="Calibri" panose="020F0502020204030204" pitchFamily="34" charset="0"/>
+              </a:rPr>
+              <a:t>Can post-processed global NWP rainfall forecasts successfully identify areas at risk of flash floods up to medium-range lead times? </a:t>
+            </a:r>
+          </a:p>
+        </p:txBody>
+      </p:sp>
+      <p:sp>
+        <p:nvSpPr>
+          <p:cNvPr id="132" name="TextBox 131">
+            <a:extLst>
+              <a:ext uri="{FF2B5EF4-FFF2-40B4-BE49-F238E27FC236}">
+                <a16:creationId xmlns:a16="http://schemas.microsoft.com/office/drawing/2014/main" id="{59155F2D-DBF5-0F9C-EC3B-2ACFE1F662A9}"/>
+              </a:ext>
+            </a:extLst>
+          </p:cNvPr>
+          <p:cNvSpPr txBox="1"/>
+          <p:nvPr/>
+        </p:nvSpPr>
+        <p:spPr>
+          <a:xfrm>
+            <a:off x="1520327" y="970576"/>
+            <a:ext cx="1296352" cy="954107"/>
+          </a:xfrm>
+          <a:prstGeom prst="rect">
+            <a:avLst/>
+          </a:prstGeom>
+          <a:noFill/>
+        </p:spPr>
+        <p:txBody>
+          <a:bodyPr wrap="square" rtlCol="0">
+            <a:spAutoFit/>
+          </a:bodyPr>
+          <a:lstStyle/>
+          <a:p>
+            <a:pPr algn="ctr"/>
+            <a:r>
+              <a:rPr lang="en-US" sz="800" dirty="0">
+                <a:solidFill>
+                  <a:srgbClr val="E68301"/>
+                </a:solidFill>
+                <a:latin typeface="Calibri" panose="020F0502020204030204" pitchFamily="34" charset="0"/>
+                <a:cs typeface="Calibri" panose="020F0502020204030204" pitchFamily="34" charset="0"/>
+              </a:rPr>
+              <a:t>Are medium-range data-driven hydro-met predictions of areas at risk of flash floods feasible with global reanalysis, forecasts, and impact flash flood reports?</a:t>
+            </a:r>
+            <a:endParaRPr lang="en-GB" sz="800" dirty="0">
+              <a:solidFill>
+                <a:srgbClr val="E68301"/>
+              </a:solidFill>
+              <a:latin typeface="Calibri" panose="020F0502020204030204" pitchFamily="34" charset="0"/>
+              <a:cs typeface="Calibri" panose="020F0502020204030204" pitchFamily="34" charset="0"/>
+            </a:endParaRPr>
+          </a:p>
+        </p:txBody>
+      </p:sp>
+      <p:sp>
+        <p:nvSpPr>
+          <p:cNvPr id="133" name="TextBox 132">
+            <a:extLst>
+              <a:ext uri="{FF2B5EF4-FFF2-40B4-BE49-F238E27FC236}">
+                <a16:creationId xmlns:a16="http://schemas.microsoft.com/office/drawing/2014/main" id="{750E6499-AEDD-05B1-0F02-F5A5C33BAA43}"/>
+              </a:ext>
+            </a:extLst>
+          </p:cNvPr>
+          <p:cNvSpPr txBox="1"/>
+          <p:nvPr/>
+        </p:nvSpPr>
+        <p:spPr>
+          <a:xfrm>
+            <a:off x="2838987" y="970576"/>
+            <a:ext cx="1290311" cy="954107"/>
+          </a:xfrm>
+          <a:prstGeom prst="rect">
+            <a:avLst/>
+          </a:prstGeom>
+          <a:noFill/>
+        </p:spPr>
+        <p:txBody>
+          <a:bodyPr wrap="square" rtlCol="0">
+            <a:spAutoFit/>
+          </a:bodyPr>
+          <a:lstStyle/>
+          <a:p>
+            <a:pPr algn="ctr"/>
+            <a:r>
+              <a:rPr lang="en-US" sz="800" dirty="0">
+                <a:solidFill>
+                  <a:srgbClr val="3F37C9"/>
+                </a:solidFill>
+                <a:latin typeface="Calibri" panose="020F0502020204030204" pitchFamily="34" charset="0"/>
+                <a:cs typeface="Calibri" panose="020F0502020204030204" pitchFamily="34" charset="0"/>
+              </a:rPr>
+              <a:t>How does coverage-density trade-off influence training data strategies to develop predictions of areas at risk of flash flood over a continuous global domain?</a:t>
+            </a:r>
+            <a:endParaRPr lang="en-GB" sz="800" dirty="0">
+              <a:solidFill>
+                <a:srgbClr val="3F37C9"/>
+              </a:solidFill>
+              <a:latin typeface="Calibri" panose="020F0502020204030204" pitchFamily="34" charset="0"/>
+              <a:cs typeface="Calibri" panose="020F0502020204030204" pitchFamily="34" charset="0"/>
             </a:endParaRPr>
           </a:p>
         </p:txBody>

</xml_diff>

<commit_message>
Improved main infographic in chapter 3
</commit_message>
<xml_diff>
--- a/chapter_03/figures/integrated_experimental_strategy.pptx
+++ b/chapter_03/figures/integrated_experimental_strategy.pptx
@@ -128,7 +128,7 @@
   <pc:docChgLst>
     <pc:chgData name="Fatima Pillosu" userId="a6295d4dc9e22643" providerId="LiveId" clId="{F0B9C950-5C19-45BA-B39E-FADB59417D97}"/>
     <pc:docChg chg="undo redo custSel addSld delSld modSld">
-      <pc:chgData name="Fatima Pillosu" userId="a6295d4dc9e22643" providerId="LiveId" clId="{F0B9C950-5C19-45BA-B39E-FADB59417D97}" dt="2025-06-26T04:32:42.588" v="3764"/>
+      <pc:chgData name="Fatima Pillosu" userId="a6295d4dc9e22643" providerId="LiveId" clId="{F0B9C950-5C19-45BA-B39E-FADB59417D97}" dt="2025-06-26T04:53:40.445" v="3778" actId="20577"/>
       <pc:docMkLst>
         <pc:docMk/>
       </pc:docMkLst>
@@ -1924,7 +1924,7 @@
         </pc:spChg>
       </pc:sldChg>
       <pc:sldChg chg="addSp delSp modSp new mod setBg">
-        <pc:chgData name="Fatima Pillosu" userId="a6295d4dc9e22643" providerId="LiveId" clId="{F0B9C950-5C19-45BA-B39E-FADB59417D97}" dt="2025-06-26T04:32:42.588" v="3764"/>
+        <pc:chgData name="Fatima Pillosu" userId="a6295d4dc9e22643" providerId="LiveId" clId="{F0B9C950-5C19-45BA-B39E-FADB59417D97}" dt="2025-06-26T04:53:40.445" v="3778" actId="20577"/>
         <pc:sldMkLst>
           <pc:docMk/>
           <pc:sldMk cId="4289110639" sldId="257"/>
@@ -3266,7 +3266,7 @@
           </ac:spMkLst>
         </pc:spChg>
         <pc:spChg chg="add mod">
-          <ac:chgData name="Fatima Pillosu" userId="a6295d4dc9e22643" providerId="LiveId" clId="{F0B9C950-5C19-45BA-B39E-FADB59417D97}" dt="2025-06-26T04:32:42.588" v="3764"/>
+          <ac:chgData name="Fatima Pillosu" userId="a6295d4dc9e22643" providerId="LiveId" clId="{F0B9C950-5C19-45BA-B39E-FADB59417D97}" dt="2025-06-26T04:53:40.445" v="3778" actId="20577"/>
           <ac:spMkLst>
             <pc:docMk/>
             <pc:sldMk cId="4289110639" sldId="257"/>
@@ -11064,7 +11064,7 @@
                 <a:latin typeface="Calibri Light" panose="020F0302020204030204" pitchFamily="34" charset="0"/>
                 <a:cs typeface="Calibri Light" panose="020F0302020204030204" pitchFamily="34" charset="0"/>
               </a:rPr>
-              <a:t> underlying the research objectives presented in each main analysis chapter</a:t>
+              <a:t> underlying the research questions and objectives presented in each main analysis chapter</a:t>
             </a:r>
             <a:endParaRPr lang="en-GB" sz="1000" dirty="0">
               <a:solidFill>

</xml_diff>